<commit_message>
Update mental map, and lesson content
</commit_message>
<xml_diff>
--- a/data-subsetting.pptx
+++ b/data-subsetting.pptx
@@ -5,7 +5,7 @@
     <p:sldMasterId id="2147483660" r:id="rId1"/>
   </p:sldMasterIdLst>
   <p:notesMasterIdLst>
-    <p:notesMasterId r:id="rId11"/>
+    <p:notesMasterId r:id="rId12"/>
   </p:notesMasterIdLst>
   <p:sldIdLst>
     <p:sldId id="256" r:id="rId2"/>
@@ -17,6 +17,7 @@
     <p:sldId id="261" r:id="rId8"/>
     <p:sldId id="262" r:id="rId9"/>
     <p:sldId id="263" r:id="rId10"/>
+    <p:sldId id="265" r:id="rId11"/>
   </p:sldIdLst>
   <p:sldSz cx="12192000" cy="6858000"/>
   <p:notesSz cx="6858000" cy="9144000"/>
@@ -115,6 +116,14 @@
       </a:defRPr>
     </a:lvl9pPr>
   </p:defaultTextStyle>
+  <p:extLst>
+    <p:ext uri="{EFAFB233-063F-42B5-8137-9DF3F51BA10A}">
+      <p15:sldGuideLst xmlns:p15="http://schemas.microsoft.com/office/powerpoint/2012/main"/>
+    </p:ext>
+    <p:ext uri="{2D200454-40CA-4A62-9FC3-DE9A4176ACB9}">
+      <p15:notesGuideLst xmlns:p15="http://schemas.microsoft.com/office/powerpoint/2012/main"/>
+    </p:ext>
+  </p:extLst>
 </p:presentation>
 </file>
 
@@ -200,7 +209,7 @@
           <a:p>
             <a:fld id="{8BBA90DE-0CBD-471C-9481-850953A91599}" type="datetimeFigureOut">
               <a:rPr lang="en-US" smtClean="0"/>
-              <a:t>2020-03-29</a:t>
+              <a:t>2020-03-30</a:t>
             </a:fld>
             <a:endParaRPr lang="en-US"/>
           </a:p>
@@ -754,9 +763,12 @@
             </a:r>
             <a:r>
               <a:rPr lang="en-US" b="1" baseline="0" dirty="0" smtClean="0"/>
-              <a:t>need to get to just the data you’re interested in, and fast!</a:t>
-            </a:r>
-            <a:endParaRPr lang="en-US" b="1" dirty="0"/>
+              <a:t>need to get to just the data you’re interested in, </a:t>
+            </a:r>
+            <a:r>
+              <a:rPr lang="en-US" b="1" baseline="0" dirty="0" smtClean="0"/>
+              <a:t>(and fast)!</a:t>
+            </a:r>
           </a:p>
         </p:txBody>
       </p:sp>
@@ -874,12 +886,39 @@
             </a:pPr>
             <a:r>
               <a:rPr lang="en-US" b="0" dirty="0" smtClean="0"/>
-              <a:t>Will require some of your effort, but that’s why you’re in </a:t>
-            </a:r>
-            <a:r>
-              <a:rPr lang="en-US" b="0" smtClean="0"/>
-              <a:t>this class!</a:t>
-            </a:r>
+              <a:t>Will require some of your effort, but that’s why you’re in this class</a:t>
+            </a:r>
+            <a:r>
+              <a:rPr lang="en-US" b="0" dirty="0" smtClean="0"/>
+              <a:t>!</a:t>
+            </a:r>
+          </a:p>
+          <a:p>
+            <a:pPr marL="628650" lvl="1" indent="-171450">
+              <a:buFont typeface="Arial" panose="020B0604020202020204" pitchFamily="34" charset="0"/>
+              <a:buChar char="•"/>
+            </a:pPr>
+            <a:r>
+              <a:rPr lang="en-US" b="1" baseline="0" dirty="0" smtClean="0"/>
+              <a:t>You need to subset</a:t>
+            </a:r>
+          </a:p>
+          <a:p>
+            <a:pPr marL="628650" lvl="1" indent="-171450">
+              <a:buFont typeface="Arial" panose="020B0604020202020204" pitchFamily="34" charset="0"/>
+              <a:buChar char="•"/>
+            </a:pPr>
+            <a:r>
+              <a:rPr lang="en-US" b="1" baseline="0" dirty="0" smtClean="0"/>
+              <a:t>This is one of the most common, and therefore most useful data transformation steps</a:t>
+            </a:r>
+            <a:endParaRPr lang="en-US" b="1" dirty="0" smtClean="0"/>
+          </a:p>
+          <a:p>
+            <a:pPr marL="0" indent="0">
+              <a:buFont typeface="+mj-lt"/>
+              <a:buNone/>
+            </a:pPr>
             <a:endParaRPr lang="en-US" b="0" dirty="0"/>
           </a:p>
         </p:txBody>
@@ -1307,8 +1346,23 @@
             </a:pPr>
             <a:r>
               <a:rPr lang="en-US" b="0" i="0" baseline="0" dirty="0" smtClean="0"/>
-              <a:t>And we get the same function sig. we had before: name, data, subset</a:t>
-            </a:r>
+              <a:t>And we get the same function sig. we had before: name, data, </a:t>
+            </a:r>
+            <a:r>
+              <a:rPr lang="en-US" b="0" i="0" baseline="0" dirty="0" smtClean="0"/>
+              <a:t>subset</a:t>
+            </a:r>
+          </a:p>
+          <a:p>
+            <a:pPr marL="171450" lvl="0" indent="-171450">
+              <a:buFont typeface="Arial" panose="020B0604020202020204" pitchFamily="34" charset="0"/>
+              <a:buChar char="•"/>
+            </a:pPr>
+            <a:r>
+              <a:rPr lang="en-US" b="0" i="0" baseline="0" dirty="0" smtClean="0"/>
+              <a:t>Let’s see a couple of quick examples</a:t>
+            </a:r>
+            <a:endParaRPr lang="en-US" b="0" i="0" baseline="0" dirty="0" smtClean="0"/>
           </a:p>
         </p:txBody>
       </p:sp>
@@ -1519,15 +1573,35 @@
             </a:pPr>
             <a:r>
               <a:rPr lang="en-US" dirty="0" smtClean="0"/>
-              <a:t>The first function we’re going to use is </a:t>
+              <a:t>The </a:t>
+            </a:r>
+            <a:r>
+              <a:rPr lang="en-US" dirty="0" smtClean="0"/>
+              <a:t>other </a:t>
+            </a:r>
+            <a:r>
+              <a:rPr lang="en-US" dirty="0" smtClean="0"/>
+              <a:t>function we’re going to use is </a:t>
             </a:r>
             <a:r>
               <a:rPr lang="en-US" i="1" dirty="0" smtClean="0"/>
-              <a:t>select</a:t>
+              <a:t>filter</a:t>
             </a:r>
             <a:r>
               <a:rPr lang="en-US" i="0" dirty="0" smtClean="0"/>
-              <a:t> – used to get just the columns we</a:t>
+              <a:t> </a:t>
+            </a:r>
+            <a:r>
+              <a:rPr lang="en-US" i="0" dirty="0" smtClean="0"/>
+              <a:t>– used to get just the </a:t>
+            </a:r>
+            <a:r>
+              <a:rPr lang="en-US" i="0" dirty="0" smtClean="0"/>
+              <a:t>rows </a:t>
+            </a:r>
+            <a:r>
+              <a:rPr lang="en-US" i="0" dirty="0" smtClean="0"/>
+              <a:t>we</a:t>
             </a:r>
             <a:r>
               <a:rPr lang="en-US" i="0" baseline="0" dirty="0" smtClean="0"/>
@@ -1541,7 +1615,30 @@
             </a:pPr>
             <a:r>
               <a:rPr lang="en-US" i="0" baseline="0" dirty="0" smtClean="0"/>
-              <a:t>What do we think goes in the gap, remembering the mental model of:</a:t>
+              <a:t>What do we think goes in the gap, remembering the mental model </a:t>
+            </a:r>
+            <a:r>
+              <a:rPr lang="en-US" i="0" baseline="0" dirty="0" smtClean="0"/>
+              <a:t>of name, data, subset?</a:t>
+            </a:r>
+            <a:endParaRPr lang="en-US" i="0" baseline="0" dirty="0" smtClean="0"/>
+          </a:p>
+          <a:p>
+            <a:pPr marL="171450" lvl="0" indent="-171450">
+              <a:buFont typeface="Arial" panose="020B0604020202020204" pitchFamily="34" charset="0"/>
+              <a:buChar char="•"/>
+            </a:pPr>
+            <a:r>
+              <a:rPr lang="en-US" i="0" baseline="0" dirty="0" smtClean="0"/>
+              <a:t>The </a:t>
+            </a:r>
+            <a:r>
+              <a:rPr lang="en-US" i="0" baseline="0" dirty="0" smtClean="0"/>
+              <a:t>answer is a </a:t>
+            </a:r>
+            <a:r>
+              <a:rPr lang="en-US" i="0" baseline="0" dirty="0" smtClean="0"/>
+              <a:t>condition – use &gt;, &lt;, ==, &gt;=, &lt;=, etc.</a:t>
             </a:r>
           </a:p>
           <a:p>
@@ -1550,30 +1647,18 @@
               <a:buChar char="•"/>
             </a:pPr>
             <a:r>
-              <a:rPr lang="en-US" i="0" baseline="0" dirty="0" err="1" smtClean="0"/>
-              <a:t>Function_name</a:t>
-            </a:r>
-            <a:endParaRPr lang="en-US" i="0" baseline="0" dirty="0" smtClean="0"/>
-          </a:p>
-          <a:p>
-            <a:pPr marL="628650" lvl="1" indent="-171450">
-              <a:buFont typeface="Arial" panose="020B0604020202020204" pitchFamily="34" charset="0"/>
-              <a:buChar char="•"/>
-            </a:pPr>
-            <a:r>
-              <a:rPr lang="en-US" i="0" baseline="0" dirty="0" smtClean="0"/>
-              <a:t>Data to subset (full data)</a:t>
-            </a:r>
-          </a:p>
-          <a:p>
-            <a:pPr marL="628650" lvl="1" indent="-171450">
-              <a:buFont typeface="Arial" panose="020B0604020202020204" pitchFamily="34" charset="0"/>
-              <a:buChar char="•"/>
-            </a:pPr>
-            <a:r>
-              <a:rPr lang="en-US" i="0" baseline="0" dirty="0" smtClean="0"/>
-              <a:t>The subset we want</a:t>
-            </a:r>
+              <a:rPr lang="en-US" b="0" i="0" baseline="0" dirty="0" smtClean="0"/>
+              <a:t>But </a:t>
+            </a:r>
+            <a:r>
+              <a:rPr lang="en-US" b="0" i="0" baseline="0" dirty="0" smtClean="0"/>
+              <a:t>what if we want more than </a:t>
+            </a:r>
+            <a:r>
+              <a:rPr lang="en-US" b="0" i="0" baseline="0" dirty="0" smtClean="0"/>
+              <a:t>1?</a:t>
+            </a:r>
+            <a:endParaRPr lang="en-US" b="0" i="0" baseline="0" dirty="0" smtClean="0"/>
           </a:p>
           <a:p>
             <a:pPr marL="171450" lvl="0" indent="-171450">
@@ -1581,34 +1666,8 @@
               <a:buChar char="•"/>
             </a:pPr>
             <a:r>
-              <a:rPr lang="en-US" i="0" baseline="0" dirty="0" smtClean="0"/>
-              <a:t>The answer is a column </a:t>
-            </a:r>
-            <a:r>
-              <a:rPr lang="en-US" b="1" i="1" baseline="0" dirty="0" smtClean="0"/>
-              <a:t>name </a:t>
-            </a:r>
-            <a:r>
               <a:rPr lang="en-US" b="0" i="0" baseline="0" dirty="0" smtClean="0"/>
-              <a:t>(here we imagine the columns are called col1, col2, col3, </a:t>
-            </a:r>
-            <a:r>
-              <a:rPr lang="en-US" b="0" i="0" baseline="0" dirty="0" err="1" smtClean="0"/>
-              <a:t>etc</a:t>
-            </a:r>
-            <a:r>
-              <a:rPr lang="en-US" b="0" i="0" baseline="0" dirty="0" smtClean="0"/>
-              <a:t>)</a:t>
-            </a:r>
-          </a:p>
-          <a:p>
-            <a:pPr marL="628650" lvl="1" indent="-171450">
-              <a:buFont typeface="Arial" panose="020B0604020202020204" pitchFamily="34" charset="0"/>
-              <a:buChar char="•"/>
-            </a:pPr>
-            <a:r>
-              <a:rPr lang="en-US" b="0" i="0" baseline="0" dirty="0" smtClean="0"/>
-              <a:t>But what if we want more than 1 column?</a:t>
+              <a:t>We just add them, separated by columns</a:t>
             </a:r>
           </a:p>
           <a:p>
@@ -1618,7 +1677,15 @@
             </a:pPr>
             <a:r>
               <a:rPr lang="en-US" b="0" i="0" baseline="0" dirty="0" smtClean="0"/>
-              <a:t>We just add them, separated by columns</a:t>
+              <a:t>Until we have (potentially) multiple </a:t>
+            </a:r>
+            <a:r>
+              <a:rPr lang="en-US" b="0" i="0" baseline="0" dirty="0" smtClean="0"/>
+              <a:t>conditions, </a:t>
+            </a:r>
+            <a:r>
+              <a:rPr lang="en-US" b="0" i="0" baseline="0" dirty="0" smtClean="0"/>
+              <a:t>comma-separated</a:t>
             </a:r>
           </a:p>
           <a:p>
@@ -1628,7 +1695,34 @@
             </a:pPr>
             <a:r>
               <a:rPr lang="en-US" b="0" i="0" baseline="0" dirty="0" smtClean="0"/>
-              <a:t>Until we have (potentially) multiple columns, comma-separated</a:t>
+              <a:t>And we get the same function sig. we had before: name, data, </a:t>
+            </a:r>
+            <a:r>
+              <a:rPr lang="en-US" b="0" i="0" baseline="0" dirty="0" smtClean="0"/>
+              <a:t>subset</a:t>
+            </a:r>
+          </a:p>
+          <a:p>
+            <a:pPr marL="171450" marR="0" lvl="0" indent="-171450" algn="l" defTabSz="914400" rtl="0" eaLnBrk="1" fontAlgn="auto" latinLnBrk="0" hangingPunct="1">
+              <a:lnSpc>
+                <a:spcPct val="100000"/>
+              </a:lnSpc>
+              <a:spcBef>
+                <a:spcPts val="0"/>
+              </a:spcBef>
+              <a:spcAft>
+                <a:spcPts val="0"/>
+              </a:spcAft>
+              <a:buClrTx/>
+              <a:buSzTx/>
+              <a:buFont typeface="Arial" panose="020B0604020202020204" pitchFamily="34" charset="0"/>
+              <a:buChar char="•"/>
+              <a:tabLst/>
+              <a:defRPr/>
+            </a:pPr>
+            <a:r>
+              <a:rPr lang="en-US" b="0" i="0" baseline="0" dirty="0" smtClean="0"/>
+              <a:t>Let’s see a couple of quick examples</a:t>
             </a:r>
           </a:p>
           <a:p>
@@ -1636,10 +1730,7 @@
               <a:buFont typeface="Arial" panose="020B0604020202020204" pitchFamily="34" charset="0"/>
               <a:buChar char="•"/>
             </a:pPr>
-            <a:r>
-              <a:rPr lang="en-US" b="0" i="0" baseline="0" dirty="0" smtClean="0"/>
-              <a:t>And we get the same function sig. we had before: name, data, subset</a:t>
-            </a:r>
+            <a:endParaRPr lang="en-US" b="0" i="0" baseline="0" dirty="0" smtClean="0"/>
           </a:p>
         </p:txBody>
       </p:sp>
@@ -1803,6 +1894,97 @@
     <p:extLst>
       <p:ext uri="{BB962C8B-B14F-4D97-AF65-F5344CB8AC3E}">
         <p14:creationId xmlns:p14="http://schemas.microsoft.com/office/powerpoint/2010/main" val="3205286388"/>
+      </p:ext>
+    </p:extLst>
+  </p:cSld>
+  <p:clrMapOvr>
+    <a:masterClrMapping/>
+  </p:clrMapOvr>
+</p:notes>
+</file>
+
+<file path=ppt/notesSlides/notesSlide9.xml><?xml version="1.0" encoding="utf-8"?>
+<p:notes xmlns:a="http://schemas.openxmlformats.org/drawingml/2006/main" xmlns:r="http://schemas.openxmlformats.org/officeDocument/2006/relationships" xmlns:p="http://schemas.openxmlformats.org/presentationml/2006/main">
+  <p:cSld>
+    <p:spTree>
+      <p:nvGrpSpPr>
+        <p:cNvPr id="1" name=""/>
+        <p:cNvGrpSpPr/>
+        <p:nvPr/>
+      </p:nvGrpSpPr>
+      <p:grpSpPr>
+        <a:xfrm>
+          <a:off x="0" y="0"/>
+          <a:ext cx="0" cy="0"/>
+          <a:chOff x="0" y="0"/>
+          <a:chExt cx="0" cy="0"/>
+        </a:xfrm>
+      </p:grpSpPr>
+      <p:sp>
+        <p:nvSpPr>
+          <p:cNvPr id="2" name="Slide Image Placeholder 1"/>
+          <p:cNvSpPr>
+            <a:spLocks noGrp="1" noRot="1" noChangeAspect="1"/>
+          </p:cNvSpPr>
+          <p:nvPr>
+            <p:ph type="sldImg"/>
+          </p:nvPr>
+        </p:nvSpPr>
+        <p:spPr/>
+      </p:sp>
+      <p:sp>
+        <p:nvSpPr>
+          <p:cNvPr id="3" name="Notes Placeholder 2"/>
+          <p:cNvSpPr>
+            <a:spLocks noGrp="1"/>
+          </p:cNvSpPr>
+          <p:nvPr>
+            <p:ph type="body" idx="1"/>
+          </p:nvPr>
+        </p:nvSpPr>
+        <p:spPr/>
+        <p:txBody>
+          <a:bodyPr/>
+          <a:lstStyle/>
+          <a:p>
+            <a:pPr marL="171450" indent="-171450">
+              <a:buFont typeface="Arial" panose="020B0604020202020204" pitchFamily="34" charset="0"/>
+              <a:buChar char="•"/>
+            </a:pPr>
+            <a:r>
+              <a:rPr lang="en-US" b="1" baseline="0" dirty="0" smtClean="0"/>
+              <a:t>So now you have learned how to </a:t>
+            </a:r>
+          </a:p>
+        </p:txBody>
+      </p:sp>
+      <p:sp>
+        <p:nvSpPr>
+          <p:cNvPr id="4" name="Slide Number Placeholder 3"/>
+          <p:cNvSpPr>
+            <a:spLocks noGrp="1"/>
+          </p:cNvSpPr>
+          <p:nvPr>
+            <p:ph type="sldNum" sz="quarter" idx="10"/>
+          </p:nvPr>
+        </p:nvSpPr>
+        <p:spPr/>
+        <p:txBody>
+          <a:bodyPr/>
+          <a:lstStyle/>
+          <a:p>
+            <a:fld id="{0CD4F51B-92DB-4235-BE1A-8989114F4168}" type="slidenum">
+              <a:rPr lang="en-US" smtClean="0"/>
+              <a:t>10</a:t>
+            </a:fld>
+            <a:endParaRPr lang="en-US"/>
+          </a:p>
+        </p:txBody>
+      </p:sp>
+    </p:spTree>
+    <p:extLst>
+      <p:ext uri="{BB962C8B-B14F-4D97-AF65-F5344CB8AC3E}">
+        <p14:creationId xmlns:p14="http://schemas.microsoft.com/office/powerpoint/2010/main" val="2615238242"/>
       </p:ext>
     </p:extLst>
   </p:cSld>
@@ -10605,7 +10787,7 @@
           <a:p>
             <a:fld id="{B5B8FAE6-331F-4C0E-8996-7471609552E9}" type="datetimeFigureOut">
               <a:rPr lang="en-US" smtClean="0"/>
-              <a:t>2020-03-29</a:t>
+              <a:t>2020-03-30</a:t>
             </a:fld>
             <a:endParaRPr lang="en-US"/>
           </a:p>
@@ -10690,6 +10872,35 @@
           </a:fontRef>
         </p:style>
       </p:cxnSp>
+      <p:sp>
+        <p:nvSpPr>
+          <p:cNvPr id="12" name="Rectangle 11"/>
+          <p:cNvSpPr/>
+          <p:nvPr userDrawn="1"/>
+        </p:nvSpPr>
+        <p:spPr>
+          <a:xfrm>
+            <a:off x="8406605" y="6423198"/>
+            <a:ext cx="3785395" cy="369332"/>
+          </a:xfrm>
+          <a:prstGeom prst="rect">
+            <a:avLst/>
+          </a:prstGeom>
+        </p:spPr>
+        <p:txBody>
+          <a:bodyPr wrap="none">
+            <a:spAutoFit/>
+          </a:bodyPr>
+          <a:lstStyle/>
+          <a:p>
+            <a:r>
+              <a:rPr lang="en-US" dirty="0" smtClean="0"/>
+              <a:t>https://rstudio.cloud/project/1088739</a:t>
+            </a:r>
+            <a:endParaRPr lang="en-US" dirty="0" smtClean="0"/>
+          </a:p>
+        </p:txBody>
+      </p:sp>
     </p:spTree>
     <p:extLst>
       <p:ext uri="{BB962C8B-B14F-4D97-AF65-F5344CB8AC3E}">
@@ -10700,6 +10911,13 @@
   <p:clrMapOvr>
     <a:masterClrMapping/>
   </p:clrMapOvr>
+  <p:timing>
+    <p:tnLst>
+      <p:par>
+        <p:cTn id="1" dur="indefinite" restart="never" nodeType="tmRoot"/>
+      </p:par>
+    </p:tnLst>
+  </p:timing>
 </p:sldLayout>
 </file>
 
@@ -10812,7 +11030,7 @@
           <a:p>
             <a:fld id="{B5B8FAE6-331F-4C0E-8996-7471609552E9}" type="datetimeFigureOut">
               <a:rPr lang="en-US" smtClean="0"/>
-              <a:t>2020-03-29</a:t>
+              <a:t>2020-03-30</a:t>
             </a:fld>
             <a:endParaRPr lang="en-US"/>
           </a:p>
@@ -10992,7 +11210,7 @@
           <a:p>
             <a:fld id="{B5B8FAE6-331F-4C0E-8996-7471609552E9}" type="datetimeFigureOut">
               <a:rPr lang="en-US" smtClean="0"/>
-              <a:t>2020-03-29</a:t>
+              <a:t>2020-03-30</a:t>
             </a:fld>
             <a:endParaRPr lang="en-US"/>
           </a:p>
@@ -11197,7 +11415,7 @@
           <a:p>
             <a:fld id="{B5B8FAE6-331F-4C0E-8996-7471609552E9}" type="datetimeFigureOut">
               <a:rPr lang="en-US" smtClean="0"/>
-              <a:t>2020-03-29</a:t>
+              <a:t>2020-03-30</a:t>
             </a:fld>
             <a:endParaRPr lang="en-US"/>
           </a:p>
@@ -11245,6 +11463,35 @@
           </a:p>
         </p:txBody>
       </p:sp>
+      <p:sp>
+        <p:nvSpPr>
+          <p:cNvPr id="7" name="Rectangle 6"/>
+          <p:cNvSpPr/>
+          <p:nvPr userDrawn="1"/>
+        </p:nvSpPr>
+        <p:spPr>
+          <a:xfrm>
+            <a:off x="8406605" y="6423198"/>
+            <a:ext cx="3785395" cy="369332"/>
+          </a:xfrm>
+          <a:prstGeom prst="rect">
+            <a:avLst/>
+          </a:prstGeom>
+        </p:spPr>
+        <p:txBody>
+          <a:bodyPr wrap="none">
+            <a:spAutoFit/>
+          </a:bodyPr>
+          <a:lstStyle/>
+          <a:p>
+            <a:r>
+              <a:rPr lang="en-US" dirty="0" smtClean="0"/>
+              <a:t>https://rstudio.cloud/project/1088739</a:t>
+            </a:r>
+            <a:endParaRPr lang="en-US" dirty="0" smtClean="0"/>
+          </a:p>
+        </p:txBody>
+      </p:sp>
     </p:spTree>
     <p:extLst>
       <p:ext uri="{BB962C8B-B14F-4D97-AF65-F5344CB8AC3E}">
@@ -11255,6 +11502,13 @@
   <p:clrMapOvr>
     <a:masterClrMapping/>
   </p:clrMapOvr>
+  <p:timing>
+    <p:tnLst>
+      <p:par>
+        <p:cTn id="1" dur="indefinite" restart="never" nodeType="tmRoot"/>
+      </p:par>
+    </p:tnLst>
+  </p:timing>
 </p:sldLayout>
 </file>
 
@@ -20095,7 +20349,7 @@
           <a:p>
             <a:fld id="{B5B8FAE6-331F-4C0E-8996-7471609552E9}" type="datetimeFigureOut">
               <a:rPr lang="en-US" smtClean="0"/>
-              <a:t>2020-03-29</a:t>
+              <a:t>2020-03-30</a:t>
             </a:fld>
             <a:endParaRPr lang="en-US"/>
           </a:p>
@@ -20190,6 +20444,13 @@
   <p:clrMapOvr>
     <a:masterClrMapping/>
   </p:clrMapOvr>
+  <p:timing>
+    <p:tnLst>
+      <p:par>
+        <p:cTn id="1" dur="indefinite" restart="never" nodeType="tmRoot"/>
+      </p:par>
+    </p:tnLst>
+  </p:timing>
 </p:sldLayout>
 </file>
 
@@ -20369,7 +20630,7 @@
           <a:p>
             <a:fld id="{B5B8FAE6-331F-4C0E-8996-7471609552E9}" type="datetimeFigureOut">
               <a:rPr lang="en-US" smtClean="0"/>
-              <a:t>2020-03-29</a:t>
+              <a:t>2020-03-30</a:t>
             </a:fld>
             <a:endParaRPr lang="en-US"/>
           </a:p>
@@ -20767,7 +21028,7 @@
           <a:p>
             <a:fld id="{B5B8FAE6-331F-4C0E-8996-7471609552E9}" type="datetimeFigureOut">
               <a:rPr lang="en-US" smtClean="0"/>
-              <a:t>2020-03-29</a:t>
+              <a:t>2020-03-30</a:t>
             </a:fld>
             <a:endParaRPr lang="en-US"/>
           </a:p>
@@ -20885,7 +21146,7 @@
           <a:p>
             <a:fld id="{B5B8FAE6-331F-4C0E-8996-7471609552E9}" type="datetimeFigureOut">
               <a:rPr lang="en-US" smtClean="0"/>
-              <a:t>2020-03-29</a:t>
+              <a:t>2020-03-30</a:t>
             </a:fld>
             <a:endParaRPr lang="en-US"/>
           </a:p>
@@ -20980,7 +21241,7 @@
           <a:p>
             <a:fld id="{B5B8FAE6-331F-4C0E-8996-7471609552E9}" type="datetimeFigureOut">
               <a:rPr lang="en-US" smtClean="0"/>
-              <a:t>2020-03-29</a:t>
+              <a:t>2020-03-30</a:t>
             </a:fld>
             <a:endParaRPr lang="en-US"/>
           </a:p>
@@ -21270,7 +21531,7 @@
           <a:p>
             <a:fld id="{B5B8FAE6-331F-4C0E-8996-7471609552E9}" type="datetimeFigureOut">
               <a:rPr lang="en-US" smtClean="0"/>
-              <a:t>2020-03-29</a:t>
+              <a:t>2020-03-30</a:t>
             </a:fld>
             <a:endParaRPr lang="en-US"/>
           </a:p>
@@ -21550,7 +21811,7 @@
           <a:p>
             <a:fld id="{B5B8FAE6-331F-4C0E-8996-7471609552E9}" type="datetimeFigureOut">
               <a:rPr lang="en-US" smtClean="0"/>
-              <a:t>2020-03-29</a:t>
+              <a:t>2020-03-30</a:t>
             </a:fld>
             <a:endParaRPr lang="en-US"/>
           </a:p>
@@ -21643,6 +21904,13 @@
   <p:clrMapOvr>
     <a:masterClrMapping/>
   </p:clrMapOvr>
+  <p:timing>
+    <p:tnLst>
+      <p:par>
+        <p:cTn id="1" dur="indefinite" restart="never" nodeType="tmRoot"/>
+      </p:par>
+    </p:tnLst>
+  </p:timing>
 </p:sldLayout>
 </file>
 
@@ -21728,35 +21996,35 @@
           <a:p>
             <a:pPr lvl="0"/>
             <a:r>
-              <a:rPr lang="en-US" smtClean="0"/>
+              <a:rPr lang="en-US" dirty="0" smtClean="0"/>
               <a:t>Click to edit Master text styles</a:t>
             </a:r>
           </a:p>
           <a:p>
             <a:pPr lvl="1"/>
             <a:r>
-              <a:rPr lang="en-US" smtClean="0"/>
+              <a:rPr lang="en-US" dirty="0" smtClean="0"/>
               <a:t>Second level</a:t>
             </a:r>
           </a:p>
           <a:p>
             <a:pPr lvl="2"/>
             <a:r>
-              <a:rPr lang="en-US" smtClean="0"/>
+              <a:rPr lang="en-US" dirty="0" smtClean="0"/>
               <a:t>Third level</a:t>
             </a:r>
           </a:p>
           <a:p>
             <a:pPr lvl="3"/>
             <a:r>
-              <a:rPr lang="en-US" smtClean="0"/>
+              <a:rPr lang="en-US" dirty="0" smtClean="0"/>
               <a:t>Fourth level</a:t>
             </a:r>
           </a:p>
           <a:p>
             <a:pPr lvl="4"/>
             <a:r>
-              <a:rPr lang="en-US" smtClean="0"/>
+              <a:rPr lang="en-US" dirty="0" smtClean="0"/>
               <a:t>Fifth level</a:t>
             </a:r>
             <a:endParaRPr lang="en-US" dirty="0"/>
@@ -21800,7 +22068,7 @@
           <a:p>
             <a:fld id="{B5B8FAE6-331F-4C0E-8996-7471609552E9}" type="datetimeFigureOut">
               <a:rPr lang="en-US" smtClean="0"/>
-              <a:t>2020-03-29</a:t>
+              <a:t>2020-03-30</a:t>
             </a:fld>
             <a:endParaRPr lang="en-US"/>
           </a:p>
@@ -21841,7 +22109,10 @@
             </a:lvl1pPr>
           </a:lstStyle>
           <a:p>
-            <a:endParaRPr lang="en-US"/>
+            <a:r>
+              <a:rPr lang="en-US" dirty="0" smtClean="0"/>
+              <a:t>https://rstudio.cloud/project/1088739</a:t>
+            </a:r>
           </a:p>
         </p:txBody>
       </p:sp>
@@ -21944,6 +22215,13 @@
     <p:sldLayoutId id="2147483670" r:id="rId10"/>
     <p:sldLayoutId id="2147483671" r:id="rId11"/>
   </p:sldLayoutIdLst>
+  <p:timing>
+    <p:tnLst>
+      <p:par>
+        <p:cTn id="1" dur="indefinite" restart="never" nodeType="tmRoot"/>
+      </p:par>
+    </p:tnLst>
+  </p:timing>
   <p:txStyles>
     <p:titleStyle>
       <a:lvl1pPr algn="l" defTabSz="914400" rtl="0" eaLnBrk="1" latinLnBrk="0" hangingPunct="1">
@@ -22353,7 +22631,15 @@
             <a:pPr algn="ctr"/>
             <a:r>
               <a:rPr lang="en-US" i="1" dirty="0" smtClean="0"/>
-              <a:t>Getting you just the values you need</a:t>
+              <a:t>Getting you just the </a:t>
+            </a:r>
+            <a:r>
+              <a:rPr lang="en-US" i="1" dirty="0" smtClean="0"/>
+              <a:t>data values you </a:t>
+            </a:r>
+            <a:r>
+              <a:rPr lang="en-US" i="1" dirty="0" smtClean="0"/>
+              <a:t>need</a:t>
             </a:r>
             <a:endParaRPr lang="en-US" i="1" dirty="0"/>
           </a:p>
@@ -22363,6 +22649,1320 @@
     <p:extLst>
       <p:ext uri="{BB962C8B-B14F-4D97-AF65-F5344CB8AC3E}">
         <p14:creationId xmlns:p14="http://schemas.microsoft.com/office/powerpoint/2010/main" val="1218194891"/>
+      </p:ext>
+    </p:extLst>
+  </p:cSld>
+  <p:clrMapOvr>
+    <a:masterClrMapping/>
+  </p:clrMapOvr>
+  <p:timing>
+    <p:tnLst>
+      <p:par>
+        <p:cTn id="1" dur="indefinite" restart="never" nodeType="tmRoot"/>
+      </p:par>
+    </p:tnLst>
+  </p:timing>
+</p:sld>
+</file>
+
+<file path=ppt/slides/slide10.xml><?xml version="1.0" encoding="utf-8"?>
+<p:sld xmlns:a="http://schemas.openxmlformats.org/drawingml/2006/main" xmlns:r="http://schemas.openxmlformats.org/officeDocument/2006/relationships" xmlns:p="http://schemas.openxmlformats.org/presentationml/2006/main">
+  <p:cSld>
+    <p:spTree>
+      <p:nvGrpSpPr>
+        <p:cNvPr id="1" name=""/>
+        <p:cNvGrpSpPr/>
+        <p:nvPr/>
+      </p:nvGrpSpPr>
+      <p:grpSpPr>
+        <a:xfrm>
+          <a:off x="0" y="0"/>
+          <a:ext cx="0" cy="0"/>
+          <a:chOff x="0" y="0"/>
+          <a:chExt cx="0" cy="0"/>
+        </a:xfrm>
+      </p:grpSpPr>
+      <p:sp>
+        <p:nvSpPr>
+          <p:cNvPr id="2" name="Title 1"/>
+          <p:cNvSpPr>
+            <a:spLocks noGrp="1"/>
+          </p:cNvSpPr>
+          <p:nvPr>
+            <p:ph type="title"/>
+          </p:nvPr>
+        </p:nvSpPr>
+        <p:spPr/>
+        <p:txBody>
+          <a:bodyPr/>
+          <a:lstStyle/>
+          <a:p>
+            <a:r>
+              <a:rPr lang="en-US" dirty="0" smtClean="0"/>
+              <a:t>Imagine a scenario:</a:t>
+            </a:r>
+            <a:endParaRPr lang="en-US" dirty="0"/>
+          </a:p>
+        </p:txBody>
+      </p:sp>
+      <p:graphicFrame>
+        <p:nvGraphicFramePr>
+          <p:cNvPr id="3" name="Table 2"/>
+          <p:cNvGraphicFramePr>
+            <a:graphicFrameLocks noGrp="1"/>
+          </p:cNvGraphicFramePr>
+          <p:nvPr>
+            <p:extLst/>
+          </p:nvPr>
+        </p:nvGraphicFramePr>
+        <p:xfrm>
+          <a:off x="723900" y="2084832"/>
+          <a:ext cx="11036300" cy="3695255"/>
+        </p:xfrm>
+        <a:graphic>
+          <a:graphicData uri="http://schemas.openxmlformats.org/drawingml/2006/table">
+            <a:tbl>
+              <a:tblPr firstRow="1">
+                <a:tableStyleId>{EB9631B5-78F2-41C9-869B-9F39066F8104}</a:tableStyleId>
+              </a:tblPr>
+              <a:tblGrid>
+                <a:gridCol w="1103630"/>
+                <a:gridCol w="1103630"/>
+                <a:gridCol w="1103630"/>
+                <a:gridCol w="1103630"/>
+                <a:gridCol w="1103630"/>
+                <a:gridCol w="1103630"/>
+                <a:gridCol w="1103630"/>
+                <a:gridCol w="1103630"/>
+                <a:gridCol w="1103630"/>
+                <a:gridCol w="1103630"/>
+              </a:tblGrid>
+              <a:tr h="445029">
+                <a:tc>
+                  <a:txBody>
+                    <a:bodyPr/>
+                    <a:lstStyle/>
+                    <a:p>
+                      <a:endParaRPr lang="en-US" dirty="0"/>
+                    </a:p>
+                  </a:txBody>
+                  <a:tcPr/>
+                </a:tc>
+                <a:tc>
+                  <a:txBody>
+                    <a:bodyPr/>
+                    <a:lstStyle/>
+                    <a:p>
+                      <a:endParaRPr lang="en-US"/>
+                    </a:p>
+                  </a:txBody>
+                  <a:tcPr/>
+                </a:tc>
+                <a:tc>
+                  <a:txBody>
+                    <a:bodyPr/>
+                    <a:lstStyle/>
+                    <a:p>
+                      <a:endParaRPr lang="en-US" dirty="0"/>
+                    </a:p>
+                  </a:txBody>
+                  <a:tcPr>
+                    <a:solidFill>
+                      <a:schemeClr val="bg2"/>
+                    </a:solidFill>
+                  </a:tcPr>
+                </a:tc>
+                <a:tc>
+                  <a:txBody>
+                    <a:bodyPr/>
+                    <a:lstStyle/>
+                    <a:p>
+                      <a:endParaRPr lang="en-US"/>
+                    </a:p>
+                  </a:txBody>
+                  <a:tcPr>
+                    <a:solidFill>
+                      <a:schemeClr val="bg2"/>
+                    </a:solidFill>
+                  </a:tcPr>
+                </a:tc>
+                <a:tc>
+                  <a:txBody>
+                    <a:bodyPr/>
+                    <a:lstStyle/>
+                    <a:p>
+                      <a:endParaRPr lang="en-US"/>
+                    </a:p>
+                  </a:txBody>
+                  <a:tcPr>
+                    <a:solidFill>
+                      <a:schemeClr val="bg2"/>
+                    </a:solidFill>
+                  </a:tcPr>
+                </a:tc>
+                <a:tc>
+                  <a:txBody>
+                    <a:bodyPr/>
+                    <a:lstStyle/>
+                    <a:p>
+                      <a:endParaRPr lang="en-US"/>
+                    </a:p>
+                  </a:txBody>
+                  <a:tcPr>
+                    <a:solidFill>
+                      <a:schemeClr val="bg2"/>
+                    </a:solidFill>
+                  </a:tcPr>
+                </a:tc>
+                <a:tc>
+                  <a:txBody>
+                    <a:bodyPr/>
+                    <a:lstStyle/>
+                    <a:p>
+                      <a:endParaRPr lang="en-US"/>
+                    </a:p>
+                  </a:txBody>
+                  <a:tcPr/>
+                </a:tc>
+                <a:tc>
+                  <a:txBody>
+                    <a:bodyPr/>
+                    <a:lstStyle/>
+                    <a:p>
+                      <a:endParaRPr lang="en-US"/>
+                    </a:p>
+                  </a:txBody>
+                  <a:tcPr/>
+                </a:tc>
+                <a:tc>
+                  <a:txBody>
+                    <a:bodyPr/>
+                    <a:lstStyle/>
+                    <a:p>
+                      <a:endParaRPr lang="en-US"/>
+                    </a:p>
+                  </a:txBody>
+                  <a:tcPr/>
+                </a:tc>
+                <a:tc>
+                  <a:txBody>
+                    <a:bodyPr/>
+                    <a:lstStyle/>
+                    <a:p>
+                      <a:endParaRPr lang="en-US"/>
+                    </a:p>
+                  </a:txBody>
+                  <a:tcPr/>
+                </a:tc>
+              </a:tr>
+              <a:tr h="445029">
+                <a:tc>
+                  <a:txBody>
+                    <a:bodyPr/>
+                    <a:lstStyle/>
+                    <a:p>
+                      <a:endParaRPr lang="en-US" dirty="0"/>
+                    </a:p>
+                  </a:txBody>
+                  <a:tcPr/>
+                </a:tc>
+                <a:tc>
+                  <a:txBody>
+                    <a:bodyPr/>
+                    <a:lstStyle/>
+                    <a:p>
+                      <a:endParaRPr lang="en-US" dirty="0"/>
+                    </a:p>
+                  </a:txBody>
+                  <a:tcPr/>
+                </a:tc>
+                <a:tc>
+                  <a:txBody>
+                    <a:bodyPr/>
+                    <a:lstStyle/>
+                    <a:p>
+                      <a:endParaRPr lang="en-US" dirty="0"/>
+                    </a:p>
+                  </a:txBody>
+                  <a:tcPr>
+                    <a:solidFill>
+                      <a:schemeClr val="bg2"/>
+                    </a:solidFill>
+                  </a:tcPr>
+                </a:tc>
+                <a:tc>
+                  <a:txBody>
+                    <a:bodyPr/>
+                    <a:lstStyle/>
+                    <a:p>
+                      <a:endParaRPr lang="en-US" dirty="0"/>
+                    </a:p>
+                  </a:txBody>
+                  <a:tcPr>
+                    <a:solidFill>
+                      <a:schemeClr val="bg2"/>
+                    </a:solidFill>
+                  </a:tcPr>
+                </a:tc>
+                <a:tc>
+                  <a:txBody>
+                    <a:bodyPr/>
+                    <a:lstStyle/>
+                    <a:p>
+                      <a:endParaRPr lang="en-US"/>
+                    </a:p>
+                  </a:txBody>
+                  <a:tcPr>
+                    <a:solidFill>
+                      <a:schemeClr val="bg2"/>
+                    </a:solidFill>
+                  </a:tcPr>
+                </a:tc>
+                <a:tc>
+                  <a:txBody>
+                    <a:bodyPr/>
+                    <a:lstStyle/>
+                    <a:p>
+                      <a:endParaRPr lang="en-US"/>
+                    </a:p>
+                  </a:txBody>
+                  <a:tcPr>
+                    <a:solidFill>
+                      <a:schemeClr val="bg2"/>
+                    </a:solidFill>
+                  </a:tcPr>
+                </a:tc>
+                <a:tc>
+                  <a:txBody>
+                    <a:bodyPr/>
+                    <a:lstStyle/>
+                    <a:p>
+                      <a:endParaRPr lang="en-US"/>
+                    </a:p>
+                  </a:txBody>
+                  <a:tcPr/>
+                </a:tc>
+                <a:tc>
+                  <a:txBody>
+                    <a:bodyPr/>
+                    <a:lstStyle/>
+                    <a:p>
+                      <a:endParaRPr lang="en-US"/>
+                    </a:p>
+                  </a:txBody>
+                  <a:tcPr/>
+                </a:tc>
+                <a:tc>
+                  <a:txBody>
+                    <a:bodyPr/>
+                    <a:lstStyle/>
+                    <a:p>
+                      <a:endParaRPr lang="en-US"/>
+                    </a:p>
+                  </a:txBody>
+                  <a:tcPr/>
+                </a:tc>
+                <a:tc>
+                  <a:txBody>
+                    <a:bodyPr/>
+                    <a:lstStyle/>
+                    <a:p>
+                      <a:endParaRPr lang="en-US"/>
+                    </a:p>
+                  </a:txBody>
+                  <a:tcPr/>
+                </a:tc>
+              </a:tr>
+              <a:tr h="445029">
+                <a:tc>
+                  <a:txBody>
+                    <a:bodyPr/>
+                    <a:lstStyle/>
+                    <a:p>
+                      <a:endParaRPr lang="en-US" dirty="0"/>
+                    </a:p>
+                  </a:txBody>
+                  <a:tcPr/>
+                </a:tc>
+                <a:tc>
+                  <a:txBody>
+                    <a:bodyPr/>
+                    <a:lstStyle/>
+                    <a:p>
+                      <a:endParaRPr lang="en-US" dirty="0"/>
+                    </a:p>
+                  </a:txBody>
+                  <a:tcPr/>
+                </a:tc>
+                <a:tc>
+                  <a:txBody>
+                    <a:bodyPr/>
+                    <a:lstStyle/>
+                    <a:p>
+                      <a:endParaRPr lang="en-US" dirty="0"/>
+                    </a:p>
+                  </a:txBody>
+                  <a:tcPr>
+                    <a:solidFill>
+                      <a:schemeClr val="bg2"/>
+                    </a:solidFill>
+                  </a:tcPr>
+                </a:tc>
+                <a:tc>
+                  <a:txBody>
+                    <a:bodyPr/>
+                    <a:lstStyle/>
+                    <a:p>
+                      <a:endParaRPr lang="en-US" dirty="0"/>
+                    </a:p>
+                  </a:txBody>
+                  <a:tcPr>
+                    <a:solidFill>
+                      <a:schemeClr val="bg2"/>
+                    </a:solidFill>
+                  </a:tcPr>
+                </a:tc>
+                <a:tc>
+                  <a:txBody>
+                    <a:bodyPr/>
+                    <a:lstStyle/>
+                    <a:p>
+                      <a:endParaRPr lang="en-US"/>
+                    </a:p>
+                  </a:txBody>
+                  <a:tcPr>
+                    <a:solidFill>
+                      <a:schemeClr val="bg2"/>
+                    </a:solidFill>
+                  </a:tcPr>
+                </a:tc>
+                <a:tc>
+                  <a:txBody>
+                    <a:bodyPr/>
+                    <a:lstStyle/>
+                    <a:p>
+                      <a:endParaRPr lang="en-US"/>
+                    </a:p>
+                  </a:txBody>
+                  <a:tcPr>
+                    <a:solidFill>
+                      <a:schemeClr val="bg2"/>
+                    </a:solidFill>
+                  </a:tcPr>
+                </a:tc>
+                <a:tc>
+                  <a:txBody>
+                    <a:bodyPr/>
+                    <a:lstStyle/>
+                    <a:p>
+                      <a:endParaRPr lang="en-US"/>
+                    </a:p>
+                  </a:txBody>
+                  <a:tcPr/>
+                </a:tc>
+                <a:tc>
+                  <a:txBody>
+                    <a:bodyPr/>
+                    <a:lstStyle/>
+                    <a:p>
+                      <a:endParaRPr lang="en-US"/>
+                    </a:p>
+                  </a:txBody>
+                  <a:tcPr/>
+                </a:tc>
+                <a:tc>
+                  <a:txBody>
+                    <a:bodyPr/>
+                    <a:lstStyle/>
+                    <a:p>
+                      <a:endParaRPr lang="en-US"/>
+                    </a:p>
+                  </a:txBody>
+                  <a:tcPr/>
+                </a:tc>
+                <a:tc>
+                  <a:txBody>
+                    <a:bodyPr/>
+                    <a:lstStyle/>
+                    <a:p>
+                      <a:endParaRPr lang="en-US"/>
+                    </a:p>
+                  </a:txBody>
+                  <a:tcPr/>
+                </a:tc>
+              </a:tr>
+              <a:tr h="445029">
+                <a:tc>
+                  <a:txBody>
+                    <a:bodyPr/>
+                    <a:lstStyle/>
+                    <a:p>
+                      <a:endParaRPr lang="en-US" dirty="0"/>
+                    </a:p>
+                  </a:txBody>
+                  <a:tcPr>
+                    <a:solidFill>
+                      <a:schemeClr val="bg2"/>
+                    </a:solidFill>
+                  </a:tcPr>
+                </a:tc>
+                <a:tc>
+                  <a:txBody>
+                    <a:bodyPr/>
+                    <a:lstStyle/>
+                    <a:p>
+                      <a:endParaRPr lang="en-US" dirty="0"/>
+                    </a:p>
+                  </a:txBody>
+                  <a:tcPr>
+                    <a:solidFill>
+                      <a:schemeClr val="bg2"/>
+                    </a:solidFill>
+                  </a:tcPr>
+                </a:tc>
+                <a:tc>
+                  <a:txBody>
+                    <a:bodyPr/>
+                    <a:lstStyle/>
+                    <a:p>
+                      <a:endParaRPr lang="en-US"/>
+                    </a:p>
+                  </a:txBody>
+                  <a:tcPr>
+                    <a:solidFill>
+                      <a:schemeClr val="bg2"/>
+                    </a:solidFill>
+                  </a:tcPr>
+                </a:tc>
+                <a:tc>
+                  <a:txBody>
+                    <a:bodyPr/>
+                    <a:lstStyle/>
+                    <a:p>
+                      <a:endParaRPr lang="en-US"/>
+                    </a:p>
+                  </a:txBody>
+                  <a:tcPr>
+                    <a:solidFill>
+                      <a:schemeClr val="bg2"/>
+                    </a:solidFill>
+                  </a:tcPr>
+                </a:tc>
+                <a:tc>
+                  <a:txBody>
+                    <a:bodyPr/>
+                    <a:lstStyle/>
+                    <a:p>
+                      <a:endParaRPr lang="en-US" dirty="0"/>
+                    </a:p>
+                  </a:txBody>
+                  <a:tcPr>
+                    <a:solidFill>
+                      <a:schemeClr val="bg2"/>
+                    </a:solidFill>
+                  </a:tcPr>
+                </a:tc>
+                <a:tc>
+                  <a:txBody>
+                    <a:bodyPr/>
+                    <a:lstStyle/>
+                    <a:p>
+                      <a:endParaRPr lang="en-US"/>
+                    </a:p>
+                  </a:txBody>
+                  <a:tcPr>
+                    <a:solidFill>
+                      <a:schemeClr val="bg2"/>
+                    </a:solidFill>
+                  </a:tcPr>
+                </a:tc>
+                <a:tc>
+                  <a:txBody>
+                    <a:bodyPr/>
+                    <a:lstStyle/>
+                    <a:p>
+                      <a:endParaRPr lang="en-US" dirty="0"/>
+                    </a:p>
+                  </a:txBody>
+                  <a:tcPr>
+                    <a:solidFill>
+                      <a:schemeClr val="bg2"/>
+                    </a:solidFill>
+                  </a:tcPr>
+                </a:tc>
+                <a:tc>
+                  <a:txBody>
+                    <a:bodyPr/>
+                    <a:lstStyle/>
+                    <a:p>
+                      <a:endParaRPr lang="en-US" dirty="0"/>
+                    </a:p>
+                  </a:txBody>
+                  <a:tcPr>
+                    <a:solidFill>
+                      <a:schemeClr val="bg2"/>
+                    </a:solidFill>
+                  </a:tcPr>
+                </a:tc>
+                <a:tc>
+                  <a:txBody>
+                    <a:bodyPr/>
+                    <a:lstStyle/>
+                    <a:p>
+                      <a:endParaRPr lang="en-US"/>
+                    </a:p>
+                  </a:txBody>
+                  <a:tcPr>
+                    <a:solidFill>
+                      <a:schemeClr val="bg2"/>
+                    </a:solidFill>
+                  </a:tcPr>
+                </a:tc>
+                <a:tc>
+                  <a:txBody>
+                    <a:bodyPr/>
+                    <a:lstStyle/>
+                    <a:p>
+                      <a:endParaRPr lang="en-US"/>
+                    </a:p>
+                  </a:txBody>
+                  <a:tcPr>
+                    <a:solidFill>
+                      <a:schemeClr val="bg2"/>
+                    </a:solidFill>
+                  </a:tcPr>
+                </a:tc>
+              </a:tr>
+              <a:tr h="580052">
+                <a:tc>
+                  <a:txBody>
+                    <a:bodyPr/>
+                    <a:lstStyle/>
+                    <a:p>
+                      <a:endParaRPr lang="en-US" dirty="0"/>
+                    </a:p>
+                  </a:txBody>
+                  <a:tcPr>
+                    <a:solidFill>
+                      <a:schemeClr val="bg2"/>
+                    </a:solidFill>
+                  </a:tcPr>
+                </a:tc>
+                <a:tc>
+                  <a:txBody>
+                    <a:bodyPr/>
+                    <a:lstStyle/>
+                    <a:p>
+                      <a:endParaRPr lang="en-US" dirty="0"/>
+                    </a:p>
+                  </a:txBody>
+                  <a:tcPr>
+                    <a:solidFill>
+                      <a:schemeClr val="bg2"/>
+                    </a:solidFill>
+                  </a:tcPr>
+                </a:tc>
+                <a:tc>
+                  <a:txBody>
+                    <a:bodyPr/>
+                    <a:lstStyle/>
+                    <a:p>
+                      <a:endParaRPr lang="en-US"/>
+                    </a:p>
+                  </a:txBody>
+                  <a:tcPr>
+                    <a:solidFill>
+                      <a:schemeClr val="bg2"/>
+                    </a:solidFill>
+                  </a:tcPr>
+                </a:tc>
+                <a:tc>
+                  <a:txBody>
+                    <a:bodyPr/>
+                    <a:lstStyle/>
+                    <a:p>
+                      <a:endParaRPr lang="en-US" dirty="0"/>
+                    </a:p>
+                  </a:txBody>
+                  <a:tcPr>
+                    <a:solidFill>
+                      <a:schemeClr val="bg2"/>
+                    </a:solidFill>
+                  </a:tcPr>
+                </a:tc>
+                <a:tc>
+                  <a:txBody>
+                    <a:bodyPr/>
+                    <a:lstStyle/>
+                    <a:p>
+                      <a:endParaRPr lang="en-US" dirty="0"/>
+                    </a:p>
+                  </a:txBody>
+                  <a:tcPr>
+                    <a:solidFill>
+                      <a:schemeClr val="bg2"/>
+                    </a:solidFill>
+                  </a:tcPr>
+                </a:tc>
+                <a:tc>
+                  <a:txBody>
+                    <a:bodyPr/>
+                    <a:lstStyle/>
+                    <a:p>
+                      <a:endParaRPr lang="en-US" dirty="0"/>
+                    </a:p>
+                  </a:txBody>
+                  <a:tcPr>
+                    <a:solidFill>
+                      <a:schemeClr val="bg2"/>
+                    </a:solidFill>
+                  </a:tcPr>
+                </a:tc>
+                <a:tc>
+                  <a:txBody>
+                    <a:bodyPr/>
+                    <a:lstStyle/>
+                    <a:p>
+                      <a:endParaRPr lang="en-US" dirty="0"/>
+                    </a:p>
+                  </a:txBody>
+                  <a:tcPr>
+                    <a:solidFill>
+                      <a:schemeClr val="bg2"/>
+                    </a:solidFill>
+                  </a:tcPr>
+                </a:tc>
+                <a:tc>
+                  <a:txBody>
+                    <a:bodyPr/>
+                    <a:lstStyle/>
+                    <a:p>
+                      <a:endParaRPr lang="en-US" dirty="0"/>
+                    </a:p>
+                  </a:txBody>
+                  <a:tcPr>
+                    <a:solidFill>
+                      <a:schemeClr val="bg2"/>
+                    </a:solidFill>
+                  </a:tcPr>
+                </a:tc>
+                <a:tc>
+                  <a:txBody>
+                    <a:bodyPr/>
+                    <a:lstStyle/>
+                    <a:p>
+                      <a:endParaRPr lang="en-US" dirty="0"/>
+                    </a:p>
+                  </a:txBody>
+                  <a:tcPr>
+                    <a:solidFill>
+                      <a:schemeClr val="bg2"/>
+                    </a:solidFill>
+                  </a:tcPr>
+                </a:tc>
+                <a:tc>
+                  <a:txBody>
+                    <a:bodyPr/>
+                    <a:lstStyle/>
+                    <a:p>
+                      <a:endParaRPr lang="en-US" dirty="0"/>
+                    </a:p>
+                  </a:txBody>
+                  <a:tcPr>
+                    <a:solidFill>
+                      <a:schemeClr val="bg2"/>
+                    </a:solidFill>
+                  </a:tcPr>
+                </a:tc>
+              </a:tr>
+              <a:tr h="445029">
+                <a:tc>
+                  <a:txBody>
+                    <a:bodyPr/>
+                    <a:lstStyle/>
+                    <a:p>
+                      <a:endParaRPr lang="en-US" dirty="0"/>
+                    </a:p>
+                  </a:txBody>
+                  <a:tcPr>
+                    <a:solidFill>
+                      <a:schemeClr val="bg2"/>
+                    </a:solidFill>
+                  </a:tcPr>
+                </a:tc>
+                <a:tc>
+                  <a:txBody>
+                    <a:bodyPr/>
+                    <a:lstStyle/>
+                    <a:p>
+                      <a:endParaRPr lang="en-US" dirty="0"/>
+                    </a:p>
+                  </a:txBody>
+                  <a:tcPr>
+                    <a:solidFill>
+                      <a:schemeClr val="bg2"/>
+                    </a:solidFill>
+                  </a:tcPr>
+                </a:tc>
+                <a:tc>
+                  <a:txBody>
+                    <a:bodyPr/>
+                    <a:lstStyle/>
+                    <a:p>
+                      <a:endParaRPr lang="en-US"/>
+                    </a:p>
+                  </a:txBody>
+                  <a:tcPr>
+                    <a:solidFill>
+                      <a:schemeClr val="bg2"/>
+                    </a:solidFill>
+                  </a:tcPr>
+                </a:tc>
+                <a:tc>
+                  <a:txBody>
+                    <a:bodyPr/>
+                    <a:lstStyle/>
+                    <a:p>
+                      <a:endParaRPr lang="en-US"/>
+                    </a:p>
+                  </a:txBody>
+                  <a:tcPr>
+                    <a:solidFill>
+                      <a:schemeClr val="bg2"/>
+                    </a:solidFill>
+                  </a:tcPr>
+                </a:tc>
+                <a:tc>
+                  <a:txBody>
+                    <a:bodyPr/>
+                    <a:lstStyle/>
+                    <a:p>
+                      <a:endParaRPr lang="en-US"/>
+                    </a:p>
+                  </a:txBody>
+                  <a:tcPr>
+                    <a:solidFill>
+                      <a:schemeClr val="bg2"/>
+                    </a:solidFill>
+                  </a:tcPr>
+                </a:tc>
+                <a:tc>
+                  <a:txBody>
+                    <a:bodyPr/>
+                    <a:lstStyle/>
+                    <a:p>
+                      <a:endParaRPr lang="en-US" dirty="0"/>
+                    </a:p>
+                  </a:txBody>
+                  <a:tcPr>
+                    <a:solidFill>
+                      <a:schemeClr val="bg2"/>
+                    </a:solidFill>
+                  </a:tcPr>
+                </a:tc>
+                <a:tc>
+                  <a:txBody>
+                    <a:bodyPr/>
+                    <a:lstStyle/>
+                    <a:p>
+                      <a:endParaRPr lang="en-US" dirty="0"/>
+                    </a:p>
+                  </a:txBody>
+                  <a:tcPr>
+                    <a:solidFill>
+                      <a:schemeClr val="bg2"/>
+                    </a:solidFill>
+                  </a:tcPr>
+                </a:tc>
+                <a:tc>
+                  <a:txBody>
+                    <a:bodyPr/>
+                    <a:lstStyle/>
+                    <a:p>
+                      <a:endParaRPr lang="en-US" dirty="0"/>
+                    </a:p>
+                  </a:txBody>
+                  <a:tcPr>
+                    <a:solidFill>
+                      <a:schemeClr val="bg2"/>
+                    </a:solidFill>
+                  </a:tcPr>
+                </a:tc>
+                <a:tc>
+                  <a:txBody>
+                    <a:bodyPr/>
+                    <a:lstStyle/>
+                    <a:p>
+                      <a:endParaRPr lang="en-US"/>
+                    </a:p>
+                  </a:txBody>
+                  <a:tcPr>
+                    <a:solidFill>
+                      <a:schemeClr val="bg2"/>
+                    </a:solidFill>
+                  </a:tcPr>
+                </a:tc>
+                <a:tc>
+                  <a:txBody>
+                    <a:bodyPr/>
+                    <a:lstStyle/>
+                    <a:p>
+                      <a:endParaRPr lang="en-US" dirty="0"/>
+                    </a:p>
+                  </a:txBody>
+                  <a:tcPr>
+                    <a:solidFill>
+                      <a:schemeClr val="bg2"/>
+                    </a:solidFill>
+                  </a:tcPr>
+                </a:tc>
+              </a:tr>
+              <a:tr h="445029">
+                <a:tc>
+                  <a:txBody>
+                    <a:bodyPr/>
+                    <a:lstStyle/>
+                    <a:p>
+                      <a:endParaRPr lang="en-US" dirty="0"/>
+                    </a:p>
+                  </a:txBody>
+                  <a:tcPr>
+                    <a:solidFill>
+                      <a:schemeClr val="bg2"/>
+                    </a:solidFill>
+                  </a:tcPr>
+                </a:tc>
+                <a:tc>
+                  <a:txBody>
+                    <a:bodyPr/>
+                    <a:lstStyle/>
+                    <a:p>
+                      <a:endParaRPr lang="en-US" dirty="0"/>
+                    </a:p>
+                  </a:txBody>
+                  <a:tcPr>
+                    <a:solidFill>
+                      <a:schemeClr val="bg2"/>
+                    </a:solidFill>
+                  </a:tcPr>
+                </a:tc>
+                <a:tc>
+                  <a:txBody>
+                    <a:bodyPr/>
+                    <a:lstStyle/>
+                    <a:p>
+                      <a:endParaRPr lang="en-US"/>
+                    </a:p>
+                  </a:txBody>
+                  <a:tcPr>
+                    <a:solidFill>
+                      <a:schemeClr val="bg2"/>
+                    </a:solidFill>
+                  </a:tcPr>
+                </a:tc>
+                <a:tc>
+                  <a:txBody>
+                    <a:bodyPr/>
+                    <a:lstStyle/>
+                    <a:p>
+                      <a:endParaRPr lang="en-US"/>
+                    </a:p>
+                  </a:txBody>
+                  <a:tcPr>
+                    <a:solidFill>
+                      <a:schemeClr val="bg2"/>
+                    </a:solidFill>
+                  </a:tcPr>
+                </a:tc>
+                <a:tc>
+                  <a:txBody>
+                    <a:bodyPr/>
+                    <a:lstStyle/>
+                    <a:p>
+                      <a:endParaRPr lang="en-US"/>
+                    </a:p>
+                  </a:txBody>
+                  <a:tcPr>
+                    <a:solidFill>
+                      <a:schemeClr val="bg2"/>
+                    </a:solidFill>
+                  </a:tcPr>
+                </a:tc>
+                <a:tc>
+                  <a:txBody>
+                    <a:bodyPr/>
+                    <a:lstStyle/>
+                    <a:p>
+                      <a:endParaRPr lang="en-US" dirty="0"/>
+                    </a:p>
+                  </a:txBody>
+                  <a:tcPr>
+                    <a:solidFill>
+                      <a:schemeClr val="bg2"/>
+                    </a:solidFill>
+                  </a:tcPr>
+                </a:tc>
+                <a:tc>
+                  <a:txBody>
+                    <a:bodyPr/>
+                    <a:lstStyle/>
+                    <a:p>
+                      <a:endParaRPr lang="en-US"/>
+                    </a:p>
+                  </a:txBody>
+                  <a:tcPr>
+                    <a:solidFill>
+                      <a:schemeClr val="bg2"/>
+                    </a:solidFill>
+                  </a:tcPr>
+                </a:tc>
+                <a:tc>
+                  <a:txBody>
+                    <a:bodyPr/>
+                    <a:lstStyle/>
+                    <a:p>
+                      <a:endParaRPr lang="en-US" dirty="0"/>
+                    </a:p>
+                  </a:txBody>
+                  <a:tcPr>
+                    <a:solidFill>
+                      <a:schemeClr val="bg2"/>
+                    </a:solidFill>
+                  </a:tcPr>
+                </a:tc>
+                <a:tc>
+                  <a:txBody>
+                    <a:bodyPr/>
+                    <a:lstStyle/>
+                    <a:p>
+                      <a:endParaRPr lang="en-US" dirty="0"/>
+                    </a:p>
+                  </a:txBody>
+                  <a:tcPr>
+                    <a:solidFill>
+                      <a:schemeClr val="bg2"/>
+                    </a:solidFill>
+                  </a:tcPr>
+                </a:tc>
+                <a:tc>
+                  <a:txBody>
+                    <a:bodyPr/>
+                    <a:lstStyle/>
+                    <a:p>
+                      <a:endParaRPr lang="en-US" dirty="0"/>
+                    </a:p>
+                  </a:txBody>
+                  <a:tcPr>
+                    <a:solidFill>
+                      <a:schemeClr val="bg2"/>
+                    </a:solidFill>
+                  </a:tcPr>
+                </a:tc>
+              </a:tr>
+              <a:tr h="445029">
+                <a:tc>
+                  <a:txBody>
+                    <a:bodyPr/>
+                    <a:lstStyle/>
+                    <a:p>
+                      <a:endParaRPr lang="en-US" dirty="0"/>
+                    </a:p>
+                  </a:txBody>
+                  <a:tcPr/>
+                </a:tc>
+                <a:tc>
+                  <a:txBody>
+                    <a:bodyPr/>
+                    <a:lstStyle/>
+                    <a:p>
+                      <a:endParaRPr lang="en-US" dirty="0"/>
+                    </a:p>
+                  </a:txBody>
+                  <a:tcPr/>
+                </a:tc>
+                <a:tc>
+                  <a:txBody>
+                    <a:bodyPr/>
+                    <a:lstStyle/>
+                    <a:p>
+                      <a:endParaRPr lang="en-US"/>
+                    </a:p>
+                  </a:txBody>
+                  <a:tcPr>
+                    <a:solidFill>
+                      <a:schemeClr val="bg2"/>
+                    </a:solidFill>
+                  </a:tcPr>
+                </a:tc>
+                <a:tc>
+                  <a:txBody>
+                    <a:bodyPr/>
+                    <a:lstStyle/>
+                    <a:p>
+                      <a:endParaRPr lang="en-US"/>
+                    </a:p>
+                  </a:txBody>
+                  <a:tcPr>
+                    <a:solidFill>
+                      <a:schemeClr val="bg2"/>
+                    </a:solidFill>
+                  </a:tcPr>
+                </a:tc>
+                <a:tc>
+                  <a:txBody>
+                    <a:bodyPr/>
+                    <a:lstStyle/>
+                    <a:p>
+                      <a:endParaRPr lang="en-US"/>
+                    </a:p>
+                  </a:txBody>
+                  <a:tcPr>
+                    <a:solidFill>
+                      <a:schemeClr val="bg2"/>
+                    </a:solidFill>
+                  </a:tcPr>
+                </a:tc>
+                <a:tc>
+                  <a:txBody>
+                    <a:bodyPr/>
+                    <a:lstStyle/>
+                    <a:p>
+                      <a:endParaRPr lang="en-US" dirty="0"/>
+                    </a:p>
+                  </a:txBody>
+                  <a:tcPr>
+                    <a:solidFill>
+                      <a:schemeClr val="bg2"/>
+                    </a:solidFill>
+                  </a:tcPr>
+                </a:tc>
+                <a:tc>
+                  <a:txBody>
+                    <a:bodyPr/>
+                    <a:lstStyle/>
+                    <a:p>
+                      <a:endParaRPr lang="en-US"/>
+                    </a:p>
+                  </a:txBody>
+                  <a:tcPr/>
+                </a:tc>
+                <a:tc>
+                  <a:txBody>
+                    <a:bodyPr/>
+                    <a:lstStyle/>
+                    <a:p>
+                      <a:endParaRPr lang="en-US"/>
+                    </a:p>
+                  </a:txBody>
+                  <a:tcPr/>
+                </a:tc>
+                <a:tc>
+                  <a:txBody>
+                    <a:bodyPr/>
+                    <a:lstStyle/>
+                    <a:p>
+                      <a:endParaRPr lang="en-US" dirty="0"/>
+                    </a:p>
+                  </a:txBody>
+                  <a:tcPr/>
+                </a:tc>
+                <a:tc>
+                  <a:txBody>
+                    <a:bodyPr/>
+                    <a:lstStyle/>
+                    <a:p>
+                      <a:endParaRPr lang="en-US" dirty="0"/>
+                    </a:p>
+                  </a:txBody>
+                  <a:tcPr/>
+                </a:tc>
+              </a:tr>
+            </a:tbl>
+          </a:graphicData>
+        </a:graphic>
+      </p:graphicFrame>
+      <p:sp>
+        <p:nvSpPr>
+          <p:cNvPr id="4" name="TextBox 3"/>
+          <p:cNvSpPr txBox="1"/>
+          <p:nvPr/>
+        </p:nvSpPr>
+        <p:spPr>
+          <a:xfrm>
+            <a:off x="6379285" y="168916"/>
+            <a:ext cx="5380915" cy="1200329"/>
+          </a:xfrm>
+          <a:prstGeom prst="rect">
+            <a:avLst/>
+          </a:prstGeom>
+          <a:noFill/>
+        </p:spPr>
+        <p:txBody>
+          <a:bodyPr wrap="square" rtlCol="0">
+            <a:spAutoFit/>
+          </a:bodyPr>
+          <a:lstStyle/>
+          <a:p>
+            <a:r>
+              <a:rPr lang="en-US" sz="3600" dirty="0" smtClean="0"/>
+              <a:t>Columns </a:t>
+            </a:r>
+            <a:r>
+              <a:rPr lang="en-US" sz="3600" dirty="0" smtClean="0"/>
+              <a:t>you’re interested in – get with </a:t>
+            </a:r>
+            <a:r>
+              <a:rPr lang="en-US" sz="3600" dirty="0" smtClean="0">
+                <a:latin typeface="Courier New" panose="02070309020205020404" pitchFamily="49" charset="0"/>
+                <a:cs typeface="Courier New" panose="02070309020205020404" pitchFamily="49" charset="0"/>
+              </a:rPr>
+              <a:t>select()</a:t>
+            </a:r>
+            <a:endParaRPr lang="en-US" sz="3600" dirty="0">
+              <a:latin typeface="Courier New" panose="02070309020205020404" pitchFamily="49" charset="0"/>
+              <a:cs typeface="Courier New" panose="02070309020205020404" pitchFamily="49" charset="0"/>
+            </a:endParaRPr>
+          </a:p>
+        </p:txBody>
+      </p:sp>
+      <p:sp>
+        <p:nvSpPr>
+          <p:cNvPr id="12" name="TextBox 11"/>
+          <p:cNvSpPr txBox="1"/>
+          <p:nvPr/>
+        </p:nvSpPr>
+        <p:spPr>
+          <a:xfrm>
+            <a:off x="215153" y="5951371"/>
+            <a:ext cx="10428194" cy="646331"/>
+          </a:xfrm>
+          <a:prstGeom prst="rect">
+            <a:avLst/>
+          </a:prstGeom>
+          <a:noFill/>
+        </p:spPr>
+        <p:txBody>
+          <a:bodyPr wrap="square" rtlCol="0">
+            <a:spAutoFit/>
+          </a:bodyPr>
+          <a:lstStyle/>
+          <a:p>
+            <a:r>
+              <a:rPr lang="en-US" sz="3600" dirty="0" smtClean="0"/>
+              <a:t>Rows you </a:t>
+            </a:r>
+            <a:r>
+              <a:rPr lang="en-US" sz="3600" dirty="0" smtClean="0"/>
+              <a:t>care about – get them with </a:t>
+            </a:r>
+            <a:r>
+              <a:rPr lang="en-US" sz="3600" dirty="0" smtClean="0">
+                <a:latin typeface="Courier New" panose="02070309020205020404" pitchFamily="49" charset="0"/>
+                <a:cs typeface="Courier New" panose="02070309020205020404" pitchFamily="49" charset="0"/>
+              </a:rPr>
+              <a:t>filter()</a:t>
+            </a:r>
+            <a:endParaRPr lang="en-US" sz="3600" dirty="0">
+              <a:latin typeface="Courier New" panose="02070309020205020404" pitchFamily="49" charset="0"/>
+              <a:cs typeface="Courier New" panose="02070309020205020404" pitchFamily="49" charset="0"/>
+            </a:endParaRPr>
+          </a:p>
+        </p:txBody>
+      </p:sp>
+      <p:sp>
+        <p:nvSpPr>
+          <p:cNvPr id="13" name="Arc 12"/>
+          <p:cNvSpPr/>
+          <p:nvPr/>
+        </p:nvSpPr>
+        <p:spPr>
+          <a:xfrm rot="4632383">
+            <a:off x="8749056" y="5135912"/>
+            <a:ext cx="970838" cy="1529834"/>
+          </a:xfrm>
+          <a:prstGeom prst="arc">
+            <a:avLst>
+              <a:gd name="adj1" fmla="val 15534846"/>
+              <a:gd name="adj2" fmla="val 0"/>
+            </a:avLst>
+          </a:prstGeom>
+          <a:ln w="38100">
+            <a:headEnd type="triangle"/>
+            <a:tailEnd type="none"/>
+          </a:ln>
+        </p:spPr>
+        <p:style>
+          <a:lnRef idx="1">
+            <a:schemeClr val="accent1"/>
+          </a:lnRef>
+          <a:fillRef idx="0">
+            <a:schemeClr val="accent1"/>
+          </a:fillRef>
+          <a:effectRef idx="0">
+            <a:schemeClr val="accent1"/>
+          </a:effectRef>
+          <a:fontRef idx="minor">
+            <a:schemeClr val="tx1"/>
+          </a:fontRef>
+        </p:style>
+        <p:txBody>
+          <a:bodyPr rtlCol="0" anchor="ctr"/>
+          <a:lstStyle/>
+          <a:p>
+            <a:pPr algn="ctr"/>
+            <a:endParaRPr lang="en-US"/>
+          </a:p>
+        </p:txBody>
+      </p:sp>
+      <p:sp>
+        <p:nvSpPr>
+          <p:cNvPr id="10" name="Arc 9"/>
+          <p:cNvSpPr/>
+          <p:nvPr/>
+        </p:nvSpPr>
+        <p:spPr>
+          <a:xfrm rot="3640783">
+            <a:off x="8986610" y="775612"/>
+            <a:ext cx="2146300" cy="1529834"/>
+          </a:xfrm>
+          <a:prstGeom prst="arc">
+            <a:avLst>
+              <a:gd name="adj1" fmla="val 15713019"/>
+              <a:gd name="adj2" fmla="val 19759243"/>
+            </a:avLst>
+          </a:prstGeom>
+          <a:ln w="38100">
+            <a:headEnd type="none"/>
+            <a:tailEnd type="triangle"/>
+          </a:ln>
+        </p:spPr>
+        <p:style>
+          <a:lnRef idx="1">
+            <a:schemeClr val="accent1"/>
+          </a:lnRef>
+          <a:fillRef idx="0">
+            <a:schemeClr val="accent1"/>
+          </a:fillRef>
+          <a:effectRef idx="0">
+            <a:schemeClr val="accent1"/>
+          </a:effectRef>
+          <a:fontRef idx="minor">
+            <a:schemeClr val="tx1"/>
+          </a:fontRef>
+        </p:style>
+        <p:txBody>
+          <a:bodyPr rtlCol="0" anchor="ctr"/>
+          <a:lstStyle/>
+          <a:p>
+            <a:pPr algn="ctr"/>
+            <a:endParaRPr lang="en-US"/>
+          </a:p>
+        </p:txBody>
+      </p:sp>
+    </p:spTree>
+    <p:extLst>
+      <p:ext uri="{BB962C8B-B14F-4D97-AF65-F5344CB8AC3E}">
+        <p14:creationId xmlns:p14="http://schemas.microsoft.com/office/powerpoint/2010/main" val="1969019720"/>
       </p:ext>
     </p:extLst>
   </p:cSld>
@@ -23738,7 +25338,7 @@
         </p:nvSpPr>
         <p:spPr>
           <a:xfrm>
-            <a:off x="4381500" y="5995987"/>
+            <a:off x="4381500" y="5817570"/>
             <a:ext cx="6477000" cy="646331"/>
           </a:xfrm>
           <a:prstGeom prst="rect">
@@ -23768,7 +25368,7 @@
         </p:nvSpPr>
         <p:spPr>
           <a:xfrm rot="4632383">
-            <a:off x="8127999" y="4613314"/>
+            <a:off x="8127999" y="4434897"/>
             <a:ext cx="2146300" cy="1529834"/>
           </a:xfrm>
           <a:prstGeom prst="arc">
@@ -23844,21 +25444,50 @@
       </p:grpSpPr>
       <p:sp>
         <p:nvSpPr>
-          <p:cNvPr id="2" name="Title 1"/>
-          <p:cNvSpPr>
-            <a:spLocks noGrp="1"/>
+          <p:cNvPr id="6" name="Title 1"/>
+          <p:cNvSpPr txBox="1">
+            <a:spLocks/>
           </p:cNvSpPr>
-          <p:nvPr>
-            <p:ph type="title"/>
-          </p:nvPr>
+          <p:nvPr/>
         </p:nvSpPr>
-        <p:spPr/>
+        <p:spPr>
+          <a:xfrm>
+            <a:off x="1024128" y="585216"/>
+            <a:ext cx="9720072" cy="1499616"/>
+          </a:xfrm>
+          <a:prstGeom prst="rect">
+            <a:avLst/>
+          </a:prstGeom>
+        </p:spPr>
         <p:txBody>
-          <a:bodyPr/>
-          <a:lstStyle/>
+          <a:bodyPr vert="horz" lIns="91440" tIns="45720" rIns="91440" bIns="45720" rtlCol="0" anchor="ctr">
+            <a:normAutofit/>
+          </a:bodyPr>
+          <a:lstStyle>
+            <a:lvl1pPr algn="l" defTabSz="914400" rtl="0" eaLnBrk="1" latinLnBrk="0" hangingPunct="1">
+              <a:lnSpc>
+                <a:spcPct val="80000"/>
+              </a:lnSpc>
+              <a:spcBef>
+                <a:spcPct val="0"/>
+              </a:spcBef>
+              <a:buNone/>
+              <a:defRPr sz="5000" kern="1200" cap="all" spc="100" baseline="0">
+                <a:solidFill>
+                  <a:schemeClr val="tx1">
+                    <a:lumMod val="95000"/>
+                    <a:lumOff val="5000"/>
+                  </a:schemeClr>
+                </a:solidFill>
+                <a:latin typeface="+mj-lt"/>
+                <a:ea typeface="+mj-ea"/>
+                <a:cs typeface="+mj-cs"/>
+              </a:defRPr>
+            </a:lvl1pPr>
+          </a:lstStyle>
           <a:p>
             <a:r>
-              <a:rPr lang="en-US" dirty="0" smtClean="0"/>
+              <a:rPr lang="en-US" smtClean="0"/>
               <a:t>Your options</a:t>
             </a:r>
             <a:endParaRPr lang="en-US" dirty="0"/>
@@ -23867,14 +25496,14 @@
       </p:sp>
       <p:sp>
         <p:nvSpPr>
-          <p:cNvPr id="5" name="TextBox 4"/>
+          <p:cNvPr id="7" name="TextBox 6"/>
           <p:cNvSpPr txBox="1"/>
           <p:nvPr/>
         </p:nvSpPr>
         <p:spPr>
           <a:xfrm>
-            <a:off x="1024128" y="1944914"/>
-            <a:ext cx="10421257" cy="4401205"/>
+            <a:off x="2377489" y="2084832"/>
+            <a:ext cx="9419588" cy="3170099"/>
           </a:xfrm>
           <a:prstGeom prst="rect">
             <a:avLst/>
@@ -23887,26 +25516,45 @@
           </a:bodyPr>
           <a:lstStyle/>
           <a:p>
-            <a:pPr marL="742950" indent="-742950">
-              <a:buAutoNum type="arabicPeriod"/>
-            </a:pPr>
-            <a:r>
-              <a:rPr lang="en-US" sz="4000" dirty="0" smtClean="0"/>
-              <a:t>Manually extract just the data you want (e.g. with Excel)</a:t>
+            <a:r>
+              <a:rPr lang="en-US" sz="4000" strike="sngStrike" dirty="0" smtClean="0"/>
+              <a:t>Manually extract </a:t>
+            </a:r>
+            <a:r>
+              <a:rPr lang="en-US" sz="4000" strike="sngStrike" dirty="0" smtClean="0"/>
+              <a:t>the data </a:t>
+            </a:r>
+            <a:r>
+              <a:rPr lang="en-US" sz="4000" strike="sngStrike" dirty="0" smtClean="0"/>
+              <a:t>you </a:t>
+            </a:r>
+            <a:r>
+              <a:rPr lang="en-US" sz="4000" strike="sngStrike" dirty="0" smtClean="0"/>
+              <a:t>want</a:t>
+            </a:r>
+            <a:r>
+              <a:rPr lang="en-US" sz="4000" strike="sngStrike" dirty="0" smtClean="0"/>
+              <a:t/>
             </a:r>
             <a:br>
-              <a:rPr lang="en-US" sz="4000" dirty="0" smtClean="0"/>
+              <a:rPr lang="en-US" sz="4000" strike="sngStrike" dirty="0" smtClean="0"/>
             </a:br>
-            <a:endParaRPr lang="en-US" sz="4000" dirty="0" smtClean="0"/>
+            <a:endParaRPr lang="en-US" sz="4000" strike="sngStrike" dirty="0" smtClean="0"/>
           </a:p>
           <a:p>
-            <a:pPr marL="742950" indent="-742950">
-              <a:buAutoNum type="arabicPeriod"/>
-            </a:pPr>
-            <a:r>
-              <a:rPr lang="en-US" sz="4000" dirty="0" smtClean="0"/>
-              <a:t>Tell your collaborator to reduce what they’ve sent you themselves</a:t>
-            </a:r>
+            <a:r>
+              <a:rPr lang="en-US" sz="4000" strike="sngStrike" dirty="0" smtClean="0"/>
+              <a:t>Ask </a:t>
+            </a:r>
+            <a:r>
+              <a:rPr lang="en-US" sz="4000" strike="sngStrike" dirty="0" smtClean="0"/>
+              <a:t>your collaborator </a:t>
+            </a:r>
+            <a:r>
+              <a:rPr lang="en-US" sz="4000" strike="sngStrike" dirty="0" smtClean="0"/>
+              <a:t>for help</a:t>
+            </a:r>
+            <a:endParaRPr lang="en-US" sz="4000" strike="sngStrike" dirty="0" smtClean="0"/>
           </a:p>
           <a:p>
             <a:pPr marL="742950" indent="-742950">
@@ -23915,14 +25563,140 @@
             <a:endParaRPr lang="en-US" sz="4000" dirty="0"/>
           </a:p>
           <a:p>
-            <a:pPr marL="742950" indent="-742950">
-              <a:buAutoNum type="arabicPeriod"/>
-            </a:pPr>
             <a:r>
               <a:rPr lang="en-US" sz="4000" dirty="0" smtClean="0"/>
               <a:t>Write some R code to extract what you need</a:t>
             </a:r>
             <a:endParaRPr lang="en-US" sz="4000" dirty="0"/>
+          </a:p>
+        </p:txBody>
+      </p:sp>
+      <p:pic>
+        <p:nvPicPr>
+          <p:cNvPr id="8" name="Picture 7"/>
+          <p:cNvPicPr>
+            <a:picLocks noChangeAspect="1"/>
+          </p:cNvPicPr>
+          <p:nvPr/>
+        </p:nvPicPr>
+        <p:blipFill>
+          <a:blip r:embed="rId3">
+            <a:extLst>
+              <a:ext uri="{28A0092B-C50C-407E-A947-70E740481C1C}">
+                <a14:useLocalDpi xmlns:a14="http://schemas.microsoft.com/office/drawing/2010/main" val="0"/>
+              </a:ext>
+            </a:extLst>
+          </a:blip>
+          <a:stretch>
+            <a:fillRect/>
+          </a:stretch>
+        </p:blipFill>
+        <p:spPr>
+          <a:xfrm>
+            <a:off x="1179308" y="2003224"/>
+            <a:ext cx="992746" cy="992746"/>
+          </a:xfrm>
+          <a:prstGeom prst="rect">
+            <a:avLst/>
+          </a:prstGeom>
+        </p:spPr>
+      </p:pic>
+      <p:pic>
+        <p:nvPicPr>
+          <p:cNvPr id="9" name="Picture 8"/>
+          <p:cNvPicPr>
+            <a:picLocks noChangeAspect="1"/>
+          </p:cNvPicPr>
+          <p:nvPr/>
+        </p:nvPicPr>
+        <p:blipFill>
+          <a:blip r:embed="rId4" cstate="print">
+            <a:extLst>
+              <a:ext uri="{28A0092B-C50C-407E-A947-70E740481C1C}">
+                <a14:useLocalDpi xmlns:a14="http://schemas.microsoft.com/office/drawing/2010/main" val="0"/>
+              </a:ext>
+            </a:extLst>
+          </a:blip>
+          <a:stretch>
+            <a:fillRect/>
+          </a:stretch>
+        </p:blipFill>
+        <p:spPr>
+          <a:xfrm>
+            <a:off x="1024128" y="4394516"/>
+            <a:ext cx="1237595" cy="958965"/>
+          </a:xfrm>
+          <a:prstGeom prst="rect">
+            <a:avLst/>
+          </a:prstGeom>
+        </p:spPr>
+      </p:pic>
+      <p:pic>
+        <p:nvPicPr>
+          <p:cNvPr id="10" name="Picture 9"/>
+          <p:cNvPicPr>
+            <a:picLocks noChangeAspect="1"/>
+          </p:cNvPicPr>
+          <p:nvPr/>
+        </p:nvPicPr>
+        <p:blipFill>
+          <a:blip r:embed="rId5" cstate="print">
+            <a:extLst>
+              <a:ext uri="{28A0092B-C50C-407E-A947-70E740481C1C}">
+                <a14:useLocalDpi xmlns:a14="http://schemas.microsoft.com/office/drawing/2010/main" val="0"/>
+              </a:ext>
+            </a:extLst>
+          </a:blip>
+          <a:stretch>
+            <a:fillRect/>
+          </a:stretch>
+        </p:blipFill>
+        <p:spPr>
+          <a:xfrm>
+            <a:off x="1089639" y="3242352"/>
+            <a:ext cx="1172084" cy="846713"/>
+          </a:xfrm>
+          <a:prstGeom prst="rect">
+            <a:avLst/>
+          </a:prstGeom>
+        </p:spPr>
+      </p:pic>
+      <p:sp>
+        <p:nvSpPr>
+          <p:cNvPr id="4" name="Rectangle 3"/>
+          <p:cNvSpPr/>
+          <p:nvPr/>
+        </p:nvSpPr>
+        <p:spPr>
+          <a:xfrm>
+            <a:off x="1479433" y="3033151"/>
+            <a:ext cx="392496" cy="584775"/>
+          </a:xfrm>
+          <a:prstGeom prst="rect">
+            <a:avLst/>
+          </a:prstGeom>
+        </p:spPr>
+        <p:txBody>
+          <a:bodyPr wrap="square">
+            <a:spAutoFit/>
+          </a:bodyPr>
+          <a:lstStyle/>
+          <a:p>
+            <a:r>
+              <a:rPr lang="en-US" sz="3200" dirty="0">
+                <a:solidFill>
+                  <a:srgbClr val="C00000"/>
+                </a:solidFill>
+                <a:latin typeface="Segoe UI Symbol" panose="020B0502040204020203" pitchFamily="34" charset="0"/>
+                <a:ea typeface="Segoe UI Symbol" panose="020B0502040204020203" pitchFamily="34" charset="0"/>
+              </a:rPr>
+              <a:t>❗</a:t>
+            </a:r>
+            <a:endParaRPr lang="en-US" sz="3200" dirty="0">
+              <a:solidFill>
+                <a:srgbClr val="C00000"/>
+              </a:solidFill>
+            </a:endParaRPr>
           </a:p>
         </p:txBody>
       </p:sp>
@@ -24024,7 +25798,7 @@
         <p:spPr>
           <a:xfrm>
             <a:off x="546100" y="2042615"/>
-            <a:ext cx="11214100" cy="1200329"/>
+            <a:ext cx="11214100" cy="646331"/>
           </a:xfrm>
           <a:prstGeom prst="rect">
             <a:avLst/>
@@ -24047,7 +25821,11 @@
             </a:r>
             <a:r>
               <a:rPr lang="en-US" sz="3600" dirty="0" smtClean="0"/>
-              <a:t> package, that work in the same way:</a:t>
+              <a:t> </a:t>
+            </a:r>
+            <a:r>
+              <a:rPr lang="en-US" sz="3600" dirty="0" smtClean="0"/>
+              <a:t>package</a:t>
             </a:r>
             <a:endParaRPr lang="en-US" sz="3600" dirty="0"/>
           </a:p>
@@ -24438,10 +26216,10 @@
         </p:nvGrpSpPr>
         <p:grpSpPr>
           <a:xfrm>
-            <a:off x="-92570" y="3145233"/>
-            <a:ext cx="12675002" cy="3738167"/>
+            <a:off x="-82522" y="2084832"/>
+            <a:ext cx="12675002" cy="3888902"/>
             <a:chOff x="-92570" y="3145233"/>
-            <a:chExt cx="12675002" cy="3738167"/>
+            <a:chExt cx="12675002" cy="3888902"/>
           </a:xfrm>
         </p:grpSpPr>
         <p:grpSp>
@@ -24453,9 +26231,9 @@
           <p:grpSpPr>
             <a:xfrm>
               <a:off x="-92570" y="3145233"/>
-              <a:ext cx="12675002" cy="3738167"/>
+              <a:ext cx="12675002" cy="3888902"/>
               <a:chOff x="-92570" y="3145233"/>
-              <a:chExt cx="12675002" cy="3738167"/>
+              <a:chExt cx="12675002" cy="3888902"/>
             </a:xfrm>
           </p:grpSpPr>
           <p:grpSp>
@@ -24851,8 +26629,8 @@
             </p:nvSpPr>
             <p:spPr>
               <a:xfrm>
-                <a:off x="2196658" y="6127672"/>
-                <a:ext cx="8398740" cy="602943"/>
+                <a:off x="154854" y="6431192"/>
+                <a:ext cx="12323668" cy="602943"/>
               </a:xfrm>
               <a:prstGeom prst="rect">
                 <a:avLst/>
@@ -24883,7 +26661,7 @@
               <a:lstStyle/>
               <a:p>
                 <a:r>
-                  <a:rPr lang="en-US" sz="2000" dirty="0" err="1" smtClean="0">
+                  <a:rPr lang="en-US" sz="3200" dirty="0" err="1" smtClean="0">
                     <a:solidFill>
                       <a:schemeClr val="tx1"/>
                     </a:solidFill>
@@ -24893,17 +26671,27 @@
                   <a:t>subset_data</a:t>
                 </a:r>
                 <a:r>
-                  <a:rPr lang="en-US" sz="2000" dirty="0" smtClean="0">
+                  <a:rPr lang="en-US" sz="3200" dirty="0" smtClean="0">
                     <a:solidFill>
                       <a:schemeClr val="tx1"/>
                     </a:solidFill>
                     <a:latin typeface="Courier New" panose="02070309020205020404" pitchFamily="49" charset="0"/>
                     <a:cs typeface="Courier New" panose="02070309020205020404" pitchFamily="49" charset="0"/>
                   </a:rPr>
-                  <a:t> &lt;- </a:t>
+                  <a:t> </a:t>
                 </a:r>
                 <a:r>
-                  <a:rPr lang="en-US" sz="2000" dirty="0" err="1" smtClean="0">
+                  <a:rPr lang="en-US" sz="3200" dirty="0" smtClean="0">
+                    <a:solidFill>
+                      <a:schemeClr val="tx1"/>
+                    </a:solidFill>
+                    <a:latin typeface="Courier New" panose="02070309020205020404" pitchFamily="49" charset="0"/>
+                    <a:cs typeface="Courier New" panose="02070309020205020404" pitchFamily="49" charset="0"/>
+                  </a:rPr>
+                  <a:t>&lt;- </a:t>
+                </a:r>
+                <a:r>
+                  <a:rPr lang="en-US" sz="3200" dirty="0" err="1" smtClean="0">
                     <a:solidFill>
                       <a:schemeClr val="tx1"/>
                     </a:solidFill>
@@ -24913,7 +26701,7 @@
                   <a:t>function_name</a:t>
                 </a:r>
                 <a:r>
-                  <a:rPr lang="en-US" sz="2000" dirty="0" smtClean="0">
+                  <a:rPr lang="en-US" sz="3200" dirty="0" smtClean="0">
                     <a:solidFill>
                       <a:schemeClr val="tx1"/>
                     </a:solidFill>
@@ -24923,7 +26711,7 @@
                   <a:t>(</a:t>
                 </a:r>
                 <a:r>
-                  <a:rPr lang="en-US" sz="2000" dirty="0" err="1" smtClean="0">
+                  <a:rPr lang="en-US" sz="3200" dirty="0" err="1" smtClean="0">
                     <a:solidFill>
                       <a:schemeClr val="tx1"/>
                     </a:solidFill>
@@ -24933,7 +26721,7 @@
                   <a:t>some_data</a:t>
                 </a:r>
                 <a:r>
-                  <a:rPr lang="en-US" sz="2000" dirty="0" smtClean="0">
+                  <a:rPr lang="en-US" sz="3200" dirty="0" smtClean="0">
                     <a:solidFill>
                       <a:schemeClr val="tx1"/>
                     </a:solidFill>
@@ -24943,7 +26731,7 @@
                   <a:t>, </a:t>
                 </a:r>
                 <a:r>
-                  <a:rPr lang="en-US" sz="2000" dirty="0" err="1" smtClean="0">
+                  <a:rPr lang="en-US" sz="3200" dirty="0" err="1" smtClean="0">
                     <a:solidFill>
                       <a:schemeClr val="tx1"/>
                     </a:solidFill>
@@ -24953,7 +26741,7 @@
                   <a:t>a_subset</a:t>
                 </a:r>
                 <a:r>
-                  <a:rPr lang="en-US" sz="2000" dirty="0" smtClean="0">
+                  <a:rPr lang="en-US" sz="3200" dirty="0" smtClean="0">
                     <a:solidFill>
                       <a:schemeClr val="tx1"/>
                     </a:solidFill>
@@ -24962,7 +26750,7 @@
                   </a:rPr>
                   <a:t>)</a:t>
                 </a:r>
-                <a:endParaRPr lang="en-US" sz="2000" dirty="0">
+                <a:endParaRPr lang="en-US" sz="3200" dirty="0">
                   <a:solidFill>
                     <a:schemeClr val="tx1"/>
                   </a:solidFill>
@@ -25093,6 +26881,33 @@
                                   </p:childTnLst>
                                 </p:cTn>
                               </p:par>
+                              <p:par>
+                                <p:cTn id="7" presetID="1" presetClass="exit" presetSubtype="0" fill="hold" grpId="0" nodeType="withEffect">
+                                  <p:stCondLst>
+                                    <p:cond delay="0"/>
+                                  </p:stCondLst>
+                                  <p:childTnLst>
+                                    <p:set>
+                                      <p:cBhvr>
+                                        <p:cTn id="8" dur="1" fill="hold">
+                                          <p:stCondLst>
+                                            <p:cond delay="0"/>
+                                          </p:stCondLst>
+                                        </p:cTn>
+                                        <p:tgtEl>
+                                          <p:spTgt spid="8"/>
+                                        </p:tgtEl>
+                                        <p:attrNameLst>
+                                          <p:attrName>style.visibility</p:attrName>
+                                        </p:attrNameLst>
+                                      </p:cBhvr>
+                                      <p:to>
+                                        <p:strVal val="hidden"/>
+                                      </p:to>
+                                    </p:set>
+                                  </p:childTnLst>
+                                </p:cTn>
+                              </p:par>
                             </p:childTnLst>
                           </p:cTn>
                         </p:par>
@@ -25100,26 +26915,26 @@
                     </p:cTn>
                   </p:par>
                   <p:par>
-                    <p:cTn id="7" fill="hold">
+                    <p:cTn id="9" fill="hold">
                       <p:stCondLst>
                         <p:cond delay="indefinite"/>
                       </p:stCondLst>
                       <p:childTnLst>
                         <p:par>
-                          <p:cTn id="8" fill="hold">
+                          <p:cTn id="10" fill="hold">
                             <p:stCondLst>
                               <p:cond delay="0"/>
                             </p:stCondLst>
                             <p:childTnLst>
                               <p:par>
-                                <p:cTn id="9" presetID="1" presetClass="entr" presetSubtype="0" fill="hold" nodeType="clickEffect">
+                                <p:cTn id="11" presetID="1" presetClass="entr" presetSubtype="0" fill="hold" nodeType="clickEffect">
                                   <p:stCondLst>
                                     <p:cond delay="0"/>
                                   </p:stCondLst>
                                   <p:childTnLst>
                                     <p:set>
                                       <p:cBhvr>
-                                        <p:cTn id="10" dur="1" fill="hold">
+                                        <p:cTn id="12" dur="1" fill="hold">
                                           <p:stCondLst>
                                             <p:cond delay="0"/>
                                           </p:stCondLst>
@@ -25145,26 +26960,26 @@
                     </p:cTn>
                   </p:par>
                   <p:par>
-                    <p:cTn id="11" fill="hold">
+                    <p:cTn id="13" fill="hold">
                       <p:stCondLst>
                         <p:cond delay="indefinite"/>
                       </p:stCondLst>
                       <p:childTnLst>
                         <p:par>
-                          <p:cTn id="12" fill="hold">
+                          <p:cTn id="14" fill="hold">
                             <p:stCondLst>
                               <p:cond delay="0"/>
                             </p:stCondLst>
                             <p:childTnLst>
                               <p:par>
-                                <p:cTn id="13" presetID="1" presetClass="entr" presetSubtype="0" fill="hold" nodeType="clickEffect">
+                                <p:cTn id="15" presetID="1" presetClass="entr" presetSubtype="0" fill="hold" nodeType="clickEffect">
                                   <p:stCondLst>
                                     <p:cond delay="0"/>
                                   </p:stCondLst>
                                   <p:childTnLst>
                                     <p:set>
                                       <p:cBhvr>
-                                        <p:cTn id="14" dur="1" fill="hold">
+                                        <p:cTn id="16" dur="1" fill="hold">
                                           <p:stCondLst>
                                             <p:cond delay="0"/>
                                           </p:stCondLst>
@@ -25190,26 +27005,26 @@
                     </p:cTn>
                   </p:par>
                   <p:par>
-                    <p:cTn id="15" fill="hold">
+                    <p:cTn id="17" fill="hold">
                       <p:stCondLst>
                         <p:cond delay="indefinite"/>
                       </p:stCondLst>
                       <p:childTnLst>
                         <p:par>
-                          <p:cTn id="16" fill="hold">
+                          <p:cTn id="18" fill="hold">
                             <p:stCondLst>
                               <p:cond delay="0"/>
                             </p:stCondLst>
                             <p:childTnLst>
                               <p:par>
-                                <p:cTn id="17" presetID="1" presetClass="entr" presetSubtype="0" fill="hold" nodeType="clickEffect">
+                                <p:cTn id="19" presetID="1" presetClass="entr" presetSubtype="0" fill="hold" nodeType="clickEffect">
                                   <p:stCondLst>
                                     <p:cond delay="0"/>
                                   </p:stCondLst>
                                   <p:childTnLst>
                                     <p:set>
                                       <p:cBhvr>
-                                        <p:cTn id="18" dur="1" fill="hold">
+                                        <p:cTn id="20" dur="1" fill="hold">
                                           <p:stCondLst>
                                             <p:cond delay="0"/>
                                           </p:stCondLst>
@@ -25223,6 +27038,87 @@
                                       </p:cBhvr>
                                       <p:to>
                                         <p:strVal val="visible"/>
+                                      </p:to>
+                                    </p:set>
+                                  </p:childTnLst>
+                                </p:cTn>
+                              </p:par>
+                              <p:par>
+                                <p:cTn id="21" presetID="1" presetClass="exit" presetSubtype="0" fill="hold" nodeType="withEffect">
+                                  <p:stCondLst>
+                                    <p:cond delay="0"/>
+                                  </p:stCondLst>
+                                  <p:childTnLst>
+                                    <p:set>
+                                      <p:cBhvr>
+                                        <p:cTn id="22" dur="1" fill="hold">
+                                          <p:stCondLst>
+                                            <p:cond delay="0"/>
+                                          </p:stCondLst>
+                                        </p:cTn>
+                                        <p:tgtEl>
+                                          <p:spTgt spid="22"/>
+                                        </p:tgtEl>
+                                        <p:attrNameLst>
+                                          <p:attrName>style.visibility</p:attrName>
+                                        </p:attrNameLst>
+                                      </p:cBhvr>
+                                      <p:to>
+                                        <p:strVal val="hidden"/>
+                                      </p:to>
+                                    </p:set>
+                                  </p:childTnLst>
+                                </p:cTn>
+                              </p:par>
+                              <p:par>
+                                <p:cTn id="23" presetID="1" presetClass="exit" presetSubtype="0" fill="hold" nodeType="withEffect">
+                                  <p:stCondLst>
+                                    <p:cond delay="0"/>
+                                  </p:stCondLst>
+                                  <p:childTnLst>
+                                    <p:set>
+                                      <p:cBhvr>
+                                        <p:cTn id="24" dur="1" fill="hold">
+                                          <p:stCondLst>
+                                            <p:cond delay="0"/>
+                                          </p:stCondLst>
+                                        </p:cTn>
+                                        <p:tgtEl>
+                                          <p:spTgt spid="23"/>
+                                        </p:tgtEl>
+                                        <p:attrNameLst>
+                                          <p:attrName>style.visibility</p:attrName>
+                                        </p:attrNameLst>
+                                      </p:cBhvr>
+                                      <p:to>
+                                        <p:strVal val="hidden"/>
+                                      </p:to>
+                                    </p:set>
+                                  </p:childTnLst>
+                                </p:cTn>
+                              </p:par>
+                              <p:par>
+                                <p:cTn id="25" presetID="1" presetClass="exit" presetSubtype="0" fill="hold" nodeType="withEffect">
+                                  <p:stCondLst>
+                                    <p:cond delay="0"/>
+                                  </p:stCondLst>
+                                  <p:childTnLst>
+                                    <p:set>
+                                      <p:cBhvr>
+                                        <p:cTn id="26" dur="1" fill="hold">
+                                          <p:stCondLst>
+                                            <p:cond delay="0"/>
+                                          </p:stCondLst>
+                                        </p:cTn>
+                                        <p:tgtEl>
+                                          <p:spTgt spid="29"/>
+                                        </p:tgtEl>
+                                        <p:attrNameLst>
+                                          <p:attrName>style.visibility</p:attrName>
+                                        </p:attrNameLst>
+                                      </p:cBhvr>
+                                      <p:to>
+                                        <p:strVal val="hidden"/>
                                       </p:to>
                                     </p:set>
                                   </p:childTnLst>
@@ -25255,6 +27151,9 @@
         </p:cTn>
       </p:par>
     </p:tnLst>
+    <p:bldLst>
+      <p:bldP spid="8" grpId="0"/>
+    </p:bldLst>
   </p:timing>
 </p:sld>
 </file>
@@ -25802,10 +27701,10 @@
         </p:nvGrpSpPr>
         <p:grpSpPr>
           <a:xfrm>
-            <a:off x="5079392" y="2995336"/>
-            <a:ext cx="7268265" cy="1195866"/>
-            <a:chOff x="2802635" y="-1791202"/>
-            <a:chExt cx="7268265" cy="1195866"/>
+            <a:off x="5777345" y="2995336"/>
+            <a:ext cx="6570312" cy="1195866"/>
+            <a:chOff x="3500588" y="-1791202"/>
+            <a:chExt cx="6570312" cy="1195866"/>
           </a:xfrm>
         </p:grpSpPr>
         <p:sp>
@@ -25855,8 +27754,8 @@
           </p:nvSpPr>
           <p:spPr>
             <a:xfrm>
-              <a:off x="2802635" y="-1303222"/>
-              <a:ext cx="7268265" cy="707886"/>
+              <a:off x="3500588" y="-1303222"/>
+              <a:ext cx="6570312" cy="707886"/>
             </a:xfrm>
             <a:prstGeom prst="rect">
               <a:avLst/>
@@ -25869,9 +27768,10 @@
             </a:bodyPr>
             <a:lstStyle/>
             <a:p>
+              <a:pPr algn="ctr"/>
               <a:r>
                 <a:rPr lang="en-US" sz="4000" i="1" dirty="0" smtClean="0"/>
-                <a:t>Multiple columns: comma-separated</a:t>
+                <a:t>comma-separated</a:t>
               </a:r>
               <a:endParaRPr lang="en-US" sz="4000" i="1" dirty="0"/>
             </a:p>
@@ -25912,343 +27812,388 @@
       </p:sp>
       <p:grpSp>
         <p:nvGrpSpPr>
-          <p:cNvPr id="91" name="Group 90"/>
+          <p:cNvPr id="3" name="Group 2"/>
           <p:cNvGrpSpPr/>
           <p:nvPr/>
         </p:nvGrpSpPr>
         <p:grpSpPr>
           <a:xfrm>
-            <a:off x="322286" y="4349012"/>
+            <a:off x="322286" y="3129351"/>
             <a:ext cx="11659204" cy="2227821"/>
             <a:chOff x="322286" y="4349012"/>
             <a:chExt cx="11659204" cy="2227821"/>
           </a:xfrm>
         </p:grpSpPr>
-        <p:pic>
-          <p:nvPicPr>
-            <p:cNvPr id="49" name="Picture 48"/>
-            <p:cNvPicPr>
-              <a:picLocks noChangeAspect="1"/>
-            </p:cNvPicPr>
+        <p:grpSp>
+          <p:nvGrpSpPr>
+            <p:cNvPr id="91" name="Group 90"/>
+            <p:cNvGrpSpPr/>
             <p:nvPr/>
-          </p:nvPicPr>
-          <p:blipFill>
-            <a:blip r:embed="rId4"/>
-            <a:stretch>
-              <a:fillRect/>
-            </a:stretch>
-          </p:blipFill>
-          <p:spPr>
+          </p:nvGrpSpPr>
+          <p:grpSpPr>
             <a:xfrm>
               <a:off x="322286" y="4349012"/>
-              <a:ext cx="2828665" cy="1814055"/>
+              <a:ext cx="11659204" cy="2227821"/>
+              <a:chOff x="322286" y="4349012"/>
+              <a:chExt cx="11659204" cy="2227821"/>
             </a:xfrm>
-            <a:prstGeom prst="rect">
-              <a:avLst/>
-            </a:prstGeom>
-          </p:spPr>
-        </p:pic>
-        <p:pic>
-          <p:nvPicPr>
-            <p:cNvPr id="52" name="Picture 51"/>
-            <p:cNvPicPr>
-              <a:picLocks noChangeAspect="1"/>
-            </p:cNvPicPr>
-            <p:nvPr/>
-          </p:nvPicPr>
-          <p:blipFill>
-            <a:blip r:embed="rId5"/>
-            <a:stretch>
-              <a:fillRect/>
-            </a:stretch>
-          </p:blipFill>
-          <p:spPr>
-            <a:xfrm>
-              <a:off x="10288260" y="4349012"/>
-              <a:ext cx="1685355" cy="1814056"/>
-            </a:xfrm>
-            <a:prstGeom prst="rect">
-              <a:avLst/>
-            </a:prstGeom>
-          </p:spPr>
-        </p:pic>
+          </p:grpSpPr>
+          <p:pic>
+            <p:nvPicPr>
+              <p:cNvPr id="49" name="Picture 48"/>
+              <p:cNvPicPr>
+                <a:picLocks noChangeAspect="1"/>
+              </p:cNvPicPr>
+              <p:nvPr/>
+            </p:nvPicPr>
+            <p:blipFill>
+              <a:blip r:embed="rId4"/>
+              <a:stretch>
+                <a:fillRect/>
+              </a:stretch>
+            </p:blipFill>
+            <p:spPr>
+              <a:xfrm>
+                <a:off x="322286" y="4349012"/>
+                <a:ext cx="2828665" cy="1814055"/>
+              </a:xfrm>
+              <a:prstGeom prst="rect">
+                <a:avLst/>
+              </a:prstGeom>
+            </p:spPr>
+          </p:pic>
+          <p:pic>
+            <p:nvPicPr>
+              <p:cNvPr id="52" name="Picture 51"/>
+              <p:cNvPicPr>
+                <a:picLocks noChangeAspect="1"/>
+              </p:cNvPicPr>
+              <p:nvPr/>
+            </p:nvPicPr>
+            <p:blipFill>
+              <a:blip r:embed="rId5"/>
+              <a:stretch>
+                <a:fillRect/>
+              </a:stretch>
+            </p:blipFill>
+            <p:spPr>
+              <a:xfrm>
+                <a:off x="10288260" y="4349012"/>
+                <a:ext cx="1685355" cy="1814056"/>
+              </a:xfrm>
+              <a:prstGeom prst="rect">
+                <a:avLst/>
+              </a:prstGeom>
+            </p:spPr>
+          </p:pic>
+          <p:sp>
+            <p:nvSpPr>
+              <p:cNvPr id="53" name="Rectangle 52"/>
+              <p:cNvSpPr/>
+              <p:nvPr/>
+            </p:nvSpPr>
+            <p:spPr>
+              <a:xfrm>
+                <a:off x="3856838" y="4954567"/>
+                <a:ext cx="5712434" cy="602943"/>
+              </a:xfrm>
+              <a:prstGeom prst="rect">
+                <a:avLst/>
+              </a:prstGeom>
+              <a:noFill/>
+              <a:ln>
+                <a:noFill/>
+              </a:ln>
+            </p:spPr>
+            <p:style>
+              <a:lnRef idx="2">
+                <a:schemeClr val="accent1">
+                  <a:shade val="50000"/>
+                </a:schemeClr>
+              </a:lnRef>
+              <a:fillRef idx="1">
+                <a:schemeClr val="accent1"/>
+              </a:fillRef>
+              <a:effectRef idx="0">
+                <a:schemeClr val="accent1"/>
+              </a:effectRef>
+              <a:fontRef idx="minor">
+                <a:schemeClr val="lt1"/>
+              </a:fontRef>
+            </p:style>
+            <p:txBody>
+              <a:bodyPr rtlCol="0" anchor="ctr"/>
+              <a:lstStyle/>
+              <a:p>
+                <a:pPr algn="ctr"/>
+                <a:r>
+                  <a:rPr lang="en-US" sz="2000" dirty="0" smtClean="0">
+                    <a:solidFill>
+                      <a:schemeClr val="tx1"/>
+                    </a:solidFill>
+                    <a:latin typeface="Courier New" panose="02070309020205020404" pitchFamily="49" charset="0"/>
+                    <a:cs typeface="Courier New" panose="02070309020205020404" pitchFamily="49" charset="0"/>
+                  </a:rPr>
+                  <a:t>select(</a:t>
+                </a:r>
+                <a:r>
+                  <a:rPr lang="en-US" sz="2000" dirty="0" err="1" smtClean="0">
+                    <a:solidFill>
+                      <a:schemeClr val="tx1"/>
+                    </a:solidFill>
+                    <a:latin typeface="Courier New" panose="02070309020205020404" pitchFamily="49" charset="0"/>
+                    <a:cs typeface="Courier New" panose="02070309020205020404" pitchFamily="49" charset="0"/>
+                  </a:rPr>
+                  <a:t>some_data</a:t>
+                </a:r>
+                <a:r>
+                  <a:rPr lang="en-US" sz="2000" dirty="0" smtClean="0">
+                    <a:solidFill>
+                      <a:schemeClr val="tx1"/>
+                    </a:solidFill>
+                    <a:latin typeface="Courier New" panose="02070309020205020404" pitchFamily="49" charset="0"/>
+                    <a:cs typeface="Courier New" panose="02070309020205020404" pitchFamily="49" charset="0"/>
+                  </a:rPr>
+                  <a:t>, </a:t>
+                </a:r>
+                <a:r>
+                  <a:rPr lang="en-US" sz="2000" dirty="0" err="1" smtClean="0">
+                    <a:solidFill>
+                      <a:schemeClr val="tx1"/>
+                    </a:solidFill>
+                    <a:latin typeface="Courier New" panose="02070309020205020404" pitchFamily="49" charset="0"/>
+                    <a:cs typeface="Courier New" panose="02070309020205020404" pitchFamily="49" charset="0"/>
+                  </a:rPr>
+                  <a:t>colA</a:t>
+                </a:r>
+                <a:r>
+                  <a:rPr lang="en-US" sz="2000" dirty="0" smtClean="0">
+                    <a:solidFill>
+                      <a:schemeClr val="tx1"/>
+                    </a:solidFill>
+                    <a:latin typeface="Courier New" panose="02070309020205020404" pitchFamily="49" charset="0"/>
+                    <a:cs typeface="Courier New" panose="02070309020205020404" pitchFamily="49" charset="0"/>
+                  </a:rPr>
+                  <a:t>, </a:t>
+                </a:r>
+                <a:r>
+                  <a:rPr lang="en-US" sz="2000" dirty="0" err="1" smtClean="0">
+                    <a:solidFill>
+                      <a:schemeClr val="tx1"/>
+                    </a:solidFill>
+                    <a:latin typeface="Courier New" panose="02070309020205020404" pitchFamily="49" charset="0"/>
+                    <a:cs typeface="Courier New" panose="02070309020205020404" pitchFamily="49" charset="0"/>
+                  </a:rPr>
+                  <a:t>colB</a:t>
+                </a:r>
+                <a:r>
+                  <a:rPr lang="en-US" sz="2000" dirty="0" smtClean="0">
+                    <a:solidFill>
+                      <a:schemeClr val="tx1"/>
+                    </a:solidFill>
+                    <a:latin typeface="Courier New" panose="02070309020205020404" pitchFamily="49" charset="0"/>
+                    <a:cs typeface="Courier New" panose="02070309020205020404" pitchFamily="49" charset="0"/>
+                  </a:rPr>
+                  <a:t>, </a:t>
+                </a:r>
+                <a:r>
+                  <a:rPr lang="en-US" sz="2000" dirty="0" err="1" smtClean="0">
+                    <a:solidFill>
+                      <a:schemeClr val="tx1"/>
+                    </a:solidFill>
+                    <a:latin typeface="Courier New" panose="02070309020205020404" pitchFamily="49" charset="0"/>
+                    <a:cs typeface="Courier New" panose="02070309020205020404" pitchFamily="49" charset="0"/>
+                  </a:rPr>
+                  <a:t>colC</a:t>
+                </a:r>
+                <a:r>
+                  <a:rPr lang="en-US" sz="2000" dirty="0" smtClean="0">
+                    <a:solidFill>
+                      <a:schemeClr val="tx1"/>
+                    </a:solidFill>
+                    <a:latin typeface="Courier New" panose="02070309020205020404" pitchFamily="49" charset="0"/>
+                    <a:cs typeface="Courier New" panose="02070309020205020404" pitchFamily="49" charset="0"/>
+                  </a:rPr>
+                  <a:t>)</a:t>
+                </a:r>
+                <a:endParaRPr lang="en-US" sz="2000" dirty="0">
+                  <a:solidFill>
+                    <a:schemeClr val="tx1"/>
+                  </a:solidFill>
+                  <a:latin typeface="Courier New" panose="02070309020205020404" pitchFamily="49" charset="0"/>
+                  <a:cs typeface="Courier New" panose="02070309020205020404" pitchFamily="49" charset="0"/>
+                </a:endParaRPr>
+              </a:p>
+            </p:txBody>
+          </p:sp>
+          <p:cxnSp>
+            <p:nvCxnSpPr>
+              <p:cNvPr id="65" name="Straight Arrow Connector 64"/>
+              <p:cNvCxnSpPr>
+                <a:stCxn id="49" idx="3"/>
+                <a:endCxn id="53" idx="1"/>
+              </p:cNvCxnSpPr>
+              <p:nvPr/>
+            </p:nvCxnSpPr>
+            <p:spPr>
+              <a:xfrm flipV="1">
+                <a:off x="3150951" y="5256039"/>
+                <a:ext cx="705887" cy="1"/>
+              </a:xfrm>
+              <a:prstGeom prst="straightConnector1">
+                <a:avLst/>
+              </a:prstGeom>
+              <a:ln w="25400">
+                <a:tailEnd type="triangle"/>
+              </a:ln>
+            </p:spPr>
+            <p:style>
+              <a:lnRef idx="1">
+                <a:schemeClr val="accent1"/>
+              </a:lnRef>
+              <a:fillRef idx="0">
+                <a:schemeClr val="accent1"/>
+              </a:fillRef>
+              <a:effectRef idx="0">
+                <a:schemeClr val="accent1"/>
+              </a:effectRef>
+              <a:fontRef idx="minor">
+                <a:schemeClr val="tx1"/>
+              </a:fontRef>
+            </p:style>
+          </p:cxnSp>
+          <p:cxnSp>
+            <p:nvCxnSpPr>
+              <p:cNvPr id="67" name="Straight Arrow Connector 66"/>
+              <p:cNvCxnSpPr>
+                <a:stCxn id="53" idx="3"/>
+                <a:endCxn id="52" idx="1"/>
+              </p:cNvCxnSpPr>
+              <p:nvPr/>
+            </p:nvCxnSpPr>
+            <p:spPr>
+              <a:xfrm>
+                <a:off x="9569272" y="5256039"/>
+                <a:ext cx="718988" cy="1"/>
+              </a:xfrm>
+              <a:prstGeom prst="straightConnector1">
+                <a:avLst/>
+              </a:prstGeom>
+              <a:ln w="25400">
+                <a:tailEnd type="triangle"/>
+              </a:ln>
+            </p:spPr>
+            <p:style>
+              <a:lnRef idx="1">
+                <a:schemeClr val="accent1"/>
+              </a:lnRef>
+              <a:fillRef idx="0">
+                <a:schemeClr val="accent1"/>
+              </a:fillRef>
+              <a:effectRef idx="0">
+                <a:schemeClr val="accent1"/>
+              </a:effectRef>
+              <a:fontRef idx="minor">
+                <a:schemeClr val="tx1"/>
+              </a:fontRef>
+            </p:style>
+          </p:cxnSp>
+          <p:sp>
+            <p:nvSpPr>
+              <p:cNvPr id="68" name="Rectangle 67"/>
+              <p:cNvSpPr/>
+              <p:nvPr/>
+            </p:nvSpPr>
+            <p:spPr>
+              <a:xfrm>
+                <a:off x="827035" y="6207501"/>
+                <a:ext cx="1425390" cy="369332"/>
+              </a:xfrm>
+              <a:prstGeom prst="rect">
+                <a:avLst/>
+              </a:prstGeom>
+            </p:spPr>
+            <p:txBody>
+              <a:bodyPr wrap="none">
+                <a:spAutoFit/>
+              </a:bodyPr>
+              <a:lstStyle/>
+              <a:p>
+                <a:r>
+                  <a:rPr lang="en-US" dirty="0" err="1" smtClean="0">
+                    <a:solidFill>
+                      <a:schemeClr val="tx1"/>
+                    </a:solidFill>
+                    <a:latin typeface="Courier New" panose="02070309020205020404" pitchFamily="49" charset="0"/>
+                    <a:cs typeface="Courier New" panose="02070309020205020404" pitchFamily="49" charset="0"/>
+                  </a:rPr>
+                  <a:t>some_data</a:t>
+                </a:r>
+                <a:endParaRPr lang="en-US" dirty="0"/>
+              </a:p>
+            </p:txBody>
+          </p:sp>
+          <p:sp>
+            <p:nvSpPr>
+              <p:cNvPr id="90" name="Rectangle 89"/>
+              <p:cNvSpPr/>
+              <p:nvPr/>
+            </p:nvSpPr>
+            <p:spPr>
+              <a:xfrm>
+                <a:off x="10280383" y="6207501"/>
+                <a:ext cx="1701107" cy="369332"/>
+              </a:xfrm>
+              <a:prstGeom prst="rect">
+                <a:avLst/>
+              </a:prstGeom>
+            </p:spPr>
+            <p:txBody>
+              <a:bodyPr wrap="none">
+                <a:spAutoFit/>
+              </a:bodyPr>
+              <a:lstStyle/>
+              <a:p>
+                <a:r>
+                  <a:rPr lang="en-US" dirty="0" err="1" smtClean="0">
+                    <a:solidFill>
+                      <a:schemeClr val="tx1"/>
+                    </a:solidFill>
+                    <a:latin typeface="Courier New" panose="02070309020205020404" pitchFamily="49" charset="0"/>
+                    <a:cs typeface="Courier New" panose="02070309020205020404" pitchFamily="49" charset="0"/>
+                  </a:rPr>
+                  <a:t>subset_data</a:t>
+                </a:r>
+                <a:endParaRPr lang="en-US" dirty="0"/>
+              </a:p>
+            </p:txBody>
+          </p:sp>
+        </p:grpSp>
         <p:sp>
           <p:nvSpPr>
-            <p:cNvPr id="53" name="Rectangle 52"/>
-            <p:cNvSpPr/>
+            <p:cNvPr id="2" name="TextBox 1"/>
+            <p:cNvSpPr txBox="1"/>
             <p:nvPr/>
           </p:nvSpPr>
           <p:spPr>
             <a:xfrm>
-              <a:off x="3856838" y="4954567"/>
-              <a:ext cx="5712434" cy="602943"/>
+              <a:off x="3969327" y="4816311"/>
+              <a:ext cx="5599945" cy="369332"/>
             </a:xfrm>
             <a:prstGeom prst="rect">
               <a:avLst/>
             </a:prstGeom>
             <a:noFill/>
-            <a:ln>
-              <a:noFill/>
-            </a:ln>
-          </p:spPr>
-          <p:style>
-            <a:lnRef idx="2">
-              <a:schemeClr val="accent1">
-                <a:shade val="50000"/>
-              </a:schemeClr>
-            </a:lnRef>
-            <a:fillRef idx="1">
-              <a:schemeClr val="accent1"/>
-            </a:fillRef>
-            <a:effectRef idx="0">
-              <a:schemeClr val="accent1"/>
-            </a:effectRef>
-            <a:fontRef idx="minor">
-              <a:schemeClr val="lt1"/>
-            </a:fontRef>
-          </p:style>
-          <p:txBody>
-            <a:bodyPr rtlCol="0" anchor="ctr"/>
-            <a:lstStyle/>
-            <a:p>
-              <a:pPr algn="ctr"/>
-              <a:r>
-                <a:rPr lang="en-US" sz="2000" dirty="0" smtClean="0">
-                  <a:solidFill>
-                    <a:schemeClr val="tx1"/>
-                  </a:solidFill>
-                  <a:latin typeface="Courier New" panose="02070309020205020404" pitchFamily="49" charset="0"/>
-                  <a:cs typeface="Courier New" panose="02070309020205020404" pitchFamily="49" charset="0"/>
-                </a:rPr>
-                <a:t>select(</a:t>
-              </a:r>
-              <a:r>
-                <a:rPr lang="en-US" sz="2000" dirty="0" err="1" smtClean="0">
-                  <a:solidFill>
-                    <a:schemeClr val="tx1"/>
-                  </a:solidFill>
-                  <a:latin typeface="Courier New" panose="02070309020205020404" pitchFamily="49" charset="0"/>
-                  <a:cs typeface="Courier New" panose="02070309020205020404" pitchFamily="49" charset="0"/>
-                </a:rPr>
-                <a:t>some_data</a:t>
-              </a:r>
-              <a:r>
-                <a:rPr lang="en-US" sz="2000" dirty="0" smtClean="0">
-                  <a:solidFill>
-                    <a:schemeClr val="tx1"/>
-                  </a:solidFill>
-                  <a:latin typeface="Courier New" panose="02070309020205020404" pitchFamily="49" charset="0"/>
-                  <a:cs typeface="Courier New" panose="02070309020205020404" pitchFamily="49" charset="0"/>
-                </a:rPr>
-                <a:t>, </a:t>
-              </a:r>
-              <a:r>
-                <a:rPr lang="en-US" sz="2000" dirty="0" err="1" smtClean="0">
-                  <a:solidFill>
-                    <a:schemeClr val="tx1"/>
-                  </a:solidFill>
-                  <a:latin typeface="Courier New" panose="02070309020205020404" pitchFamily="49" charset="0"/>
-                  <a:cs typeface="Courier New" panose="02070309020205020404" pitchFamily="49" charset="0"/>
-                </a:rPr>
-                <a:t>colA</a:t>
-              </a:r>
-              <a:r>
-                <a:rPr lang="en-US" sz="2000" dirty="0" smtClean="0">
-                  <a:solidFill>
-                    <a:schemeClr val="tx1"/>
-                  </a:solidFill>
-                  <a:latin typeface="Courier New" panose="02070309020205020404" pitchFamily="49" charset="0"/>
-                  <a:cs typeface="Courier New" panose="02070309020205020404" pitchFamily="49" charset="0"/>
-                </a:rPr>
-                <a:t>, </a:t>
-              </a:r>
-              <a:r>
-                <a:rPr lang="en-US" sz="2000" dirty="0" err="1" smtClean="0">
-                  <a:solidFill>
-                    <a:schemeClr val="tx1"/>
-                  </a:solidFill>
-                  <a:latin typeface="Courier New" panose="02070309020205020404" pitchFamily="49" charset="0"/>
-                  <a:cs typeface="Courier New" panose="02070309020205020404" pitchFamily="49" charset="0"/>
-                </a:rPr>
-                <a:t>colB</a:t>
-              </a:r>
-              <a:r>
-                <a:rPr lang="en-US" sz="2000" dirty="0" smtClean="0">
-                  <a:solidFill>
-                    <a:schemeClr val="tx1"/>
-                  </a:solidFill>
-                  <a:latin typeface="Courier New" panose="02070309020205020404" pitchFamily="49" charset="0"/>
-                  <a:cs typeface="Courier New" panose="02070309020205020404" pitchFamily="49" charset="0"/>
-                </a:rPr>
-                <a:t>, </a:t>
-              </a:r>
-              <a:r>
-                <a:rPr lang="en-US" sz="2000" dirty="0" err="1" smtClean="0">
-                  <a:solidFill>
-                    <a:schemeClr val="tx1"/>
-                  </a:solidFill>
-                  <a:latin typeface="Courier New" panose="02070309020205020404" pitchFamily="49" charset="0"/>
-                  <a:cs typeface="Courier New" panose="02070309020205020404" pitchFamily="49" charset="0"/>
-                </a:rPr>
-                <a:t>colC</a:t>
-              </a:r>
-              <a:r>
-                <a:rPr lang="en-US" sz="2000" dirty="0" smtClean="0">
-                  <a:solidFill>
-                    <a:schemeClr val="tx1"/>
-                  </a:solidFill>
-                  <a:latin typeface="Courier New" panose="02070309020205020404" pitchFamily="49" charset="0"/>
-                  <a:cs typeface="Courier New" panose="02070309020205020404" pitchFamily="49" charset="0"/>
-                </a:rPr>
-                <a:t>)</a:t>
-              </a:r>
-              <a:endParaRPr lang="en-US" sz="2000" dirty="0">
-                <a:solidFill>
-                  <a:schemeClr val="tx1"/>
-                </a:solidFill>
-                <a:latin typeface="Courier New" panose="02070309020205020404" pitchFamily="49" charset="0"/>
-                <a:cs typeface="Courier New" panose="02070309020205020404" pitchFamily="49" charset="0"/>
-              </a:endParaRPr>
-            </a:p>
-          </p:txBody>
-        </p:sp>
-        <p:cxnSp>
-          <p:nvCxnSpPr>
-            <p:cNvPr id="65" name="Straight Arrow Connector 64"/>
-            <p:cNvCxnSpPr>
-              <a:stCxn id="49" idx="3"/>
-              <a:endCxn id="53" idx="1"/>
-            </p:cNvCxnSpPr>
-            <p:nvPr/>
-          </p:nvCxnSpPr>
-          <p:spPr>
-            <a:xfrm flipV="1">
-              <a:off x="3150951" y="5256039"/>
-              <a:ext cx="705887" cy="1"/>
-            </a:xfrm>
-            <a:prstGeom prst="straightConnector1">
-              <a:avLst/>
-            </a:prstGeom>
-            <a:ln w="25400">
-              <a:tailEnd type="triangle"/>
-            </a:ln>
-          </p:spPr>
-          <p:style>
-            <a:lnRef idx="1">
-              <a:schemeClr val="accent1"/>
-            </a:lnRef>
-            <a:fillRef idx="0">
-              <a:schemeClr val="accent1"/>
-            </a:fillRef>
-            <a:effectRef idx="0">
-              <a:schemeClr val="accent1"/>
-            </a:effectRef>
-            <a:fontRef idx="minor">
-              <a:schemeClr val="tx1"/>
-            </a:fontRef>
-          </p:style>
-        </p:cxnSp>
-        <p:cxnSp>
-          <p:nvCxnSpPr>
-            <p:cNvPr id="67" name="Straight Arrow Connector 66"/>
-            <p:cNvCxnSpPr>
-              <a:stCxn id="53" idx="3"/>
-              <a:endCxn id="52" idx="1"/>
-            </p:cNvCxnSpPr>
-            <p:nvPr/>
-          </p:nvCxnSpPr>
-          <p:spPr>
-            <a:xfrm>
-              <a:off x="9569272" y="5256039"/>
-              <a:ext cx="718988" cy="1"/>
-            </a:xfrm>
-            <a:prstGeom prst="straightConnector1">
-              <a:avLst/>
-            </a:prstGeom>
-            <a:ln w="25400">
-              <a:tailEnd type="triangle"/>
-            </a:ln>
-          </p:spPr>
-          <p:style>
-            <a:lnRef idx="1">
-              <a:schemeClr val="accent1"/>
-            </a:lnRef>
-            <a:fillRef idx="0">
-              <a:schemeClr val="accent1"/>
-            </a:fillRef>
-            <a:effectRef idx="0">
-              <a:schemeClr val="accent1"/>
-            </a:effectRef>
-            <a:fontRef idx="minor">
-              <a:schemeClr val="tx1"/>
-            </a:fontRef>
-          </p:style>
-        </p:cxnSp>
-        <p:sp>
-          <p:nvSpPr>
-            <p:cNvPr id="68" name="Rectangle 67"/>
-            <p:cNvSpPr/>
-            <p:nvPr/>
-          </p:nvSpPr>
-          <p:spPr>
-            <a:xfrm>
-              <a:off x="827035" y="6207501"/>
-              <a:ext cx="1425390" cy="369332"/>
-            </a:xfrm>
-            <a:prstGeom prst="rect">
-              <a:avLst/>
-            </a:prstGeom>
           </p:spPr>
           <p:txBody>
-            <a:bodyPr wrap="none">
+            <a:bodyPr wrap="square" rtlCol="0">
               <a:spAutoFit/>
             </a:bodyPr>
             <a:lstStyle/>
             <a:p>
               <a:r>
-                <a:rPr lang="en-US" dirty="0" err="1" smtClean="0">
-                  <a:solidFill>
-                    <a:schemeClr val="tx1"/>
-                  </a:solidFill>
-                  <a:latin typeface="Courier New" panose="02070309020205020404" pitchFamily="49" charset="0"/>
-                  <a:cs typeface="Courier New" panose="02070309020205020404" pitchFamily="49" charset="0"/>
-                </a:rPr>
-                <a:t>some_data</a:t>
-              </a:r>
-              <a:endParaRPr lang="en-US" dirty="0"/>
-            </a:p>
-          </p:txBody>
-        </p:sp>
-        <p:sp>
-          <p:nvSpPr>
-            <p:cNvPr id="90" name="Rectangle 89"/>
-            <p:cNvSpPr/>
-            <p:nvPr/>
-          </p:nvSpPr>
-          <p:spPr>
-            <a:xfrm>
-              <a:off x="10280383" y="6207501"/>
-              <a:ext cx="1701107" cy="369332"/>
-            </a:xfrm>
-            <a:prstGeom prst="rect">
-              <a:avLst/>
-            </a:prstGeom>
-          </p:spPr>
-          <p:txBody>
-            <a:bodyPr wrap="none">
-              <a:spAutoFit/>
-            </a:bodyPr>
-            <a:lstStyle/>
-            <a:p>
-              <a:r>
-                <a:rPr lang="en-US" dirty="0" err="1" smtClean="0">
-                  <a:solidFill>
-                    <a:schemeClr val="tx1"/>
-                  </a:solidFill>
-                  <a:latin typeface="Courier New" panose="02070309020205020404" pitchFamily="49" charset="0"/>
-                  <a:cs typeface="Courier New" panose="02070309020205020404" pitchFamily="49" charset="0"/>
-                </a:rPr>
-                <a:t>subset_data</a:t>
+                <a:rPr lang="en-US" dirty="0" smtClean="0"/>
+                <a:t>An example</a:t>
               </a:r>
               <a:endParaRPr lang="en-US" dirty="0"/>
             </a:p>
@@ -26528,21 +28473,39 @@
                                   </p:childTnLst>
                                 </p:cTn>
                               </p:par>
+                            </p:childTnLst>
+                          </p:cTn>
+                        </p:par>
+                      </p:childTnLst>
+                    </p:cTn>
+                  </p:par>
+                  <p:par>
+                    <p:cTn id="25" fill="hold">
+                      <p:stCondLst>
+                        <p:cond delay="indefinite"/>
+                      </p:stCondLst>
+                      <p:childTnLst>
+                        <p:par>
+                          <p:cTn id="26" fill="hold">
+                            <p:stCondLst>
+                              <p:cond delay="0"/>
+                            </p:stCondLst>
+                            <p:childTnLst>
                               <p:par>
-                                <p:cTn id="25" presetID="1" presetClass="entr" presetSubtype="0" fill="hold" nodeType="withEffect">
+                                <p:cTn id="27" presetID="1" presetClass="entr" presetSubtype="0" fill="hold" nodeType="clickEffect">
                                   <p:stCondLst>
                                     <p:cond delay="0"/>
                                   </p:stCondLst>
                                   <p:childTnLst>
                                     <p:set>
                                       <p:cBhvr>
-                                        <p:cTn id="26" dur="1" fill="hold">
+                                        <p:cTn id="28" dur="1" fill="hold">
                                           <p:stCondLst>
                                             <p:cond delay="0"/>
                                           </p:stCondLst>
                                         </p:cTn>
                                         <p:tgtEl>
-                                          <p:spTgt spid="91"/>
+                                          <p:spTgt spid="3"/>
                                         </p:tgtEl>
                                         <p:attrNameLst>
                                           <p:attrName>style.visibility</p:attrName>
@@ -26550,6 +28513,60 @@
                                       </p:cBhvr>
                                       <p:to>
                                         <p:strVal val="visible"/>
+                                      </p:to>
+                                    </p:set>
+                                  </p:childTnLst>
+                                </p:cTn>
+                              </p:par>
+                              <p:par>
+                                <p:cTn id="29" presetID="1" presetClass="exit" presetSubtype="0" fill="hold" grpId="1" nodeType="withEffect">
+                                  <p:stCondLst>
+                                    <p:cond delay="0"/>
+                                  </p:stCondLst>
+                                  <p:childTnLst>
+                                    <p:set>
+                                      <p:cBhvr>
+                                        <p:cTn id="30" dur="1" fill="hold">
+                                          <p:stCondLst>
+                                            <p:cond delay="0"/>
+                                          </p:stCondLst>
+                                        </p:cTn>
+                                        <p:tgtEl>
+                                          <p:spTgt spid="73"/>
+                                        </p:tgtEl>
+                                        <p:attrNameLst>
+                                          <p:attrName>style.visibility</p:attrName>
+                                        </p:attrNameLst>
+                                      </p:cBhvr>
+                                      <p:to>
+                                        <p:strVal val="hidden"/>
+                                      </p:to>
+                                    </p:set>
+                                  </p:childTnLst>
+                                </p:cTn>
+                              </p:par>
+                              <p:par>
+                                <p:cTn id="31" presetID="1" presetClass="exit" presetSubtype="0" fill="hold" nodeType="withEffect">
+                                  <p:stCondLst>
+                                    <p:cond delay="0"/>
+                                  </p:stCondLst>
+                                  <p:childTnLst>
+                                    <p:set>
+                                      <p:cBhvr>
+                                        <p:cTn id="32" dur="1" fill="hold">
+                                          <p:stCondLst>
+                                            <p:cond delay="0"/>
+                                          </p:stCondLst>
+                                        </p:cTn>
+                                        <p:tgtEl>
+                                          <p:spTgt spid="92"/>
+                                        </p:tgtEl>
+                                        <p:attrNameLst>
+                                          <p:attrName>style.visibility</p:attrName>
+                                        </p:attrNameLst>
+                                      </p:cBhvr>
+                                      <p:to>
+                                        <p:strVal val="hidden"/>
                                       </p:to>
                                     </p:set>
                                   </p:childTnLst>
@@ -26586,6 +28603,7 @@
       <p:bldP spid="69" grpId="0"/>
       <p:bldP spid="69" grpId="1"/>
       <p:bldP spid="73" grpId="0"/>
+      <p:bldP spid="73" grpId="1"/>
     </p:bldLst>
   </p:timing>
 </p:sld>
@@ -26707,7 +28725,7 @@
                 <a:ea typeface="+mj-ea"/>
                 <a:cs typeface="+mj-cs"/>
               </a:rPr>
-              <a:t>Exercises</a:t>
+              <a:t>quiz</a:t>
             </a:r>
             <a:endParaRPr lang="en-US" sz="3200" cap="all" spc="100" dirty="0">
               <a:solidFill>
@@ -26747,7 +28765,15 @@
           <a:p>
             <a:r>
               <a:rPr lang="en-US" sz="2800" dirty="0" smtClean="0"/>
-              <a:t>You have some data, </a:t>
+              <a:t>You have </a:t>
+            </a:r>
+            <a:r>
+              <a:rPr lang="en-US" sz="2800" dirty="0" smtClean="0"/>
+              <a:t>data</a:t>
+            </a:r>
+            <a:r>
+              <a:rPr lang="en-US" sz="2800" dirty="0" smtClean="0"/>
+              <a:t>, </a:t>
             </a:r>
             <a:r>
               <a:rPr lang="en-US" sz="2800" dirty="0" err="1" smtClean="0">
@@ -26765,7 +28791,15 @@
             </a:r>
             <a:r>
               <a:rPr lang="en-US" sz="2800" dirty="0" smtClean="0"/>
-              <a:t>and want to take a subset of 3 columns: </a:t>
+              <a:t>and want to take </a:t>
+            </a:r>
+            <a:r>
+              <a:rPr lang="en-US" sz="2800" dirty="0" smtClean="0"/>
+              <a:t>and keep a </a:t>
+            </a:r>
+            <a:r>
+              <a:rPr lang="en-US" sz="2800" dirty="0" smtClean="0"/>
+              <a:t>subset of 3 columns: </a:t>
             </a:r>
             <a:r>
               <a:rPr lang="en-US" sz="2800" dirty="0" err="1" smtClean="0">
@@ -26811,7 +28845,11 @@
             </a:r>
             <a:r>
               <a:rPr lang="en-US" sz="2800" b="1" dirty="0" smtClean="0"/>
-              <a:t>Which line is correct?</a:t>
+              <a:t>Which line is correct</a:t>
+            </a:r>
+            <a:r>
+              <a:rPr lang="en-US" sz="2800" b="1" dirty="0" smtClean="0"/>
+              <a:t>? Why?</a:t>
             </a:r>
             <a:endParaRPr lang="en-US" sz="2800" b="1" dirty="0">
               <a:latin typeface="Courier New" panose="02070309020205020404" pitchFamily="49" charset="0"/>
@@ -27345,7 +29383,7 @@
         </p:nvSpPr>
         <p:spPr>
           <a:xfrm>
-            <a:off x="702243" y="2388113"/>
+            <a:off x="702242" y="2402416"/>
             <a:ext cx="11271369" cy="602943"/>
           </a:xfrm>
           <a:prstGeom prst="rect">
@@ -27404,7 +29442,37 @@
                 <a:latin typeface="Courier New" panose="02070309020205020404" pitchFamily="49" charset="0"/>
                 <a:cs typeface="Courier New" panose="02070309020205020404" pitchFamily="49" charset="0"/>
               </a:rPr>
-              <a:t>, col4 &gt; 65)</a:t>
+              <a:t>, </a:t>
+            </a:r>
+            <a:r>
+              <a:rPr lang="en-US" sz="4800" dirty="0" err="1" smtClean="0">
+                <a:solidFill>
+                  <a:schemeClr val="tx1"/>
+                </a:solidFill>
+                <a:latin typeface="Courier New" panose="02070309020205020404" pitchFamily="49" charset="0"/>
+                <a:cs typeface="Courier New" panose="02070309020205020404" pitchFamily="49" charset="0"/>
+              </a:rPr>
+              <a:t>colD</a:t>
+            </a:r>
+            <a:r>
+              <a:rPr lang="en-US" sz="4800" dirty="0" smtClean="0">
+                <a:solidFill>
+                  <a:schemeClr val="tx1"/>
+                </a:solidFill>
+                <a:latin typeface="Courier New" panose="02070309020205020404" pitchFamily="49" charset="0"/>
+                <a:cs typeface="Courier New" panose="02070309020205020404" pitchFamily="49" charset="0"/>
+              </a:rPr>
+              <a:t> </a:t>
+            </a:r>
+            <a:r>
+              <a:rPr lang="en-US" sz="4800" dirty="0" smtClean="0">
+                <a:solidFill>
+                  <a:schemeClr val="tx1"/>
+                </a:solidFill>
+                <a:latin typeface="Courier New" panose="02070309020205020404" pitchFamily="49" charset="0"/>
+                <a:cs typeface="Courier New" panose="02070309020205020404" pitchFamily="49" charset="0"/>
+              </a:rPr>
+              <a:t>&gt; 65)</a:t>
             </a:r>
             <a:endParaRPr lang="en-US" sz="4800" dirty="0">
               <a:solidFill>
@@ -27505,7 +29573,7 @@
         </p:nvSpPr>
         <p:spPr>
           <a:xfrm>
-            <a:off x="702242" y="2381133"/>
+            <a:off x="702242" y="2413215"/>
             <a:ext cx="11271369" cy="1352054"/>
           </a:xfrm>
           <a:prstGeom prst="rect">
@@ -27564,7 +29632,67 @@
                 <a:latin typeface="Courier New" panose="02070309020205020404" pitchFamily="49" charset="0"/>
                 <a:cs typeface="Courier New" panose="02070309020205020404" pitchFamily="49" charset="0"/>
               </a:rPr>
-              <a:t>, col4 &gt; 65, col6 == “P”)</a:t>
+              <a:t>, </a:t>
+            </a:r>
+            <a:r>
+              <a:rPr lang="en-US" sz="4800" dirty="0" err="1" smtClean="0">
+                <a:solidFill>
+                  <a:schemeClr val="tx1"/>
+                </a:solidFill>
+                <a:latin typeface="Courier New" panose="02070309020205020404" pitchFamily="49" charset="0"/>
+                <a:cs typeface="Courier New" panose="02070309020205020404" pitchFamily="49" charset="0"/>
+              </a:rPr>
+              <a:t>colD</a:t>
+            </a:r>
+            <a:r>
+              <a:rPr lang="en-US" sz="4800" dirty="0" smtClean="0">
+                <a:solidFill>
+                  <a:schemeClr val="tx1"/>
+                </a:solidFill>
+                <a:latin typeface="Courier New" panose="02070309020205020404" pitchFamily="49" charset="0"/>
+                <a:cs typeface="Courier New" panose="02070309020205020404" pitchFamily="49" charset="0"/>
+              </a:rPr>
+              <a:t> </a:t>
+            </a:r>
+            <a:r>
+              <a:rPr lang="en-US" sz="4800" dirty="0" smtClean="0">
+                <a:solidFill>
+                  <a:schemeClr val="tx1"/>
+                </a:solidFill>
+                <a:latin typeface="Courier New" panose="02070309020205020404" pitchFamily="49" charset="0"/>
+                <a:cs typeface="Courier New" panose="02070309020205020404" pitchFamily="49" charset="0"/>
+              </a:rPr>
+              <a:t>&gt; 65, </a:t>
+            </a:r>
+            <a:r>
+              <a:rPr lang="en-US" sz="4800" dirty="0" err="1" smtClean="0">
+                <a:solidFill>
+                  <a:schemeClr val="tx1"/>
+                </a:solidFill>
+                <a:latin typeface="Courier New" panose="02070309020205020404" pitchFamily="49" charset="0"/>
+                <a:cs typeface="Courier New" panose="02070309020205020404" pitchFamily="49" charset="0"/>
+              </a:rPr>
+              <a:t>colE</a:t>
+            </a:r>
+            <a:r>
+              <a:rPr lang="en-US" sz="4800" dirty="0" smtClean="0">
+                <a:solidFill>
+                  <a:schemeClr val="tx1"/>
+                </a:solidFill>
+                <a:latin typeface="Courier New" panose="02070309020205020404" pitchFamily="49" charset="0"/>
+                <a:cs typeface="Courier New" panose="02070309020205020404" pitchFamily="49" charset="0"/>
+              </a:rPr>
+              <a:t> </a:t>
+            </a:r>
+            <a:r>
+              <a:rPr lang="en-US" sz="4800" dirty="0" smtClean="0">
+                <a:solidFill>
+                  <a:schemeClr val="tx1"/>
+                </a:solidFill>
+                <a:latin typeface="Courier New" panose="02070309020205020404" pitchFamily="49" charset="0"/>
+                <a:cs typeface="Courier New" panose="02070309020205020404" pitchFamily="49" charset="0"/>
+              </a:rPr>
+              <a:t>== “P”)</a:t>
             </a:r>
             <a:endParaRPr lang="en-US" sz="4800" dirty="0">
               <a:solidFill>
@@ -27738,7 +29866,67 @@
                   <a:latin typeface="Courier New" panose="02070309020205020404" pitchFamily="49" charset="0"/>
                   <a:cs typeface="Courier New" panose="02070309020205020404" pitchFamily="49" charset="0"/>
                 </a:rPr>
-                <a:t>, col4 &gt; 65, col6 == “P”)</a:t>
+                <a:t>, </a:t>
+              </a:r>
+              <a:r>
+                <a:rPr lang="en-US" sz="2000" dirty="0" err="1" smtClean="0">
+                  <a:solidFill>
+                    <a:schemeClr val="tx1"/>
+                  </a:solidFill>
+                  <a:latin typeface="Courier New" panose="02070309020205020404" pitchFamily="49" charset="0"/>
+                  <a:cs typeface="Courier New" panose="02070309020205020404" pitchFamily="49" charset="0"/>
+                </a:rPr>
+                <a:t>colD</a:t>
+              </a:r>
+              <a:r>
+                <a:rPr lang="en-US" sz="2000" dirty="0" smtClean="0">
+                  <a:solidFill>
+                    <a:schemeClr val="tx1"/>
+                  </a:solidFill>
+                  <a:latin typeface="Courier New" panose="02070309020205020404" pitchFamily="49" charset="0"/>
+                  <a:cs typeface="Courier New" panose="02070309020205020404" pitchFamily="49" charset="0"/>
+                </a:rPr>
+                <a:t> </a:t>
+              </a:r>
+              <a:r>
+                <a:rPr lang="en-US" sz="2000" dirty="0" smtClean="0">
+                  <a:solidFill>
+                    <a:schemeClr val="tx1"/>
+                  </a:solidFill>
+                  <a:latin typeface="Courier New" panose="02070309020205020404" pitchFamily="49" charset="0"/>
+                  <a:cs typeface="Courier New" panose="02070309020205020404" pitchFamily="49" charset="0"/>
+                </a:rPr>
+                <a:t>&gt; 65, </a:t>
+              </a:r>
+              <a:r>
+                <a:rPr lang="en-US" sz="2000" dirty="0" err="1" smtClean="0">
+                  <a:solidFill>
+                    <a:schemeClr val="tx1"/>
+                  </a:solidFill>
+                  <a:latin typeface="Courier New" panose="02070309020205020404" pitchFamily="49" charset="0"/>
+                  <a:cs typeface="Courier New" panose="02070309020205020404" pitchFamily="49" charset="0"/>
+                </a:rPr>
+                <a:t>colE</a:t>
+              </a:r>
+              <a:r>
+                <a:rPr lang="en-US" sz="2000" dirty="0" smtClean="0">
+                  <a:solidFill>
+                    <a:schemeClr val="tx1"/>
+                  </a:solidFill>
+                  <a:latin typeface="Courier New" panose="02070309020205020404" pitchFamily="49" charset="0"/>
+                  <a:cs typeface="Courier New" panose="02070309020205020404" pitchFamily="49" charset="0"/>
+                </a:rPr>
+                <a:t> </a:t>
+              </a:r>
+              <a:r>
+                <a:rPr lang="en-US" sz="2000" dirty="0" smtClean="0">
+                  <a:solidFill>
+                    <a:schemeClr val="tx1"/>
+                  </a:solidFill>
+                  <a:latin typeface="Courier New" panose="02070309020205020404" pitchFamily="49" charset="0"/>
+                  <a:cs typeface="Courier New" panose="02070309020205020404" pitchFamily="49" charset="0"/>
+                </a:rPr>
+                <a:t>== “P”)</a:t>
               </a:r>
               <a:endParaRPr lang="en-US" sz="2000" dirty="0">
                 <a:solidFill>
@@ -27901,10 +30089,10 @@
         </p:nvGrpSpPr>
         <p:grpSpPr>
           <a:xfrm>
-            <a:off x="702240" y="3446818"/>
-            <a:ext cx="7746628" cy="1004064"/>
-            <a:chOff x="827031" y="3447504"/>
-            <a:chExt cx="7746628" cy="1004064"/>
+            <a:off x="7288981" y="3040352"/>
+            <a:ext cx="3856086" cy="1004063"/>
+            <a:chOff x="4717573" y="3447505"/>
+            <a:chExt cx="3856086" cy="1004063"/>
           </a:xfrm>
         </p:grpSpPr>
         <p:sp>
@@ -27915,8 +30103,8 @@
           </p:nvSpPr>
           <p:spPr>
             <a:xfrm>
-              <a:off x="827031" y="3743682"/>
-              <a:ext cx="7746628" cy="707886"/>
+              <a:off x="4717573" y="3743682"/>
+              <a:ext cx="3856086" cy="707886"/>
             </a:xfrm>
             <a:prstGeom prst="rect">
               <a:avLst/>
@@ -27931,7 +30119,7 @@
             <a:p>
               <a:r>
                 <a:rPr lang="en-US" sz="4000" i="1" dirty="0" smtClean="0"/>
-                <a:t>Multiple conditions: comma-separated</a:t>
+                <a:t>comma-separated</a:t>
               </a:r>
               <a:endParaRPr lang="en-US" sz="4000" i="1" dirty="0"/>
             </a:p>
@@ -27947,8 +30135,8 @@
           </p:nvCxnSpPr>
           <p:spPr>
             <a:xfrm flipH="1" flipV="1">
-              <a:off x="8291038" y="3447504"/>
-              <a:ext cx="282621" cy="650121"/>
+              <a:off x="8291039" y="3447505"/>
+              <a:ext cx="282620" cy="650120"/>
             </a:xfrm>
             <a:prstGeom prst="curvedConnector4">
               <a:avLst>
@@ -28428,7 +30616,7 @@
                 <a:ea typeface="+mj-ea"/>
                 <a:cs typeface="+mj-cs"/>
               </a:rPr>
-              <a:t>Exercises</a:t>
+              <a:t>quiz</a:t>
             </a:r>
             <a:endParaRPr lang="en-US" sz="3200" cap="all" spc="100" dirty="0">
               <a:solidFill>
@@ -28452,8 +30640,8 @@
         </p:nvSpPr>
         <p:spPr>
           <a:xfrm>
-            <a:off x="917222" y="2516012"/>
-            <a:ext cx="10477500" cy="954107"/>
+            <a:off x="879761" y="2300568"/>
+            <a:ext cx="10477500" cy="1384995"/>
           </a:xfrm>
           <a:prstGeom prst="rect">
             <a:avLst/>
@@ -28468,7 +30656,15 @@
           <a:p>
             <a:r>
               <a:rPr lang="en-US" sz="2800" dirty="0" smtClean="0"/>
-              <a:t>You have some data, </a:t>
+              <a:t>You have </a:t>
+            </a:r>
+            <a:r>
+              <a:rPr lang="en-US" sz="2800" dirty="0" smtClean="0"/>
+              <a:t>data</a:t>
+            </a:r>
+            <a:r>
+              <a:rPr lang="en-US" sz="2800" dirty="0" smtClean="0"/>
+              <a:t>, </a:t>
             </a:r>
             <a:r>
               <a:rPr lang="en-US" sz="2800" dirty="0" err="1" smtClean="0">
@@ -28486,7 +30682,15 @@
             </a:r>
             <a:r>
               <a:rPr lang="en-US" sz="2800" dirty="0" smtClean="0"/>
-              <a:t>and want to take a subset where </a:t>
+              <a:t>and want to </a:t>
+            </a:r>
+            <a:r>
+              <a:rPr lang="en-US" sz="2800" dirty="0" smtClean="0"/>
+              <a:t>take and keep </a:t>
+            </a:r>
+            <a:r>
+              <a:rPr lang="en-US" sz="2800" dirty="0" smtClean="0"/>
+              <a:t>a subset where </a:t>
             </a:r>
             <a:r>
               <a:rPr lang="en-US" sz="2800" dirty="0" err="1" smtClean="0">
@@ -28497,7 +30701,15 @@
             </a:r>
             <a:r>
               <a:rPr lang="en-US" sz="2800" dirty="0" smtClean="0"/>
-              <a:t> is at over 65 and </a:t>
+              <a:t> is </a:t>
+            </a:r>
+            <a:r>
+              <a:rPr lang="en-US" sz="2800" dirty="0" smtClean="0"/>
+              <a:t>over </a:t>
+            </a:r>
+            <a:r>
+              <a:rPr lang="en-US" sz="2800" dirty="0" smtClean="0"/>
+              <a:t>65 and </a:t>
             </a:r>
             <a:r>
               <a:rPr lang="en-US" sz="2800" dirty="0" err="1" smtClean="0">
@@ -28508,7 +30720,11 @@
             </a:r>
             <a:r>
               <a:rPr lang="en-US" sz="2800" dirty="0" smtClean="0"/>
-              <a:t> is 1</a:t>
+              <a:t> is </a:t>
+            </a:r>
+            <a:r>
+              <a:rPr lang="en-US" sz="2800" dirty="0" smtClean="0"/>
+              <a:t>exactly 1</a:t>
             </a:r>
             <a:r>
               <a:rPr lang="en-US" sz="2800" dirty="0" smtClean="0">
@@ -28519,7 +30735,11 @@
             </a:r>
             <a:r>
               <a:rPr lang="en-US" sz="2800" b="1" dirty="0" smtClean="0"/>
-              <a:t>Which line is correct?</a:t>
+              <a:t>Which line is correct</a:t>
+            </a:r>
+            <a:r>
+              <a:rPr lang="en-US" sz="2800" b="1" dirty="0" smtClean="0"/>
+              <a:t>? Why?</a:t>
             </a:r>
             <a:endParaRPr lang="en-US" sz="2800" b="1" dirty="0">
               <a:latin typeface="Courier New" panose="02070309020205020404" pitchFamily="49" charset="0"/>

</xml_diff>

<commit_message>
Move mental map in to main slides, and remove old deck
</commit_message>
<xml_diff>
--- a/data-subsetting.pptx
+++ b/data-subsetting.pptx
@@ -5,7 +5,7 @@
     <p:sldMasterId id="2147483660" r:id="rId1"/>
   </p:sldMasterIdLst>
   <p:notesMasterIdLst>
-    <p:notesMasterId r:id="rId12"/>
+    <p:notesMasterId r:id="rId14"/>
   </p:notesMasterIdLst>
   <p:sldIdLst>
     <p:sldId id="256" r:id="rId2"/>
@@ -18,6 +18,8 @@
     <p:sldId id="262" r:id="rId9"/>
     <p:sldId id="263" r:id="rId10"/>
     <p:sldId id="265" r:id="rId11"/>
+    <p:sldId id="267" r:id="rId12"/>
+    <p:sldId id="266" r:id="rId13"/>
   </p:sldIdLst>
   <p:sldSz cx="12192000" cy="6858000"/>
   <p:notesSz cx="6858000" cy="9144000"/>
@@ -209,7 +211,7 @@
           <a:p>
             <a:fld id="{8BBA90DE-0CBD-471C-9481-850953A91599}" type="datetimeFigureOut">
               <a:rPr lang="en-US" smtClean="0"/>
-              <a:t>2020-03-30</a:t>
+              <a:t>2020-03-31</a:t>
             </a:fld>
             <a:endParaRPr lang="en-US"/>
           </a:p>
@@ -705,7 +707,11 @@
             </a:pPr>
             <a:r>
               <a:rPr lang="en-US" dirty="0" smtClean="0"/>
-              <a:t>We’re in this situation.</a:t>
+              <a:t>You’ve received lots of data, a lot of which isn’t useful</a:t>
+            </a:r>
+            <a:r>
+              <a:rPr lang="en-US" baseline="0" dirty="0" smtClean="0"/>
+              <a:t> to you.</a:t>
             </a:r>
           </a:p>
           <a:p>
@@ -714,20 +720,6 @@
               <a:buChar char="•"/>
             </a:pPr>
             <a:r>
-              <a:rPr lang="en-US" dirty="0" smtClean="0"/>
-              <a:t>You’ve received lots of data, a lot of which isn’t useful</a:t>
-            </a:r>
-            <a:r>
-              <a:rPr lang="en-US" baseline="0" dirty="0" smtClean="0"/>
-              <a:t> to you.</a:t>
-            </a:r>
-          </a:p>
-          <a:p>
-            <a:pPr marL="171450" indent="-171450">
-              <a:buFont typeface="Arial" panose="020B0604020202020204" pitchFamily="34" charset="0"/>
-              <a:buChar char="•"/>
-            </a:pPr>
-            <a:r>
               <a:rPr lang="en-US" baseline="0" dirty="0" smtClean="0"/>
               <a:t>There are </a:t>
             </a:r>
@@ -739,7 +731,7 @@
             </a:pPr>
             <a:r>
               <a:rPr lang="en-US" baseline="0" dirty="0" smtClean="0"/>
-              <a:t>Columns you’re not interested in (because the measurements aren’t relevant to your study)</a:t>
+              <a:t>Columns you’re not interested in (e.g. because the measurements aren’t relevant to your study)</a:t>
             </a:r>
           </a:p>
           <a:p>
@@ -749,7 +741,7 @@
             </a:pPr>
             <a:r>
               <a:rPr lang="en-US" baseline="0" dirty="0" smtClean="0"/>
-              <a:t>Rows you don’t care about (e.g. because of the values in them)</a:t>
+              <a:t>Rows you don’t care about (e.g. because of the values in them mean that information isn’t useful to you)</a:t>
             </a:r>
           </a:p>
           <a:p>
@@ -763,12 +755,31 @@
             </a:r>
             <a:r>
               <a:rPr lang="en-US" b="1" baseline="0" dirty="0" smtClean="0"/>
-              <a:t>need to get to just the data you’re interested in, </a:t>
+              <a:t>need to get to just the data you’re interested </a:t>
             </a:r>
             <a:r>
               <a:rPr lang="en-US" b="1" baseline="0" dirty="0" smtClean="0"/>
-              <a:t>(and fast)!</a:t>
-            </a:r>
+              <a:t>in.</a:t>
+            </a:r>
+          </a:p>
+          <a:p>
+            <a:pPr marL="171450" lvl="0" indent="-171450">
+              <a:buFont typeface="Arial" panose="020B0604020202020204" pitchFamily="34" charset="0"/>
+              <a:buChar char="•"/>
+            </a:pPr>
+            <a:r>
+              <a:rPr lang="en-US" b="1" baseline="0" dirty="0" smtClean="0"/>
+              <a:t>You </a:t>
+            </a:r>
+            <a:r>
+              <a:rPr lang="en-US" b="1" baseline="0" dirty="0" smtClean="0"/>
+              <a:t>need to </a:t>
+            </a:r>
+            <a:r>
+              <a:rPr lang="en-US" b="1" baseline="0" dirty="0" smtClean="0"/>
+              <a:t>subset, based on the rows and columns of your data!</a:t>
+            </a:r>
+            <a:endParaRPr lang="en-US" b="1" baseline="0" dirty="0" smtClean="0"/>
           </a:p>
         </p:txBody>
       </p:sp>
@@ -860,10 +871,6 @@
               <a:rPr lang="en-US" b="0" dirty="0" smtClean="0"/>
               <a:t>Is not great – there’s going to be more data next week, and you’d have to do this all over again</a:t>
             </a:r>
-            <a:br>
-              <a:rPr lang="en-US" b="0" dirty="0" smtClean="0"/>
-            </a:br>
-            <a:endParaRPr lang="en-US" b="0" dirty="0" smtClean="0"/>
           </a:p>
           <a:p>
             <a:pPr marL="228600" indent="-228600">
@@ -874,10 +881,6 @@
               <a:rPr lang="en-US" b="0" dirty="0" smtClean="0"/>
               <a:t>Might be hard – they already said that getting the data were tricky</a:t>
             </a:r>
-            <a:br>
-              <a:rPr lang="en-US" b="0" dirty="0" smtClean="0"/>
-            </a:br>
-            <a:endParaRPr lang="en-US" b="0" dirty="0" smtClean="0"/>
           </a:p>
           <a:p>
             <a:pPr marL="228600" indent="-228600">
@@ -886,11 +889,7 @@
             </a:pPr>
             <a:r>
               <a:rPr lang="en-US" b="0" dirty="0" smtClean="0"/>
-              <a:t>Will require some of your effort, but that’s why you’re in this class</a:t>
-            </a:r>
-            <a:r>
-              <a:rPr lang="en-US" b="0" dirty="0" smtClean="0"/>
-              <a:t>!</a:t>
+              <a:t>Will require some of your effort, but that’s why you’re in this class!</a:t>
             </a:r>
           </a:p>
           <a:p>
@@ -1346,11 +1345,7 @@
             </a:pPr>
             <a:r>
               <a:rPr lang="en-US" b="0" i="0" baseline="0" dirty="0" smtClean="0"/>
-              <a:t>And we get the same function sig. we had before: name, data, </a:t>
-            </a:r>
-            <a:r>
-              <a:rPr lang="en-US" b="0" i="0" baseline="0" dirty="0" smtClean="0"/>
-              <a:t>subset</a:t>
+              <a:t>And we get the same function sig. we had before: name, data, subset</a:t>
             </a:r>
           </a:p>
           <a:p>
@@ -1362,7 +1357,6 @@
               <a:rPr lang="en-US" b="0" i="0" baseline="0" dirty="0" smtClean="0"/>
               <a:t>Let’s see a couple of quick examples</a:t>
             </a:r>
-            <a:endParaRPr lang="en-US" b="0" i="0" baseline="0" dirty="0" smtClean="0"/>
           </a:p>
         </p:txBody>
       </p:sp>
@@ -1573,15 +1567,7 @@
             </a:pPr>
             <a:r>
               <a:rPr lang="en-US" dirty="0" smtClean="0"/>
-              <a:t>The </a:t>
-            </a:r>
-            <a:r>
-              <a:rPr lang="en-US" dirty="0" smtClean="0"/>
-              <a:t>other </a:t>
-            </a:r>
-            <a:r>
-              <a:rPr lang="en-US" dirty="0" smtClean="0"/>
-              <a:t>function we’re going to use is </a:t>
+              <a:t>The other function we’re going to use is </a:t>
             </a:r>
             <a:r>
               <a:rPr lang="en-US" i="1" dirty="0" smtClean="0"/>
@@ -1589,19 +1575,7 @@
             </a:r>
             <a:r>
               <a:rPr lang="en-US" i="0" dirty="0" smtClean="0"/>
-              <a:t> </a:t>
-            </a:r>
-            <a:r>
-              <a:rPr lang="en-US" i="0" dirty="0" smtClean="0"/>
-              <a:t>– used to get just the </a:t>
-            </a:r>
-            <a:r>
-              <a:rPr lang="en-US" i="0" dirty="0" smtClean="0"/>
-              <a:t>rows </a:t>
-            </a:r>
-            <a:r>
-              <a:rPr lang="en-US" i="0" dirty="0" smtClean="0"/>
-              <a:t>we</a:t>
+              <a:t> – used to get just the rows we</a:t>
             </a:r>
             <a:r>
               <a:rPr lang="en-US" i="0" baseline="0" dirty="0" smtClean="0"/>
@@ -1615,13 +1589,8 @@
             </a:pPr>
             <a:r>
               <a:rPr lang="en-US" i="0" baseline="0" dirty="0" smtClean="0"/>
-              <a:t>What do we think goes in the gap, remembering the mental model </a:t>
-            </a:r>
-            <a:r>
-              <a:rPr lang="en-US" i="0" baseline="0" dirty="0" smtClean="0"/>
-              <a:t>of name, data, subset?</a:t>
-            </a:r>
-            <a:endParaRPr lang="en-US" i="0" baseline="0" dirty="0" smtClean="0"/>
+              <a:t>What do we think goes in the gap, remembering the mental model of name, data, subset?</a:t>
+            </a:r>
           </a:p>
           <a:p>
             <a:pPr marL="171450" lvl="0" indent="-171450">
@@ -1630,15 +1599,7 @@
             </a:pPr>
             <a:r>
               <a:rPr lang="en-US" i="0" baseline="0" dirty="0" smtClean="0"/>
-              <a:t>The </a:t>
-            </a:r>
-            <a:r>
-              <a:rPr lang="en-US" i="0" baseline="0" dirty="0" smtClean="0"/>
-              <a:t>answer is a </a:t>
-            </a:r>
-            <a:r>
-              <a:rPr lang="en-US" i="0" baseline="0" dirty="0" smtClean="0"/>
-              <a:t>condition – use &gt;, &lt;, ==, &gt;=, &lt;=, etc.</a:t>
+              <a:t>The answer is a condition – use &gt;, &lt;, ==, &gt;=, &lt;=, etc.</a:t>
             </a:r>
           </a:p>
           <a:p>
@@ -1648,17 +1609,8 @@
             </a:pPr>
             <a:r>
               <a:rPr lang="en-US" b="0" i="0" baseline="0" dirty="0" smtClean="0"/>
-              <a:t>But </a:t>
-            </a:r>
-            <a:r>
-              <a:rPr lang="en-US" b="0" i="0" baseline="0" dirty="0" smtClean="0"/>
-              <a:t>what if we want more than </a:t>
-            </a:r>
-            <a:r>
-              <a:rPr lang="en-US" b="0" i="0" baseline="0" dirty="0" smtClean="0"/>
-              <a:t>1?</a:t>
-            </a:r>
-            <a:endParaRPr lang="en-US" b="0" i="0" baseline="0" dirty="0" smtClean="0"/>
+              <a:t>But what if we want more than 1?</a:t>
+            </a:r>
           </a:p>
           <a:p>
             <a:pPr marL="171450" lvl="0" indent="-171450">
@@ -1677,15 +1629,7 @@
             </a:pPr>
             <a:r>
               <a:rPr lang="en-US" b="0" i="0" baseline="0" dirty="0" smtClean="0"/>
-              <a:t>Until we have (potentially) multiple </a:t>
-            </a:r>
-            <a:r>
-              <a:rPr lang="en-US" b="0" i="0" baseline="0" dirty="0" smtClean="0"/>
-              <a:t>conditions, </a:t>
-            </a:r>
-            <a:r>
-              <a:rPr lang="en-US" b="0" i="0" baseline="0" dirty="0" smtClean="0"/>
-              <a:t>comma-separated</a:t>
+              <a:t>Until we have (potentially) multiple conditions, comma-separated</a:t>
             </a:r>
           </a:p>
           <a:p>
@@ -1695,11 +1639,7 @@
             </a:pPr>
             <a:r>
               <a:rPr lang="en-US" b="0" i="0" baseline="0" dirty="0" smtClean="0"/>
-              <a:t>And we get the same function sig. we had before: name, data, </a:t>
-            </a:r>
-            <a:r>
-              <a:rPr lang="en-US" b="0" i="0" baseline="0" dirty="0" smtClean="0"/>
-              <a:t>subset</a:t>
+              <a:t>And we get the same function sig. we had before: name, data, subset</a:t>
             </a:r>
           </a:p>
           <a:p>
@@ -1947,13 +1887,86 @@
           <a:bodyPr/>
           <a:lstStyle/>
           <a:p>
+            <a:pPr marL="171450" lvl="0" indent="-171450">
+              <a:buFont typeface="Arial" panose="020B0604020202020204" pitchFamily="34" charset="0"/>
+              <a:buChar char="•"/>
+            </a:pPr>
+            <a:r>
+              <a:rPr lang="en-US" b="1" i="0" baseline="0" dirty="0" smtClean="0"/>
+              <a:t>Let’s do some exercises – go to the </a:t>
+            </a:r>
+            <a:r>
+              <a:rPr lang="en-US" b="1" i="0" baseline="0" dirty="0" err="1" smtClean="0"/>
+              <a:t>RStudio</a:t>
+            </a:r>
+            <a:r>
+              <a:rPr lang="en-US" b="1" i="0" baseline="0" dirty="0" smtClean="0"/>
+              <a:t> cloud project, and open up the </a:t>
+            </a:r>
+            <a:r>
+              <a:rPr lang="en-US" b="1" i="0" baseline="0" dirty="0" err="1" smtClean="0"/>
+              <a:t>subsetting.Rmd</a:t>
+            </a:r>
+            <a:r>
+              <a:rPr lang="en-US" b="1" i="0" baseline="0" dirty="0" smtClean="0"/>
+              <a:t> exercise</a:t>
+            </a:r>
+          </a:p>
+          <a:p>
+            <a:pPr marL="628650" lvl="1" indent="-171450">
+              <a:buFont typeface="Arial" panose="020B0604020202020204" pitchFamily="34" charset="0"/>
+              <a:buChar char="•"/>
+            </a:pPr>
+            <a:r>
+              <a:rPr lang="en-US" b="1" i="0" baseline="0" dirty="0" smtClean="0"/>
+              <a:t>Work through them</a:t>
+            </a:r>
+            <a:endParaRPr lang="en-US" b="1" baseline="0" dirty="0" smtClean="0"/>
+          </a:p>
+          <a:p>
             <a:pPr marL="171450" indent="-171450">
               <a:buFont typeface="Arial" panose="020B0604020202020204" pitchFamily="34" charset="0"/>
               <a:buChar char="•"/>
             </a:pPr>
             <a:r>
               <a:rPr lang="en-US" b="1" baseline="0" dirty="0" smtClean="0"/>
-              <a:t>So now you have learned how to </a:t>
+              <a:t>So now you have learned how to:</a:t>
+            </a:r>
+          </a:p>
+          <a:p>
+            <a:pPr marL="628650" lvl="1" indent="-171450">
+              <a:buFont typeface="Arial" panose="020B0604020202020204" pitchFamily="34" charset="0"/>
+              <a:buChar char="•"/>
+            </a:pPr>
+            <a:r>
+              <a:rPr lang="en-US" b="1" baseline="0" dirty="0" smtClean="0"/>
+              <a:t>Get the </a:t>
+            </a:r>
+            <a:r>
+              <a:rPr lang="en-US" b="1" i="1" baseline="0" dirty="0" smtClean="0"/>
+              <a:t>rows</a:t>
+            </a:r>
+            <a:r>
+              <a:rPr lang="en-US" b="1" baseline="0" dirty="0" smtClean="0"/>
+              <a:t> you care about using filter()</a:t>
+            </a:r>
+          </a:p>
+          <a:p>
+            <a:pPr marL="628650" lvl="1" indent="-171450">
+              <a:buFont typeface="Arial" panose="020B0604020202020204" pitchFamily="34" charset="0"/>
+              <a:buChar char="•"/>
+            </a:pPr>
+            <a:r>
+              <a:rPr lang="en-US" b="1" baseline="0" dirty="0" smtClean="0"/>
+              <a:t>Get the </a:t>
+            </a:r>
+            <a:r>
+              <a:rPr lang="en-US" b="1" i="1" baseline="0" dirty="0" smtClean="0"/>
+              <a:t>columns</a:t>
+            </a:r>
+            <a:r>
+              <a:rPr lang="en-US" b="1" i="0" baseline="0" dirty="0" smtClean="0"/>
+              <a:t> you care about using select()</a:t>
             </a:r>
           </a:p>
         </p:txBody>
@@ -10787,7 +10800,7 @@
           <a:p>
             <a:fld id="{B5B8FAE6-331F-4C0E-8996-7471609552E9}" type="datetimeFigureOut">
               <a:rPr lang="en-US" smtClean="0"/>
-              <a:t>2020-03-30</a:t>
+              <a:t>2020-03-31</a:t>
             </a:fld>
             <a:endParaRPr lang="en-US"/>
           </a:p>
@@ -10897,7 +10910,6 @@
               <a:rPr lang="en-US" dirty="0" smtClean="0"/>
               <a:t>https://rstudio.cloud/project/1088739</a:t>
             </a:r>
-            <a:endParaRPr lang="en-US" dirty="0" smtClean="0"/>
           </a:p>
         </p:txBody>
       </p:sp>
@@ -11030,7 +11042,7 @@
           <a:p>
             <a:fld id="{B5B8FAE6-331F-4C0E-8996-7471609552E9}" type="datetimeFigureOut">
               <a:rPr lang="en-US" smtClean="0"/>
-              <a:t>2020-03-30</a:t>
+              <a:t>2020-03-31</a:t>
             </a:fld>
             <a:endParaRPr lang="en-US"/>
           </a:p>
@@ -11210,7 +11222,7 @@
           <a:p>
             <a:fld id="{B5B8FAE6-331F-4C0E-8996-7471609552E9}" type="datetimeFigureOut">
               <a:rPr lang="en-US" smtClean="0"/>
-              <a:t>2020-03-30</a:t>
+              <a:t>2020-03-31</a:t>
             </a:fld>
             <a:endParaRPr lang="en-US"/>
           </a:p>
@@ -11415,7 +11427,7 @@
           <a:p>
             <a:fld id="{B5B8FAE6-331F-4C0E-8996-7471609552E9}" type="datetimeFigureOut">
               <a:rPr lang="en-US" smtClean="0"/>
-              <a:t>2020-03-30</a:t>
+              <a:t>2020-03-31</a:t>
             </a:fld>
             <a:endParaRPr lang="en-US"/>
           </a:p>
@@ -11488,7 +11500,6 @@
               <a:rPr lang="en-US" dirty="0" smtClean="0"/>
               <a:t>https://rstudio.cloud/project/1088739</a:t>
             </a:r>
-            <a:endParaRPr lang="en-US" dirty="0" smtClean="0"/>
           </a:p>
         </p:txBody>
       </p:sp>
@@ -20349,7 +20360,7 @@
           <a:p>
             <a:fld id="{B5B8FAE6-331F-4C0E-8996-7471609552E9}" type="datetimeFigureOut">
               <a:rPr lang="en-US" smtClean="0"/>
-              <a:t>2020-03-30</a:t>
+              <a:t>2020-03-31</a:t>
             </a:fld>
             <a:endParaRPr lang="en-US"/>
           </a:p>
@@ -20630,7 +20641,7 @@
           <a:p>
             <a:fld id="{B5B8FAE6-331F-4C0E-8996-7471609552E9}" type="datetimeFigureOut">
               <a:rPr lang="en-US" smtClean="0"/>
-              <a:t>2020-03-30</a:t>
+              <a:t>2020-03-31</a:t>
             </a:fld>
             <a:endParaRPr lang="en-US"/>
           </a:p>
@@ -21028,7 +21039,7 @@
           <a:p>
             <a:fld id="{B5B8FAE6-331F-4C0E-8996-7471609552E9}" type="datetimeFigureOut">
               <a:rPr lang="en-US" smtClean="0"/>
-              <a:t>2020-03-30</a:t>
+              <a:t>2020-03-31</a:t>
             </a:fld>
             <a:endParaRPr lang="en-US"/>
           </a:p>
@@ -21146,7 +21157,7 @@
           <a:p>
             <a:fld id="{B5B8FAE6-331F-4C0E-8996-7471609552E9}" type="datetimeFigureOut">
               <a:rPr lang="en-US" smtClean="0"/>
-              <a:t>2020-03-30</a:t>
+              <a:t>2020-03-31</a:t>
             </a:fld>
             <a:endParaRPr lang="en-US"/>
           </a:p>
@@ -21241,7 +21252,7 @@
           <a:p>
             <a:fld id="{B5B8FAE6-331F-4C0E-8996-7471609552E9}" type="datetimeFigureOut">
               <a:rPr lang="en-US" smtClean="0"/>
-              <a:t>2020-03-30</a:t>
+              <a:t>2020-03-31</a:t>
             </a:fld>
             <a:endParaRPr lang="en-US"/>
           </a:p>
@@ -21531,7 +21542,7 @@
           <a:p>
             <a:fld id="{B5B8FAE6-331F-4C0E-8996-7471609552E9}" type="datetimeFigureOut">
               <a:rPr lang="en-US" smtClean="0"/>
-              <a:t>2020-03-30</a:t>
+              <a:t>2020-03-31</a:t>
             </a:fld>
             <a:endParaRPr lang="en-US"/>
           </a:p>
@@ -21811,7 +21822,7 @@
           <a:p>
             <a:fld id="{B5B8FAE6-331F-4C0E-8996-7471609552E9}" type="datetimeFigureOut">
               <a:rPr lang="en-US" smtClean="0"/>
-              <a:t>2020-03-30</a:t>
+              <a:t>2020-03-31</a:t>
             </a:fld>
             <a:endParaRPr lang="en-US"/>
           </a:p>
@@ -22068,7 +22079,7 @@
           <a:p>
             <a:fld id="{B5B8FAE6-331F-4C0E-8996-7471609552E9}" type="datetimeFigureOut">
               <a:rPr lang="en-US" smtClean="0"/>
-              <a:t>2020-03-30</a:t>
+              <a:t>2020-03-31</a:t>
             </a:fld>
             <a:endParaRPr lang="en-US"/>
           </a:p>
@@ -22631,15 +22642,7 @@
             <a:pPr algn="ctr"/>
             <a:r>
               <a:rPr lang="en-US" i="1" dirty="0" smtClean="0"/>
-              <a:t>Getting you just the </a:t>
-            </a:r>
-            <a:r>
-              <a:rPr lang="en-US" i="1" dirty="0" smtClean="0"/>
-              <a:t>data values you </a:t>
-            </a:r>
-            <a:r>
-              <a:rPr lang="en-US" i="1" dirty="0" smtClean="0"/>
-              <a:t>need</a:t>
+              <a:t>Getting you just the data values you need</a:t>
             </a:r>
             <a:endParaRPr lang="en-US" i="1" dirty="0"/>
           </a:p>
@@ -23805,11 +23808,7 @@
           <a:p>
             <a:r>
               <a:rPr lang="en-US" sz="3600" dirty="0" smtClean="0"/>
-              <a:t>Columns </a:t>
-            </a:r>
-            <a:r>
-              <a:rPr lang="en-US" sz="3600" dirty="0" smtClean="0"/>
-              <a:t>you’re interested in – get with </a:t>
+              <a:t>Columns you’re interested in – get with </a:t>
             </a:r>
             <a:r>
               <a:rPr lang="en-US" sz="3600" dirty="0" smtClean="0">
@@ -23849,11 +23848,7 @@
           <a:p>
             <a:r>
               <a:rPr lang="en-US" sz="3600" dirty="0" smtClean="0"/>
-              <a:t>Rows you </a:t>
-            </a:r>
-            <a:r>
-              <a:rPr lang="en-US" sz="3600" dirty="0" smtClean="0"/>
-              <a:t>care about – get them with </a:t>
+              <a:t>Rows you care about – get them with </a:t>
             </a:r>
             <a:r>
               <a:rPr lang="en-US" sz="3600" dirty="0" smtClean="0">
@@ -23979,6 +23974,2777 @@
 </p:sld>
 </file>
 
+<file path=ppt/slides/slide11.xml><?xml version="1.0" encoding="utf-8"?>
+<p:sld xmlns:a="http://schemas.openxmlformats.org/drawingml/2006/main" xmlns:r="http://schemas.openxmlformats.org/officeDocument/2006/relationships" xmlns:p="http://schemas.openxmlformats.org/presentationml/2006/main">
+  <p:cSld>
+    <p:spTree>
+      <p:nvGrpSpPr>
+        <p:cNvPr id="1" name=""/>
+        <p:cNvGrpSpPr/>
+        <p:nvPr/>
+      </p:nvGrpSpPr>
+      <p:grpSpPr>
+        <a:xfrm>
+          <a:off x="0" y="0"/>
+          <a:ext cx="0" cy="0"/>
+          <a:chOff x="0" y="0"/>
+          <a:chExt cx="0" cy="0"/>
+        </a:xfrm>
+      </p:grpSpPr>
+      <p:sp>
+        <p:nvSpPr>
+          <p:cNvPr id="2" name="Title 1"/>
+          <p:cNvSpPr>
+            <a:spLocks noGrp="1"/>
+          </p:cNvSpPr>
+          <p:nvPr>
+            <p:ph type="title"/>
+          </p:nvPr>
+        </p:nvSpPr>
+        <p:spPr/>
+        <p:txBody>
+          <a:bodyPr/>
+          <a:lstStyle/>
+          <a:p>
+            <a:r>
+              <a:rPr lang="en-US" dirty="0" smtClean="0"/>
+              <a:t>Putting both together...</a:t>
+            </a:r>
+            <a:endParaRPr lang="en-US" dirty="0"/>
+          </a:p>
+        </p:txBody>
+      </p:sp>
+      <p:sp>
+        <p:nvSpPr>
+          <p:cNvPr id="3" name="Text Placeholder 2"/>
+          <p:cNvSpPr>
+            <a:spLocks noGrp="1"/>
+          </p:cNvSpPr>
+          <p:nvPr>
+            <p:ph type="body" idx="1"/>
+          </p:nvPr>
+        </p:nvSpPr>
+        <p:spPr/>
+        <p:txBody>
+          <a:bodyPr/>
+          <a:lstStyle/>
+          <a:p>
+            <a:r>
+              <a:rPr lang="en-US" dirty="0" smtClean="0"/>
+              <a:t>Using pipes %&gt;%</a:t>
+            </a:r>
+            <a:endParaRPr lang="en-US" dirty="0"/>
+          </a:p>
+        </p:txBody>
+      </p:sp>
+    </p:spTree>
+    <p:extLst>
+      <p:ext uri="{BB962C8B-B14F-4D97-AF65-F5344CB8AC3E}">
+        <p14:creationId xmlns:p14="http://schemas.microsoft.com/office/powerpoint/2010/main" val="862621042"/>
+      </p:ext>
+    </p:extLst>
+  </p:cSld>
+  <p:clrMapOvr>
+    <a:masterClrMapping/>
+  </p:clrMapOvr>
+</p:sld>
+</file>
+
+<file path=ppt/slides/slide12.xml><?xml version="1.0" encoding="utf-8"?>
+<p:sld xmlns:a="http://schemas.openxmlformats.org/drawingml/2006/main" xmlns:r="http://schemas.openxmlformats.org/officeDocument/2006/relationships" xmlns:p="http://schemas.openxmlformats.org/presentationml/2006/main">
+  <p:cSld>
+    <p:spTree>
+      <p:nvGrpSpPr>
+        <p:cNvPr id="1" name=""/>
+        <p:cNvGrpSpPr/>
+        <p:nvPr/>
+      </p:nvGrpSpPr>
+      <p:grpSpPr>
+        <a:xfrm>
+          <a:off x="0" y="0"/>
+          <a:ext cx="0" cy="0"/>
+          <a:chOff x="0" y="0"/>
+          <a:chExt cx="0" cy="0"/>
+        </a:xfrm>
+      </p:grpSpPr>
+      <p:sp>
+        <p:nvSpPr>
+          <p:cNvPr id="7" name="Rectangle 6"/>
+          <p:cNvSpPr/>
+          <p:nvPr/>
+        </p:nvSpPr>
+        <p:spPr>
+          <a:xfrm>
+            <a:off x="4181707" y="3668751"/>
+            <a:ext cx="7579331" cy="2743200"/>
+          </a:xfrm>
+          <a:prstGeom prst="rect">
+            <a:avLst/>
+          </a:prstGeom>
+          <a:noFill/>
+        </p:spPr>
+        <p:style>
+          <a:lnRef idx="2">
+            <a:schemeClr val="accent1">
+              <a:shade val="50000"/>
+            </a:schemeClr>
+          </a:lnRef>
+          <a:fillRef idx="1">
+            <a:schemeClr val="accent1"/>
+          </a:fillRef>
+          <a:effectRef idx="0">
+            <a:schemeClr val="accent1"/>
+          </a:effectRef>
+          <a:fontRef idx="minor">
+            <a:schemeClr val="lt1"/>
+          </a:fontRef>
+        </p:style>
+        <p:txBody>
+          <a:bodyPr rtlCol="0" anchor="ctr"/>
+          <a:lstStyle/>
+          <a:p>
+            <a:pPr algn="ctr"/>
+            <a:endParaRPr lang="en-US"/>
+          </a:p>
+        </p:txBody>
+      </p:sp>
+      <p:sp>
+        <p:nvSpPr>
+          <p:cNvPr id="5" name="Rectangle 4"/>
+          <p:cNvSpPr/>
+          <p:nvPr/>
+        </p:nvSpPr>
+        <p:spPr>
+          <a:xfrm>
+            <a:off x="3794727" y="969915"/>
+            <a:ext cx="1180408" cy="548640"/>
+          </a:xfrm>
+          <a:prstGeom prst="rect">
+            <a:avLst/>
+          </a:prstGeom>
+        </p:spPr>
+        <p:style>
+          <a:lnRef idx="2">
+            <a:schemeClr val="accent1">
+              <a:shade val="50000"/>
+            </a:schemeClr>
+          </a:lnRef>
+          <a:fillRef idx="1">
+            <a:schemeClr val="accent1"/>
+          </a:fillRef>
+          <a:effectRef idx="0">
+            <a:schemeClr val="accent1"/>
+          </a:effectRef>
+          <a:fontRef idx="minor">
+            <a:schemeClr val="lt1"/>
+          </a:fontRef>
+        </p:style>
+        <p:txBody>
+          <a:bodyPr rtlCol="0" anchor="ctr"/>
+          <a:lstStyle/>
+          <a:p>
+            <a:r>
+              <a:rPr lang="en-US" b="1" dirty="0" err="1" smtClean="0"/>
+              <a:t>Subsetting</a:t>
+            </a:r>
+            <a:endParaRPr lang="en-US" b="1" dirty="0" smtClean="0"/>
+          </a:p>
+        </p:txBody>
+      </p:sp>
+      <p:sp>
+        <p:nvSpPr>
+          <p:cNvPr id="30" name="Rectangle 29"/>
+          <p:cNvSpPr/>
+          <p:nvPr/>
+        </p:nvSpPr>
+        <p:spPr>
+          <a:xfrm>
+            <a:off x="454367" y="610019"/>
+            <a:ext cx="2093197" cy="504570"/>
+          </a:xfrm>
+          <a:prstGeom prst="rect">
+            <a:avLst/>
+          </a:prstGeom>
+        </p:spPr>
+        <p:style>
+          <a:lnRef idx="2">
+            <a:schemeClr val="accent1">
+              <a:shade val="50000"/>
+            </a:schemeClr>
+          </a:lnRef>
+          <a:fillRef idx="1">
+            <a:schemeClr val="accent1"/>
+          </a:fillRef>
+          <a:effectRef idx="0">
+            <a:schemeClr val="accent1"/>
+          </a:effectRef>
+          <a:fontRef idx="minor">
+            <a:schemeClr val="lt1"/>
+          </a:fontRef>
+        </p:style>
+        <p:txBody>
+          <a:bodyPr rtlCol="0" anchor="ctr"/>
+          <a:lstStyle/>
+          <a:p>
+            <a:pPr algn="ctr"/>
+            <a:r>
+              <a:rPr lang="en-US" dirty="0" smtClean="0"/>
+              <a:t>Getting (only) the data you need</a:t>
+            </a:r>
+          </a:p>
+        </p:txBody>
+      </p:sp>
+      <p:sp>
+        <p:nvSpPr>
+          <p:cNvPr id="46" name="TextBox 45"/>
+          <p:cNvSpPr txBox="1"/>
+          <p:nvPr/>
+        </p:nvSpPr>
+        <p:spPr>
+          <a:xfrm>
+            <a:off x="2810513" y="441720"/>
+            <a:ext cx="1257992" cy="646331"/>
+          </a:xfrm>
+          <a:prstGeom prst="rect">
+            <a:avLst/>
+          </a:prstGeom>
+          <a:noFill/>
+        </p:spPr>
+        <p:txBody>
+          <a:bodyPr wrap="square" rtlCol="0">
+            <a:spAutoFit/>
+          </a:bodyPr>
+          <a:lstStyle/>
+          <a:p>
+            <a:pPr algn="ctr"/>
+            <a:r>
+              <a:rPr lang="en-US" dirty="0" smtClean="0">
+                <a:solidFill>
+                  <a:schemeClr val="bg2">
+                    <a:lumMod val="90000"/>
+                  </a:schemeClr>
+                </a:solidFill>
+              </a:rPr>
+              <a:t>Is often called</a:t>
+            </a:r>
+            <a:endParaRPr lang="en-US" dirty="0">
+              <a:solidFill>
+                <a:schemeClr val="bg2">
+                  <a:lumMod val="90000"/>
+                </a:schemeClr>
+              </a:solidFill>
+            </a:endParaRPr>
+          </a:p>
+        </p:txBody>
+      </p:sp>
+      <p:grpSp>
+        <p:nvGrpSpPr>
+          <p:cNvPr id="170" name="Group 169"/>
+          <p:cNvGrpSpPr/>
+          <p:nvPr/>
+        </p:nvGrpSpPr>
+        <p:grpSpPr>
+          <a:xfrm>
+            <a:off x="8418599" y="4560345"/>
+            <a:ext cx="2702923" cy="584775"/>
+            <a:chOff x="79672" y="4876172"/>
+            <a:chExt cx="2702923" cy="584775"/>
+          </a:xfrm>
+        </p:grpSpPr>
+        <p:sp>
+          <p:nvSpPr>
+            <p:cNvPr id="128" name="Rectangle 127"/>
+            <p:cNvSpPr/>
+            <p:nvPr/>
+          </p:nvSpPr>
+          <p:spPr>
+            <a:xfrm>
+              <a:off x="79672" y="4894239"/>
+              <a:ext cx="1180408" cy="548640"/>
+            </a:xfrm>
+            <a:prstGeom prst="rect">
+              <a:avLst/>
+            </a:prstGeom>
+            <a:solidFill>
+              <a:schemeClr val="accent2"/>
+            </a:solidFill>
+            <a:ln>
+              <a:solidFill>
+                <a:schemeClr val="accent2"/>
+              </a:solidFill>
+            </a:ln>
+          </p:spPr>
+          <p:style>
+            <a:lnRef idx="2">
+              <a:schemeClr val="accent1">
+                <a:shade val="50000"/>
+              </a:schemeClr>
+            </a:lnRef>
+            <a:fillRef idx="1">
+              <a:schemeClr val="accent1"/>
+            </a:fillRef>
+            <a:effectRef idx="0">
+              <a:schemeClr val="accent1"/>
+            </a:effectRef>
+            <a:fontRef idx="minor">
+              <a:schemeClr val="lt1"/>
+            </a:fontRef>
+          </p:style>
+          <p:txBody>
+            <a:bodyPr rtlCol="0" anchor="ctr"/>
+            <a:lstStyle/>
+            <a:p>
+              <a:pPr algn="ctr"/>
+              <a:r>
+                <a:rPr lang="en-US" b="1" dirty="0" smtClean="0"/>
+                <a:t>select()</a:t>
+              </a:r>
+            </a:p>
+          </p:txBody>
+        </p:sp>
+        <p:sp>
+          <p:nvSpPr>
+            <p:cNvPr id="129" name="Rectangle 128"/>
+            <p:cNvSpPr/>
+            <p:nvPr/>
+          </p:nvSpPr>
+          <p:spPr>
+            <a:xfrm>
+              <a:off x="1602187" y="4894239"/>
+              <a:ext cx="1180408" cy="548640"/>
+            </a:xfrm>
+            <a:prstGeom prst="rect">
+              <a:avLst/>
+            </a:prstGeom>
+            <a:solidFill>
+              <a:schemeClr val="accent2">
+                <a:lumMod val="40000"/>
+                <a:lumOff val="60000"/>
+              </a:schemeClr>
+            </a:solidFill>
+            <a:ln>
+              <a:solidFill>
+                <a:schemeClr val="accent2">
+                  <a:lumMod val="40000"/>
+                  <a:lumOff val="60000"/>
+                </a:schemeClr>
+              </a:solidFill>
+            </a:ln>
+          </p:spPr>
+          <p:style>
+            <a:lnRef idx="2">
+              <a:schemeClr val="accent1">
+                <a:shade val="50000"/>
+              </a:schemeClr>
+            </a:lnRef>
+            <a:fillRef idx="1">
+              <a:schemeClr val="accent1"/>
+            </a:fillRef>
+            <a:effectRef idx="0">
+              <a:schemeClr val="accent1"/>
+            </a:effectRef>
+            <a:fontRef idx="minor">
+              <a:schemeClr val="lt1"/>
+            </a:fontRef>
+          </p:style>
+          <p:txBody>
+            <a:bodyPr rtlCol="0" anchor="ctr"/>
+            <a:lstStyle/>
+            <a:p>
+              <a:pPr algn="ctr"/>
+              <a:r>
+                <a:rPr lang="en-US" b="1" dirty="0" smtClean="0"/>
+                <a:t>names</a:t>
+              </a:r>
+            </a:p>
+          </p:txBody>
+        </p:sp>
+        <p:sp>
+          <p:nvSpPr>
+            <p:cNvPr id="136" name="TextBox 135"/>
+            <p:cNvSpPr txBox="1"/>
+            <p:nvPr/>
+          </p:nvSpPr>
+          <p:spPr>
+            <a:xfrm>
+              <a:off x="1250927" y="4876172"/>
+              <a:ext cx="342107" cy="584775"/>
+            </a:xfrm>
+            <a:prstGeom prst="rect">
+              <a:avLst/>
+            </a:prstGeom>
+            <a:noFill/>
+          </p:spPr>
+          <p:txBody>
+            <a:bodyPr wrap="square" rtlCol="0">
+              <a:spAutoFit/>
+            </a:bodyPr>
+            <a:lstStyle/>
+            <a:p>
+              <a:pPr algn="ctr"/>
+              <a:r>
+                <a:rPr lang="en-US" sz="3200" dirty="0" smtClean="0"/>
+                <a:t>+</a:t>
+              </a:r>
+              <a:endParaRPr lang="en-US" sz="3200" dirty="0"/>
+            </a:p>
+          </p:txBody>
+        </p:sp>
+      </p:grpSp>
+      <p:grpSp>
+        <p:nvGrpSpPr>
+          <p:cNvPr id="157" name="Group 156"/>
+          <p:cNvGrpSpPr/>
+          <p:nvPr/>
+        </p:nvGrpSpPr>
+        <p:grpSpPr>
+          <a:xfrm>
+            <a:off x="5537668" y="951848"/>
+            <a:ext cx="2787309" cy="584775"/>
+            <a:chOff x="7407869" y="1008150"/>
+            <a:chExt cx="2787309" cy="584775"/>
+          </a:xfrm>
+        </p:grpSpPr>
+        <p:sp>
+          <p:nvSpPr>
+            <p:cNvPr id="53" name="Rectangle 52"/>
+            <p:cNvSpPr/>
+            <p:nvPr/>
+          </p:nvSpPr>
+          <p:spPr>
+            <a:xfrm>
+              <a:off x="9014770" y="1026217"/>
+              <a:ext cx="1180408" cy="548640"/>
+            </a:xfrm>
+            <a:prstGeom prst="rect">
+              <a:avLst/>
+            </a:prstGeom>
+          </p:spPr>
+          <p:style>
+            <a:lnRef idx="2">
+              <a:schemeClr val="accent1">
+                <a:shade val="50000"/>
+              </a:schemeClr>
+            </a:lnRef>
+            <a:fillRef idx="1">
+              <a:schemeClr val="accent1"/>
+            </a:fillRef>
+            <a:effectRef idx="0">
+              <a:schemeClr val="accent1"/>
+            </a:effectRef>
+            <a:fontRef idx="minor">
+              <a:schemeClr val="lt1"/>
+            </a:fontRef>
+          </p:style>
+          <p:txBody>
+            <a:bodyPr rtlCol="0" anchor="ctr"/>
+            <a:lstStyle/>
+            <a:p>
+              <a:pPr algn="ctr"/>
+              <a:r>
+                <a:rPr lang="en-US" b="1" dirty="0" smtClean="0"/>
+                <a:t>Columns</a:t>
+              </a:r>
+            </a:p>
+          </p:txBody>
+        </p:sp>
+        <p:sp>
+          <p:nvSpPr>
+            <p:cNvPr id="54" name="Rectangle 53"/>
+            <p:cNvSpPr/>
+            <p:nvPr/>
+          </p:nvSpPr>
+          <p:spPr>
+            <a:xfrm>
+              <a:off x="7407869" y="1026217"/>
+              <a:ext cx="1180408" cy="548640"/>
+            </a:xfrm>
+            <a:prstGeom prst="rect">
+              <a:avLst/>
+            </a:prstGeom>
+          </p:spPr>
+          <p:style>
+            <a:lnRef idx="2">
+              <a:schemeClr val="accent1">
+                <a:shade val="50000"/>
+              </a:schemeClr>
+            </a:lnRef>
+            <a:fillRef idx="1">
+              <a:schemeClr val="accent1"/>
+            </a:fillRef>
+            <a:effectRef idx="0">
+              <a:schemeClr val="accent1"/>
+            </a:effectRef>
+            <a:fontRef idx="minor">
+              <a:schemeClr val="lt1"/>
+            </a:fontRef>
+          </p:style>
+          <p:txBody>
+            <a:bodyPr rtlCol="0" anchor="ctr"/>
+            <a:lstStyle/>
+            <a:p>
+              <a:pPr algn="ctr"/>
+              <a:r>
+                <a:rPr lang="en-US" b="1" dirty="0" smtClean="0"/>
+                <a:t>Rows</a:t>
+              </a:r>
+            </a:p>
+          </p:txBody>
+        </p:sp>
+        <p:sp>
+          <p:nvSpPr>
+            <p:cNvPr id="156" name="TextBox 155"/>
+            <p:cNvSpPr txBox="1"/>
+            <p:nvPr/>
+          </p:nvSpPr>
+          <p:spPr>
+            <a:xfrm>
+              <a:off x="8630470" y="1008150"/>
+              <a:ext cx="342107" cy="584775"/>
+            </a:xfrm>
+            <a:prstGeom prst="rect">
+              <a:avLst/>
+            </a:prstGeom>
+            <a:noFill/>
+          </p:spPr>
+          <p:txBody>
+            <a:bodyPr wrap="square" rtlCol="0">
+              <a:spAutoFit/>
+            </a:bodyPr>
+            <a:lstStyle/>
+            <a:p>
+              <a:pPr algn="ctr"/>
+              <a:r>
+                <a:rPr lang="en-US" sz="3200" dirty="0" smtClean="0"/>
+                <a:t>+</a:t>
+              </a:r>
+              <a:endParaRPr lang="en-US" sz="3200" dirty="0"/>
+            </a:p>
+          </p:txBody>
+        </p:sp>
+      </p:grpSp>
+      <p:cxnSp>
+        <p:nvCxnSpPr>
+          <p:cNvPr id="161" name="Elbow Connector 160"/>
+          <p:cNvCxnSpPr>
+            <a:stCxn id="5" idx="0"/>
+            <a:endCxn id="156" idx="0"/>
+          </p:cNvCxnSpPr>
+          <p:nvPr/>
+        </p:nvCxnSpPr>
+        <p:spPr>
+          <a:xfrm rot="5400000" flipH="1" flipV="1">
+            <a:off x="5649094" y="-312314"/>
+            <a:ext cx="18067" cy="2546392"/>
+          </a:xfrm>
+          <a:prstGeom prst="bentConnector3">
+            <a:avLst>
+              <a:gd name="adj1" fmla="val 1365290"/>
+            </a:avLst>
+          </a:prstGeom>
+          <a:ln>
+            <a:tailEnd type="triangle"/>
+          </a:ln>
+        </p:spPr>
+        <p:style>
+          <a:lnRef idx="1">
+            <a:schemeClr val="accent1"/>
+          </a:lnRef>
+          <a:fillRef idx="0">
+            <a:schemeClr val="accent1"/>
+          </a:fillRef>
+          <a:effectRef idx="0">
+            <a:schemeClr val="accent1"/>
+          </a:effectRef>
+          <a:fontRef idx="minor">
+            <a:schemeClr val="tx1"/>
+          </a:fontRef>
+        </p:style>
+      </p:cxnSp>
+      <p:sp>
+        <p:nvSpPr>
+          <p:cNvPr id="162" name="TextBox 161"/>
+          <p:cNvSpPr txBox="1"/>
+          <p:nvPr/>
+        </p:nvSpPr>
+        <p:spPr>
+          <a:xfrm>
+            <a:off x="4323590" y="367733"/>
+            <a:ext cx="2544888" cy="369332"/>
+          </a:xfrm>
+          <a:prstGeom prst="rect">
+            <a:avLst/>
+          </a:prstGeom>
+          <a:noFill/>
+        </p:spPr>
+        <p:txBody>
+          <a:bodyPr wrap="square" rtlCol="0">
+            <a:spAutoFit/>
+          </a:bodyPr>
+          <a:lstStyle/>
+          <a:p>
+            <a:pPr algn="ctr"/>
+            <a:r>
+              <a:rPr lang="en-US" dirty="0" smtClean="0">
+                <a:solidFill>
+                  <a:schemeClr val="bg2">
+                    <a:lumMod val="90000"/>
+                  </a:schemeClr>
+                </a:solidFill>
+              </a:rPr>
+              <a:t>Based on the</a:t>
+            </a:r>
+            <a:endParaRPr lang="en-US" dirty="0">
+              <a:solidFill>
+                <a:schemeClr val="bg2">
+                  <a:lumMod val="90000"/>
+                </a:schemeClr>
+              </a:solidFill>
+            </a:endParaRPr>
+          </a:p>
+        </p:txBody>
+      </p:sp>
+      <p:sp>
+        <p:nvSpPr>
+          <p:cNvPr id="164" name="Rectangle 163"/>
+          <p:cNvSpPr/>
+          <p:nvPr/>
+        </p:nvSpPr>
+        <p:spPr>
+          <a:xfrm>
+            <a:off x="9331223" y="972243"/>
+            <a:ext cx="1180408" cy="548640"/>
+          </a:xfrm>
+          <a:prstGeom prst="rect">
+            <a:avLst/>
+          </a:prstGeom>
+        </p:spPr>
+        <p:style>
+          <a:lnRef idx="2">
+            <a:schemeClr val="accent1">
+              <a:shade val="50000"/>
+            </a:schemeClr>
+          </a:lnRef>
+          <a:fillRef idx="1">
+            <a:schemeClr val="accent1"/>
+          </a:fillRef>
+          <a:effectRef idx="0">
+            <a:schemeClr val="accent1"/>
+          </a:effectRef>
+          <a:fontRef idx="minor">
+            <a:schemeClr val="lt1"/>
+          </a:fontRef>
+        </p:style>
+        <p:txBody>
+          <a:bodyPr rtlCol="0" anchor="ctr"/>
+          <a:lstStyle/>
+          <a:p>
+            <a:pPr algn="ctr"/>
+            <a:r>
+              <a:rPr lang="en-US" b="1" dirty="0" smtClean="0"/>
+              <a:t>Data</a:t>
+            </a:r>
+          </a:p>
+        </p:txBody>
+      </p:sp>
+      <p:cxnSp>
+        <p:nvCxnSpPr>
+          <p:cNvPr id="166" name="Straight Arrow Connector 165"/>
+          <p:cNvCxnSpPr>
+            <a:stCxn id="53" idx="3"/>
+            <a:endCxn id="164" idx="1"/>
+          </p:cNvCxnSpPr>
+          <p:nvPr/>
+        </p:nvCxnSpPr>
+        <p:spPr>
+          <a:xfrm>
+            <a:off x="8324977" y="1244235"/>
+            <a:ext cx="1006246" cy="2328"/>
+          </a:xfrm>
+          <a:prstGeom prst="straightConnector1">
+            <a:avLst/>
+          </a:prstGeom>
+          <a:ln>
+            <a:tailEnd type="triangle"/>
+          </a:ln>
+        </p:spPr>
+        <p:style>
+          <a:lnRef idx="1">
+            <a:schemeClr val="accent1"/>
+          </a:lnRef>
+          <a:fillRef idx="0">
+            <a:schemeClr val="accent1"/>
+          </a:fillRef>
+          <a:effectRef idx="0">
+            <a:schemeClr val="accent1"/>
+          </a:effectRef>
+          <a:fontRef idx="minor">
+            <a:schemeClr val="tx1"/>
+          </a:fontRef>
+        </p:style>
+      </p:cxnSp>
+      <p:sp>
+        <p:nvSpPr>
+          <p:cNvPr id="167" name="TextBox 166"/>
+          <p:cNvSpPr txBox="1"/>
+          <p:nvPr/>
+        </p:nvSpPr>
+        <p:spPr>
+          <a:xfrm>
+            <a:off x="8577468" y="911326"/>
+            <a:ext cx="626703" cy="369332"/>
+          </a:xfrm>
+          <a:prstGeom prst="rect">
+            <a:avLst/>
+          </a:prstGeom>
+          <a:noFill/>
+        </p:spPr>
+        <p:txBody>
+          <a:bodyPr wrap="square" rtlCol="0">
+            <a:spAutoFit/>
+          </a:bodyPr>
+          <a:lstStyle/>
+          <a:p>
+            <a:pPr algn="ctr"/>
+            <a:r>
+              <a:rPr lang="en-US" dirty="0" smtClean="0">
+                <a:solidFill>
+                  <a:schemeClr val="bg2">
+                    <a:lumMod val="90000"/>
+                  </a:schemeClr>
+                </a:solidFill>
+              </a:rPr>
+              <a:t>Of</a:t>
+            </a:r>
+            <a:endParaRPr lang="en-US" dirty="0">
+              <a:solidFill>
+                <a:schemeClr val="bg2">
+                  <a:lumMod val="90000"/>
+                </a:schemeClr>
+              </a:solidFill>
+            </a:endParaRPr>
+          </a:p>
+        </p:txBody>
+      </p:sp>
+      <p:grpSp>
+        <p:nvGrpSpPr>
+          <p:cNvPr id="171" name="Group 170"/>
+          <p:cNvGrpSpPr/>
+          <p:nvPr/>
+        </p:nvGrpSpPr>
+        <p:grpSpPr>
+          <a:xfrm>
+            <a:off x="4566827" y="4538527"/>
+            <a:ext cx="2702923" cy="584775"/>
+            <a:chOff x="79672" y="4876172"/>
+            <a:chExt cx="2702923" cy="584775"/>
+          </a:xfrm>
+        </p:grpSpPr>
+        <p:sp>
+          <p:nvSpPr>
+            <p:cNvPr id="172" name="Rectangle 171"/>
+            <p:cNvSpPr/>
+            <p:nvPr/>
+          </p:nvSpPr>
+          <p:spPr>
+            <a:xfrm>
+              <a:off x="79672" y="4894239"/>
+              <a:ext cx="1180408" cy="548640"/>
+            </a:xfrm>
+            <a:prstGeom prst="rect">
+              <a:avLst/>
+            </a:prstGeom>
+            <a:solidFill>
+              <a:schemeClr val="accent2"/>
+            </a:solidFill>
+            <a:ln>
+              <a:solidFill>
+                <a:schemeClr val="accent2"/>
+              </a:solidFill>
+            </a:ln>
+          </p:spPr>
+          <p:style>
+            <a:lnRef idx="2">
+              <a:schemeClr val="accent1">
+                <a:shade val="50000"/>
+              </a:schemeClr>
+            </a:lnRef>
+            <a:fillRef idx="1">
+              <a:schemeClr val="accent1"/>
+            </a:fillRef>
+            <a:effectRef idx="0">
+              <a:schemeClr val="accent1"/>
+            </a:effectRef>
+            <a:fontRef idx="minor">
+              <a:schemeClr val="lt1"/>
+            </a:fontRef>
+          </p:style>
+          <p:txBody>
+            <a:bodyPr rtlCol="0" anchor="ctr"/>
+            <a:lstStyle/>
+            <a:p>
+              <a:pPr algn="ctr"/>
+              <a:r>
+                <a:rPr lang="en-US" b="1" dirty="0" smtClean="0"/>
+                <a:t>filter()</a:t>
+              </a:r>
+            </a:p>
+          </p:txBody>
+        </p:sp>
+        <p:sp>
+          <p:nvSpPr>
+            <p:cNvPr id="173" name="Rectangle 172"/>
+            <p:cNvSpPr/>
+            <p:nvPr/>
+          </p:nvSpPr>
+          <p:spPr>
+            <a:xfrm>
+              <a:off x="1602187" y="4894239"/>
+              <a:ext cx="1180408" cy="548640"/>
+            </a:xfrm>
+            <a:prstGeom prst="rect">
+              <a:avLst/>
+            </a:prstGeom>
+            <a:solidFill>
+              <a:schemeClr val="accent2">
+                <a:lumMod val="40000"/>
+                <a:lumOff val="60000"/>
+              </a:schemeClr>
+            </a:solidFill>
+            <a:ln>
+              <a:solidFill>
+                <a:schemeClr val="accent2">
+                  <a:lumMod val="40000"/>
+                  <a:lumOff val="60000"/>
+                </a:schemeClr>
+              </a:solidFill>
+            </a:ln>
+          </p:spPr>
+          <p:style>
+            <a:lnRef idx="2">
+              <a:schemeClr val="accent1">
+                <a:shade val="50000"/>
+              </a:schemeClr>
+            </a:lnRef>
+            <a:fillRef idx="1">
+              <a:schemeClr val="accent1"/>
+            </a:fillRef>
+            <a:effectRef idx="0">
+              <a:schemeClr val="accent1"/>
+            </a:effectRef>
+            <a:fontRef idx="minor">
+              <a:schemeClr val="lt1"/>
+            </a:fontRef>
+          </p:style>
+          <p:txBody>
+            <a:bodyPr rtlCol="0" anchor="ctr"/>
+            <a:lstStyle/>
+            <a:p>
+              <a:pPr algn="ctr"/>
+              <a:r>
+                <a:rPr lang="en-US" b="1" dirty="0" smtClean="0"/>
+                <a:t>conditions</a:t>
+              </a:r>
+            </a:p>
+          </p:txBody>
+        </p:sp>
+        <p:sp>
+          <p:nvSpPr>
+            <p:cNvPr id="174" name="TextBox 173"/>
+            <p:cNvSpPr txBox="1"/>
+            <p:nvPr/>
+          </p:nvSpPr>
+          <p:spPr>
+            <a:xfrm>
+              <a:off x="1250927" y="4876172"/>
+              <a:ext cx="342107" cy="584775"/>
+            </a:xfrm>
+            <a:prstGeom prst="rect">
+              <a:avLst/>
+            </a:prstGeom>
+            <a:noFill/>
+          </p:spPr>
+          <p:txBody>
+            <a:bodyPr wrap="square" rtlCol="0">
+              <a:spAutoFit/>
+            </a:bodyPr>
+            <a:lstStyle/>
+            <a:p>
+              <a:pPr algn="ctr"/>
+              <a:r>
+                <a:rPr lang="en-US" sz="3200" dirty="0" smtClean="0"/>
+                <a:t>+</a:t>
+              </a:r>
+              <a:endParaRPr lang="en-US" sz="3200" dirty="0"/>
+            </a:p>
+          </p:txBody>
+        </p:sp>
+      </p:grpSp>
+      <p:cxnSp>
+        <p:nvCxnSpPr>
+          <p:cNvPr id="177" name="Elbow Connector 176"/>
+          <p:cNvCxnSpPr>
+            <a:stCxn id="54" idx="2"/>
+            <a:endCxn id="247" idx="0"/>
+          </p:cNvCxnSpPr>
+          <p:nvPr/>
+        </p:nvCxnSpPr>
+        <p:spPr>
+          <a:xfrm rot="16200000" flipH="1">
+            <a:off x="6065655" y="1580771"/>
+            <a:ext cx="1199454" cy="1075021"/>
+          </a:xfrm>
+          <a:prstGeom prst="bentConnector3">
+            <a:avLst>
+              <a:gd name="adj1" fmla="val 50000"/>
+            </a:avLst>
+          </a:prstGeom>
+          <a:ln>
+            <a:tailEnd type="triangle"/>
+          </a:ln>
+        </p:spPr>
+        <p:style>
+          <a:lnRef idx="1">
+            <a:schemeClr val="accent1"/>
+          </a:lnRef>
+          <a:fillRef idx="0">
+            <a:schemeClr val="accent1"/>
+          </a:fillRef>
+          <a:effectRef idx="0">
+            <a:schemeClr val="accent1"/>
+          </a:effectRef>
+          <a:fontRef idx="minor">
+            <a:schemeClr val="tx1"/>
+          </a:fontRef>
+        </p:style>
+      </p:cxnSp>
+      <p:cxnSp>
+        <p:nvCxnSpPr>
+          <p:cNvPr id="179" name="Elbow Connector 178"/>
+          <p:cNvCxnSpPr>
+            <a:stCxn id="53" idx="2"/>
+            <a:endCxn id="247" idx="0"/>
+          </p:cNvCxnSpPr>
+          <p:nvPr/>
+        </p:nvCxnSpPr>
+        <p:spPr>
+          <a:xfrm rot="5400000">
+            <a:off x="6869106" y="1852342"/>
+            <a:ext cx="1199454" cy="531880"/>
+          </a:xfrm>
+          <a:prstGeom prst="bentConnector3">
+            <a:avLst>
+              <a:gd name="adj1" fmla="val 50000"/>
+            </a:avLst>
+          </a:prstGeom>
+          <a:ln>
+            <a:tailEnd type="triangle"/>
+          </a:ln>
+        </p:spPr>
+        <p:style>
+          <a:lnRef idx="1">
+            <a:schemeClr val="accent1"/>
+          </a:lnRef>
+          <a:fillRef idx="0">
+            <a:schemeClr val="accent1"/>
+          </a:fillRef>
+          <a:effectRef idx="0">
+            <a:schemeClr val="accent1"/>
+          </a:effectRef>
+          <a:fontRef idx="minor">
+            <a:schemeClr val="tx1"/>
+          </a:fontRef>
+        </p:style>
+      </p:cxnSp>
+      <p:sp>
+        <p:nvSpPr>
+          <p:cNvPr id="206" name="TextBox 205"/>
+          <p:cNvSpPr txBox="1"/>
+          <p:nvPr/>
+        </p:nvSpPr>
+        <p:spPr>
+          <a:xfrm>
+            <a:off x="5932533" y="4164148"/>
+            <a:ext cx="1505667" cy="369332"/>
+          </a:xfrm>
+          <a:prstGeom prst="rect">
+            <a:avLst/>
+          </a:prstGeom>
+          <a:noFill/>
+        </p:spPr>
+        <p:txBody>
+          <a:bodyPr wrap="square" rtlCol="0">
+            <a:spAutoFit/>
+          </a:bodyPr>
+          <a:lstStyle/>
+          <a:p>
+            <a:pPr algn="ctr"/>
+            <a:r>
+              <a:rPr lang="en-US" dirty="0" smtClean="0">
+                <a:solidFill>
+                  <a:schemeClr val="bg2">
+                    <a:lumMod val="90000"/>
+                  </a:schemeClr>
+                </a:solidFill>
+              </a:rPr>
+              <a:t>One or more</a:t>
+            </a:r>
+            <a:endParaRPr lang="en-US" dirty="0">
+              <a:solidFill>
+                <a:schemeClr val="bg2">
+                  <a:lumMod val="90000"/>
+                </a:schemeClr>
+              </a:solidFill>
+            </a:endParaRPr>
+          </a:p>
+        </p:txBody>
+      </p:sp>
+      <p:sp>
+        <p:nvSpPr>
+          <p:cNvPr id="207" name="TextBox 206"/>
+          <p:cNvSpPr txBox="1"/>
+          <p:nvPr/>
+        </p:nvSpPr>
+        <p:spPr>
+          <a:xfrm>
+            <a:off x="9723311" y="4159809"/>
+            <a:ext cx="1505667" cy="369332"/>
+          </a:xfrm>
+          <a:prstGeom prst="rect">
+            <a:avLst/>
+          </a:prstGeom>
+          <a:noFill/>
+        </p:spPr>
+        <p:txBody>
+          <a:bodyPr wrap="square" rtlCol="0">
+            <a:spAutoFit/>
+          </a:bodyPr>
+          <a:lstStyle/>
+          <a:p>
+            <a:pPr algn="ctr"/>
+            <a:r>
+              <a:rPr lang="en-US" dirty="0" smtClean="0">
+                <a:solidFill>
+                  <a:schemeClr val="bg2">
+                    <a:lumMod val="90000"/>
+                  </a:schemeClr>
+                </a:solidFill>
+              </a:rPr>
+              <a:t>One or more</a:t>
+            </a:r>
+            <a:endParaRPr lang="en-US" dirty="0">
+              <a:solidFill>
+                <a:schemeClr val="bg2">
+                  <a:lumMod val="90000"/>
+                </a:schemeClr>
+              </a:solidFill>
+            </a:endParaRPr>
+          </a:p>
+        </p:txBody>
+      </p:sp>
+      <p:sp>
+        <p:nvSpPr>
+          <p:cNvPr id="217" name="Rectangle 216"/>
+          <p:cNvSpPr/>
+          <p:nvPr/>
+        </p:nvSpPr>
+        <p:spPr>
+          <a:xfrm>
+            <a:off x="7168642" y="5765174"/>
+            <a:ext cx="1180408" cy="548640"/>
+          </a:xfrm>
+          <a:prstGeom prst="rect">
+            <a:avLst/>
+          </a:prstGeom>
+        </p:spPr>
+        <p:style>
+          <a:lnRef idx="2">
+            <a:schemeClr val="accent1">
+              <a:shade val="50000"/>
+            </a:schemeClr>
+          </a:lnRef>
+          <a:fillRef idx="1">
+            <a:schemeClr val="accent1"/>
+          </a:fillRef>
+          <a:effectRef idx="0">
+            <a:schemeClr val="accent1"/>
+          </a:effectRef>
+          <a:fontRef idx="minor">
+            <a:schemeClr val="lt1"/>
+          </a:fontRef>
+        </p:style>
+        <p:txBody>
+          <a:bodyPr rtlCol="0" anchor="ctr"/>
+          <a:lstStyle/>
+          <a:p>
+            <a:pPr algn="ctr"/>
+            <a:r>
+              <a:rPr lang="en-US" b="1" dirty="0" smtClean="0"/>
+              <a:t>Less Data</a:t>
+            </a:r>
+          </a:p>
+        </p:txBody>
+      </p:sp>
+      <p:sp>
+        <p:nvSpPr>
+          <p:cNvPr id="218" name="Rectangle 217"/>
+          <p:cNvSpPr/>
+          <p:nvPr/>
+        </p:nvSpPr>
+        <p:spPr>
+          <a:xfrm>
+            <a:off x="4511656" y="4154337"/>
+            <a:ext cx="2815564" cy="1004899"/>
+          </a:xfrm>
+          <a:prstGeom prst="rect">
+            <a:avLst/>
+          </a:prstGeom>
+          <a:noFill/>
+          <a:ln>
+            <a:solidFill>
+              <a:schemeClr val="bg2">
+                <a:lumMod val="50000"/>
+              </a:schemeClr>
+            </a:solidFill>
+          </a:ln>
+        </p:spPr>
+        <p:style>
+          <a:lnRef idx="2">
+            <a:schemeClr val="accent1">
+              <a:shade val="50000"/>
+            </a:schemeClr>
+          </a:lnRef>
+          <a:fillRef idx="1">
+            <a:schemeClr val="accent1"/>
+          </a:fillRef>
+          <a:effectRef idx="0">
+            <a:schemeClr val="accent1"/>
+          </a:effectRef>
+          <a:fontRef idx="minor">
+            <a:schemeClr val="lt1"/>
+          </a:fontRef>
+        </p:style>
+        <p:txBody>
+          <a:bodyPr rtlCol="0" anchor="ctr"/>
+          <a:lstStyle/>
+          <a:p>
+            <a:pPr algn="ctr"/>
+            <a:endParaRPr lang="en-US"/>
+          </a:p>
+        </p:txBody>
+      </p:sp>
+      <p:sp>
+        <p:nvSpPr>
+          <p:cNvPr id="219" name="Rectangle 218"/>
+          <p:cNvSpPr/>
+          <p:nvPr/>
+        </p:nvSpPr>
+        <p:spPr>
+          <a:xfrm>
+            <a:off x="8309592" y="4141742"/>
+            <a:ext cx="2909214" cy="1073722"/>
+          </a:xfrm>
+          <a:prstGeom prst="rect">
+            <a:avLst/>
+          </a:prstGeom>
+          <a:noFill/>
+          <a:ln>
+            <a:solidFill>
+              <a:schemeClr val="bg2">
+                <a:lumMod val="50000"/>
+              </a:schemeClr>
+            </a:solidFill>
+          </a:ln>
+        </p:spPr>
+        <p:style>
+          <a:lnRef idx="2">
+            <a:schemeClr val="accent1">
+              <a:shade val="50000"/>
+            </a:schemeClr>
+          </a:lnRef>
+          <a:fillRef idx="1">
+            <a:schemeClr val="accent1"/>
+          </a:fillRef>
+          <a:effectRef idx="0">
+            <a:schemeClr val="accent1"/>
+          </a:effectRef>
+          <a:fontRef idx="minor">
+            <a:schemeClr val="lt1"/>
+          </a:fontRef>
+        </p:style>
+        <p:txBody>
+          <a:bodyPr rtlCol="0" anchor="ctr"/>
+          <a:lstStyle/>
+          <a:p>
+            <a:pPr algn="ctr"/>
+            <a:endParaRPr lang="en-US"/>
+          </a:p>
+        </p:txBody>
+      </p:sp>
+      <p:cxnSp>
+        <p:nvCxnSpPr>
+          <p:cNvPr id="221" name="Elbow Connector 220"/>
+          <p:cNvCxnSpPr>
+            <a:stCxn id="218" idx="2"/>
+            <a:endCxn id="217" idx="1"/>
+          </p:cNvCxnSpPr>
+          <p:nvPr/>
+        </p:nvCxnSpPr>
+        <p:spPr>
+          <a:xfrm rot="16200000" flipH="1">
+            <a:off x="6103911" y="4974763"/>
+            <a:ext cx="880258" cy="1249204"/>
+          </a:xfrm>
+          <a:prstGeom prst="bentConnector2">
+            <a:avLst/>
+          </a:prstGeom>
+          <a:ln>
+            <a:tailEnd type="triangle"/>
+          </a:ln>
+        </p:spPr>
+        <p:style>
+          <a:lnRef idx="1">
+            <a:schemeClr val="accent1"/>
+          </a:lnRef>
+          <a:fillRef idx="0">
+            <a:schemeClr val="accent1"/>
+          </a:fillRef>
+          <a:effectRef idx="0">
+            <a:schemeClr val="accent1"/>
+          </a:effectRef>
+          <a:fontRef idx="minor">
+            <a:schemeClr val="tx1"/>
+          </a:fontRef>
+        </p:style>
+      </p:cxnSp>
+      <p:cxnSp>
+        <p:nvCxnSpPr>
+          <p:cNvPr id="223" name="Elbow Connector 222"/>
+          <p:cNvCxnSpPr>
+            <a:stCxn id="219" idx="2"/>
+            <a:endCxn id="217" idx="3"/>
+          </p:cNvCxnSpPr>
+          <p:nvPr/>
+        </p:nvCxnSpPr>
+        <p:spPr>
+          <a:xfrm rot="5400000">
+            <a:off x="8644610" y="4919905"/>
+            <a:ext cx="824030" cy="1415149"/>
+          </a:xfrm>
+          <a:prstGeom prst="bentConnector2">
+            <a:avLst/>
+          </a:prstGeom>
+          <a:ln>
+            <a:tailEnd type="triangle"/>
+          </a:ln>
+        </p:spPr>
+        <p:style>
+          <a:lnRef idx="1">
+            <a:schemeClr val="accent1"/>
+          </a:lnRef>
+          <a:fillRef idx="0">
+            <a:schemeClr val="accent1"/>
+          </a:fillRef>
+          <a:effectRef idx="0">
+            <a:schemeClr val="accent1"/>
+          </a:effectRef>
+          <a:fontRef idx="minor">
+            <a:schemeClr val="tx1"/>
+          </a:fontRef>
+        </p:style>
+      </p:cxnSp>
+      <p:sp>
+        <p:nvSpPr>
+          <p:cNvPr id="226" name="TextBox 225"/>
+          <p:cNvSpPr txBox="1"/>
+          <p:nvPr/>
+        </p:nvSpPr>
+        <p:spPr>
+          <a:xfrm>
+            <a:off x="7309208" y="5393642"/>
+            <a:ext cx="876327" cy="369332"/>
+          </a:xfrm>
+          <a:prstGeom prst="rect">
+            <a:avLst/>
+          </a:prstGeom>
+          <a:noFill/>
+        </p:spPr>
+        <p:txBody>
+          <a:bodyPr wrap="square" rtlCol="0">
+            <a:spAutoFit/>
+          </a:bodyPr>
+          <a:lstStyle/>
+          <a:p>
+            <a:pPr algn="ctr"/>
+            <a:r>
+              <a:rPr lang="en-US" dirty="0" smtClean="0">
+                <a:solidFill>
+                  <a:schemeClr val="bg2">
+                    <a:lumMod val="90000"/>
+                  </a:schemeClr>
+                </a:solidFill>
+              </a:rPr>
+              <a:t>To get</a:t>
+            </a:r>
+            <a:endParaRPr lang="en-US" dirty="0">
+              <a:solidFill>
+                <a:schemeClr val="bg2">
+                  <a:lumMod val="90000"/>
+                </a:schemeClr>
+              </a:solidFill>
+            </a:endParaRPr>
+          </a:p>
+        </p:txBody>
+      </p:sp>
+      <p:sp>
+        <p:nvSpPr>
+          <p:cNvPr id="233" name="TextBox 232"/>
+          <p:cNvSpPr txBox="1"/>
+          <p:nvPr/>
+        </p:nvSpPr>
+        <p:spPr>
+          <a:xfrm>
+            <a:off x="4501484" y="4208355"/>
+            <a:ext cx="1505667" cy="369332"/>
+          </a:xfrm>
+          <a:prstGeom prst="rect">
+            <a:avLst/>
+          </a:prstGeom>
+          <a:noFill/>
+        </p:spPr>
+        <p:txBody>
+          <a:bodyPr wrap="square" rtlCol="0">
+            <a:spAutoFit/>
+          </a:bodyPr>
+          <a:lstStyle/>
+          <a:p>
+            <a:pPr algn="ctr"/>
+            <a:r>
+              <a:rPr lang="en-US" dirty="0" smtClean="0">
+                <a:solidFill>
+                  <a:schemeClr val="bg2">
+                    <a:lumMod val="90000"/>
+                  </a:schemeClr>
+                </a:solidFill>
+              </a:rPr>
+              <a:t>The function</a:t>
+            </a:r>
+            <a:endParaRPr lang="en-US" dirty="0">
+              <a:solidFill>
+                <a:schemeClr val="bg2">
+                  <a:lumMod val="90000"/>
+                </a:schemeClr>
+              </a:solidFill>
+            </a:endParaRPr>
+          </a:p>
+        </p:txBody>
+      </p:sp>
+      <p:sp>
+        <p:nvSpPr>
+          <p:cNvPr id="234" name="TextBox 233"/>
+          <p:cNvSpPr txBox="1"/>
+          <p:nvPr/>
+        </p:nvSpPr>
+        <p:spPr>
+          <a:xfrm>
+            <a:off x="8266596" y="4198265"/>
+            <a:ext cx="1505667" cy="369332"/>
+          </a:xfrm>
+          <a:prstGeom prst="rect">
+            <a:avLst/>
+          </a:prstGeom>
+          <a:noFill/>
+        </p:spPr>
+        <p:txBody>
+          <a:bodyPr wrap="square" rtlCol="0">
+            <a:spAutoFit/>
+          </a:bodyPr>
+          <a:lstStyle/>
+          <a:p>
+            <a:pPr algn="ctr"/>
+            <a:r>
+              <a:rPr lang="en-US" dirty="0" smtClean="0">
+                <a:solidFill>
+                  <a:schemeClr val="bg2">
+                    <a:lumMod val="90000"/>
+                  </a:schemeClr>
+                </a:solidFill>
+              </a:rPr>
+              <a:t>The function</a:t>
+            </a:r>
+            <a:endParaRPr lang="en-US" dirty="0">
+              <a:solidFill>
+                <a:schemeClr val="bg2">
+                  <a:lumMod val="90000"/>
+                </a:schemeClr>
+              </a:solidFill>
+            </a:endParaRPr>
+          </a:p>
+        </p:txBody>
+      </p:sp>
+      <p:sp>
+        <p:nvSpPr>
+          <p:cNvPr id="246" name="TextBox 245"/>
+          <p:cNvSpPr txBox="1"/>
+          <p:nvPr/>
+        </p:nvSpPr>
+        <p:spPr>
+          <a:xfrm>
+            <a:off x="6154355" y="1771029"/>
+            <a:ext cx="1553934" cy="369332"/>
+          </a:xfrm>
+          <a:prstGeom prst="rect">
+            <a:avLst/>
+          </a:prstGeom>
+          <a:noFill/>
+        </p:spPr>
+        <p:txBody>
+          <a:bodyPr wrap="square" rtlCol="0">
+            <a:spAutoFit/>
+          </a:bodyPr>
+          <a:lstStyle/>
+          <a:p>
+            <a:pPr algn="ctr"/>
+            <a:r>
+              <a:rPr lang="en-US" dirty="0" smtClean="0">
+                <a:solidFill>
+                  <a:schemeClr val="bg2">
+                    <a:lumMod val="90000"/>
+                  </a:schemeClr>
+                </a:solidFill>
+              </a:rPr>
+              <a:t>Using functions</a:t>
+            </a:r>
+            <a:endParaRPr lang="en-US" dirty="0">
+              <a:solidFill>
+                <a:schemeClr val="bg2">
+                  <a:lumMod val="90000"/>
+                </a:schemeClr>
+              </a:solidFill>
+            </a:endParaRPr>
+          </a:p>
+        </p:txBody>
+      </p:sp>
+      <p:sp>
+        <p:nvSpPr>
+          <p:cNvPr id="247" name="Rectangle 246"/>
+          <p:cNvSpPr/>
+          <p:nvPr/>
+        </p:nvSpPr>
+        <p:spPr>
+          <a:xfrm>
+            <a:off x="5219425" y="2718009"/>
+            <a:ext cx="3966936" cy="548640"/>
+          </a:xfrm>
+          <a:prstGeom prst="rect">
+            <a:avLst/>
+          </a:prstGeom>
+          <a:solidFill>
+            <a:schemeClr val="accent6"/>
+          </a:solidFill>
+          <a:ln>
+            <a:solidFill>
+              <a:schemeClr val="accent2"/>
+            </a:solidFill>
+          </a:ln>
+        </p:spPr>
+        <p:style>
+          <a:lnRef idx="2">
+            <a:schemeClr val="accent1">
+              <a:shade val="50000"/>
+            </a:schemeClr>
+          </a:lnRef>
+          <a:fillRef idx="1">
+            <a:schemeClr val="accent1"/>
+          </a:fillRef>
+          <a:effectRef idx="0">
+            <a:schemeClr val="accent1"/>
+          </a:effectRef>
+          <a:fontRef idx="minor">
+            <a:schemeClr val="lt1"/>
+          </a:fontRef>
+        </p:style>
+        <p:txBody>
+          <a:bodyPr rtlCol="0" anchor="ctr"/>
+          <a:lstStyle/>
+          <a:p>
+            <a:pPr algn="ctr"/>
+            <a:r>
+              <a:rPr lang="en-US" b="1" dirty="0" err="1" smtClean="0"/>
+              <a:t>function_name</a:t>
+            </a:r>
+            <a:r>
+              <a:rPr lang="en-US" b="1" dirty="0" smtClean="0"/>
+              <a:t>(.data, .thing1, .thing2)</a:t>
+            </a:r>
+          </a:p>
+        </p:txBody>
+      </p:sp>
+      <p:cxnSp>
+        <p:nvCxnSpPr>
+          <p:cNvPr id="253" name="Straight Arrow Connector 252"/>
+          <p:cNvCxnSpPr/>
+          <p:nvPr/>
+        </p:nvCxnSpPr>
+        <p:spPr>
+          <a:xfrm>
+            <a:off x="7327220" y="4667695"/>
+            <a:ext cx="982372" cy="21816"/>
+          </a:xfrm>
+          <a:prstGeom prst="straightConnector1">
+            <a:avLst/>
+          </a:prstGeom>
+          <a:ln>
+            <a:headEnd type="triangle"/>
+            <a:tailEnd type="triangle"/>
+          </a:ln>
+        </p:spPr>
+        <p:style>
+          <a:lnRef idx="1">
+            <a:schemeClr val="accent1"/>
+          </a:lnRef>
+          <a:fillRef idx="0">
+            <a:schemeClr val="accent1"/>
+          </a:fillRef>
+          <a:effectRef idx="0">
+            <a:schemeClr val="accent1"/>
+          </a:effectRef>
+          <a:fontRef idx="minor">
+            <a:schemeClr val="tx1"/>
+          </a:fontRef>
+        </p:style>
+      </p:cxnSp>
+      <p:sp>
+        <p:nvSpPr>
+          <p:cNvPr id="258" name="TextBox 257"/>
+          <p:cNvSpPr txBox="1"/>
+          <p:nvPr/>
+        </p:nvSpPr>
+        <p:spPr>
+          <a:xfrm>
+            <a:off x="5029866" y="2385644"/>
+            <a:ext cx="1393654" cy="369332"/>
+          </a:xfrm>
+          <a:prstGeom prst="rect">
+            <a:avLst/>
+          </a:prstGeom>
+          <a:noFill/>
+        </p:spPr>
+        <p:txBody>
+          <a:bodyPr wrap="square" rtlCol="0">
+            <a:spAutoFit/>
+          </a:bodyPr>
+          <a:lstStyle/>
+          <a:p>
+            <a:pPr algn="ctr"/>
+            <a:r>
+              <a:rPr lang="en-US" dirty="0" smtClean="0">
+                <a:solidFill>
+                  <a:schemeClr val="bg2">
+                    <a:lumMod val="90000"/>
+                  </a:schemeClr>
+                </a:solidFill>
+              </a:rPr>
+              <a:t>Signature</a:t>
+            </a:r>
+            <a:endParaRPr lang="en-US" dirty="0">
+              <a:solidFill>
+                <a:schemeClr val="bg2">
+                  <a:lumMod val="90000"/>
+                </a:schemeClr>
+              </a:solidFill>
+            </a:endParaRPr>
+          </a:p>
+        </p:txBody>
+      </p:sp>
+      <p:cxnSp>
+        <p:nvCxnSpPr>
+          <p:cNvPr id="59" name="Elbow Connector 58"/>
+          <p:cNvCxnSpPr>
+            <a:stCxn id="247" idx="2"/>
+            <a:endCxn id="218" idx="0"/>
+          </p:cNvCxnSpPr>
+          <p:nvPr/>
+        </p:nvCxnSpPr>
+        <p:spPr>
+          <a:xfrm rot="5400000">
+            <a:off x="6117322" y="3068766"/>
+            <a:ext cx="887688" cy="1283455"/>
+          </a:xfrm>
+          <a:prstGeom prst="bentConnector3">
+            <a:avLst>
+              <a:gd name="adj1" fmla="val 75227"/>
+            </a:avLst>
+          </a:prstGeom>
+          <a:ln>
+            <a:tailEnd type="triangle"/>
+          </a:ln>
+        </p:spPr>
+        <p:style>
+          <a:lnRef idx="1">
+            <a:schemeClr val="accent1"/>
+          </a:lnRef>
+          <a:fillRef idx="0">
+            <a:schemeClr val="accent1"/>
+          </a:fillRef>
+          <a:effectRef idx="0">
+            <a:schemeClr val="accent1"/>
+          </a:effectRef>
+          <a:fontRef idx="minor">
+            <a:schemeClr val="tx1"/>
+          </a:fontRef>
+        </p:style>
+      </p:cxnSp>
+      <p:cxnSp>
+        <p:nvCxnSpPr>
+          <p:cNvPr id="62" name="Elbow Connector 61"/>
+          <p:cNvCxnSpPr>
+            <a:stCxn id="247" idx="2"/>
+            <a:endCxn id="219" idx="0"/>
+          </p:cNvCxnSpPr>
+          <p:nvPr/>
+        </p:nvCxnSpPr>
+        <p:spPr>
+          <a:xfrm rot="16200000" flipH="1">
+            <a:off x="8046000" y="2423542"/>
+            <a:ext cx="875093" cy="2561306"/>
+          </a:xfrm>
+          <a:prstGeom prst="bentConnector3">
+            <a:avLst>
+              <a:gd name="adj1" fmla="val 24410"/>
+            </a:avLst>
+          </a:prstGeom>
+          <a:ln>
+            <a:tailEnd type="triangle"/>
+          </a:ln>
+        </p:spPr>
+        <p:style>
+          <a:lnRef idx="1">
+            <a:schemeClr val="accent1"/>
+          </a:lnRef>
+          <a:fillRef idx="0">
+            <a:schemeClr val="accent1"/>
+          </a:fillRef>
+          <a:effectRef idx="0">
+            <a:schemeClr val="accent1"/>
+          </a:effectRef>
+          <a:fontRef idx="minor">
+            <a:schemeClr val="tx1"/>
+          </a:fontRef>
+        </p:style>
+      </p:cxnSp>
+      <p:sp>
+        <p:nvSpPr>
+          <p:cNvPr id="70" name="Rectangle 69"/>
+          <p:cNvSpPr/>
+          <p:nvPr/>
+        </p:nvSpPr>
+        <p:spPr>
+          <a:xfrm>
+            <a:off x="454367" y="1498955"/>
+            <a:ext cx="2093197" cy="548640"/>
+          </a:xfrm>
+          <a:prstGeom prst="rect">
+            <a:avLst/>
+          </a:prstGeom>
+        </p:spPr>
+        <p:style>
+          <a:lnRef idx="2">
+            <a:schemeClr val="accent1">
+              <a:shade val="50000"/>
+            </a:schemeClr>
+          </a:lnRef>
+          <a:fillRef idx="1">
+            <a:schemeClr val="accent1"/>
+          </a:fillRef>
+          <a:effectRef idx="0">
+            <a:schemeClr val="accent1"/>
+          </a:effectRef>
+          <a:fontRef idx="minor">
+            <a:schemeClr val="lt1"/>
+          </a:fontRef>
+        </p:style>
+        <p:txBody>
+          <a:bodyPr rtlCol="0" anchor="ctr"/>
+          <a:lstStyle/>
+          <a:p>
+            <a:pPr algn="ctr"/>
+            <a:r>
+              <a:rPr lang="en-US" dirty="0" smtClean="0"/>
+              <a:t>Fundamental, primary activity</a:t>
+            </a:r>
+          </a:p>
+        </p:txBody>
+      </p:sp>
+      <p:cxnSp>
+        <p:nvCxnSpPr>
+          <p:cNvPr id="24" name="Elbow Connector 23"/>
+          <p:cNvCxnSpPr>
+            <a:stCxn id="30" idx="3"/>
+            <a:endCxn id="5" idx="1"/>
+          </p:cNvCxnSpPr>
+          <p:nvPr/>
+        </p:nvCxnSpPr>
+        <p:spPr>
+          <a:xfrm>
+            <a:off x="2547564" y="862304"/>
+            <a:ext cx="1247163" cy="381931"/>
+          </a:xfrm>
+          <a:prstGeom prst="bentConnector3">
+            <a:avLst>
+              <a:gd name="adj1" fmla="val 41540"/>
+            </a:avLst>
+          </a:prstGeom>
+          <a:ln>
+            <a:tailEnd type="triangle"/>
+          </a:ln>
+        </p:spPr>
+        <p:style>
+          <a:lnRef idx="1">
+            <a:schemeClr val="accent1"/>
+          </a:lnRef>
+          <a:fillRef idx="0">
+            <a:schemeClr val="accent1"/>
+          </a:fillRef>
+          <a:effectRef idx="0">
+            <a:schemeClr val="accent1"/>
+          </a:effectRef>
+          <a:fontRef idx="minor">
+            <a:schemeClr val="tx1"/>
+          </a:fontRef>
+        </p:style>
+      </p:cxnSp>
+      <p:cxnSp>
+        <p:nvCxnSpPr>
+          <p:cNvPr id="227" name="Straight Arrow Connector 226"/>
+          <p:cNvCxnSpPr>
+            <a:stCxn id="30" idx="2"/>
+            <a:endCxn id="70" idx="0"/>
+          </p:cNvCxnSpPr>
+          <p:nvPr/>
+        </p:nvCxnSpPr>
+        <p:spPr>
+          <a:xfrm>
+            <a:off x="1500966" y="1114589"/>
+            <a:ext cx="0" cy="384366"/>
+          </a:xfrm>
+          <a:prstGeom prst="straightConnector1">
+            <a:avLst/>
+          </a:prstGeom>
+          <a:ln>
+            <a:tailEnd type="triangle"/>
+          </a:ln>
+        </p:spPr>
+        <p:style>
+          <a:lnRef idx="1">
+            <a:schemeClr val="accent1"/>
+          </a:lnRef>
+          <a:fillRef idx="0">
+            <a:schemeClr val="accent1"/>
+          </a:fillRef>
+          <a:effectRef idx="0">
+            <a:schemeClr val="accent1"/>
+          </a:effectRef>
+          <a:fontRef idx="minor">
+            <a:schemeClr val="tx1"/>
+          </a:fontRef>
+        </p:style>
+      </p:cxnSp>
+      <p:sp>
+        <p:nvSpPr>
+          <p:cNvPr id="86" name="TextBox 85"/>
+          <p:cNvSpPr txBox="1"/>
+          <p:nvPr/>
+        </p:nvSpPr>
+        <p:spPr>
+          <a:xfrm>
+            <a:off x="1285192" y="1132656"/>
+            <a:ext cx="878104" cy="369332"/>
+          </a:xfrm>
+          <a:prstGeom prst="rect">
+            <a:avLst/>
+          </a:prstGeom>
+          <a:noFill/>
+        </p:spPr>
+        <p:txBody>
+          <a:bodyPr wrap="square" rtlCol="0">
+            <a:spAutoFit/>
+          </a:bodyPr>
+          <a:lstStyle/>
+          <a:p>
+            <a:pPr algn="ctr"/>
+            <a:r>
+              <a:rPr lang="en-US" dirty="0" smtClean="0">
+                <a:solidFill>
+                  <a:schemeClr val="bg2">
+                    <a:lumMod val="90000"/>
+                  </a:schemeClr>
+                </a:solidFill>
+              </a:rPr>
+              <a:t>Is a</a:t>
+            </a:r>
+            <a:endParaRPr lang="en-US" dirty="0">
+              <a:solidFill>
+                <a:schemeClr val="bg2">
+                  <a:lumMod val="90000"/>
+                </a:schemeClr>
+              </a:solidFill>
+            </a:endParaRPr>
+          </a:p>
+        </p:txBody>
+      </p:sp>
+      <p:sp>
+        <p:nvSpPr>
+          <p:cNvPr id="91" name="Rectangle 90"/>
+          <p:cNvSpPr/>
+          <p:nvPr/>
+        </p:nvSpPr>
+        <p:spPr>
+          <a:xfrm>
+            <a:off x="9589854" y="2726024"/>
+            <a:ext cx="2310784" cy="548640"/>
+          </a:xfrm>
+          <a:prstGeom prst="rect">
+            <a:avLst/>
+          </a:prstGeom>
+          <a:solidFill>
+            <a:schemeClr val="accent2">
+              <a:lumMod val="40000"/>
+              <a:lumOff val="60000"/>
+            </a:schemeClr>
+          </a:solidFill>
+          <a:ln>
+            <a:solidFill>
+              <a:schemeClr val="accent2">
+                <a:lumMod val="40000"/>
+                <a:lumOff val="60000"/>
+              </a:schemeClr>
+            </a:solidFill>
+          </a:ln>
+        </p:spPr>
+        <p:style>
+          <a:lnRef idx="2">
+            <a:schemeClr val="accent1">
+              <a:shade val="50000"/>
+            </a:schemeClr>
+          </a:lnRef>
+          <a:fillRef idx="1">
+            <a:schemeClr val="accent1"/>
+          </a:fillRef>
+          <a:effectRef idx="0">
+            <a:schemeClr val="accent1"/>
+          </a:effectRef>
+          <a:fontRef idx="minor">
+            <a:schemeClr val="lt1"/>
+          </a:fontRef>
+        </p:style>
+        <p:txBody>
+          <a:bodyPr rtlCol="0" anchor="ctr"/>
+          <a:lstStyle/>
+          <a:p>
+            <a:pPr algn="ctr"/>
+            <a:r>
+              <a:rPr lang="en-US" b="1" dirty="0" smtClean="0"/>
+              <a:t>commas ,</a:t>
+            </a:r>
+          </a:p>
+        </p:txBody>
+      </p:sp>
+      <p:cxnSp>
+        <p:nvCxnSpPr>
+          <p:cNvPr id="236" name="Elbow Connector 235"/>
+          <p:cNvCxnSpPr>
+            <a:stCxn id="91" idx="0"/>
+            <a:endCxn id="247" idx="3"/>
+          </p:cNvCxnSpPr>
+          <p:nvPr/>
+        </p:nvCxnSpPr>
+        <p:spPr>
+          <a:xfrm rot="16200000" flipH="1" flipV="1">
+            <a:off x="9832651" y="2079733"/>
+            <a:ext cx="266305" cy="1558885"/>
+          </a:xfrm>
+          <a:prstGeom prst="bentConnector4">
+            <a:avLst>
+              <a:gd name="adj1" fmla="val -85841"/>
+              <a:gd name="adj2" fmla="val 87058"/>
+            </a:avLst>
+          </a:prstGeom>
+          <a:ln>
+            <a:headEnd type="triangle"/>
+            <a:tailEnd type="triangle"/>
+          </a:ln>
+        </p:spPr>
+        <p:style>
+          <a:lnRef idx="1">
+            <a:schemeClr val="accent1"/>
+          </a:lnRef>
+          <a:fillRef idx="0">
+            <a:schemeClr val="accent1"/>
+          </a:fillRef>
+          <a:effectRef idx="0">
+            <a:schemeClr val="accent1"/>
+          </a:effectRef>
+          <a:fontRef idx="minor">
+            <a:schemeClr val="tx1"/>
+          </a:fontRef>
+        </p:style>
+      </p:cxnSp>
+      <p:sp>
+        <p:nvSpPr>
+          <p:cNvPr id="103" name="Rectangle 102"/>
+          <p:cNvSpPr/>
+          <p:nvPr/>
+        </p:nvSpPr>
+        <p:spPr>
+          <a:xfrm>
+            <a:off x="1371630" y="4030399"/>
+            <a:ext cx="1180408" cy="548640"/>
+          </a:xfrm>
+          <a:prstGeom prst="rect">
+            <a:avLst/>
+          </a:prstGeom>
+          <a:solidFill>
+            <a:schemeClr val="accent2"/>
+          </a:solidFill>
+          <a:ln>
+            <a:solidFill>
+              <a:schemeClr val="accent2"/>
+            </a:solidFill>
+          </a:ln>
+        </p:spPr>
+        <p:style>
+          <a:lnRef idx="2">
+            <a:schemeClr val="accent1">
+              <a:shade val="50000"/>
+            </a:schemeClr>
+          </a:lnRef>
+          <a:fillRef idx="1">
+            <a:schemeClr val="accent1"/>
+          </a:fillRef>
+          <a:effectRef idx="0">
+            <a:schemeClr val="accent1"/>
+          </a:effectRef>
+          <a:fontRef idx="minor">
+            <a:schemeClr val="lt1"/>
+          </a:fontRef>
+        </p:style>
+        <p:txBody>
+          <a:bodyPr rtlCol="0" anchor="ctr"/>
+          <a:lstStyle/>
+          <a:p>
+            <a:pPr algn="ctr"/>
+            <a:r>
+              <a:rPr lang="en-US" b="1" dirty="0" err="1" smtClean="0"/>
+              <a:t>dplyr</a:t>
+            </a:r>
+            <a:r>
+              <a:rPr lang="en-US" b="1" dirty="0" smtClean="0"/>
+              <a:t> </a:t>
+            </a:r>
+          </a:p>
+        </p:txBody>
+      </p:sp>
+      <p:sp>
+        <p:nvSpPr>
+          <p:cNvPr id="106" name="TextBox 105"/>
+          <p:cNvSpPr txBox="1"/>
+          <p:nvPr/>
+        </p:nvSpPr>
+        <p:spPr>
+          <a:xfrm>
+            <a:off x="2703779" y="3919637"/>
+            <a:ext cx="1278795" cy="369332"/>
+          </a:xfrm>
+          <a:prstGeom prst="rect">
+            <a:avLst/>
+          </a:prstGeom>
+          <a:noFill/>
+        </p:spPr>
+        <p:txBody>
+          <a:bodyPr wrap="square" rtlCol="0">
+            <a:spAutoFit/>
+          </a:bodyPr>
+          <a:lstStyle/>
+          <a:p>
+            <a:pPr algn="ctr"/>
+            <a:r>
+              <a:rPr lang="en-US" dirty="0" smtClean="0">
+                <a:solidFill>
+                  <a:schemeClr val="bg2">
+                    <a:lumMod val="90000"/>
+                  </a:schemeClr>
+                </a:solidFill>
+              </a:rPr>
+              <a:t>Both from</a:t>
+            </a:r>
+            <a:endParaRPr lang="en-US" dirty="0">
+              <a:solidFill>
+                <a:schemeClr val="bg2">
+                  <a:lumMod val="90000"/>
+                </a:schemeClr>
+              </a:solidFill>
+            </a:endParaRPr>
+          </a:p>
+        </p:txBody>
+      </p:sp>
+      <p:cxnSp>
+        <p:nvCxnSpPr>
+          <p:cNvPr id="231" name="Straight Arrow Connector 230"/>
+          <p:cNvCxnSpPr>
+            <a:endCxn id="103" idx="3"/>
+          </p:cNvCxnSpPr>
+          <p:nvPr/>
+        </p:nvCxnSpPr>
+        <p:spPr>
+          <a:xfrm flipH="1">
+            <a:off x="2552038" y="4292368"/>
+            <a:ext cx="2261372" cy="12351"/>
+          </a:xfrm>
+          <a:prstGeom prst="straightConnector1">
+            <a:avLst/>
+          </a:prstGeom>
+          <a:ln>
+            <a:tailEnd type="triangle"/>
+          </a:ln>
+        </p:spPr>
+        <p:style>
+          <a:lnRef idx="1">
+            <a:schemeClr val="accent1"/>
+          </a:lnRef>
+          <a:fillRef idx="0">
+            <a:schemeClr val="accent1"/>
+          </a:fillRef>
+          <a:effectRef idx="0">
+            <a:schemeClr val="accent1"/>
+          </a:effectRef>
+          <a:fontRef idx="minor">
+            <a:schemeClr val="tx1"/>
+          </a:fontRef>
+        </p:style>
+      </p:cxnSp>
+      <p:sp>
+        <p:nvSpPr>
+          <p:cNvPr id="93" name="TextBox 92"/>
+          <p:cNvSpPr txBox="1"/>
+          <p:nvPr/>
+        </p:nvSpPr>
+        <p:spPr>
+          <a:xfrm>
+            <a:off x="4357999" y="3808873"/>
+            <a:ext cx="1225209" cy="369332"/>
+          </a:xfrm>
+          <a:prstGeom prst="rect">
+            <a:avLst/>
+          </a:prstGeom>
+          <a:noFill/>
+        </p:spPr>
+        <p:txBody>
+          <a:bodyPr wrap="square" rtlCol="0">
+            <a:spAutoFit/>
+          </a:bodyPr>
+          <a:lstStyle/>
+          <a:p>
+            <a:pPr algn="ctr"/>
+            <a:r>
+              <a:rPr lang="en-US" dirty="0" smtClean="0">
+                <a:solidFill>
+                  <a:schemeClr val="bg2">
+                    <a:lumMod val="90000"/>
+                  </a:schemeClr>
+                </a:solidFill>
+              </a:rPr>
+              <a:t>For rows</a:t>
+            </a:r>
+            <a:endParaRPr lang="en-US" dirty="0">
+              <a:solidFill>
+                <a:schemeClr val="bg2">
+                  <a:lumMod val="90000"/>
+                </a:schemeClr>
+              </a:solidFill>
+            </a:endParaRPr>
+          </a:p>
+        </p:txBody>
+      </p:sp>
+      <p:sp>
+        <p:nvSpPr>
+          <p:cNvPr id="94" name="TextBox 93"/>
+          <p:cNvSpPr txBox="1"/>
+          <p:nvPr/>
+        </p:nvSpPr>
+        <p:spPr>
+          <a:xfrm>
+            <a:off x="8269746" y="3808873"/>
+            <a:ext cx="1354811" cy="369332"/>
+          </a:xfrm>
+          <a:prstGeom prst="rect">
+            <a:avLst/>
+          </a:prstGeom>
+          <a:noFill/>
+        </p:spPr>
+        <p:txBody>
+          <a:bodyPr wrap="square" rtlCol="0">
+            <a:spAutoFit/>
+          </a:bodyPr>
+          <a:lstStyle/>
+          <a:p>
+            <a:pPr algn="ctr"/>
+            <a:r>
+              <a:rPr lang="en-US" dirty="0" smtClean="0">
+                <a:solidFill>
+                  <a:schemeClr val="bg2">
+                    <a:lumMod val="90000"/>
+                  </a:schemeClr>
+                </a:solidFill>
+              </a:rPr>
+              <a:t>For columns</a:t>
+            </a:r>
+            <a:endParaRPr lang="en-US" dirty="0">
+              <a:solidFill>
+                <a:schemeClr val="bg2">
+                  <a:lumMod val="90000"/>
+                </a:schemeClr>
+              </a:solidFill>
+            </a:endParaRPr>
+          </a:p>
+        </p:txBody>
+      </p:sp>
+      <p:sp>
+        <p:nvSpPr>
+          <p:cNvPr id="95" name="Rectangle 94"/>
+          <p:cNvSpPr/>
+          <p:nvPr/>
+        </p:nvSpPr>
+        <p:spPr>
+          <a:xfrm>
+            <a:off x="454367" y="2464581"/>
+            <a:ext cx="2093197" cy="331930"/>
+          </a:xfrm>
+          <a:prstGeom prst="rect">
+            <a:avLst/>
+          </a:prstGeom>
+        </p:spPr>
+        <p:style>
+          <a:lnRef idx="2">
+            <a:schemeClr val="accent1">
+              <a:shade val="50000"/>
+            </a:schemeClr>
+          </a:lnRef>
+          <a:fillRef idx="1">
+            <a:schemeClr val="accent1"/>
+          </a:fillRef>
+          <a:effectRef idx="0">
+            <a:schemeClr val="accent1"/>
+          </a:effectRef>
+          <a:fontRef idx="minor">
+            <a:schemeClr val="lt1"/>
+          </a:fontRef>
+        </p:style>
+        <p:txBody>
+          <a:bodyPr rtlCol="0" anchor="ctr"/>
+          <a:lstStyle/>
+          <a:p>
+            <a:pPr algn="ctr"/>
+            <a:r>
+              <a:rPr lang="en-US" dirty="0" smtClean="0"/>
+              <a:t>Really useful!</a:t>
+            </a:r>
+          </a:p>
+        </p:txBody>
+      </p:sp>
+      <p:cxnSp>
+        <p:nvCxnSpPr>
+          <p:cNvPr id="239" name="Straight Arrow Connector 238"/>
+          <p:cNvCxnSpPr>
+            <a:stCxn id="70" idx="2"/>
+            <a:endCxn id="95" idx="0"/>
+          </p:cNvCxnSpPr>
+          <p:nvPr/>
+        </p:nvCxnSpPr>
+        <p:spPr>
+          <a:xfrm>
+            <a:off x="1500966" y="2047595"/>
+            <a:ext cx="0" cy="416986"/>
+          </a:xfrm>
+          <a:prstGeom prst="straightConnector1">
+            <a:avLst/>
+          </a:prstGeom>
+          <a:ln>
+            <a:tailEnd type="triangle"/>
+          </a:ln>
+        </p:spPr>
+        <p:style>
+          <a:lnRef idx="1">
+            <a:schemeClr val="accent1"/>
+          </a:lnRef>
+          <a:fillRef idx="0">
+            <a:schemeClr val="accent1"/>
+          </a:fillRef>
+          <a:effectRef idx="0">
+            <a:schemeClr val="accent1"/>
+          </a:effectRef>
+          <a:fontRef idx="minor">
+            <a:schemeClr val="tx1"/>
+          </a:fontRef>
+        </p:style>
+      </p:cxnSp>
+      <p:sp>
+        <p:nvSpPr>
+          <p:cNvPr id="98" name="TextBox 97"/>
+          <p:cNvSpPr txBox="1"/>
+          <p:nvPr/>
+        </p:nvSpPr>
+        <p:spPr>
+          <a:xfrm>
+            <a:off x="1500965" y="2068393"/>
+            <a:ext cx="878104" cy="369332"/>
+          </a:xfrm>
+          <a:prstGeom prst="rect">
+            <a:avLst/>
+          </a:prstGeom>
+          <a:noFill/>
+        </p:spPr>
+        <p:txBody>
+          <a:bodyPr wrap="square" rtlCol="0">
+            <a:spAutoFit/>
+          </a:bodyPr>
+          <a:lstStyle/>
+          <a:p>
+            <a:pPr algn="ctr"/>
+            <a:r>
+              <a:rPr lang="en-US" dirty="0" smtClean="0">
+                <a:solidFill>
+                  <a:schemeClr val="bg2">
+                    <a:lumMod val="90000"/>
+                  </a:schemeClr>
+                </a:solidFill>
+              </a:rPr>
+              <a:t>So it’s</a:t>
+            </a:r>
+            <a:endParaRPr lang="en-US" dirty="0">
+              <a:solidFill>
+                <a:schemeClr val="bg2">
+                  <a:lumMod val="90000"/>
+                </a:schemeClr>
+              </a:solidFill>
+            </a:endParaRPr>
+          </a:p>
+        </p:txBody>
+      </p:sp>
+      <p:cxnSp>
+        <p:nvCxnSpPr>
+          <p:cNvPr id="250" name="Elbow Connector 249"/>
+          <p:cNvCxnSpPr>
+            <a:stCxn id="247" idx="1"/>
+            <a:endCxn id="103" idx="0"/>
+          </p:cNvCxnSpPr>
+          <p:nvPr/>
+        </p:nvCxnSpPr>
+        <p:spPr>
+          <a:xfrm rot="10800000" flipV="1">
+            <a:off x="1961835" y="2992329"/>
+            <a:ext cx="3257591" cy="1038070"/>
+          </a:xfrm>
+          <a:prstGeom prst="bentConnector2">
+            <a:avLst/>
+          </a:prstGeom>
+          <a:ln>
+            <a:tailEnd type="triangle"/>
+          </a:ln>
+        </p:spPr>
+        <p:style>
+          <a:lnRef idx="1">
+            <a:schemeClr val="accent1"/>
+          </a:lnRef>
+          <a:fillRef idx="0">
+            <a:schemeClr val="accent1"/>
+          </a:fillRef>
+          <a:effectRef idx="0">
+            <a:schemeClr val="accent1"/>
+          </a:effectRef>
+          <a:fontRef idx="minor">
+            <a:schemeClr val="tx1"/>
+          </a:fontRef>
+        </p:style>
+      </p:cxnSp>
+      <p:sp>
+        <p:nvSpPr>
+          <p:cNvPr id="107" name="TextBox 106"/>
+          <p:cNvSpPr txBox="1"/>
+          <p:nvPr/>
+        </p:nvSpPr>
+        <p:spPr>
+          <a:xfrm>
+            <a:off x="3246526" y="2621298"/>
+            <a:ext cx="1393654" cy="369332"/>
+          </a:xfrm>
+          <a:prstGeom prst="rect">
+            <a:avLst/>
+          </a:prstGeom>
+          <a:noFill/>
+        </p:spPr>
+        <p:txBody>
+          <a:bodyPr wrap="square" rtlCol="0">
+            <a:spAutoFit/>
+          </a:bodyPr>
+          <a:lstStyle/>
+          <a:p>
+            <a:pPr algn="ctr"/>
+            <a:r>
+              <a:rPr lang="en-US" dirty="0" smtClean="0">
+                <a:solidFill>
+                  <a:schemeClr val="bg2">
+                    <a:lumMod val="90000"/>
+                  </a:schemeClr>
+                </a:solidFill>
+              </a:rPr>
+              <a:t>Used across</a:t>
+            </a:r>
+            <a:endParaRPr lang="en-US" dirty="0">
+              <a:solidFill>
+                <a:schemeClr val="bg2">
+                  <a:lumMod val="90000"/>
+                </a:schemeClr>
+              </a:solidFill>
+            </a:endParaRPr>
+          </a:p>
+        </p:txBody>
+      </p:sp>
+      <p:sp>
+        <p:nvSpPr>
+          <p:cNvPr id="81" name="TextBox 80"/>
+          <p:cNvSpPr txBox="1"/>
+          <p:nvPr/>
+        </p:nvSpPr>
+        <p:spPr>
+          <a:xfrm>
+            <a:off x="454367" y="46913"/>
+            <a:ext cx="10477500" cy="523220"/>
+          </a:xfrm>
+          <a:prstGeom prst="rect">
+            <a:avLst/>
+          </a:prstGeom>
+          <a:noFill/>
+        </p:spPr>
+        <p:txBody>
+          <a:bodyPr wrap="square" rtlCol="0">
+            <a:spAutoFit/>
+          </a:bodyPr>
+          <a:lstStyle/>
+          <a:p>
+            <a:r>
+              <a:rPr lang="en-US" sz="2800" dirty="0" smtClean="0"/>
+              <a:t>Mental Model:</a:t>
+            </a:r>
+            <a:endParaRPr lang="en-US" sz="2800" b="1" dirty="0">
+              <a:latin typeface="Courier New" panose="02070309020205020404" pitchFamily="49" charset="0"/>
+              <a:cs typeface="Courier New" panose="02070309020205020404" pitchFamily="49" charset="0"/>
+            </a:endParaRPr>
+          </a:p>
+        </p:txBody>
+      </p:sp>
+      <p:cxnSp>
+        <p:nvCxnSpPr>
+          <p:cNvPr id="25" name="Straight Arrow Connector 24"/>
+          <p:cNvCxnSpPr/>
+          <p:nvPr/>
+        </p:nvCxnSpPr>
+        <p:spPr>
+          <a:xfrm flipH="1">
+            <a:off x="2413500" y="6039494"/>
+            <a:ext cx="1768207" cy="0"/>
+          </a:xfrm>
+          <a:prstGeom prst="straightConnector1">
+            <a:avLst/>
+          </a:prstGeom>
+          <a:ln>
+            <a:solidFill>
+              <a:schemeClr val="accent1">
+                <a:alpha val="47000"/>
+              </a:schemeClr>
+            </a:solidFill>
+            <a:tailEnd type="triangle"/>
+          </a:ln>
+        </p:spPr>
+        <p:style>
+          <a:lnRef idx="1">
+            <a:schemeClr val="accent1"/>
+          </a:lnRef>
+          <a:fillRef idx="0">
+            <a:schemeClr val="accent1"/>
+          </a:fillRef>
+          <a:effectRef idx="0">
+            <a:schemeClr val="accent1"/>
+          </a:effectRef>
+          <a:fontRef idx="minor">
+            <a:schemeClr val="tx1"/>
+          </a:fontRef>
+        </p:style>
+      </p:cxnSp>
+      <p:sp>
+        <p:nvSpPr>
+          <p:cNvPr id="84" name="Rectangle 83"/>
+          <p:cNvSpPr/>
+          <p:nvPr/>
+        </p:nvSpPr>
+        <p:spPr>
+          <a:xfrm>
+            <a:off x="1198694" y="5765174"/>
+            <a:ext cx="1180408" cy="548640"/>
+          </a:xfrm>
+          <a:prstGeom prst="rect">
+            <a:avLst/>
+          </a:prstGeom>
+          <a:solidFill>
+            <a:schemeClr val="accent2">
+              <a:alpha val="43000"/>
+            </a:schemeClr>
+          </a:solidFill>
+          <a:ln>
+            <a:solidFill>
+              <a:schemeClr val="accent2">
+                <a:alpha val="42000"/>
+              </a:schemeClr>
+            </a:solidFill>
+          </a:ln>
+        </p:spPr>
+        <p:style>
+          <a:lnRef idx="2">
+            <a:schemeClr val="accent1">
+              <a:shade val="50000"/>
+            </a:schemeClr>
+          </a:lnRef>
+          <a:fillRef idx="1">
+            <a:schemeClr val="accent1"/>
+          </a:fillRef>
+          <a:effectRef idx="0">
+            <a:schemeClr val="accent1"/>
+          </a:effectRef>
+          <a:fontRef idx="minor">
+            <a:schemeClr val="lt1"/>
+          </a:fontRef>
+        </p:style>
+        <p:txBody>
+          <a:bodyPr rtlCol="0" anchor="ctr"/>
+          <a:lstStyle/>
+          <a:p>
+            <a:pPr algn="ctr"/>
+            <a:r>
+              <a:rPr lang="en-US" b="1" dirty="0" smtClean="0"/>
+              <a:t>… </a:t>
+            </a:r>
+          </a:p>
+        </p:txBody>
+      </p:sp>
+      <p:sp>
+        <p:nvSpPr>
+          <p:cNvPr id="85" name="TextBox 84"/>
+          <p:cNvSpPr txBox="1"/>
+          <p:nvPr/>
+        </p:nvSpPr>
+        <p:spPr>
+          <a:xfrm>
+            <a:off x="2571847" y="5670162"/>
+            <a:ext cx="1412352" cy="369332"/>
+          </a:xfrm>
+          <a:prstGeom prst="rect">
+            <a:avLst/>
+          </a:prstGeom>
+          <a:noFill/>
+        </p:spPr>
+        <p:txBody>
+          <a:bodyPr wrap="square" rtlCol="0">
+            <a:spAutoFit/>
+          </a:bodyPr>
+          <a:lstStyle/>
+          <a:p>
+            <a:pPr algn="ctr"/>
+            <a:r>
+              <a:rPr lang="en-US" dirty="0" smtClean="0">
+                <a:solidFill>
+                  <a:schemeClr val="bg2">
+                    <a:lumMod val="90000"/>
+                  </a:schemeClr>
+                </a:solidFill>
+              </a:rPr>
+              <a:t>Combine with</a:t>
+            </a:r>
+            <a:endParaRPr lang="en-US" dirty="0">
+              <a:solidFill>
+                <a:schemeClr val="bg2">
+                  <a:lumMod val="90000"/>
+                </a:schemeClr>
+              </a:solidFill>
+            </a:endParaRPr>
+          </a:p>
+        </p:txBody>
+      </p:sp>
+      <p:sp>
+        <p:nvSpPr>
+          <p:cNvPr id="87" name="TextBox 86"/>
+          <p:cNvSpPr txBox="1"/>
+          <p:nvPr/>
+        </p:nvSpPr>
+        <p:spPr>
+          <a:xfrm>
+            <a:off x="1092294" y="5392718"/>
+            <a:ext cx="1412352" cy="369332"/>
+          </a:xfrm>
+          <a:prstGeom prst="rect">
+            <a:avLst/>
+          </a:prstGeom>
+          <a:noFill/>
+        </p:spPr>
+        <p:txBody>
+          <a:bodyPr wrap="square" rtlCol="0">
+            <a:spAutoFit/>
+          </a:bodyPr>
+          <a:lstStyle/>
+          <a:p>
+            <a:pPr algn="ctr"/>
+            <a:r>
+              <a:rPr lang="en-US" dirty="0" smtClean="0">
+                <a:solidFill>
+                  <a:schemeClr val="bg2">
+                    <a:lumMod val="90000"/>
+                  </a:schemeClr>
+                </a:solidFill>
+              </a:rPr>
+              <a:t>Later content</a:t>
+            </a:r>
+            <a:endParaRPr lang="en-US" dirty="0">
+              <a:solidFill>
+                <a:schemeClr val="bg2">
+                  <a:lumMod val="90000"/>
+                </a:schemeClr>
+              </a:solidFill>
+            </a:endParaRPr>
+          </a:p>
+        </p:txBody>
+      </p:sp>
+      <p:sp>
+        <p:nvSpPr>
+          <p:cNvPr id="92" name="TextBox 91"/>
+          <p:cNvSpPr txBox="1"/>
+          <p:nvPr/>
+        </p:nvSpPr>
+        <p:spPr>
+          <a:xfrm>
+            <a:off x="9124540" y="2128996"/>
+            <a:ext cx="1850370" cy="369332"/>
+          </a:xfrm>
+          <a:prstGeom prst="rect">
+            <a:avLst/>
+          </a:prstGeom>
+          <a:noFill/>
+        </p:spPr>
+        <p:txBody>
+          <a:bodyPr wrap="square" rtlCol="0">
+            <a:spAutoFit/>
+          </a:bodyPr>
+          <a:lstStyle/>
+          <a:p>
+            <a:pPr algn="ctr"/>
+            <a:r>
+              <a:rPr lang="en-US" dirty="0" smtClean="0">
+                <a:solidFill>
+                  <a:schemeClr val="bg2">
+                    <a:lumMod val="90000"/>
+                  </a:schemeClr>
+                </a:solidFill>
+              </a:rPr>
+              <a:t>Separated with</a:t>
+            </a:r>
+            <a:endParaRPr lang="en-US" dirty="0">
+              <a:solidFill>
+                <a:schemeClr val="bg2">
+                  <a:lumMod val="90000"/>
+                </a:schemeClr>
+              </a:solidFill>
+            </a:endParaRPr>
+          </a:p>
+        </p:txBody>
+      </p:sp>
+      <p:sp>
+        <p:nvSpPr>
+          <p:cNvPr id="64" name="Rectangle 63"/>
+          <p:cNvSpPr/>
+          <p:nvPr/>
+        </p:nvSpPr>
+        <p:spPr>
+          <a:xfrm>
+            <a:off x="125635" y="4766031"/>
+            <a:ext cx="1180408" cy="548640"/>
+          </a:xfrm>
+          <a:prstGeom prst="rect">
+            <a:avLst/>
+          </a:prstGeom>
+          <a:solidFill>
+            <a:schemeClr val="accent2"/>
+          </a:solidFill>
+          <a:ln>
+            <a:solidFill>
+              <a:schemeClr val="accent2"/>
+            </a:solidFill>
+          </a:ln>
+        </p:spPr>
+        <p:style>
+          <a:lnRef idx="2">
+            <a:schemeClr val="accent1">
+              <a:shade val="50000"/>
+            </a:schemeClr>
+          </a:lnRef>
+          <a:fillRef idx="1">
+            <a:schemeClr val="accent1"/>
+          </a:fillRef>
+          <a:effectRef idx="0">
+            <a:schemeClr val="accent1"/>
+          </a:effectRef>
+          <a:fontRef idx="minor">
+            <a:schemeClr val="lt1"/>
+          </a:fontRef>
+        </p:style>
+        <p:txBody>
+          <a:bodyPr rtlCol="0" anchor="ctr"/>
+          <a:lstStyle/>
+          <a:p>
+            <a:pPr algn="ctr"/>
+            <a:r>
+              <a:rPr lang="en-US" b="1" dirty="0" err="1" smtClean="0"/>
+              <a:t>tidyverse</a:t>
+            </a:r>
+            <a:endParaRPr lang="en-US" b="1" dirty="0" smtClean="0"/>
+          </a:p>
+        </p:txBody>
+      </p:sp>
+      <p:cxnSp>
+        <p:nvCxnSpPr>
+          <p:cNvPr id="4" name="Elbow Connector 3"/>
+          <p:cNvCxnSpPr>
+            <a:stCxn id="103" idx="1"/>
+            <a:endCxn id="64" idx="0"/>
+          </p:cNvCxnSpPr>
+          <p:nvPr/>
+        </p:nvCxnSpPr>
+        <p:spPr>
+          <a:xfrm rot="10800000" flipV="1">
+            <a:off x="715840" y="4304719"/>
+            <a:ext cx="655791" cy="461312"/>
+          </a:xfrm>
+          <a:prstGeom prst="bentConnector2">
+            <a:avLst/>
+          </a:prstGeom>
+          <a:ln>
+            <a:tailEnd type="triangle"/>
+          </a:ln>
+        </p:spPr>
+        <p:style>
+          <a:lnRef idx="1">
+            <a:schemeClr val="accent1"/>
+          </a:lnRef>
+          <a:fillRef idx="0">
+            <a:schemeClr val="accent1"/>
+          </a:fillRef>
+          <a:effectRef idx="0">
+            <a:schemeClr val="accent1"/>
+          </a:effectRef>
+          <a:fontRef idx="minor">
+            <a:schemeClr val="tx1"/>
+          </a:fontRef>
+        </p:style>
+      </p:cxnSp>
+      <p:sp>
+        <p:nvSpPr>
+          <p:cNvPr id="67" name="TextBox 66"/>
+          <p:cNvSpPr txBox="1"/>
+          <p:nvPr/>
+        </p:nvSpPr>
+        <p:spPr>
+          <a:xfrm>
+            <a:off x="129615" y="3929211"/>
+            <a:ext cx="851170" cy="369332"/>
+          </a:xfrm>
+          <a:prstGeom prst="rect">
+            <a:avLst/>
+          </a:prstGeom>
+          <a:noFill/>
+        </p:spPr>
+        <p:txBody>
+          <a:bodyPr wrap="square" rtlCol="0">
+            <a:spAutoFit/>
+          </a:bodyPr>
+          <a:lstStyle/>
+          <a:p>
+            <a:pPr algn="ctr"/>
+            <a:r>
+              <a:rPr lang="en-US" dirty="0" smtClean="0">
+                <a:solidFill>
+                  <a:schemeClr val="bg2">
+                    <a:lumMod val="90000"/>
+                  </a:schemeClr>
+                </a:solidFill>
+              </a:rPr>
+              <a:t>Part of</a:t>
+            </a:r>
+            <a:endParaRPr lang="en-US" dirty="0">
+              <a:solidFill>
+                <a:schemeClr val="bg2">
+                  <a:lumMod val="90000"/>
+                </a:schemeClr>
+              </a:solidFill>
+            </a:endParaRPr>
+          </a:p>
+        </p:txBody>
+      </p:sp>
+      <p:cxnSp>
+        <p:nvCxnSpPr>
+          <p:cNvPr id="8" name="Elbow Connector 7"/>
+          <p:cNvCxnSpPr>
+            <a:stCxn id="64" idx="2"/>
+            <a:endCxn id="84" idx="1"/>
+          </p:cNvCxnSpPr>
+          <p:nvPr/>
+        </p:nvCxnSpPr>
+        <p:spPr>
+          <a:xfrm rot="16200000" flipH="1">
+            <a:off x="594855" y="5435654"/>
+            <a:ext cx="724823" cy="482855"/>
+          </a:xfrm>
+          <a:prstGeom prst="bentConnector2">
+            <a:avLst/>
+          </a:prstGeom>
+          <a:ln>
+            <a:tailEnd type="triangle"/>
+          </a:ln>
+        </p:spPr>
+        <p:style>
+          <a:lnRef idx="1">
+            <a:schemeClr val="accent1"/>
+          </a:lnRef>
+          <a:fillRef idx="0">
+            <a:schemeClr val="accent1"/>
+          </a:fillRef>
+          <a:effectRef idx="0">
+            <a:schemeClr val="accent1"/>
+          </a:effectRef>
+          <a:fontRef idx="minor">
+            <a:schemeClr val="tx1"/>
+          </a:fontRef>
+        </p:style>
+      </p:cxnSp>
+    </p:spTree>
+    <p:extLst>
+      <p:ext uri="{BB962C8B-B14F-4D97-AF65-F5344CB8AC3E}">
+        <p14:creationId xmlns:p14="http://schemas.microsoft.com/office/powerpoint/2010/main" val="123914790"/>
+      </p:ext>
+    </p:extLst>
+  </p:cSld>
+  <p:clrMapOvr>
+    <a:masterClrMapping/>
+  </p:clrMapOvr>
+</p:sld>
+</file>
+
 <file path=ppt/slides/slide2.xml><?xml version="1.0" encoding="utf-8"?>
 <p:sld xmlns:a="http://schemas.openxmlformats.org/drawingml/2006/main" xmlns:r="http://schemas.openxmlformats.org/officeDocument/2006/relationships" xmlns:p="http://schemas.openxmlformats.org/presentationml/2006/main">
   <p:cSld>
@@ -24057,8 +26823,8 @@
         </p:nvSpPr>
         <p:spPr>
           <a:xfrm>
-            <a:off x="414528" y="1820538"/>
-            <a:ext cx="5994294" cy="4893647"/>
+            <a:off x="311085" y="1820538"/>
+            <a:ext cx="6097737" cy="4524315"/>
           </a:xfrm>
           <a:prstGeom prst="rect">
             <a:avLst/>
@@ -24073,7 +26839,7 @@
           <a:p>
             <a:r>
               <a:rPr lang="en-US" sz="2400" i="1" dirty="0" smtClean="0"/>
-              <a:t>Hi Jo,</a:t>
+              <a:t>Hi,</a:t>
             </a:r>
           </a:p>
           <a:p>
@@ -24091,7 +26857,15 @@
           <a:p>
             <a:r>
               <a:rPr lang="en-US" sz="2400" i="1" dirty="0" smtClean="0"/>
-              <a:t>Working with the data was tricky, and I wasn’t able to get just what you asked for, but I’m sure having the full details can’t hurt!</a:t>
+              <a:t>Working with the data was tricky, but I</a:t>
+            </a:r>
+            <a:r>
+              <a:rPr lang="en-US" sz="2400" i="1" dirty="0"/>
+              <a:t> </a:t>
+            </a:r>
+            <a:r>
+              <a:rPr lang="en-US" sz="2400" i="1" dirty="0" smtClean="0"/>
+              <a:t>think I’ve we should be ok!</a:t>
             </a:r>
           </a:p>
           <a:p>
@@ -25518,23 +28292,7 @@
           <a:p>
             <a:r>
               <a:rPr lang="en-US" sz="4000" strike="sngStrike" dirty="0" smtClean="0"/>
-              <a:t>Manually extract </a:t>
-            </a:r>
-            <a:r>
-              <a:rPr lang="en-US" sz="4000" strike="sngStrike" dirty="0" smtClean="0"/>
-              <a:t>the data </a:t>
-            </a:r>
-            <a:r>
-              <a:rPr lang="en-US" sz="4000" strike="sngStrike" dirty="0" smtClean="0"/>
-              <a:t>you </a:t>
-            </a:r>
-            <a:r>
-              <a:rPr lang="en-US" sz="4000" strike="sngStrike" dirty="0" smtClean="0"/>
-              <a:t>want</a:t>
-            </a:r>
-            <a:r>
-              <a:rPr lang="en-US" sz="4000" strike="sngStrike" dirty="0" smtClean="0"/>
-              <a:t/>
+              <a:t>Manually extract the data you want</a:t>
             </a:r>
             <a:br>
               <a:rPr lang="en-US" sz="4000" strike="sngStrike" dirty="0" smtClean="0"/>
@@ -25544,17 +28302,8 @@
           <a:p>
             <a:r>
               <a:rPr lang="en-US" sz="4000" strike="sngStrike" dirty="0" smtClean="0"/>
-              <a:t>Ask </a:t>
-            </a:r>
-            <a:r>
-              <a:rPr lang="en-US" sz="4000" strike="sngStrike" dirty="0" smtClean="0"/>
-              <a:t>your collaborator </a:t>
-            </a:r>
-            <a:r>
-              <a:rPr lang="en-US" sz="4000" strike="sngStrike" dirty="0" smtClean="0"/>
-              <a:t>for help</a:t>
-            </a:r>
-            <a:endParaRPr lang="en-US" sz="4000" strike="sngStrike" dirty="0" smtClean="0"/>
+              <a:t>Ask your collaborator for help</a:t>
+            </a:r>
           </a:p>
           <a:p>
             <a:pPr marL="742950" indent="-742950">
@@ -25761,7 +28510,7 @@
         </p:blipFill>
         <p:spPr>
           <a:xfrm>
-            <a:off x="10858501" y="204216"/>
+            <a:off x="10858501" y="250871"/>
             <a:ext cx="1115114" cy="1293896"/>
           </a:xfrm>
         </p:spPr>
@@ -25821,11 +28570,7 @@
             </a:r>
             <a:r>
               <a:rPr lang="en-US" sz="3600" dirty="0" smtClean="0"/>
-              <a:t> </a:t>
-            </a:r>
-            <a:r>
-              <a:rPr lang="en-US" sz="3600" dirty="0" smtClean="0"/>
-              <a:t>package</a:t>
+              <a:t> package</a:t>
             </a:r>
             <a:endParaRPr lang="en-US" sz="3600" dirty="0"/>
           </a:p>
@@ -26678,17 +29423,7 @@
                     <a:latin typeface="Courier New" panose="02070309020205020404" pitchFamily="49" charset="0"/>
                     <a:cs typeface="Courier New" panose="02070309020205020404" pitchFamily="49" charset="0"/>
                   </a:rPr>
-                  <a:t> </a:t>
-                </a:r>
-                <a:r>
-                  <a:rPr lang="en-US" sz="3200" dirty="0" smtClean="0">
-                    <a:solidFill>
-                      <a:schemeClr val="tx1"/>
-                    </a:solidFill>
-                    <a:latin typeface="Courier New" panose="02070309020205020404" pitchFamily="49" charset="0"/>
-                    <a:cs typeface="Courier New" panose="02070309020205020404" pitchFamily="49" charset="0"/>
-                  </a:rPr>
-                  <a:t>&lt;- </a:t>
+                  <a:t> &lt;- </a:t>
                 </a:r>
                 <a:r>
                   <a:rPr lang="en-US" sz="3200" dirty="0" err="1" smtClean="0">
@@ -26824,6 +29559,36 @@
           </p:txBody>
         </p:sp>
       </p:grpSp>
+      <p:pic>
+        <p:nvPicPr>
+          <p:cNvPr id="2" name="Picture 1"/>
+          <p:cNvPicPr>
+            <a:picLocks noChangeAspect="1"/>
+          </p:cNvPicPr>
+          <p:nvPr/>
+        </p:nvPicPr>
+        <p:blipFill>
+          <a:blip r:embed="rId6" cstate="print">
+            <a:extLst>
+              <a:ext uri="{28A0092B-C50C-407E-A947-70E740481C1C}">
+                <a14:useLocalDpi xmlns:a14="http://schemas.microsoft.com/office/drawing/2010/main" val="0"/>
+              </a:ext>
+            </a:extLst>
+          </a:blip>
+          <a:stretch>
+            <a:fillRect/>
+          </a:stretch>
+        </p:blipFill>
+        <p:spPr>
+          <a:xfrm>
+            <a:off x="9421153" y="39339"/>
+            <a:ext cx="1380198" cy="1693043"/>
+          </a:xfrm>
+          <a:prstGeom prst="rect">
+            <a:avLst/>
+          </a:prstGeom>
+        </p:spPr>
+      </p:pic>
     </p:spTree>
     <p:extLst>
       <p:ext uri="{BB962C8B-B14F-4D97-AF65-F5344CB8AC3E}">
@@ -27175,35 +29940,6 @@
           <a:chExt cx="0" cy="0"/>
         </a:xfrm>
       </p:grpSpPr>
-      <p:pic>
-        <p:nvPicPr>
-          <p:cNvPr id="6" name="Content Placeholder 5"/>
-          <p:cNvPicPr>
-            <a:picLocks noGrp="1" noChangeAspect="1"/>
-          </p:cNvPicPr>
-          <p:nvPr>
-            <p:ph idx="1"/>
-          </p:nvPr>
-        </p:nvPicPr>
-        <p:blipFill>
-          <a:blip r:embed="rId3" cstate="print">
-            <a:extLst>
-              <a:ext uri="{28A0092B-C50C-407E-A947-70E740481C1C}">
-                <a14:useLocalDpi xmlns:a14="http://schemas.microsoft.com/office/drawing/2010/main" val="0"/>
-              </a:ext>
-            </a:extLst>
-          </a:blip>
-          <a:stretch>
-            <a:fillRect/>
-          </a:stretch>
-        </p:blipFill>
-        <p:spPr>
-          <a:xfrm>
-            <a:off x="10858501" y="204216"/>
-            <a:ext cx="1115114" cy="1293896"/>
-          </a:xfrm>
-        </p:spPr>
-      </p:pic>
       <p:sp>
         <p:nvSpPr>
           <p:cNvPr id="5" name="Title 4"/>
@@ -27847,7 +30583,7 @@
               <p:nvPr/>
             </p:nvPicPr>
             <p:blipFill>
-              <a:blip r:embed="rId4"/>
+              <a:blip r:embed="rId3"/>
               <a:stretch>
                 <a:fillRect/>
               </a:stretch>
@@ -27871,7 +30607,7 @@
               <p:nvPr/>
             </p:nvPicPr>
             <p:blipFill>
-              <a:blip r:embed="rId5"/>
+              <a:blip r:embed="rId4"/>
               <a:stretch>
                 <a:fillRect/>
               </a:stretch>
@@ -28200,6 +30936,85 @@
           </p:txBody>
         </p:sp>
       </p:grpSp>
+      <p:sp>
+        <p:nvSpPr>
+          <p:cNvPr id="4" name="Content Placeholder 3"/>
+          <p:cNvSpPr>
+            <a:spLocks noGrp="1"/>
+          </p:cNvSpPr>
+          <p:nvPr>
+            <p:ph idx="1"/>
+          </p:nvPr>
+        </p:nvSpPr>
+        <p:spPr/>
+        <p:txBody>
+          <a:bodyPr/>
+          <a:lstStyle/>
+          <a:p>
+            <a:endParaRPr lang="en-US"/>
+          </a:p>
+        </p:txBody>
+      </p:sp>
+      <p:pic>
+        <p:nvPicPr>
+          <p:cNvPr id="30" name="Content Placeholder 5"/>
+          <p:cNvPicPr>
+            <a:picLocks noChangeAspect="1"/>
+          </p:cNvPicPr>
+          <p:nvPr/>
+        </p:nvPicPr>
+        <p:blipFill>
+          <a:blip r:embed="rId5" cstate="print">
+            <a:extLst>
+              <a:ext uri="{28A0092B-C50C-407E-A947-70E740481C1C}">
+                <a14:useLocalDpi xmlns:a14="http://schemas.microsoft.com/office/drawing/2010/main" val="0"/>
+              </a:ext>
+            </a:extLst>
+          </a:blip>
+          <a:stretch>
+            <a:fillRect/>
+          </a:stretch>
+        </p:blipFill>
+        <p:spPr>
+          <a:xfrm>
+            <a:off x="10858501" y="250871"/>
+            <a:ext cx="1115114" cy="1293896"/>
+          </a:xfrm>
+          <a:prstGeom prst="rect">
+            <a:avLst/>
+          </a:prstGeom>
+        </p:spPr>
+      </p:pic>
+      <p:pic>
+        <p:nvPicPr>
+          <p:cNvPr id="31" name="Picture 30"/>
+          <p:cNvPicPr>
+            <a:picLocks noChangeAspect="1"/>
+          </p:cNvPicPr>
+          <p:nvPr/>
+        </p:nvPicPr>
+        <p:blipFill>
+          <a:blip r:embed="rId6" cstate="print">
+            <a:extLst>
+              <a:ext uri="{28A0092B-C50C-407E-A947-70E740481C1C}">
+                <a14:useLocalDpi xmlns:a14="http://schemas.microsoft.com/office/drawing/2010/main" val="0"/>
+              </a:ext>
+            </a:extLst>
+          </a:blip>
+          <a:stretch>
+            <a:fillRect/>
+          </a:stretch>
+        </p:blipFill>
+        <p:spPr>
+          <a:xfrm>
+            <a:off x="9421153" y="39339"/>
+            <a:ext cx="1380198" cy="1693043"/>
+          </a:xfrm>
+          <a:prstGeom prst="rect">
+            <a:avLst/>
+          </a:prstGeom>
+        </p:spPr>
+      </p:pic>
     </p:spTree>
     <p:extLst>
       <p:ext uri="{BB962C8B-B14F-4D97-AF65-F5344CB8AC3E}">
@@ -28626,35 +31441,6 @@
           <a:chExt cx="0" cy="0"/>
         </a:xfrm>
       </p:grpSpPr>
-      <p:pic>
-        <p:nvPicPr>
-          <p:cNvPr id="6" name="Content Placeholder 5"/>
-          <p:cNvPicPr>
-            <a:picLocks noGrp="1" noChangeAspect="1"/>
-          </p:cNvPicPr>
-          <p:nvPr>
-            <p:ph idx="1"/>
-          </p:nvPr>
-        </p:nvPicPr>
-        <p:blipFill>
-          <a:blip r:embed="rId3" cstate="print">
-            <a:extLst>
-              <a:ext uri="{28A0092B-C50C-407E-A947-70E740481C1C}">
-                <a14:useLocalDpi xmlns:a14="http://schemas.microsoft.com/office/drawing/2010/main" val="0"/>
-              </a:ext>
-            </a:extLst>
-          </a:blip>
-          <a:stretch>
-            <a:fillRect/>
-          </a:stretch>
-        </p:blipFill>
-        <p:spPr>
-          <a:xfrm>
-            <a:off x="10858501" y="204216"/>
-            <a:ext cx="1115114" cy="1293896"/>
-          </a:xfrm>
-        </p:spPr>
-      </p:pic>
       <p:sp>
         <p:nvSpPr>
           <p:cNvPr id="5" name="Title 4"/>
@@ -28765,15 +31551,7 @@
           <a:p>
             <a:r>
               <a:rPr lang="en-US" sz="2800" dirty="0" smtClean="0"/>
-              <a:t>You have </a:t>
-            </a:r>
-            <a:r>
-              <a:rPr lang="en-US" sz="2800" dirty="0" smtClean="0"/>
-              <a:t>data</a:t>
-            </a:r>
-            <a:r>
-              <a:rPr lang="en-US" sz="2800" dirty="0" smtClean="0"/>
-              <a:t>, </a:t>
+              <a:t>You have data, </a:t>
             </a:r>
             <a:r>
               <a:rPr lang="en-US" sz="2800" dirty="0" err="1" smtClean="0">
@@ -28791,15 +31569,7 @@
             </a:r>
             <a:r>
               <a:rPr lang="en-US" sz="2800" dirty="0" smtClean="0"/>
-              <a:t>and want to take </a:t>
-            </a:r>
-            <a:r>
-              <a:rPr lang="en-US" sz="2800" dirty="0" smtClean="0"/>
-              <a:t>and keep a </a:t>
-            </a:r>
-            <a:r>
-              <a:rPr lang="en-US" sz="2800" dirty="0" smtClean="0"/>
-              <a:t>subset of 3 columns: </a:t>
+              <a:t>and want to take and keep a subset of 3 columns: </a:t>
             </a:r>
             <a:r>
               <a:rPr lang="en-US" sz="2800" dirty="0" err="1" smtClean="0">
@@ -28845,11 +31615,7 @@
             </a:r>
             <a:r>
               <a:rPr lang="en-US" sz="2800" b="1" dirty="0" smtClean="0"/>
-              <a:t>Which line is correct</a:t>
-            </a:r>
-            <a:r>
-              <a:rPr lang="en-US" sz="2800" b="1" dirty="0" smtClean="0"/>
-              <a:t>? Why?</a:t>
+              <a:t>Which line is correct? Why?</a:t>
             </a:r>
             <a:endParaRPr lang="en-US" sz="2800" b="1" dirty="0">
               <a:latin typeface="Courier New" panose="02070309020205020404" pitchFamily="49" charset="0"/>
@@ -29119,6 +31885,85 @@
           </a:p>
         </p:txBody>
       </p:sp>
+      <p:sp>
+        <p:nvSpPr>
+          <p:cNvPr id="3" name="Content Placeholder 2"/>
+          <p:cNvSpPr>
+            <a:spLocks noGrp="1"/>
+          </p:cNvSpPr>
+          <p:nvPr>
+            <p:ph idx="1"/>
+          </p:nvPr>
+        </p:nvSpPr>
+        <p:spPr/>
+        <p:txBody>
+          <a:bodyPr/>
+          <a:lstStyle/>
+          <a:p>
+            <a:endParaRPr lang="en-US"/>
+          </a:p>
+        </p:txBody>
+      </p:sp>
+      <p:pic>
+        <p:nvPicPr>
+          <p:cNvPr id="8" name="Content Placeholder 5"/>
+          <p:cNvPicPr>
+            <a:picLocks noChangeAspect="1"/>
+          </p:cNvPicPr>
+          <p:nvPr/>
+        </p:nvPicPr>
+        <p:blipFill>
+          <a:blip r:embed="rId3" cstate="print">
+            <a:extLst>
+              <a:ext uri="{28A0092B-C50C-407E-A947-70E740481C1C}">
+                <a14:useLocalDpi xmlns:a14="http://schemas.microsoft.com/office/drawing/2010/main" val="0"/>
+              </a:ext>
+            </a:extLst>
+          </a:blip>
+          <a:stretch>
+            <a:fillRect/>
+          </a:stretch>
+        </p:blipFill>
+        <p:spPr>
+          <a:xfrm>
+            <a:off x="10858501" y="250871"/>
+            <a:ext cx="1115114" cy="1293896"/>
+          </a:xfrm>
+          <a:prstGeom prst="rect">
+            <a:avLst/>
+          </a:prstGeom>
+        </p:spPr>
+      </p:pic>
+      <p:pic>
+        <p:nvPicPr>
+          <p:cNvPr id="9" name="Picture 8"/>
+          <p:cNvPicPr>
+            <a:picLocks noChangeAspect="1"/>
+          </p:cNvPicPr>
+          <p:nvPr/>
+        </p:nvPicPr>
+        <p:blipFill>
+          <a:blip r:embed="rId4" cstate="print">
+            <a:extLst>
+              <a:ext uri="{28A0092B-C50C-407E-A947-70E740481C1C}">
+                <a14:useLocalDpi xmlns:a14="http://schemas.microsoft.com/office/drawing/2010/main" val="0"/>
+              </a:ext>
+            </a:extLst>
+          </a:blip>
+          <a:stretch>
+            <a:fillRect/>
+          </a:stretch>
+        </p:blipFill>
+        <p:spPr>
+          <a:xfrm>
+            <a:off x="9421153" y="39339"/>
+            <a:ext cx="1380198" cy="1693043"/>
+          </a:xfrm>
+          <a:prstGeom prst="rect">
+            <a:avLst/>
+          </a:prstGeom>
+        </p:spPr>
+      </p:pic>
     </p:spTree>
     <p:extLst>
       <p:ext uri="{BB962C8B-B14F-4D97-AF65-F5344CB8AC3E}">
@@ -29156,35 +32001,6 @@
           <a:chExt cx="0" cy="0"/>
         </a:xfrm>
       </p:grpSpPr>
-      <p:pic>
-        <p:nvPicPr>
-          <p:cNvPr id="6" name="Content Placeholder 5"/>
-          <p:cNvPicPr>
-            <a:picLocks noGrp="1" noChangeAspect="1"/>
-          </p:cNvPicPr>
-          <p:nvPr>
-            <p:ph idx="1"/>
-          </p:nvPr>
-        </p:nvPicPr>
-        <p:blipFill>
-          <a:blip r:embed="rId3" cstate="print">
-            <a:extLst>
-              <a:ext uri="{28A0092B-C50C-407E-A947-70E740481C1C}">
-                <a14:useLocalDpi xmlns:a14="http://schemas.microsoft.com/office/drawing/2010/main" val="0"/>
-              </a:ext>
-            </a:extLst>
-          </a:blip>
-          <a:stretch>
-            <a:fillRect/>
-          </a:stretch>
-        </p:blipFill>
-        <p:spPr>
-          <a:xfrm>
-            <a:off x="10858501" y="204216"/>
-            <a:ext cx="1115114" cy="1293896"/>
-          </a:xfrm>
-        </p:spPr>
-      </p:pic>
       <p:sp>
         <p:nvSpPr>
           <p:cNvPr id="5" name="Title 4"/>
@@ -29462,17 +32278,7 @@
                 <a:latin typeface="Courier New" panose="02070309020205020404" pitchFamily="49" charset="0"/>
                 <a:cs typeface="Courier New" panose="02070309020205020404" pitchFamily="49" charset="0"/>
               </a:rPr>
-              <a:t> </a:t>
-            </a:r>
-            <a:r>
-              <a:rPr lang="en-US" sz="4800" dirty="0" smtClean="0">
-                <a:solidFill>
-                  <a:schemeClr val="tx1"/>
-                </a:solidFill>
-                <a:latin typeface="Courier New" panose="02070309020205020404" pitchFamily="49" charset="0"/>
-                <a:cs typeface="Courier New" panose="02070309020205020404" pitchFamily="49" charset="0"/>
-              </a:rPr>
-              <a:t>&gt; 65)</a:t>
+              <a:t> &gt; 65)</a:t>
             </a:r>
             <a:endParaRPr lang="en-US" sz="4800" dirty="0">
               <a:solidFill>
@@ -29652,17 +32458,7 @@
                 <a:latin typeface="Courier New" panose="02070309020205020404" pitchFamily="49" charset="0"/>
                 <a:cs typeface="Courier New" panose="02070309020205020404" pitchFamily="49" charset="0"/>
               </a:rPr>
-              <a:t> </a:t>
-            </a:r>
-            <a:r>
-              <a:rPr lang="en-US" sz="4800" dirty="0" smtClean="0">
-                <a:solidFill>
-                  <a:schemeClr val="tx1"/>
-                </a:solidFill>
-                <a:latin typeface="Courier New" panose="02070309020205020404" pitchFamily="49" charset="0"/>
-                <a:cs typeface="Courier New" panose="02070309020205020404" pitchFamily="49" charset="0"/>
-              </a:rPr>
-              <a:t>&gt; 65, </a:t>
+              <a:t> &gt; 65, </a:t>
             </a:r>
             <a:r>
               <a:rPr lang="en-US" sz="4800" dirty="0" err="1" smtClean="0">
@@ -29682,17 +32478,7 @@
                 <a:latin typeface="Courier New" panose="02070309020205020404" pitchFamily="49" charset="0"/>
                 <a:cs typeface="Courier New" panose="02070309020205020404" pitchFamily="49" charset="0"/>
               </a:rPr>
-              <a:t> </a:t>
-            </a:r>
-            <a:r>
-              <a:rPr lang="en-US" sz="4800" dirty="0" smtClean="0">
-                <a:solidFill>
-                  <a:schemeClr val="tx1"/>
-                </a:solidFill>
-                <a:latin typeface="Courier New" panose="02070309020205020404" pitchFamily="49" charset="0"/>
-                <a:cs typeface="Courier New" panose="02070309020205020404" pitchFamily="49" charset="0"/>
-              </a:rPr>
-              <a:t>== “P”)</a:t>
+              <a:t> == “P”)</a:t>
             </a:r>
             <a:endParaRPr lang="en-US" sz="4800" dirty="0">
               <a:solidFill>
@@ -29759,7 +32545,7 @@
             <p:nvPr/>
           </p:nvPicPr>
           <p:blipFill>
-            <a:blip r:embed="rId4"/>
+            <a:blip r:embed="rId3"/>
             <a:stretch>
               <a:fillRect/>
             </a:stretch>
@@ -29783,7 +32569,7 @@
             <p:nvPr/>
           </p:nvPicPr>
           <p:blipFill>
-            <a:blip r:embed="rId5"/>
+            <a:blip r:embed="rId4"/>
             <a:stretch>
               <a:fillRect/>
             </a:stretch>
@@ -29886,17 +32672,7 @@
                   <a:latin typeface="Courier New" panose="02070309020205020404" pitchFamily="49" charset="0"/>
                   <a:cs typeface="Courier New" panose="02070309020205020404" pitchFamily="49" charset="0"/>
                 </a:rPr>
-                <a:t> </a:t>
-              </a:r>
-              <a:r>
-                <a:rPr lang="en-US" sz="2000" dirty="0" smtClean="0">
-                  <a:solidFill>
-                    <a:schemeClr val="tx1"/>
-                  </a:solidFill>
-                  <a:latin typeface="Courier New" panose="02070309020205020404" pitchFamily="49" charset="0"/>
-                  <a:cs typeface="Courier New" panose="02070309020205020404" pitchFamily="49" charset="0"/>
-                </a:rPr>
-                <a:t>&gt; 65, </a:t>
+                <a:t> &gt; 65, </a:t>
               </a:r>
               <a:r>
                 <a:rPr lang="en-US" sz="2000" dirty="0" err="1" smtClean="0">
@@ -29916,17 +32692,7 @@
                   <a:latin typeface="Courier New" panose="02070309020205020404" pitchFamily="49" charset="0"/>
                   <a:cs typeface="Courier New" panose="02070309020205020404" pitchFamily="49" charset="0"/>
                 </a:rPr>
-                <a:t> </a:t>
-              </a:r>
-              <a:r>
-                <a:rPr lang="en-US" sz="2000" dirty="0" smtClean="0">
-                  <a:solidFill>
-                    <a:schemeClr val="tx1"/>
-                  </a:solidFill>
-                  <a:latin typeface="Courier New" panose="02070309020205020404" pitchFamily="49" charset="0"/>
-                  <a:cs typeface="Courier New" panose="02070309020205020404" pitchFamily="49" charset="0"/>
-                </a:rPr>
-                <a:t>== “P”)</a:t>
+                <a:t> == “P”)</a:t>
               </a:r>
               <a:endParaRPr lang="en-US" sz="2000" dirty="0">
                 <a:solidFill>
@@ -30164,6 +32930,85 @@
           </p:style>
         </p:cxnSp>
       </p:grpSp>
+      <p:sp>
+        <p:nvSpPr>
+          <p:cNvPr id="2" name="Content Placeholder 1"/>
+          <p:cNvSpPr>
+            <a:spLocks noGrp="1"/>
+          </p:cNvSpPr>
+          <p:nvPr>
+            <p:ph idx="1"/>
+          </p:nvPr>
+        </p:nvSpPr>
+        <p:spPr/>
+        <p:txBody>
+          <a:bodyPr/>
+          <a:lstStyle/>
+          <a:p>
+            <a:endParaRPr lang="en-US"/>
+          </a:p>
+        </p:txBody>
+      </p:sp>
+      <p:pic>
+        <p:nvPicPr>
+          <p:cNvPr id="26" name="Content Placeholder 5"/>
+          <p:cNvPicPr>
+            <a:picLocks noChangeAspect="1"/>
+          </p:cNvPicPr>
+          <p:nvPr/>
+        </p:nvPicPr>
+        <p:blipFill>
+          <a:blip r:embed="rId5" cstate="print">
+            <a:extLst>
+              <a:ext uri="{28A0092B-C50C-407E-A947-70E740481C1C}">
+                <a14:useLocalDpi xmlns:a14="http://schemas.microsoft.com/office/drawing/2010/main" val="0"/>
+              </a:ext>
+            </a:extLst>
+          </a:blip>
+          <a:stretch>
+            <a:fillRect/>
+          </a:stretch>
+        </p:blipFill>
+        <p:spPr>
+          <a:xfrm>
+            <a:off x="10858501" y="260200"/>
+            <a:ext cx="1115114" cy="1293896"/>
+          </a:xfrm>
+          <a:prstGeom prst="rect">
+            <a:avLst/>
+          </a:prstGeom>
+        </p:spPr>
+      </p:pic>
+      <p:pic>
+        <p:nvPicPr>
+          <p:cNvPr id="27" name="Picture 26"/>
+          <p:cNvPicPr>
+            <a:picLocks noChangeAspect="1"/>
+          </p:cNvPicPr>
+          <p:nvPr/>
+        </p:nvPicPr>
+        <p:blipFill>
+          <a:blip r:embed="rId6" cstate="print">
+            <a:extLst>
+              <a:ext uri="{28A0092B-C50C-407E-A947-70E740481C1C}">
+                <a14:useLocalDpi xmlns:a14="http://schemas.microsoft.com/office/drawing/2010/main" val="0"/>
+              </a:ext>
+            </a:extLst>
+          </a:blip>
+          <a:stretch>
+            <a:fillRect/>
+          </a:stretch>
+        </p:blipFill>
+        <p:spPr>
+          <a:xfrm>
+            <a:off x="9421153" y="48668"/>
+            <a:ext cx="1380198" cy="1693043"/>
+          </a:xfrm>
+          <a:prstGeom prst="rect">
+            <a:avLst/>
+          </a:prstGeom>
+        </p:spPr>
+      </p:pic>
     </p:spTree>
     <p:extLst>
       <p:ext uri="{BB962C8B-B14F-4D97-AF65-F5344CB8AC3E}">
@@ -30517,35 +33362,6 @@
           <a:chExt cx="0" cy="0"/>
         </a:xfrm>
       </p:grpSpPr>
-      <p:pic>
-        <p:nvPicPr>
-          <p:cNvPr id="6" name="Content Placeholder 5"/>
-          <p:cNvPicPr>
-            <a:picLocks noGrp="1" noChangeAspect="1"/>
-          </p:cNvPicPr>
-          <p:nvPr>
-            <p:ph idx="1"/>
-          </p:nvPr>
-        </p:nvPicPr>
-        <p:blipFill>
-          <a:blip r:embed="rId3" cstate="print">
-            <a:extLst>
-              <a:ext uri="{28A0092B-C50C-407E-A947-70E740481C1C}">
-                <a14:useLocalDpi xmlns:a14="http://schemas.microsoft.com/office/drawing/2010/main" val="0"/>
-              </a:ext>
-            </a:extLst>
-          </a:blip>
-          <a:stretch>
-            <a:fillRect/>
-          </a:stretch>
-        </p:blipFill>
-        <p:spPr>
-          <a:xfrm>
-            <a:off x="10858501" y="204216"/>
-            <a:ext cx="1115114" cy="1293896"/>
-          </a:xfrm>
-        </p:spPr>
-      </p:pic>
       <p:sp>
         <p:nvSpPr>
           <p:cNvPr id="5" name="Title 4"/>
@@ -30656,15 +33472,7 @@
           <a:p>
             <a:r>
               <a:rPr lang="en-US" sz="2800" dirty="0" smtClean="0"/>
-              <a:t>You have </a:t>
-            </a:r>
-            <a:r>
-              <a:rPr lang="en-US" sz="2800" dirty="0" smtClean="0"/>
-              <a:t>data</a:t>
-            </a:r>
-            <a:r>
-              <a:rPr lang="en-US" sz="2800" dirty="0" smtClean="0"/>
-              <a:t>, </a:t>
+              <a:t>You have data, </a:t>
             </a:r>
             <a:r>
               <a:rPr lang="en-US" sz="2800" dirty="0" err="1" smtClean="0">
@@ -30682,15 +33490,7 @@
             </a:r>
             <a:r>
               <a:rPr lang="en-US" sz="2800" dirty="0" smtClean="0"/>
-              <a:t>and want to </a:t>
-            </a:r>
-            <a:r>
-              <a:rPr lang="en-US" sz="2800" dirty="0" smtClean="0"/>
-              <a:t>take and keep </a:t>
-            </a:r>
-            <a:r>
-              <a:rPr lang="en-US" sz="2800" dirty="0" smtClean="0"/>
-              <a:t>a subset where </a:t>
+              <a:t>and want to take and keep a subset where </a:t>
             </a:r>
             <a:r>
               <a:rPr lang="en-US" sz="2800" dirty="0" err="1" smtClean="0">
@@ -30701,15 +33501,7 @@
             </a:r>
             <a:r>
               <a:rPr lang="en-US" sz="2800" dirty="0" smtClean="0"/>
-              <a:t> is </a:t>
-            </a:r>
-            <a:r>
-              <a:rPr lang="en-US" sz="2800" dirty="0" smtClean="0"/>
-              <a:t>over </a:t>
-            </a:r>
-            <a:r>
-              <a:rPr lang="en-US" sz="2800" dirty="0" smtClean="0"/>
-              <a:t>65 and </a:t>
+              <a:t> is over 65 and </a:t>
             </a:r>
             <a:r>
               <a:rPr lang="en-US" sz="2800" dirty="0" err="1" smtClean="0">
@@ -30720,11 +33512,7 @@
             </a:r>
             <a:r>
               <a:rPr lang="en-US" sz="2800" dirty="0" smtClean="0"/>
-              <a:t> is </a:t>
-            </a:r>
-            <a:r>
-              <a:rPr lang="en-US" sz="2800" dirty="0" smtClean="0"/>
-              <a:t>exactly 1</a:t>
+              <a:t> is exactly 1</a:t>
             </a:r>
             <a:r>
               <a:rPr lang="en-US" sz="2800" dirty="0" smtClean="0">
@@ -30735,11 +33523,7 @@
             </a:r>
             <a:r>
               <a:rPr lang="en-US" sz="2800" b="1" dirty="0" smtClean="0"/>
-              <a:t>Which line is correct</a:t>
-            </a:r>
-            <a:r>
-              <a:rPr lang="en-US" sz="2800" b="1" dirty="0" smtClean="0"/>
-              <a:t>? Why?</a:t>
+              <a:t>Which line is correct? Why?</a:t>
             </a:r>
             <a:endParaRPr lang="en-US" sz="2800" b="1" dirty="0">
               <a:latin typeface="Courier New" panose="02070309020205020404" pitchFamily="49" charset="0"/>
@@ -30981,6 +33765,85 @@
           </a:p>
         </p:txBody>
       </p:sp>
+      <p:sp>
+        <p:nvSpPr>
+          <p:cNvPr id="3" name="Content Placeholder 2"/>
+          <p:cNvSpPr>
+            <a:spLocks noGrp="1"/>
+          </p:cNvSpPr>
+          <p:nvPr>
+            <p:ph idx="1"/>
+          </p:nvPr>
+        </p:nvSpPr>
+        <p:spPr/>
+        <p:txBody>
+          <a:bodyPr/>
+          <a:lstStyle/>
+          <a:p>
+            <a:endParaRPr lang="en-US"/>
+          </a:p>
+        </p:txBody>
+      </p:sp>
+      <p:pic>
+        <p:nvPicPr>
+          <p:cNvPr id="8" name="Content Placeholder 5"/>
+          <p:cNvPicPr>
+            <a:picLocks noChangeAspect="1"/>
+          </p:cNvPicPr>
+          <p:nvPr/>
+        </p:nvPicPr>
+        <p:blipFill>
+          <a:blip r:embed="rId3" cstate="print">
+            <a:extLst>
+              <a:ext uri="{28A0092B-C50C-407E-A947-70E740481C1C}">
+                <a14:useLocalDpi xmlns:a14="http://schemas.microsoft.com/office/drawing/2010/main" val="0"/>
+              </a:ext>
+            </a:extLst>
+          </a:blip>
+          <a:stretch>
+            <a:fillRect/>
+          </a:stretch>
+        </p:blipFill>
+        <p:spPr>
+          <a:xfrm>
+            <a:off x="10858501" y="237198"/>
+            <a:ext cx="1115114" cy="1293896"/>
+          </a:xfrm>
+          <a:prstGeom prst="rect">
+            <a:avLst/>
+          </a:prstGeom>
+        </p:spPr>
+      </p:pic>
+      <p:pic>
+        <p:nvPicPr>
+          <p:cNvPr id="9" name="Picture 8"/>
+          <p:cNvPicPr>
+            <a:picLocks noChangeAspect="1"/>
+          </p:cNvPicPr>
+          <p:nvPr/>
+        </p:nvPicPr>
+        <p:blipFill>
+          <a:blip r:embed="rId4" cstate="print">
+            <a:extLst>
+              <a:ext uri="{28A0092B-C50C-407E-A947-70E740481C1C}">
+                <a14:useLocalDpi xmlns:a14="http://schemas.microsoft.com/office/drawing/2010/main" val="0"/>
+              </a:ext>
+            </a:extLst>
+          </a:blip>
+          <a:stretch>
+            <a:fillRect/>
+          </a:stretch>
+        </p:blipFill>
+        <p:spPr>
+          <a:xfrm>
+            <a:off x="9421153" y="25666"/>
+            <a:ext cx="1380198" cy="1693043"/>
+          </a:xfrm>
+          <a:prstGeom prst="rect">
+            <a:avLst/>
+          </a:prstGeom>
+        </p:spPr>
+      </p:pic>
     </p:spTree>
     <p:extLst>
       <p:ext uri="{BB962C8B-B14F-4D97-AF65-F5344CB8AC3E}">

</xml_diff>

<commit_message>
Small tweak to some speaker notes
</commit_message>
<xml_diff>
--- a/data-subsetting.pptx
+++ b/data-subsetting.pptx
@@ -523,6 +523,274 @@
           <a:bodyPr/>
           <a:lstStyle/>
           <a:p>
+            <a:r>
+              <a:rPr lang="en-US" dirty="0" smtClean="0"/>
+              <a:t>In this lesson, we're going to cover one of the </a:t>
+            </a:r>
+            <a:r>
+              <a:rPr lang="en-US" i="1" dirty="0" smtClean="0"/>
+              <a:t>most important</a:t>
+            </a:r>
+            <a:r>
+              <a:rPr lang="en-US" dirty="0" smtClean="0"/>
+              <a:t> elements of data analysis: how to work with </a:t>
+            </a:r>
+            <a:r>
+              <a:rPr lang="en-US" dirty="0" err="1" smtClean="0"/>
+              <a:t>tablular</a:t>
+            </a:r>
+            <a:r>
+              <a:rPr lang="en-US" dirty="0" smtClean="0"/>
+              <a:t> data to extract just the bits of it that you need. We'll cover the two main applications: selecting columns and filtering rows, and show how to use both to get the subsets of data you need for your work.</a:t>
+            </a:r>
+            <a:endParaRPr lang="en-US" dirty="0"/>
+          </a:p>
+        </p:txBody>
+      </p:sp>
+      <p:sp>
+        <p:nvSpPr>
+          <p:cNvPr id="4" name="Slide Number Placeholder 3"/>
+          <p:cNvSpPr>
+            <a:spLocks noGrp="1"/>
+          </p:cNvSpPr>
+          <p:nvPr>
+            <p:ph type="sldNum" sz="quarter" idx="10"/>
+          </p:nvPr>
+        </p:nvSpPr>
+        <p:spPr/>
+        <p:txBody>
+          <a:bodyPr/>
+          <a:lstStyle/>
+          <a:p>
+            <a:fld id="{0CD4F51B-92DB-4235-BE1A-8989114F4168}" type="slidenum">
+              <a:rPr lang="en-US" smtClean="0"/>
+              <a:t>1</a:t>
+            </a:fld>
+            <a:endParaRPr lang="en-US"/>
+          </a:p>
+        </p:txBody>
+      </p:sp>
+    </p:spTree>
+    <p:extLst>
+      <p:ext uri="{BB962C8B-B14F-4D97-AF65-F5344CB8AC3E}">
+        <p14:creationId xmlns:p14="http://schemas.microsoft.com/office/powerpoint/2010/main" val="1502271166"/>
+      </p:ext>
+    </p:extLst>
+  </p:cSld>
+  <p:clrMapOvr>
+    <a:masterClrMapping/>
+  </p:clrMapOvr>
+</p:notes>
+</file>
+
+<file path=ppt/notesSlides/notesSlide10.xml><?xml version="1.0" encoding="utf-8"?>
+<p:notes xmlns:a="http://schemas.openxmlformats.org/drawingml/2006/main" xmlns:r="http://schemas.openxmlformats.org/officeDocument/2006/relationships" xmlns:p="http://schemas.openxmlformats.org/presentationml/2006/main">
+  <p:cSld>
+    <p:spTree>
+      <p:nvGrpSpPr>
+        <p:cNvPr id="1" name=""/>
+        <p:cNvGrpSpPr/>
+        <p:nvPr/>
+      </p:nvGrpSpPr>
+      <p:grpSpPr>
+        <a:xfrm>
+          <a:off x="0" y="0"/>
+          <a:ext cx="0" cy="0"/>
+          <a:chOff x="0" y="0"/>
+          <a:chExt cx="0" cy="0"/>
+        </a:xfrm>
+      </p:grpSpPr>
+      <p:sp>
+        <p:nvSpPr>
+          <p:cNvPr id="2" name="Slide Image Placeholder 1"/>
+          <p:cNvSpPr>
+            <a:spLocks noGrp="1" noRot="1" noChangeAspect="1"/>
+          </p:cNvSpPr>
+          <p:nvPr>
+            <p:ph type="sldImg"/>
+          </p:nvPr>
+        </p:nvSpPr>
+        <p:spPr/>
+      </p:sp>
+      <p:sp>
+        <p:nvSpPr>
+          <p:cNvPr id="3" name="Notes Placeholder 2"/>
+          <p:cNvSpPr>
+            <a:spLocks noGrp="1"/>
+          </p:cNvSpPr>
+          <p:nvPr>
+            <p:ph type="body" idx="1"/>
+          </p:nvPr>
+        </p:nvSpPr>
+        <p:spPr/>
+        <p:txBody>
+          <a:bodyPr/>
+          <a:lstStyle/>
+          <a:p>
+            <a:pPr marL="171450" lvl="0" indent="-171450">
+              <a:buFont typeface="Arial" panose="020B0604020202020204" pitchFamily="34" charset="0"/>
+              <a:buChar char="•"/>
+            </a:pPr>
+            <a:r>
+              <a:rPr lang="en-US" b="1" i="0" baseline="0" dirty="0" smtClean="0"/>
+              <a:t>Let’s do some exercises – go to the </a:t>
+            </a:r>
+            <a:r>
+              <a:rPr lang="en-US" b="1" i="0" baseline="0" dirty="0" err="1" smtClean="0"/>
+              <a:t>RStudio</a:t>
+            </a:r>
+            <a:r>
+              <a:rPr lang="en-US" b="1" i="0" baseline="0" dirty="0" smtClean="0"/>
+              <a:t> cloud project, and open up the </a:t>
+            </a:r>
+            <a:r>
+              <a:rPr lang="en-US" b="1" i="0" baseline="0" dirty="0" err="1" smtClean="0"/>
+              <a:t>subsetting.Rmd</a:t>
+            </a:r>
+            <a:r>
+              <a:rPr lang="en-US" b="1" i="0" baseline="0" dirty="0" smtClean="0"/>
+              <a:t> exercise</a:t>
+            </a:r>
+          </a:p>
+          <a:p>
+            <a:pPr marL="628650" lvl="1" indent="-171450">
+              <a:buFont typeface="Arial" panose="020B0604020202020204" pitchFamily="34" charset="0"/>
+              <a:buChar char="•"/>
+            </a:pPr>
+            <a:r>
+              <a:rPr lang="en-US" b="1" i="0" baseline="0" dirty="0" smtClean="0"/>
+              <a:t>Work through them</a:t>
+            </a:r>
+            <a:endParaRPr lang="en-US" b="1" baseline="0" dirty="0" smtClean="0"/>
+          </a:p>
+          <a:p>
+            <a:pPr marL="171450" indent="-171450">
+              <a:buFont typeface="Arial" panose="020B0604020202020204" pitchFamily="34" charset="0"/>
+              <a:buChar char="•"/>
+            </a:pPr>
+            <a:r>
+              <a:rPr lang="en-US" b="1" baseline="0" dirty="0" smtClean="0"/>
+              <a:t>So now you have learned how to:</a:t>
+            </a:r>
+          </a:p>
+          <a:p>
+            <a:pPr marL="628650" lvl="1" indent="-171450">
+              <a:buFont typeface="Arial" panose="020B0604020202020204" pitchFamily="34" charset="0"/>
+              <a:buChar char="•"/>
+            </a:pPr>
+            <a:r>
+              <a:rPr lang="en-US" b="1" baseline="0" dirty="0" smtClean="0"/>
+              <a:t>Get the </a:t>
+            </a:r>
+            <a:r>
+              <a:rPr lang="en-US" b="1" i="1" baseline="0" dirty="0" smtClean="0"/>
+              <a:t>rows</a:t>
+            </a:r>
+            <a:r>
+              <a:rPr lang="en-US" b="1" baseline="0" dirty="0" smtClean="0"/>
+              <a:t> you care about using filter()</a:t>
+            </a:r>
+          </a:p>
+          <a:p>
+            <a:pPr marL="628650" lvl="1" indent="-171450">
+              <a:buFont typeface="Arial" panose="020B0604020202020204" pitchFamily="34" charset="0"/>
+              <a:buChar char="•"/>
+            </a:pPr>
+            <a:r>
+              <a:rPr lang="en-US" b="1" baseline="0" dirty="0" smtClean="0"/>
+              <a:t>Get the </a:t>
+            </a:r>
+            <a:r>
+              <a:rPr lang="en-US" b="1" i="1" baseline="0" dirty="0" smtClean="0"/>
+              <a:t>columns</a:t>
+            </a:r>
+            <a:r>
+              <a:rPr lang="en-US" b="1" i="0" baseline="0" dirty="0" smtClean="0"/>
+              <a:t> you care about using select()</a:t>
+            </a:r>
+          </a:p>
+        </p:txBody>
+      </p:sp>
+      <p:sp>
+        <p:nvSpPr>
+          <p:cNvPr id="4" name="Slide Number Placeholder 3"/>
+          <p:cNvSpPr>
+            <a:spLocks noGrp="1"/>
+          </p:cNvSpPr>
+          <p:nvPr>
+            <p:ph type="sldNum" sz="quarter" idx="10"/>
+          </p:nvPr>
+        </p:nvSpPr>
+        <p:spPr/>
+        <p:txBody>
+          <a:bodyPr/>
+          <a:lstStyle/>
+          <a:p>
+            <a:fld id="{0CD4F51B-92DB-4235-BE1A-8989114F4168}" type="slidenum">
+              <a:rPr lang="en-US" smtClean="0"/>
+              <a:t>10</a:t>
+            </a:fld>
+            <a:endParaRPr lang="en-US"/>
+          </a:p>
+        </p:txBody>
+      </p:sp>
+    </p:spTree>
+    <p:extLst>
+      <p:ext uri="{BB962C8B-B14F-4D97-AF65-F5344CB8AC3E}">
+        <p14:creationId xmlns:p14="http://schemas.microsoft.com/office/powerpoint/2010/main" val="2615238242"/>
+      </p:ext>
+    </p:extLst>
+  </p:cSld>
+  <p:clrMapOvr>
+    <a:masterClrMapping/>
+  </p:clrMapOvr>
+</p:notes>
+</file>
+
+<file path=ppt/notesSlides/notesSlide2.xml><?xml version="1.0" encoding="utf-8"?>
+<p:notes xmlns:a="http://schemas.openxmlformats.org/drawingml/2006/main" xmlns:r="http://schemas.openxmlformats.org/officeDocument/2006/relationships" xmlns:p="http://schemas.openxmlformats.org/presentationml/2006/main">
+  <p:cSld>
+    <p:spTree>
+      <p:nvGrpSpPr>
+        <p:cNvPr id="1" name=""/>
+        <p:cNvGrpSpPr/>
+        <p:nvPr/>
+      </p:nvGrpSpPr>
+      <p:grpSpPr>
+        <a:xfrm>
+          <a:off x="0" y="0"/>
+          <a:ext cx="0" cy="0"/>
+          <a:chOff x="0" y="0"/>
+          <a:chExt cx="0" cy="0"/>
+        </a:xfrm>
+      </p:grpSpPr>
+      <p:sp>
+        <p:nvSpPr>
+          <p:cNvPr id="2" name="Slide Image Placeholder 1"/>
+          <p:cNvSpPr>
+            <a:spLocks noGrp="1" noRot="1" noChangeAspect="1"/>
+          </p:cNvSpPr>
+          <p:nvPr>
+            <p:ph type="sldImg"/>
+          </p:nvPr>
+        </p:nvSpPr>
+        <p:spPr/>
+      </p:sp>
+      <p:sp>
+        <p:nvSpPr>
+          <p:cNvPr id="3" name="Notes Placeholder 2"/>
+          <p:cNvSpPr>
+            <a:spLocks noGrp="1"/>
+          </p:cNvSpPr>
+          <p:nvPr>
+            <p:ph type="body" idx="1"/>
+          </p:nvPr>
+        </p:nvSpPr>
+        <p:spPr/>
+        <p:txBody>
+          <a:bodyPr/>
+          <a:lstStyle/>
+          <a:p>
             <a:pPr marL="171450" indent="-171450">
               <a:buFont typeface="Arial" panose="020B0604020202020204" pitchFamily="34" charset="0"/>
               <a:buChar char="•"/>
@@ -570,48 +838,12 @@
               <a:buChar char="•"/>
             </a:pPr>
             <a:r>
-              <a:rPr lang="en-US" i="0" baseline="0" dirty="0" smtClean="0"/>
-              <a:t>Lots of data you don’t need</a:t>
+              <a:rPr lang="en-US" dirty="0" smtClean="0"/>
+              <a:t>Just </a:t>
             </a:r>
-          </a:p>
-          <a:p>
-            <a:pPr marL="628650" lvl="1" indent="-171450">
-              <a:buFont typeface="Arial" panose="020B0604020202020204" pitchFamily="34" charset="0"/>
-              <a:buChar char="•"/>
-            </a:pPr>
             <a:r>
               <a:rPr lang="en-US" dirty="0" smtClean="0"/>
-              <a:t>Measurements your study isn’t interested in</a:t>
-            </a:r>
-          </a:p>
-          <a:p>
-            <a:pPr marL="628650" lvl="1" indent="-171450">
-              <a:buFont typeface="Arial" panose="020B0604020202020204" pitchFamily="34" charset="0"/>
-              <a:buChar char="•"/>
-            </a:pPr>
-            <a:r>
-              <a:rPr lang="en-US" dirty="0" smtClean="0"/>
-              <a:t>Historical values that are no longer relevant</a:t>
-            </a:r>
-          </a:p>
-          <a:p>
-            <a:pPr marL="628650" lvl="1" indent="-171450">
-              <a:buFont typeface="Arial" panose="020B0604020202020204" pitchFamily="34" charset="0"/>
-              <a:buChar char="•"/>
-            </a:pPr>
-            <a:r>
-              <a:rPr lang="en-US" dirty="0" smtClean="0"/>
-              <a:t>Individuals not included in your study</a:t>
-            </a:r>
-          </a:p>
-          <a:p>
-            <a:pPr marL="171450" lvl="0" indent="-171450">
-              <a:buFont typeface="Arial" panose="020B0604020202020204" pitchFamily="34" charset="0"/>
-              <a:buChar char="•"/>
-            </a:pPr>
-            <a:r>
-              <a:rPr lang="en-US" dirty="0" smtClean="0"/>
-              <a:t>Just a sample,</a:t>
+              <a:t>a sample,</a:t>
             </a:r>
             <a:r>
               <a:rPr lang="en-US" baseline="0" dirty="0" smtClean="0"/>
@@ -657,7 +889,7 @@
 </p:notes>
 </file>
 
-<file path=ppt/notesSlides/notesSlide2.xml><?xml version="1.0" encoding="utf-8"?>
+<file path=ppt/notesSlides/notesSlide3.xml><?xml version="1.0" encoding="utf-8"?>
 <p:notes xmlns:a="http://schemas.openxmlformats.org/drawingml/2006/main" xmlns:r="http://schemas.openxmlformats.org/officeDocument/2006/relationships" xmlns:p="http://schemas.openxmlformats.org/presentationml/2006/main">
   <p:cSld>
     <p:spTree>
@@ -755,11 +987,7 @@
             </a:r>
             <a:r>
               <a:rPr lang="en-US" b="1" baseline="0" dirty="0" smtClean="0"/>
-              <a:t>need to get to just the data you’re interested </a:t>
-            </a:r>
-            <a:r>
-              <a:rPr lang="en-US" b="1" baseline="0" dirty="0" smtClean="0"/>
-              <a:t>in.</a:t>
+              <a:t>need to get to just the data you’re interested in.</a:t>
             </a:r>
           </a:p>
           <a:p>
@@ -769,17 +997,8 @@
             </a:pPr>
             <a:r>
               <a:rPr lang="en-US" b="1" baseline="0" dirty="0" smtClean="0"/>
-              <a:t>You </a:t>
+              <a:t>You need to subset, based on the rows and columns of your data!</a:t>
             </a:r>
-            <a:r>
-              <a:rPr lang="en-US" b="1" baseline="0" dirty="0" smtClean="0"/>
-              <a:t>need to </a:t>
-            </a:r>
-            <a:r>
-              <a:rPr lang="en-US" b="1" baseline="0" dirty="0" smtClean="0"/>
-              <a:t>subset, based on the rows and columns of your data!</a:t>
-            </a:r>
-            <a:endParaRPr lang="en-US" b="1" baseline="0" dirty="0" smtClean="0"/>
           </a:p>
         </p:txBody>
       </p:sp>
@@ -819,7 +1038,7 @@
 </p:notes>
 </file>
 
-<file path=ppt/notesSlides/notesSlide3.xml><?xml version="1.0" encoding="utf-8"?>
+<file path=ppt/notesSlides/notesSlide4.xml><?xml version="1.0" encoding="utf-8"?>
 <p:notes xmlns:a="http://schemas.openxmlformats.org/drawingml/2006/main" xmlns:r="http://schemas.openxmlformats.org/officeDocument/2006/relationships" xmlns:p="http://schemas.openxmlformats.org/presentationml/2006/main">
   <p:cSld>
     <p:spTree>
@@ -958,7 +1177,7 @@
 </p:notes>
 </file>
 
-<file path=ppt/notesSlides/notesSlide4.xml><?xml version="1.0" encoding="utf-8"?>
+<file path=ppt/notesSlides/notesSlide5.xml><?xml version="1.0" encoding="utf-8"?>
 <p:notes xmlns:a="http://schemas.openxmlformats.org/drawingml/2006/main" xmlns:r="http://schemas.openxmlformats.org/officeDocument/2006/relationships" xmlns:p="http://schemas.openxmlformats.org/presentationml/2006/main">
   <p:cSld>
     <p:spTree>
@@ -1160,7 +1379,7 @@
 </p:notes>
 </file>
 
-<file path=ppt/notesSlides/notesSlide5.xml><?xml version="1.0" encoding="utf-8"?>
+<file path=ppt/notesSlides/notesSlide6.xml><?xml version="1.0" encoding="utf-8"?>
 <p:notes xmlns:a="http://schemas.openxmlformats.org/drawingml/2006/main" xmlns:r="http://schemas.openxmlformats.org/officeDocument/2006/relationships" xmlns:p="http://schemas.openxmlformats.org/presentationml/2006/main">
   <p:cSld>
     <p:spTree>
@@ -1396,7 +1615,7 @@
 </p:notes>
 </file>
 
-<file path=ppt/notesSlides/notesSlide6.xml><?xml version="1.0" encoding="utf-8"?>
+<file path=ppt/notesSlides/notesSlide7.xml><?xml version="1.0" encoding="utf-8"?>
 <p:notes xmlns:a="http://schemas.openxmlformats.org/drawingml/2006/main" xmlns:r="http://schemas.openxmlformats.org/officeDocument/2006/relationships" xmlns:p="http://schemas.openxmlformats.org/presentationml/2006/main">
   <p:cSld>
     <p:spTree>
@@ -1517,7 +1736,7 @@
 </p:notes>
 </file>
 
-<file path=ppt/notesSlides/notesSlide7.xml><?xml version="1.0" encoding="utf-8"?>
+<file path=ppt/notesSlides/notesSlide8.xml><?xml version="1.0" encoding="utf-8"?>
 <p:notes xmlns:a="http://schemas.openxmlformats.org/drawingml/2006/main" xmlns:r="http://schemas.openxmlformats.org/officeDocument/2006/relationships" xmlns:p="http://schemas.openxmlformats.org/presentationml/2006/main">
   <p:cSld>
     <p:spTree>
@@ -1710,7 +1929,7 @@
 </p:notes>
 </file>
 
-<file path=ppt/notesSlides/notesSlide8.xml><?xml version="1.0" encoding="utf-8"?>
+<file path=ppt/notesSlides/notesSlide9.xml><?xml version="1.0" encoding="utf-8"?>
 <p:notes xmlns:a="http://schemas.openxmlformats.org/drawingml/2006/main" xmlns:r="http://schemas.openxmlformats.org/officeDocument/2006/relationships" xmlns:p="http://schemas.openxmlformats.org/presentationml/2006/main">
   <p:cSld>
     <p:spTree>
@@ -1834,170 +2053,6 @@
     <p:extLst>
       <p:ext uri="{BB962C8B-B14F-4D97-AF65-F5344CB8AC3E}">
         <p14:creationId xmlns:p14="http://schemas.microsoft.com/office/powerpoint/2010/main" val="3205286388"/>
-      </p:ext>
-    </p:extLst>
-  </p:cSld>
-  <p:clrMapOvr>
-    <a:masterClrMapping/>
-  </p:clrMapOvr>
-</p:notes>
-</file>
-
-<file path=ppt/notesSlides/notesSlide9.xml><?xml version="1.0" encoding="utf-8"?>
-<p:notes xmlns:a="http://schemas.openxmlformats.org/drawingml/2006/main" xmlns:r="http://schemas.openxmlformats.org/officeDocument/2006/relationships" xmlns:p="http://schemas.openxmlformats.org/presentationml/2006/main">
-  <p:cSld>
-    <p:spTree>
-      <p:nvGrpSpPr>
-        <p:cNvPr id="1" name=""/>
-        <p:cNvGrpSpPr/>
-        <p:nvPr/>
-      </p:nvGrpSpPr>
-      <p:grpSpPr>
-        <a:xfrm>
-          <a:off x="0" y="0"/>
-          <a:ext cx="0" cy="0"/>
-          <a:chOff x="0" y="0"/>
-          <a:chExt cx="0" cy="0"/>
-        </a:xfrm>
-      </p:grpSpPr>
-      <p:sp>
-        <p:nvSpPr>
-          <p:cNvPr id="2" name="Slide Image Placeholder 1"/>
-          <p:cNvSpPr>
-            <a:spLocks noGrp="1" noRot="1" noChangeAspect="1"/>
-          </p:cNvSpPr>
-          <p:nvPr>
-            <p:ph type="sldImg"/>
-          </p:nvPr>
-        </p:nvSpPr>
-        <p:spPr/>
-      </p:sp>
-      <p:sp>
-        <p:nvSpPr>
-          <p:cNvPr id="3" name="Notes Placeholder 2"/>
-          <p:cNvSpPr>
-            <a:spLocks noGrp="1"/>
-          </p:cNvSpPr>
-          <p:nvPr>
-            <p:ph type="body" idx="1"/>
-          </p:nvPr>
-        </p:nvSpPr>
-        <p:spPr/>
-        <p:txBody>
-          <a:bodyPr/>
-          <a:lstStyle/>
-          <a:p>
-            <a:pPr marL="171450" lvl="0" indent="-171450">
-              <a:buFont typeface="Arial" panose="020B0604020202020204" pitchFamily="34" charset="0"/>
-              <a:buChar char="•"/>
-            </a:pPr>
-            <a:r>
-              <a:rPr lang="en-US" b="1" i="0" baseline="0" dirty="0" smtClean="0"/>
-              <a:t>Let’s do some exercises – go to the </a:t>
-            </a:r>
-            <a:r>
-              <a:rPr lang="en-US" b="1" i="0" baseline="0" dirty="0" err="1" smtClean="0"/>
-              <a:t>RStudio</a:t>
-            </a:r>
-            <a:r>
-              <a:rPr lang="en-US" b="1" i="0" baseline="0" dirty="0" smtClean="0"/>
-              <a:t> cloud project, and open up the </a:t>
-            </a:r>
-            <a:r>
-              <a:rPr lang="en-US" b="1" i="0" baseline="0" dirty="0" err="1" smtClean="0"/>
-              <a:t>subsetting.Rmd</a:t>
-            </a:r>
-            <a:r>
-              <a:rPr lang="en-US" b="1" i="0" baseline="0" dirty="0" smtClean="0"/>
-              <a:t> exercise</a:t>
-            </a:r>
-          </a:p>
-          <a:p>
-            <a:pPr marL="628650" lvl="1" indent="-171450">
-              <a:buFont typeface="Arial" panose="020B0604020202020204" pitchFamily="34" charset="0"/>
-              <a:buChar char="•"/>
-            </a:pPr>
-            <a:r>
-              <a:rPr lang="en-US" b="1" i="0" baseline="0" dirty="0" smtClean="0"/>
-              <a:t>Work through them</a:t>
-            </a:r>
-            <a:endParaRPr lang="en-US" b="1" baseline="0" dirty="0" smtClean="0"/>
-          </a:p>
-          <a:p>
-            <a:pPr marL="171450" indent="-171450">
-              <a:buFont typeface="Arial" panose="020B0604020202020204" pitchFamily="34" charset="0"/>
-              <a:buChar char="•"/>
-            </a:pPr>
-            <a:r>
-              <a:rPr lang="en-US" b="1" baseline="0" dirty="0" smtClean="0"/>
-              <a:t>So now you have learned how to:</a:t>
-            </a:r>
-          </a:p>
-          <a:p>
-            <a:pPr marL="628650" lvl="1" indent="-171450">
-              <a:buFont typeface="Arial" panose="020B0604020202020204" pitchFamily="34" charset="0"/>
-              <a:buChar char="•"/>
-            </a:pPr>
-            <a:r>
-              <a:rPr lang="en-US" b="1" baseline="0" dirty="0" smtClean="0"/>
-              <a:t>Get the </a:t>
-            </a:r>
-            <a:r>
-              <a:rPr lang="en-US" b="1" i="1" baseline="0" dirty="0" smtClean="0"/>
-              <a:t>rows</a:t>
-            </a:r>
-            <a:r>
-              <a:rPr lang="en-US" b="1" baseline="0" dirty="0" smtClean="0"/>
-              <a:t> you care about using filter()</a:t>
-            </a:r>
-          </a:p>
-          <a:p>
-            <a:pPr marL="628650" lvl="1" indent="-171450">
-              <a:buFont typeface="Arial" panose="020B0604020202020204" pitchFamily="34" charset="0"/>
-              <a:buChar char="•"/>
-            </a:pPr>
-            <a:r>
-              <a:rPr lang="en-US" b="1" baseline="0" dirty="0" smtClean="0"/>
-              <a:t>Get the </a:t>
-            </a:r>
-            <a:r>
-              <a:rPr lang="en-US" b="1" i="1" baseline="0" dirty="0" smtClean="0"/>
-              <a:t>columns</a:t>
-            </a:r>
-            <a:r>
-              <a:rPr lang="en-US" b="1" i="0" baseline="0" dirty="0" smtClean="0"/>
-              <a:t> you care about using select()</a:t>
-            </a:r>
-          </a:p>
-        </p:txBody>
-      </p:sp>
-      <p:sp>
-        <p:nvSpPr>
-          <p:cNvPr id="4" name="Slide Number Placeholder 3"/>
-          <p:cNvSpPr>
-            <a:spLocks noGrp="1"/>
-          </p:cNvSpPr>
-          <p:nvPr>
-            <p:ph type="sldNum" sz="quarter" idx="10"/>
-          </p:nvPr>
-        </p:nvSpPr>
-        <p:spPr/>
-        <p:txBody>
-          <a:bodyPr/>
-          <a:lstStyle/>
-          <a:p>
-            <a:fld id="{0CD4F51B-92DB-4235-BE1A-8989114F4168}" type="slidenum">
-              <a:rPr lang="en-US" smtClean="0"/>
-              <a:t>10</a:t>
-            </a:fld>
-            <a:endParaRPr lang="en-US"/>
-          </a:p>
-        </p:txBody>
-      </p:sp>
-    </p:spTree>
-    <p:extLst>
-      <p:ext uri="{BB962C8B-B14F-4D97-AF65-F5344CB8AC3E}">
-        <p14:creationId xmlns:p14="http://schemas.microsoft.com/office/powerpoint/2010/main" val="2615238242"/>
       </p:ext>
     </p:extLst>
   </p:cSld>
@@ -33512,18 +33567,11 @@
             </a:r>
             <a:r>
               <a:rPr lang="en-US" sz="2800" dirty="0" smtClean="0"/>
-              <a:t> is exactly 1</a:t>
-            </a:r>
-            <a:r>
-              <a:rPr lang="en-US" sz="2800" dirty="0" smtClean="0">
-                <a:latin typeface="Courier New" panose="02070309020205020404" pitchFamily="49" charset="0"/>
-                <a:cs typeface="Courier New" panose="02070309020205020404" pitchFamily="49" charset="0"/>
-              </a:rPr>
-              <a:t>. </a:t>
+              <a:t> is exactly 1. </a:t>
             </a:r>
             <a:r>
               <a:rPr lang="en-US" sz="2800" b="1" dirty="0" smtClean="0"/>
-              <a:t>Which line is correct? Why?</a:t>
+              <a:t>Put the following code snippets together to do this.</a:t>
             </a:r>
             <a:endParaRPr lang="en-US" sz="2800" b="1" dirty="0">
               <a:latin typeface="Courier New" panose="02070309020205020404" pitchFamily="49" charset="0"/>
@@ -33540,8 +33588,8 @@
         </p:nvSpPr>
         <p:spPr>
           <a:xfrm>
-            <a:off x="263408" y="3901299"/>
-            <a:ext cx="11710207" cy="2246769"/>
+            <a:off x="6716203" y="3762539"/>
+            <a:ext cx="2542592" cy="1384995"/>
           </a:xfrm>
           <a:prstGeom prst="rect">
             <a:avLst/>
@@ -33549,128 +33597,17 @@
           <a:noFill/>
         </p:spPr>
         <p:txBody>
-          <a:bodyPr wrap="square" rtlCol="0">
+          <a:bodyPr wrap="square" numCol="1" rtlCol="0">
             <a:spAutoFit/>
           </a:bodyPr>
           <a:lstStyle/>
           <a:p>
-            <a:pPr marL="457200" indent="-457200">
-              <a:buFont typeface="+mj-lt"/>
-              <a:buAutoNum type="arabicPeriod"/>
-            </a:pPr>
-            <a:r>
-              <a:rPr lang="en-US" sz="2800" dirty="0" err="1" smtClean="0">
-                <a:latin typeface="Courier New" panose="02070309020205020404" pitchFamily="49" charset="0"/>
-                <a:cs typeface="Courier New" panose="02070309020205020404" pitchFamily="49" charset="0"/>
-              </a:rPr>
-              <a:t>new_data</a:t>
-            </a:r>
             <a:r>
               <a:rPr lang="en-US" sz="2800" dirty="0" smtClean="0">
                 <a:latin typeface="Courier New" panose="02070309020205020404" pitchFamily="49" charset="0"/>
                 <a:cs typeface="Courier New" panose="02070309020205020404" pitchFamily="49" charset="0"/>
               </a:rPr>
-              <a:t> &lt;- filter(</a:t>
-            </a:r>
-            <a:r>
-              <a:rPr lang="en-US" sz="2800" dirty="0" err="1" smtClean="0">
-                <a:latin typeface="Courier New" panose="02070309020205020404" pitchFamily="49" charset="0"/>
-                <a:cs typeface="Courier New" panose="02070309020205020404" pitchFamily="49" charset="0"/>
-              </a:rPr>
-              <a:t>colD</a:t>
-            </a:r>
-            <a:r>
-              <a:rPr lang="en-US" sz="2800" dirty="0" smtClean="0">
-                <a:latin typeface="Courier New" panose="02070309020205020404" pitchFamily="49" charset="0"/>
-                <a:cs typeface="Courier New" panose="02070309020205020404" pitchFamily="49" charset="0"/>
-              </a:rPr>
-              <a:t> &lt; 65, </a:t>
-            </a:r>
-            <a:r>
-              <a:rPr lang="en-US" sz="2800" dirty="0" err="1" smtClean="0">
-                <a:latin typeface="Courier New" panose="02070309020205020404" pitchFamily="49" charset="0"/>
-                <a:cs typeface="Courier New" panose="02070309020205020404" pitchFamily="49" charset="0"/>
-              </a:rPr>
-              <a:t>colE</a:t>
-            </a:r>
-            <a:r>
-              <a:rPr lang="en-US" sz="2800" dirty="0" smtClean="0">
-                <a:latin typeface="Courier New" panose="02070309020205020404" pitchFamily="49" charset="0"/>
-                <a:cs typeface="Courier New" panose="02070309020205020404" pitchFamily="49" charset="0"/>
-              </a:rPr>
-              <a:t> == 1, </a:t>
-            </a:r>
-            <a:r>
-              <a:rPr lang="en-US" sz="2800" dirty="0" err="1" smtClean="0">
-                <a:latin typeface="Courier New" panose="02070309020205020404" pitchFamily="49" charset="0"/>
-                <a:cs typeface="Courier New" panose="02070309020205020404" pitchFamily="49" charset="0"/>
-              </a:rPr>
-              <a:t>some_data</a:t>
-            </a:r>
-            <a:r>
-              <a:rPr lang="en-US" sz="2800" dirty="0" smtClean="0">
-                <a:latin typeface="Courier New" panose="02070309020205020404" pitchFamily="49" charset="0"/>
-                <a:cs typeface="Courier New" panose="02070309020205020404" pitchFamily="49" charset="0"/>
-              </a:rPr>
-              <a:t>)</a:t>
-            </a:r>
-            <a:br>
-              <a:rPr lang="en-US" sz="2800" dirty="0" smtClean="0">
-                <a:latin typeface="Courier New" panose="02070309020205020404" pitchFamily="49" charset="0"/>
-                <a:cs typeface="Courier New" panose="02070309020205020404" pitchFamily="49" charset="0"/>
-              </a:rPr>
-            </a:br>
-            <a:endParaRPr lang="en-US" sz="2800" dirty="0" smtClean="0">
-              <a:latin typeface="Courier New" panose="02070309020205020404" pitchFamily="49" charset="0"/>
-              <a:cs typeface="Courier New" panose="02070309020205020404" pitchFamily="49" charset="0"/>
-            </a:endParaRPr>
-          </a:p>
-          <a:p>
-            <a:pPr marL="457200" indent="-457200">
-              <a:buFont typeface="+mj-lt"/>
-              <a:buAutoNum type="arabicPeriod"/>
-            </a:pPr>
-            <a:r>
-              <a:rPr lang="en-US" sz="2800" dirty="0" err="1" smtClean="0">
-                <a:latin typeface="Courier New" panose="02070309020205020404" pitchFamily="49" charset="0"/>
-                <a:cs typeface="Courier New" panose="02070309020205020404" pitchFamily="49" charset="0"/>
-              </a:rPr>
-              <a:t>new_data</a:t>
-            </a:r>
-            <a:r>
-              <a:rPr lang="en-US" sz="2800" dirty="0" smtClean="0">
-                <a:latin typeface="Courier New" panose="02070309020205020404" pitchFamily="49" charset="0"/>
-                <a:cs typeface="Courier New" panose="02070309020205020404" pitchFamily="49" charset="0"/>
-              </a:rPr>
-              <a:t> &lt;- select(</a:t>
-            </a:r>
-            <a:r>
-              <a:rPr lang="en-US" sz="2800" dirty="0" err="1" smtClean="0">
-                <a:latin typeface="Courier New" panose="02070309020205020404" pitchFamily="49" charset="0"/>
-                <a:cs typeface="Courier New" panose="02070309020205020404" pitchFamily="49" charset="0"/>
-              </a:rPr>
-              <a:t>some_data</a:t>
-            </a:r>
-            <a:r>
-              <a:rPr lang="en-US" sz="2800" dirty="0" smtClean="0">
-                <a:latin typeface="Courier New" panose="02070309020205020404" pitchFamily="49" charset="0"/>
-                <a:cs typeface="Courier New" panose="02070309020205020404" pitchFamily="49" charset="0"/>
-              </a:rPr>
-              <a:t>, </a:t>
-            </a:r>
-            <a:r>
-              <a:rPr lang="en-US" sz="2800" dirty="0" err="1" smtClean="0">
-                <a:latin typeface="Courier New" panose="02070309020205020404" pitchFamily="49" charset="0"/>
-                <a:cs typeface="Courier New" panose="02070309020205020404" pitchFamily="49" charset="0"/>
-              </a:rPr>
-              <a:t>colD</a:t>
-            </a:r>
-            <a:r>
-              <a:rPr lang="en-US" sz="2800" dirty="0" smtClean="0">
-                <a:latin typeface="Courier New" panose="02070309020205020404" pitchFamily="49" charset="0"/>
-                <a:cs typeface="Courier New" panose="02070309020205020404" pitchFamily="49" charset="0"/>
-              </a:rPr>
-              <a:t> &gt; 65, </a:t>
+              <a:t>,</a:t>
             </a:r>
             <a:r>
               <a:rPr lang="en-US" sz="2800" dirty="0" err="1" smtClean="0">
@@ -33686,22 +33623,14 @@
               </a:rPr>
               <a:t> == 1)</a:t>
             </a:r>
-            <a:br>
-              <a:rPr lang="en-US" sz="2800" dirty="0" smtClean="0">
-                <a:latin typeface="Courier New" panose="02070309020205020404" pitchFamily="49" charset="0"/>
-                <a:cs typeface="Courier New" panose="02070309020205020404" pitchFamily="49" charset="0"/>
-              </a:rPr>
-            </a:br>
+          </a:p>
+          <a:p>
             <a:endParaRPr lang="en-US" sz="2800" dirty="0" smtClean="0">
               <a:latin typeface="Courier New" panose="02070309020205020404" pitchFamily="49" charset="0"/>
               <a:cs typeface="Courier New" panose="02070309020205020404" pitchFamily="49" charset="0"/>
             </a:endParaRPr>
           </a:p>
           <a:p>
-            <a:pPr marL="457200" indent="-457200">
-              <a:buFont typeface="+mj-lt"/>
-              <a:buAutoNum type="arabicPeriod"/>
-            </a:pPr>
             <a:r>
               <a:rPr lang="en-US" sz="2800" dirty="0" err="1" smtClean="0">
                 <a:latin typeface="Courier New" panose="02070309020205020404" pitchFamily="49" charset="0"/>
@@ -33714,73 +33643,8 @@
                 <a:latin typeface="Courier New" panose="02070309020205020404" pitchFamily="49" charset="0"/>
                 <a:cs typeface="Courier New" panose="02070309020205020404" pitchFamily="49" charset="0"/>
               </a:rPr>
-              <a:t> &lt;- filter(</a:t>
+              <a:t> &lt;-</a:t>
             </a:r>
-            <a:r>
-              <a:rPr lang="en-US" sz="2800" dirty="0" err="1" smtClean="0">
-                <a:latin typeface="Courier New" panose="02070309020205020404" pitchFamily="49" charset="0"/>
-                <a:cs typeface="Courier New" panose="02070309020205020404" pitchFamily="49" charset="0"/>
-              </a:rPr>
-              <a:t>some_data</a:t>
-            </a:r>
-            <a:r>
-              <a:rPr lang="en-US" sz="2800" dirty="0" smtClean="0">
-                <a:latin typeface="Courier New" panose="02070309020205020404" pitchFamily="49" charset="0"/>
-                <a:cs typeface="Courier New" panose="02070309020205020404" pitchFamily="49" charset="0"/>
-              </a:rPr>
-              <a:t>, </a:t>
-            </a:r>
-            <a:r>
-              <a:rPr lang="en-US" sz="2800" dirty="0" err="1" smtClean="0">
-                <a:latin typeface="Courier New" panose="02070309020205020404" pitchFamily="49" charset="0"/>
-                <a:cs typeface="Courier New" panose="02070309020205020404" pitchFamily="49" charset="0"/>
-              </a:rPr>
-              <a:t>colD</a:t>
-            </a:r>
-            <a:r>
-              <a:rPr lang="en-US" sz="2800" dirty="0" smtClean="0">
-                <a:latin typeface="Courier New" panose="02070309020205020404" pitchFamily="49" charset="0"/>
-                <a:cs typeface="Courier New" panose="02070309020205020404" pitchFamily="49" charset="0"/>
-              </a:rPr>
-              <a:t> &gt; 65, </a:t>
-            </a:r>
-            <a:r>
-              <a:rPr lang="en-US" sz="2800" dirty="0" err="1" smtClean="0">
-                <a:latin typeface="Courier New" panose="02070309020205020404" pitchFamily="49" charset="0"/>
-                <a:cs typeface="Courier New" panose="02070309020205020404" pitchFamily="49" charset="0"/>
-              </a:rPr>
-              <a:t>colE</a:t>
-            </a:r>
-            <a:r>
-              <a:rPr lang="en-US" sz="2800" dirty="0" smtClean="0">
-                <a:latin typeface="Courier New" panose="02070309020205020404" pitchFamily="49" charset="0"/>
-                <a:cs typeface="Courier New" panose="02070309020205020404" pitchFamily="49" charset="0"/>
-              </a:rPr>
-              <a:t> == 1)</a:t>
-            </a:r>
-            <a:endParaRPr lang="en-US" sz="2800" dirty="0">
-              <a:latin typeface="Courier New" panose="02070309020205020404" pitchFamily="49" charset="0"/>
-              <a:cs typeface="Courier New" panose="02070309020205020404" pitchFamily="49" charset="0"/>
-            </a:endParaRPr>
-          </a:p>
-        </p:txBody>
-      </p:sp>
-      <p:sp>
-        <p:nvSpPr>
-          <p:cNvPr id="3" name="Content Placeholder 2"/>
-          <p:cNvSpPr>
-            <a:spLocks noGrp="1"/>
-          </p:cNvSpPr>
-          <p:nvPr>
-            <p:ph idx="1"/>
-          </p:nvPr>
-        </p:nvSpPr>
-        <p:spPr/>
-        <p:txBody>
-          <a:bodyPr/>
-          <a:lstStyle/>
-          <a:p>
-            <a:endParaRPr lang="en-US"/>
           </a:p>
         </p:txBody>
       </p:sp>
@@ -33844,6 +33708,165 @@
           </a:prstGeom>
         </p:spPr>
       </p:pic>
+      <p:sp>
+        <p:nvSpPr>
+          <p:cNvPr id="4" name="Rectangle 3"/>
+          <p:cNvSpPr/>
+          <p:nvPr/>
+        </p:nvSpPr>
+        <p:spPr>
+          <a:xfrm>
+            <a:off x="571584" y="5625100"/>
+            <a:ext cx="11093854" cy="523220"/>
+          </a:xfrm>
+          <a:prstGeom prst="rect">
+            <a:avLst/>
+          </a:prstGeom>
+        </p:spPr>
+        <p:txBody>
+          <a:bodyPr wrap="square">
+            <a:spAutoFit/>
+          </a:bodyPr>
+          <a:lstStyle/>
+          <a:p>
+            <a:r>
+              <a:rPr lang="en-US" sz="2800" dirty="0" err="1">
+                <a:latin typeface="Courier New" panose="02070309020205020404" pitchFamily="49" charset="0"/>
+                <a:cs typeface="Courier New" panose="02070309020205020404" pitchFamily="49" charset="0"/>
+              </a:rPr>
+              <a:t>new_data</a:t>
+            </a:r>
+            <a:r>
+              <a:rPr lang="en-US" sz="2800" dirty="0">
+                <a:latin typeface="Courier New" panose="02070309020205020404" pitchFamily="49" charset="0"/>
+                <a:cs typeface="Courier New" panose="02070309020205020404" pitchFamily="49" charset="0"/>
+              </a:rPr>
+              <a:t> &lt;- filter(</a:t>
+            </a:r>
+            <a:r>
+              <a:rPr lang="en-US" sz="2800" dirty="0" err="1">
+                <a:latin typeface="Courier New" panose="02070309020205020404" pitchFamily="49" charset="0"/>
+                <a:cs typeface="Courier New" panose="02070309020205020404" pitchFamily="49" charset="0"/>
+              </a:rPr>
+              <a:t>some_data</a:t>
+            </a:r>
+            <a:r>
+              <a:rPr lang="en-US" sz="2800" dirty="0">
+                <a:latin typeface="Courier New" panose="02070309020205020404" pitchFamily="49" charset="0"/>
+                <a:cs typeface="Courier New" panose="02070309020205020404" pitchFamily="49" charset="0"/>
+              </a:rPr>
+              <a:t>, </a:t>
+            </a:r>
+            <a:r>
+              <a:rPr lang="en-US" sz="2800" dirty="0" err="1">
+                <a:latin typeface="Courier New" panose="02070309020205020404" pitchFamily="49" charset="0"/>
+                <a:cs typeface="Courier New" panose="02070309020205020404" pitchFamily="49" charset="0"/>
+              </a:rPr>
+              <a:t>colD</a:t>
+            </a:r>
+            <a:r>
+              <a:rPr lang="en-US" sz="2800" dirty="0">
+                <a:latin typeface="Courier New" panose="02070309020205020404" pitchFamily="49" charset="0"/>
+                <a:cs typeface="Courier New" panose="02070309020205020404" pitchFamily="49" charset="0"/>
+              </a:rPr>
+              <a:t> &gt; 65, </a:t>
+            </a:r>
+            <a:r>
+              <a:rPr lang="en-US" sz="2800" dirty="0" err="1">
+                <a:latin typeface="Courier New" panose="02070309020205020404" pitchFamily="49" charset="0"/>
+                <a:cs typeface="Courier New" panose="02070309020205020404" pitchFamily="49" charset="0"/>
+              </a:rPr>
+              <a:t>colE</a:t>
+            </a:r>
+            <a:r>
+              <a:rPr lang="en-US" sz="2800" dirty="0">
+                <a:latin typeface="Courier New" panose="02070309020205020404" pitchFamily="49" charset="0"/>
+                <a:cs typeface="Courier New" panose="02070309020205020404" pitchFamily="49" charset="0"/>
+              </a:rPr>
+              <a:t> == 1)</a:t>
+            </a:r>
+          </a:p>
+        </p:txBody>
+      </p:sp>
+      <p:sp>
+        <p:nvSpPr>
+          <p:cNvPr id="11" name="TextBox 10"/>
+          <p:cNvSpPr txBox="1"/>
+          <p:nvPr/>
+        </p:nvSpPr>
+        <p:spPr>
+          <a:xfrm>
+            <a:off x="1511559" y="3901299"/>
+            <a:ext cx="3705808" cy="1384995"/>
+          </a:xfrm>
+          <a:prstGeom prst="rect">
+            <a:avLst/>
+          </a:prstGeom>
+          <a:noFill/>
+        </p:spPr>
+        <p:txBody>
+          <a:bodyPr wrap="square" numCol="1" rtlCol="0">
+            <a:spAutoFit/>
+          </a:bodyPr>
+          <a:lstStyle/>
+          <a:p>
+            <a:r>
+              <a:rPr lang="en-US" sz="2800" dirty="0" smtClean="0">
+                <a:latin typeface="Courier New" panose="02070309020205020404" pitchFamily="49" charset="0"/>
+                <a:cs typeface="Courier New" panose="02070309020205020404" pitchFamily="49" charset="0"/>
+              </a:rPr>
+              <a:t>,</a:t>
+            </a:r>
+            <a:r>
+              <a:rPr lang="en-US" sz="2800" dirty="0" err="1" smtClean="0">
+                <a:latin typeface="Courier New" panose="02070309020205020404" pitchFamily="49" charset="0"/>
+                <a:cs typeface="Courier New" panose="02070309020205020404" pitchFamily="49" charset="0"/>
+              </a:rPr>
+              <a:t>colD</a:t>
+            </a:r>
+            <a:r>
+              <a:rPr lang="en-US" sz="2800" dirty="0" smtClean="0">
+                <a:latin typeface="Courier New" panose="02070309020205020404" pitchFamily="49" charset="0"/>
+                <a:cs typeface="Courier New" panose="02070309020205020404" pitchFamily="49" charset="0"/>
+              </a:rPr>
+              <a:t> &gt; 65</a:t>
+            </a:r>
+          </a:p>
+          <a:p>
+            <a:endParaRPr lang="en-US" sz="2800" dirty="0" smtClean="0">
+              <a:latin typeface="Courier New" panose="02070309020205020404" pitchFamily="49" charset="0"/>
+              <a:cs typeface="Courier New" panose="02070309020205020404" pitchFamily="49" charset="0"/>
+            </a:endParaRPr>
+          </a:p>
+          <a:p>
+            <a:r>
+              <a:rPr lang="en-US" sz="2800" dirty="0">
+                <a:latin typeface="Courier New" panose="02070309020205020404" pitchFamily="49" charset="0"/>
+                <a:cs typeface="Courier New" panose="02070309020205020404" pitchFamily="49" charset="0"/>
+              </a:rPr>
+              <a:t>f</a:t>
+            </a:r>
+            <a:r>
+              <a:rPr lang="en-US" sz="2800" dirty="0" smtClean="0">
+                <a:latin typeface="Courier New" panose="02070309020205020404" pitchFamily="49" charset="0"/>
+                <a:cs typeface="Courier New" panose="02070309020205020404" pitchFamily="49" charset="0"/>
+              </a:rPr>
+              <a:t>ilter(</a:t>
+            </a:r>
+            <a:r>
+              <a:rPr lang="en-US" sz="2800" dirty="0" err="1" smtClean="0">
+                <a:latin typeface="Courier New" panose="02070309020205020404" pitchFamily="49" charset="0"/>
+                <a:cs typeface="Courier New" panose="02070309020205020404" pitchFamily="49" charset="0"/>
+              </a:rPr>
+              <a:t>some_data</a:t>
+            </a:r>
+            <a:endParaRPr lang="en-US" sz="2800" dirty="0" smtClean="0">
+              <a:latin typeface="Courier New" panose="02070309020205020404" pitchFamily="49" charset="0"/>
+              <a:cs typeface="Courier New" panose="02070309020205020404" pitchFamily="49" charset="0"/>
+            </a:endParaRPr>
+          </a:p>
+        </p:txBody>
+      </p:sp>
     </p:spTree>
     <p:extLst>
       <p:ext uri="{BB962C8B-B14F-4D97-AF65-F5344CB8AC3E}">
@@ -33857,9 +33880,80 @@
   <p:timing>
     <p:tnLst>
       <p:par>
-        <p:cTn id="1" dur="indefinite" restart="never" nodeType="tmRoot"/>
+        <p:cTn id="1" dur="indefinite" restart="never" nodeType="tmRoot">
+          <p:childTnLst>
+            <p:seq concurrent="1" nextAc="seek">
+              <p:cTn id="2" dur="indefinite" nodeType="mainSeq">
+                <p:childTnLst>
+                  <p:par>
+                    <p:cTn id="3" fill="hold">
+                      <p:stCondLst>
+                        <p:cond delay="indefinite"/>
+                      </p:stCondLst>
+                      <p:childTnLst>
+                        <p:par>
+                          <p:cTn id="4" fill="hold">
+                            <p:stCondLst>
+                              <p:cond delay="0"/>
+                            </p:stCondLst>
+                            <p:childTnLst>
+                              <p:par>
+                                <p:cTn id="5" presetID="1" presetClass="entr" presetSubtype="0" fill="hold" grpId="0" nodeType="clickEffect">
+                                  <p:stCondLst>
+                                    <p:cond delay="0"/>
+                                  </p:stCondLst>
+                                  <p:childTnLst>
+                                    <p:set>
+                                      <p:cBhvr>
+                                        <p:cTn id="6" dur="1" fill="hold">
+                                          <p:stCondLst>
+                                            <p:cond delay="0"/>
+                                          </p:stCondLst>
+                                        </p:cTn>
+                                        <p:tgtEl>
+                                          <p:spTgt spid="4"/>
+                                        </p:tgtEl>
+                                        <p:attrNameLst>
+                                          <p:attrName>style.visibility</p:attrName>
+                                        </p:attrNameLst>
+                                      </p:cBhvr>
+                                      <p:to>
+                                        <p:strVal val="visible"/>
+                                      </p:to>
+                                    </p:set>
+                                  </p:childTnLst>
+                                </p:cTn>
+                              </p:par>
+                            </p:childTnLst>
+                          </p:cTn>
+                        </p:par>
+                      </p:childTnLst>
+                    </p:cTn>
+                  </p:par>
+                </p:childTnLst>
+              </p:cTn>
+              <p:prevCondLst>
+                <p:cond evt="onPrev" delay="0">
+                  <p:tgtEl>
+                    <p:sldTgt/>
+                  </p:tgtEl>
+                </p:cond>
+              </p:prevCondLst>
+              <p:nextCondLst>
+                <p:cond evt="onNext" delay="0">
+                  <p:tgtEl>
+                    <p:sldTgt/>
+                  </p:tgtEl>
+                </p:cond>
+              </p:nextCondLst>
+            </p:seq>
+          </p:childTnLst>
+        </p:cTn>
       </p:par>
     </p:tnLst>
+    <p:bldLst>
+      <p:bldP spid="4" grpId="0"/>
+    </p:bldLst>
   </p:timing>
 </p:sld>
 </file>

</xml_diff>

<commit_message>
Final update to slides, and add mental map for missing-ness
</commit_message>
<xml_diff>
--- a/data-subsetting.pptx
+++ b/data-subsetting.pptx
@@ -5,7 +5,7 @@
     <p:sldMasterId id="2147483660" r:id="rId1"/>
   </p:sldMasterIdLst>
   <p:notesMasterIdLst>
-    <p:notesMasterId r:id="rId14"/>
+    <p:notesMasterId r:id="rId13"/>
   </p:notesMasterIdLst>
   <p:sldIdLst>
     <p:sldId id="256" r:id="rId2"/>
@@ -16,10 +16,9 @@
     <p:sldId id="260" r:id="rId7"/>
     <p:sldId id="261" r:id="rId8"/>
     <p:sldId id="262" r:id="rId9"/>
-    <p:sldId id="263" r:id="rId10"/>
-    <p:sldId id="265" r:id="rId11"/>
-    <p:sldId id="267" r:id="rId12"/>
-    <p:sldId id="266" r:id="rId13"/>
+    <p:sldId id="265" r:id="rId10"/>
+    <p:sldId id="267" r:id="rId11"/>
+    <p:sldId id="266" r:id="rId12"/>
   </p:sldIdLst>
   <p:sldSz cx="12192000" cy="6858000"/>
   <p:notesSz cx="6858000" cy="9144000"/>
@@ -211,7 +210,7 @@
           <a:p>
             <a:fld id="{8BBA90DE-0CBD-471C-9481-850953A91599}" type="datetimeFigureOut">
               <a:rPr lang="en-US" smtClean="0"/>
-              <a:t>2020-03-31</a:t>
+              <a:t>2020-04-02</a:t>
             </a:fld>
             <a:endParaRPr lang="en-US"/>
           </a:p>
@@ -583,170 +582,6 @@
 </p:notes>
 </file>
 
-<file path=ppt/notesSlides/notesSlide10.xml><?xml version="1.0" encoding="utf-8"?>
-<p:notes xmlns:a="http://schemas.openxmlformats.org/drawingml/2006/main" xmlns:r="http://schemas.openxmlformats.org/officeDocument/2006/relationships" xmlns:p="http://schemas.openxmlformats.org/presentationml/2006/main">
-  <p:cSld>
-    <p:spTree>
-      <p:nvGrpSpPr>
-        <p:cNvPr id="1" name=""/>
-        <p:cNvGrpSpPr/>
-        <p:nvPr/>
-      </p:nvGrpSpPr>
-      <p:grpSpPr>
-        <a:xfrm>
-          <a:off x="0" y="0"/>
-          <a:ext cx="0" cy="0"/>
-          <a:chOff x="0" y="0"/>
-          <a:chExt cx="0" cy="0"/>
-        </a:xfrm>
-      </p:grpSpPr>
-      <p:sp>
-        <p:nvSpPr>
-          <p:cNvPr id="2" name="Slide Image Placeholder 1"/>
-          <p:cNvSpPr>
-            <a:spLocks noGrp="1" noRot="1" noChangeAspect="1"/>
-          </p:cNvSpPr>
-          <p:nvPr>
-            <p:ph type="sldImg"/>
-          </p:nvPr>
-        </p:nvSpPr>
-        <p:spPr/>
-      </p:sp>
-      <p:sp>
-        <p:nvSpPr>
-          <p:cNvPr id="3" name="Notes Placeholder 2"/>
-          <p:cNvSpPr>
-            <a:spLocks noGrp="1"/>
-          </p:cNvSpPr>
-          <p:nvPr>
-            <p:ph type="body" idx="1"/>
-          </p:nvPr>
-        </p:nvSpPr>
-        <p:spPr/>
-        <p:txBody>
-          <a:bodyPr/>
-          <a:lstStyle/>
-          <a:p>
-            <a:pPr marL="171450" lvl="0" indent="-171450">
-              <a:buFont typeface="Arial" panose="020B0604020202020204" pitchFamily="34" charset="0"/>
-              <a:buChar char="•"/>
-            </a:pPr>
-            <a:r>
-              <a:rPr lang="en-US" b="1" i="0" baseline="0" dirty="0" smtClean="0"/>
-              <a:t>Let’s do some exercises – go to the </a:t>
-            </a:r>
-            <a:r>
-              <a:rPr lang="en-US" b="1" i="0" baseline="0" dirty="0" err="1" smtClean="0"/>
-              <a:t>RStudio</a:t>
-            </a:r>
-            <a:r>
-              <a:rPr lang="en-US" b="1" i="0" baseline="0" dirty="0" smtClean="0"/>
-              <a:t> cloud project, and open up the </a:t>
-            </a:r>
-            <a:r>
-              <a:rPr lang="en-US" b="1" i="0" baseline="0" dirty="0" err="1" smtClean="0"/>
-              <a:t>subsetting.Rmd</a:t>
-            </a:r>
-            <a:r>
-              <a:rPr lang="en-US" b="1" i="0" baseline="0" dirty="0" smtClean="0"/>
-              <a:t> exercise</a:t>
-            </a:r>
-          </a:p>
-          <a:p>
-            <a:pPr marL="628650" lvl="1" indent="-171450">
-              <a:buFont typeface="Arial" panose="020B0604020202020204" pitchFamily="34" charset="0"/>
-              <a:buChar char="•"/>
-            </a:pPr>
-            <a:r>
-              <a:rPr lang="en-US" b="1" i="0" baseline="0" dirty="0" smtClean="0"/>
-              <a:t>Work through them</a:t>
-            </a:r>
-            <a:endParaRPr lang="en-US" b="1" baseline="0" dirty="0" smtClean="0"/>
-          </a:p>
-          <a:p>
-            <a:pPr marL="171450" indent="-171450">
-              <a:buFont typeface="Arial" panose="020B0604020202020204" pitchFamily="34" charset="0"/>
-              <a:buChar char="•"/>
-            </a:pPr>
-            <a:r>
-              <a:rPr lang="en-US" b="1" baseline="0" dirty="0" smtClean="0"/>
-              <a:t>So now you have learned how to:</a:t>
-            </a:r>
-          </a:p>
-          <a:p>
-            <a:pPr marL="628650" lvl="1" indent="-171450">
-              <a:buFont typeface="Arial" panose="020B0604020202020204" pitchFamily="34" charset="0"/>
-              <a:buChar char="•"/>
-            </a:pPr>
-            <a:r>
-              <a:rPr lang="en-US" b="1" baseline="0" dirty="0" smtClean="0"/>
-              <a:t>Get the </a:t>
-            </a:r>
-            <a:r>
-              <a:rPr lang="en-US" b="1" i="1" baseline="0" dirty="0" smtClean="0"/>
-              <a:t>rows</a:t>
-            </a:r>
-            <a:r>
-              <a:rPr lang="en-US" b="1" baseline="0" dirty="0" smtClean="0"/>
-              <a:t> you care about using filter()</a:t>
-            </a:r>
-          </a:p>
-          <a:p>
-            <a:pPr marL="628650" lvl="1" indent="-171450">
-              <a:buFont typeface="Arial" panose="020B0604020202020204" pitchFamily="34" charset="0"/>
-              <a:buChar char="•"/>
-            </a:pPr>
-            <a:r>
-              <a:rPr lang="en-US" b="1" baseline="0" dirty="0" smtClean="0"/>
-              <a:t>Get the </a:t>
-            </a:r>
-            <a:r>
-              <a:rPr lang="en-US" b="1" i="1" baseline="0" dirty="0" smtClean="0"/>
-              <a:t>columns</a:t>
-            </a:r>
-            <a:r>
-              <a:rPr lang="en-US" b="1" i="0" baseline="0" dirty="0" smtClean="0"/>
-              <a:t> you care about using select()</a:t>
-            </a:r>
-          </a:p>
-        </p:txBody>
-      </p:sp>
-      <p:sp>
-        <p:nvSpPr>
-          <p:cNvPr id="4" name="Slide Number Placeholder 3"/>
-          <p:cNvSpPr>
-            <a:spLocks noGrp="1"/>
-          </p:cNvSpPr>
-          <p:nvPr>
-            <p:ph type="sldNum" sz="quarter" idx="10"/>
-          </p:nvPr>
-        </p:nvSpPr>
-        <p:spPr/>
-        <p:txBody>
-          <a:bodyPr/>
-          <a:lstStyle/>
-          <a:p>
-            <a:fld id="{0CD4F51B-92DB-4235-BE1A-8989114F4168}" type="slidenum">
-              <a:rPr lang="en-US" smtClean="0"/>
-              <a:t>10</a:t>
-            </a:fld>
-            <a:endParaRPr lang="en-US"/>
-          </a:p>
-        </p:txBody>
-      </p:sp>
-    </p:spTree>
-    <p:extLst>
-      <p:ext uri="{BB962C8B-B14F-4D97-AF65-F5344CB8AC3E}">
-        <p14:creationId xmlns:p14="http://schemas.microsoft.com/office/powerpoint/2010/main" val="2615238242"/>
-      </p:ext>
-    </p:extLst>
-  </p:cSld>
-  <p:clrMapOvr>
-    <a:masterClrMapping/>
-  </p:clrMapOvr>
-</p:notes>
-</file>
-
 <file path=ppt/notesSlides/notesSlide2.xml><?xml version="1.0" encoding="utf-8"?>
 <p:notes xmlns:a="http://schemas.openxmlformats.org/drawingml/2006/main" xmlns:r="http://schemas.openxmlformats.org/officeDocument/2006/relationships" xmlns:p="http://schemas.openxmlformats.org/presentationml/2006/main">
   <p:cSld>
@@ -839,11 +674,7 @@
             </a:pPr>
             <a:r>
               <a:rPr lang="en-US" dirty="0" smtClean="0"/>
-              <a:t>Just </a:t>
-            </a:r>
-            <a:r>
-              <a:rPr lang="en-US" dirty="0" smtClean="0"/>
-              <a:t>a sample,</a:t>
+              <a:t>Just a sample,</a:t>
             </a:r>
             <a:r>
               <a:rPr lang="en-US" baseline="0" dirty="0" smtClean="0"/>
@@ -1973,13 +1804,57 @@
           <a:bodyPr/>
           <a:lstStyle/>
           <a:p>
-            <a:pPr marL="171450" lvl="0" indent="-171450">
+            <a:pPr marL="171450" indent="-171450">
               <a:buFont typeface="Arial" panose="020B0604020202020204" pitchFamily="34" charset="0"/>
               <a:buChar char="•"/>
             </a:pPr>
             <a:r>
-              <a:rPr lang="en-US" b="0" i="0" baseline="0" dirty="0" smtClean="0"/>
-              <a:t>Let’s do some exercises to try and cement that in your brain. First off let’s do this quiz.</a:t>
+              <a:rPr lang="en-US" b="1" baseline="0" dirty="0" smtClean="0"/>
+              <a:t>So </a:t>
+            </a:r>
+            <a:r>
+              <a:rPr lang="en-US" b="1" baseline="0" dirty="0" smtClean="0"/>
+              <a:t>now you have learned how to:</a:t>
+            </a:r>
+          </a:p>
+          <a:p>
+            <a:pPr marL="628650" lvl="1" indent="-171450">
+              <a:buFont typeface="Arial" panose="020B0604020202020204" pitchFamily="34" charset="0"/>
+              <a:buChar char="•"/>
+            </a:pPr>
+            <a:r>
+              <a:rPr lang="en-US" b="1" baseline="0" dirty="0" smtClean="0"/>
+              <a:t>Get the </a:t>
+            </a:r>
+            <a:r>
+              <a:rPr lang="en-US" b="1" i="1" baseline="0" dirty="0" smtClean="0"/>
+              <a:t>rows</a:t>
+            </a:r>
+            <a:r>
+              <a:rPr lang="en-US" b="1" baseline="0" dirty="0" smtClean="0"/>
+              <a:t> you care about using filter()</a:t>
+            </a:r>
+          </a:p>
+          <a:p>
+            <a:pPr marL="628650" lvl="1" indent="-171450">
+              <a:buFont typeface="Arial" panose="020B0604020202020204" pitchFamily="34" charset="0"/>
+              <a:buChar char="•"/>
+            </a:pPr>
+            <a:r>
+              <a:rPr lang="en-US" b="1" baseline="0" dirty="0" smtClean="0"/>
+              <a:t>Get the </a:t>
+            </a:r>
+            <a:r>
+              <a:rPr lang="en-US" b="1" i="1" baseline="0" dirty="0" smtClean="0"/>
+              <a:t>columns</a:t>
+            </a:r>
+            <a:r>
+              <a:rPr lang="en-US" b="1" i="0" baseline="0" dirty="0" smtClean="0"/>
+              <a:t> you care about using select</a:t>
+            </a:r>
+            <a:r>
+              <a:rPr lang="en-US" b="1" i="0" baseline="0" dirty="0" smtClean="0"/>
+              <a:t>() </a:t>
             </a:r>
           </a:p>
           <a:p>
@@ -1988,8 +1863,24 @@
               <a:buChar char="•"/>
             </a:pPr>
             <a:r>
-              <a:rPr lang="en-US" b="0" i="0" baseline="0" dirty="0" smtClean="0"/>
-              <a:t>The correct answer is 3 – but why?</a:t>
+              <a:rPr lang="en-US" b="1" i="0" baseline="0" dirty="0" smtClean="0"/>
+              <a:t>Let’s do some exercises – go to the </a:t>
+            </a:r>
+            <a:r>
+              <a:rPr lang="en-US" b="1" i="0" baseline="0" dirty="0" err="1" smtClean="0"/>
+              <a:t>RStudio</a:t>
+            </a:r>
+            <a:r>
+              <a:rPr lang="en-US" b="1" i="0" baseline="0" dirty="0" smtClean="0"/>
+              <a:t> cloud project, and open up the </a:t>
+            </a:r>
+            <a:r>
+              <a:rPr lang="en-US" b="1" i="0" baseline="0" dirty="0" err="1" smtClean="0"/>
+              <a:t>subsetting.Rmd</a:t>
+            </a:r>
+            <a:r>
+              <a:rPr lang="en-US" b="1" i="0" baseline="0" dirty="0" smtClean="0"/>
+              <a:t> exercise</a:t>
             </a:r>
           </a:p>
           <a:p>
@@ -1998,31 +1889,17 @@
               <a:buChar char="•"/>
             </a:pPr>
             <a:r>
-              <a:rPr lang="en-US" b="0" i="0" baseline="0" dirty="0" smtClean="0"/>
-              <a:t>1 is wrong – the data we want to subset need to come first, and we have the condition the wrong way around</a:t>
+              <a:rPr lang="en-US" b="1" i="0" baseline="0" dirty="0" smtClean="0"/>
+              <a:t>Work through them</a:t>
             </a:r>
+            <a:endParaRPr lang="en-US" b="1" baseline="0" dirty="0" smtClean="0"/>
           </a:p>
           <a:p>
             <a:pPr marL="628650" lvl="1" indent="-171450">
               <a:buFont typeface="Arial" panose="020B0604020202020204" pitchFamily="34" charset="0"/>
               <a:buChar char="•"/>
             </a:pPr>
-            <a:r>
-              <a:rPr lang="en-US" b="0" i="0" baseline="0" dirty="0" smtClean="0"/>
-              <a:t>2 is wrong – we need </a:t>
-            </a:r>
-            <a:r>
-              <a:rPr lang="en-US" b="0" i="1" baseline="0" dirty="0" smtClean="0"/>
-              <a:t>filter()</a:t>
-            </a:r>
-            <a:r>
-              <a:rPr lang="en-US" b="0" i="0" baseline="0" dirty="0" smtClean="0"/>
-              <a:t> not </a:t>
-            </a:r>
-            <a:r>
-              <a:rPr lang="en-US" b="0" i="1" baseline="0" dirty="0" smtClean="0"/>
-              <a:t>select()</a:t>
-            </a:r>
+            <a:endParaRPr lang="en-US" b="1" i="0" baseline="0" dirty="0" smtClean="0"/>
           </a:p>
         </p:txBody>
       </p:sp>
@@ -2052,7 +1929,7 @@
     </p:spTree>
     <p:extLst>
       <p:ext uri="{BB962C8B-B14F-4D97-AF65-F5344CB8AC3E}">
-        <p14:creationId xmlns:p14="http://schemas.microsoft.com/office/powerpoint/2010/main" val="3205286388"/>
+        <p14:creationId xmlns:p14="http://schemas.microsoft.com/office/powerpoint/2010/main" val="2615238242"/>
       </p:ext>
     </p:extLst>
   </p:cSld>
@@ -10855,7 +10732,7 @@
           <a:p>
             <a:fld id="{B5B8FAE6-331F-4C0E-8996-7471609552E9}" type="datetimeFigureOut">
               <a:rPr lang="en-US" smtClean="0"/>
-              <a:t>2020-03-31</a:t>
+              <a:t>2020-04-02</a:t>
             </a:fld>
             <a:endParaRPr lang="en-US"/>
           </a:p>
@@ -11097,7 +10974,7 @@
           <a:p>
             <a:fld id="{B5B8FAE6-331F-4C0E-8996-7471609552E9}" type="datetimeFigureOut">
               <a:rPr lang="en-US" smtClean="0"/>
-              <a:t>2020-03-31</a:t>
+              <a:t>2020-04-02</a:t>
             </a:fld>
             <a:endParaRPr lang="en-US"/>
           </a:p>
@@ -11277,7 +11154,7 @@
           <a:p>
             <a:fld id="{B5B8FAE6-331F-4C0E-8996-7471609552E9}" type="datetimeFigureOut">
               <a:rPr lang="en-US" smtClean="0"/>
-              <a:t>2020-03-31</a:t>
+              <a:t>2020-04-02</a:t>
             </a:fld>
             <a:endParaRPr lang="en-US"/>
           </a:p>
@@ -11482,7 +11359,7 @@
           <a:p>
             <a:fld id="{B5B8FAE6-331F-4C0E-8996-7471609552E9}" type="datetimeFigureOut">
               <a:rPr lang="en-US" smtClean="0"/>
-              <a:t>2020-03-31</a:t>
+              <a:t>2020-04-02</a:t>
             </a:fld>
             <a:endParaRPr lang="en-US"/>
           </a:p>
@@ -20415,7 +20292,7 @@
           <a:p>
             <a:fld id="{B5B8FAE6-331F-4C0E-8996-7471609552E9}" type="datetimeFigureOut">
               <a:rPr lang="en-US" smtClean="0"/>
-              <a:t>2020-03-31</a:t>
+              <a:t>2020-04-02</a:t>
             </a:fld>
             <a:endParaRPr lang="en-US"/>
           </a:p>
@@ -20696,7 +20573,7 @@
           <a:p>
             <a:fld id="{B5B8FAE6-331F-4C0E-8996-7471609552E9}" type="datetimeFigureOut">
               <a:rPr lang="en-US" smtClean="0"/>
-              <a:t>2020-03-31</a:t>
+              <a:t>2020-04-02</a:t>
             </a:fld>
             <a:endParaRPr lang="en-US"/>
           </a:p>
@@ -21094,7 +20971,7 @@
           <a:p>
             <a:fld id="{B5B8FAE6-331F-4C0E-8996-7471609552E9}" type="datetimeFigureOut">
               <a:rPr lang="en-US" smtClean="0"/>
-              <a:t>2020-03-31</a:t>
+              <a:t>2020-04-02</a:t>
             </a:fld>
             <a:endParaRPr lang="en-US"/>
           </a:p>
@@ -21212,7 +21089,7 @@
           <a:p>
             <a:fld id="{B5B8FAE6-331F-4C0E-8996-7471609552E9}" type="datetimeFigureOut">
               <a:rPr lang="en-US" smtClean="0"/>
-              <a:t>2020-03-31</a:t>
+              <a:t>2020-04-02</a:t>
             </a:fld>
             <a:endParaRPr lang="en-US"/>
           </a:p>
@@ -21307,7 +21184,7 @@
           <a:p>
             <a:fld id="{B5B8FAE6-331F-4C0E-8996-7471609552E9}" type="datetimeFigureOut">
               <a:rPr lang="en-US" smtClean="0"/>
-              <a:t>2020-03-31</a:t>
+              <a:t>2020-04-02</a:t>
             </a:fld>
             <a:endParaRPr lang="en-US"/>
           </a:p>
@@ -21597,7 +21474,7 @@
           <a:p>
             <a:fld id="{B5B8FAE6-331F-4C0E-8996-7471609552E9}" type="datetimeFigureOut">
               <a:rPr lang="en-US" smtClean="0"/>
-              <a:t>2020-03-31</a:t>
+              <a:t>2020-04-02</a:t>
             </a:fld>
             <a:endParaRPr lang="en-US"/>
           </a:p>
@@ -21877,7 +21754,7 @@
           <a:p>
             <a:fld id="{B5B8FAE6-331F-4C0E-8996-7471609552E9}" type="datetimeFigureOut">
               <a:rPr lang="en-US" smtClean="0"/>
-              <a:t>2020-03-31</a:t>
+              <a:t>2020-04-02</a:t>
             </a:fld>
             <a:endParaRPr lang="en-US"/>
           </a:p>
@@ -22134,7 +22011,7 @@
           <a:p>
             <a:fld id="{B5B8FAE6-331F-4C0E-8996-7471609552E9}" type="datetimeFigureOut">
               <a:rPr lang="en-US" smtClean="0"/>
-              <a:t>2020-03-31</a:t>
+              <a:t>2020-04-02</a:t>
             </a:fld>
             <a:endParaRPr lang="en-US"/>
           </a:p>
@@ -22757,1312 +22634,6 @@
           <a:p>
             <a:r>
               <a:rPr lang="en-US" dirty="0" smtClean="0"/>
-              <a:t>Imagine a scenario:</a:t>
-            </a:r>
-            <a:endParaRPr lang="en-US" dirty="0"/>
-          </a:p>
-        </p:txBody>
-      </p:sp>
-      <p:graphicFrame>
-        <p:nvGraphicFramePr>
-          <p:cNvPr id="3" name="Table 2"/>
-          <p:cNvGraphicFramePr>
-            <a:graphicFrameLocks noGrp="1"/>
-          </p:cNvGraphicFramePr>
-          <p:nvPr>
-            <p:extLst/>
-          </p:nvPr>
-        </p:nvGraphicFramePr>
-        <p:xfrm>
-          <a:off x="723900" y="2084832"/>
-          <a:ext cx="11036300" cy="3695255"/>
-        </p:xfrm>
-        <a:graphic>
-          <a:graphicData uri="http://schemas.openxmlformats.org/drawingml/2006/table">
-            <a:tbl>
-              <a:tblPr firstRow="1">
-                <a:tableStyleId>{EB9631B5-78F2-41C9-869B-9F39066F8104}</a:tableStyleId>
-              </a:tblPr>
-              <a:tblGrid>
-                <a:gridCol w="1103630"/>
-                <a:gridCol w="1103630"/>
-                <a:gridCol w="1103630"/>
-                <a:gridCol w="1103630"/>
-                <a:gridCol w="1103630"/>
-                <a:gridCol w="1103630"/>
-                <a:gridCol w="1103630"/>
-                <a:gridCol w="1103630"/>
-                <a:gridCol w="1103630"/>
-                <a:gridCol w="1103630"/>
-              </a:tblGrid>
-              <a:tr h="445029">
-                <a:tc>
-                  <a:txBody>
-                    <a:bodyPr/>
-                    <a:lstStyle/>
-                    <a:p>
-                      <a:endParaRPr lang="en-US" dirty="0"/>
-                    </a:p>
-                  </a:txBody>
-                  <a:tcPr/>
-                </a:tc>
-                <a:tc>
-                  <a:txBody>
-                    <a:bodyPr/>
-                    <a:lstStyle/>
-                    <a:p>
-                      <a:endParaRPr lang="en-US"/>
-                    </a:p>
-                  </a:txBody>
-                  <a:tcPr/>
-                </a:tc>
-                <a:tc>
-                  <a:txBody>
-                    <a:bodyPr/>
-                    <a:lstStyle/>
-                    <a:p>
-                      <a:endParaRPr lang="en-US" dirty="0"/>
-                    </a:p>
-                  </a:txBody>
-                  <a:tcPr>
-                    <a:solidFill>
-                      <a:schemeClr val="bg2"/>
-                    </a:solidFill>
-                  </a:tcPr>
-                </a:tc>
-                <a:tc>
-                  <a:txBody>
-                    <a:bodyPr/>
-                    <a:lstStyle/>
-                    <a:p>
-                      <a:endParaRPr lang="en-US"/>
-                    </a:p>
-                  </a:txBody>
-                  <a:tcPr>
-                    <a:solidFill>
-                      <a:schemeClr val="bg2"/>
-                    </a:solidFill>
-                  </a:tcPr>
-                </a:tc>
-                <a:tc>
-                  <a:txBody>
-                    <a:bodyPr/>
-                    <a:lstStyle/>
-                    <a:p>
-                      <a:endParaRPr lang="en-US"/>
-                    </a:p>
-                  </a:txBody>
-                  <a:tcPr>
-                    <a:solidFill>
-                      <a:schemeClr val="bg2"/>
-                    </a:solidFill>
-                  </a:tcPr>
-                </a:tc>
-                <a:tc>
-                  <a:txBody>
-                    <a:bodyPr/>
-                    <a:lstStyle/>
-                    <a:p>
-                      <a:endParaRPr lang="en-US"/>
-                    </a:p>
-                  </a:txBody>
-                  <a:tcPr>
-                    <a:solidFill>
-                      <a:schemeClr val="bg2"/>
-                    </a:solidFill>
-                  </a:tcPr>
-                </a:tc>
-                <a:tc>
-                  <a:txBody>
-                    <a:bodyPr/>
-                    <a:lstStyle/>
-                    <a:p>
-                      <a:endParaRPr lang="en-US"/>
-                    </a:p>
-                  </a:txBody>
-                  <a:tcPr/>
-                </a:tc>
-                <a:tc>
-                  <a:txBody>
-                    <a:bodyPr/>
-                    <a:lstStyle/>
-                    <a:p>
-                      <a:endParaRPr lang="en-US"/>
-                    </a:p>
-                  </a:txBody>
-                  <a:tcPr/>
-                </a:tc>
-                <a:tc>
-                  <a:txBody>
-                    <a:bodyPr/>
-                    <a:lstStyle/>
-                    <a:p>
-                      <a:endParaRPr lang="en-US"/>
-                    </a:p>
-                  </a:txBody>
-                  <a:tcPr/>
-                </a:tc>
-                <a:tc>
-                  <a:txBody>
-                    <a:bodyPr/>
-                    <a:lstStyle/>
-                    <a:p>
-                      <a:endParaRPr lang="en-US"/>
-                    </a:p>
-                  </a:txBody>
-                  <a:tcPr/>
-                </a:tc>
-              </a:tr>
-              <a:tr h="445029">
-                <a:tc>
-                  <a:txBody>
-                    <a:bodyPr/>
-                    <a:lstStyle/>
-                    <a:p>
-                      <a:endParaRPr lang="en-US" dirty="0"/>
-                    </a:p>
-                  </a:txBody>
-                  <a:tcPr/>
-                </a:tc>
-                <a:tc>
-                  <a:txBody>
-                    <a:bodyPr/>
-                    <a:lstStyle/>
-                    <a:p>
-                      <a:endParaRPr lang="en-US" dirty="0"/>
-                    </a:p>
-                  </a:txBody>
-                  <a:tcPr/>
-                </a:tc>
-                <a:tc>
-                  <a:txBody>
-                    <a:bodyPr/>
-                    <a:lstStyle/>
-                    <a:p>
-                      <a:endParaRPr lang="en-US" dirty="0"/>
-                    </a:p>
-                  </a:txBody>
-                  <a:tcPr>
-                    <a:solidFill>
-                      <a:schemeClr val="bg2"/>
-                    </a:solidFill>
-                  </a:tcPr>
-                </a:tc>
-                <a:tc>
-                  <a:txBody>
-                    <a:bodyPr/>
-                    <a:lstStyle/>
-                    <a:p>
-                      <a:endParaRPr lang="en-US" dirty="0"/>
-                    </a:p>
-                  </a:txBody>
-                  <a:tcPr>
-                    <a:solidFill>
-                      <a:schemeClr val="bg2"/>
-                    </a:solidFill>
-                  </a:tcPr>
-                </a:tc>
-                <a:tc>
-                  <a:txBody>
-                    <a:bodyPr/>
-                    <a:lstStyle/>
-                    <a:p>
-                      <a:endParaRPr lang="en-US"/>
-                    </a:p>
-                  </a:txBody>
-                  <a:tcPr>
-                    <a:solidFill>
-                      <a:schemeClr val="bg2"/>
-                    </a:solidFill>
-                  </a:tcPr>
-                </a:tc>
-                <a:tc>
-                  <a:txBody>
-                    <a:bodyPr/>
-                    <a:lstStyle/>
-                    <a:p>
-                      <a:endParaRPr lang="en-US"/>
-                    </a:p>
-                  </a:txBody>
-                  <a:tcPr>
-                    <a:solidFill>
-                      <a:schemeClr val="bg2"/>
-                    </a:solidFill>
-                  </a:tcPr>
-                </a:tc>
-                <a:tc>
-                  <a:txBody>
-                    <a:bodyPr/>
-                    <a:lstStyle/>
-                    <a:p>
-                      <a:endParaRPr lang="en-US"/>
-                    </a:p>
-                  </a:txBody>
-                  <a:tcPr/>
-                </a:tc>
-                <a:tc>
-                  <a:txBody>
-                    <a:bodyPr/>
-                    <a:lstStyle/>
-                    <a:p>
-                      <a:endParaRPr lang="en-US"/>
-                    </a:p>
-                  </a:txBody>
-                  <a:tcPr/>
-                </a:tc>
-                <a:tc>
-                  <a:txBody>
-                    <a:bodyPr/>
-                    <a:lstStyle/>
-                    <a:p>
-                      <a:endParaRPr lang="en-US"/>
-                    </a:p>
-                  </a:txBody>
-                  <a:tcPr/>
-                </a:tc>
-                <a:tc>
-                  <a:txBody>
-                    <a:bodyPr/>
-                    <a:lstStyle/>
-                    <a:p>
-                      <a:endParaRPr lang="en-US"/>
-                    </a:p>
-                  </a:txBody>
-                  <a:tcPr/>
-                </a:tc>
-              </a:tr>
-              <a:tr h="445029">
-                <a:tc>
-                  <a:txBody>
-                    <a:bodyPr/>
-                    <a:lstStyle/>
-                    <a:p>
-                      <a:endParaRPr lang="en-US" dirty="0"/>
-                    </a:p>
-                  </a:txBody>
-                  <a:tcPr/>
-                </a:tc>
-                <a:tc>
-                  <a:txBody>
-                    <a:bodyPr/>
-                    <a:lstStyle/>
-                    <a:p>
-                      <a:endParaRPr lang="en-US" dirty="0"/>
-                    </a:p>
-                  </a:txBody>
-                  <a:tcPr/>
-                </a:tc>
-                <a:tc>
-                  <a:txBody>
-                    <a:bodyPr/>
-                    <a:lstStyle/>
-                    <a:p>
-                      <a:endParaRPr lang="en-US" dirty="0"/>
-                    </a:p>
-                  </a:txBody>
-                  <a:tcPr>
-                    <a:solidFill>
-                      <a:schemeClr val="bg2"/>
-                    </a:solidFill>
-                  </a:tcPr>
-                </a:tc>
-                <a:tc>
-                  <a:txBody>
-                    <a:bodyPr/>
-                    <a:lstStyle/>
-                    <a:p>
-                      <a:endParaRPr lang="en-US" dirty="0"/>
-                    </a:p>
-                  </a:txBody>
-                  <a:tcPr>
-                    <a:solidFill>
-                      <a:schemeClr val="bg2"/>
-                    </a:solidFill>
-                  </a:tcPr>
-                </a:tc>
-                <a:tc>
-                  <a:txBody>
-                    <a:bodyPr/>
-                    <a:lstStyle/>
-                    <a:p>
-                      <a:endParaRPr lang="en-US"/>
-                    </a:p>
-                  </a:txBody>
-                  <a:tcPr>
-                    <a:solidFill>
-                      <a:schemeClr val="bg2"/>
-                    </a:solidFill>
-                  </a:tcPr>
-                </a:tc>
-                <a:tc>
-                  <a:txBody>
-                    <a:bodyPr/>
-                    <a:lstStyle/>
-                    <a:p>
-                      <a:endParaRPr lang="en-US"/>
-                    </a:p>
-                  </a:txBody>
-                  <a:tcPr>
-                    <a:solidFill>
-                      <a:schemeClr val="bg2"/>
-                    </a:solidFill>
-                  </a:tcPr>
-                </a:tc>
-                <a:tc>
-                  <a:txBody>
-                    <a:bodyPr/>
-                    <a:lstStyle/>
-                    <a:p>
-                      <a:endParaRPr lang="en-US"/>
-                    </a:p>
-                  </a:txBody>
-                  <a:tcPr/>
-                </a:tc>
-                <a:tc>
-                  <a:txBody>
-                    <a:bodyPr/>
-                    <a:lstStyle/>
-                    <a:p>
-                      <a:endParaRPr lang="en-US"/>
-                    </a:p>
-                  </a:txBody>
-                  <a:tcPr/>
-                </a:tc>
-                <a:tc>
-                  <a:txBody>
-                    <a:bodyPr/>
-                    <a:lstStyle/>
-                    <a:p>
-                      <a:endParaRPr lang="en-US"/>
-                    </a:p>
-                  </a:txBody>
-                  <a:tcPr/>
-                </a:tc>
-                <a:tc>
-                  <a:txBody>
-                    <a:bodyPr/>
-                    <a:lstStyle/>
-                    <a:p>
-                      <a:endParaRPr lang="en-US"/>
-                    </a:p>
-                  </a:txBody>
-                  <a:tcPr/>
-                </a:tc>
-              </a:tr>
-              <a:tr h="445029">
-                <a:tc>
-                  <a:txBody>
-                    <a:bodyPr/>
-                    <a:lstStyle/>
-                    <a:p>
-                      <a:endParaRPr lang="en-US" dirty="0"/>
-                    </a:p>
-                  </a:txBody>
-                  <a:tcPr>
-                    <a:solidFill>
-                      <a:schemeClr val="bg2"/>
-                    </a:solidFill>
-                  </a:tcPr>
-                </a:tc>
-                <a:tc>
-                  <a:txBody>
-                    <a:bodyPr/>
-                    <a:lstStyle/>
-                    <a:p>
-                      <a:endParaRPr lang="en-US" dirty="0"/>
-                    </a:p>
-                  </a:txBody>
-                  <a:tcPr>
-                    <a:solidFill>
-                      <a:schemeClr val="bg2"/>
-                    </a:solidFill>
-                  </a:tcPr>
-                </a:tc>
-                <a:tc>
-                  <a:txBody>
-                    <a:bodyPr/>
-                    <a:lstStyle/>
-                    <a:p>
-                      <a:endParaRPr lang="en-US"/>
-                    </a:p>
-                  </a:txBody>
-                  <a:tcPr>
-                    <a:solidFill>
-                      <a:schemeClr val="bg2"/>
-                    </a:solidFill>
-                  </a:tcPr>
-                </a:tc>
-                <a:tc>
-                  <a:txBody>
-                    <a:bodyPr/>
-                    <a:lstStyle/>
-                    <a:p>
-                      <a:endParaRPr lang="en-US"/>
-                    </a:p>
-                  </a:txBody>
-                  <a:tcPr>
-                    <a:solidFill>
-                      <a:schemeClr val="bg2"/>
-                    </a:solidFill>
-                  </a:tcPr>
-                </a:tc>
-                <a:tc>
-                  <a:txBody>
-                    <a:bodyPr/>
-                    <a:lstStyle/>
-                    <a:p>
-                      <a:endParaRPr lang="en-US" dirty="0"/>
-                    </a:p>
-                  </a:txBody>
-                  <a:tcPr>
-                    <a:solidFill>
-                      <a:schemeClr val="bg2"/>
-                    </a:solidFill>
-                  </a:tcPr>
-                </a:tc>
-                <a:tc>
-                  <a:txBody>
-                    <a:bodyPr/>
-                    <a:lstStyle/>
-                    <a:p>
-                      <a:endParaRPr lang="en-US"/>
-                    </a:p>
-                  </a:txBody>
-                  <a:tcPr>
-                    <a:solidFill>
-                      <a:schemeClr val="bg2"/>
-                    </a:solidFill>
-                  </a:tcPr>
-                </a:tc>
-                <a:tc>
-                  <a:txBody>
-                    <a:bodyPr/>
-                    <a:lstStyle/>
-                    <a:p>
-                      <a:endParaRPr lang="en-US" dirty="0"/>
-                    </a:p>
-                  </a:txBody>
-                  <a:tcPr>
-                    <a:solidFill>
-                      <a:schemeClr val="bg2"/>
-                    </a:solidFill>
-                  </a:tcPr>
-                </a:tc>
-                <a:tc>
-                  <a:txBody>
-                    <a:bodyPr/>
-                    <a:lstStyle/>
-                    <a:p>
-                      <a:endParaRPr lang="en-US" dirty="0"/>
-                    </a:p>
-                  </a:txBody>
-                  <a:tcPr>
-                    <a:solidFill>
-                      <a:schemeClr val="bg2"/>
-                    </a:solidFill>
-                  </a:tcPr>
-                </a:tc>
-                <a:tc>
-                  <a:txBody>
-                    <a:bodyPr/>
-                    <a:lstStyle/>
-                    <a:p>
-                      <a:endParaRPr lang="en-US"/>
-                    </a:p>
-                  </a:txBody>
-                  <a:tcPr>
-                    <a:solidFill>
-                      <a:schemeClr val="bg2"/>
-                    </a:solidFill>
-                  </a:tcPr>
-                </a:tc>
-                <a:tc>
-                  <a:txBody>
-                    <a:bodyPr/>
-                    <a:lstStyle/>
-                    <a:p>
-                      <a:endParaRPr lang="en-US"/>
-                    </a:p>
-                  </a:txBody>
-                  <a:tcPr>
-                    <a:solidFill>
-                      <a:schemeClr val="bg2"/>
-                    </a:solidFill>
-                  </a:tcPr>
-                </a:tc>
-              </a:tr>
-              <a:tr h="580052">
-                <a:tc>
-                  <a:txBody>
-                    <a:bodyPr/>
-                    <a:lstStyle/>
-                    <a:p>
-                      <a:endParaRPr lang="en-US" dirty="0"/>
-                    </a:p>
-                  </a:txBody>
-                  <a:tcPr>
-                    <a:solidFill>
-                      <a:schemeClr val="bg2"/>
-                    </a:solidFill>
-                  </a:tcPr>
-                </a:tc>
-                <a:tc>
-                  <a:txBody>
-                    <a:bodyPr/>
-                    <a:lstStyle/>
-                    <a:p>
-                      <a:endParaRPr lang="en-US" dirty="0"/>
-                    </a:p>
-                  </a:txBody>
-                  <a:tcPr>
-                    <a:solidFill>
-                      <a:schemeClr val="bg2"/>
-                    </a:solidFill>
-                  </a:tcPr>
-                </a:tc>
-                <a:tc>
-                  <a:txBody>
-                    <a:bodyPr/>
-                    <a:lstStyle/>
-                    <a:p>
-                      <a:endParaRPr lang="en-US"/>
-                    </a:p>
-                  </a:txBody>
-                  <a:tcPr>
-                    <a:solidFill>
-                      <a:schemeClr val="bg2"/>
-                    </a:solidFill>
-                  </a:tcPr>
-                </a:tc>
-                <a:tc>
-                  <a:txBody>
-                    <a:bodyPr/>
-                    <a:lstStyle/>
-                    <a:p>
-                      <a:endParaRPr lang="en-US" dirty="0"/>
-                    </a:p>
-                  </a:txBody>
-                  <a:tcPr>
-                    <a:solidFill>
-                      <a:schemeClr val="bg2"/>
-                    </a:solidFill>
-                  </a:tcPr>
-                </a:tc>
-                <a:tc>
-                  <a:txBody>
-                    <a:bodyPr/>
-                    <a:lstStyle/>
-                    <a:p>
-                      <a:endParaRPr lang="en-US" dirty="0"/>
-                    </a:p>
-                  </a:txBody>
-                  <a:tcPr>
-                    <a:solidFill>
-                      <a:schemeClr val="bg2"/>
-                    </a:solidFill>
-                  </a:tcPr>
-                </a:tc>
-                <a:tc>
-                  <a:txBody>
-                    <a:bodyPr/>
-                    <a:lstStyle/>
-                    <a:p>
-                      <a:endParaRPr lang="en-US" dirty="0"/>
-                    </a:p>
-                  </a:txBody>
-                  <a:tcPr>
-                    <a:solidFill>
-                      <a:schemeClr val="bg2"/>
-                    </a:solidFill>
-                  </a:tcPr>
-                </a:tc>
-                <a:tc>
-                  <a:txBody>
-                    <a:bodyPr/>
-                    <a:lstStyle/>
-                    <a:p>
-                      <a:endParaRPr lang="en-US" dirty="0"/>
-                    </a:p>
-                  </a:txBody>
-                  <a:tcPr>
-                    <a:solidFill>
-                      <a:schemeClr val="bg2"/>
-                    </a:solidFill>
-                  </a:tcPr>
-                </a:tc>
-                <a:tc>
-                  <a:txBody>
-                    <a:bodyPr/>
-                    <a:lstStyle/>
-                    <a:p>
-                      <a:endParaRPr lang="en-US" dirty="0"/>
-                    </a:p>
-                  </a:txBody>
-                  <a:tcPr>
-                    <a:solidFill>
-                      <a:schemeClr val="bg2"/>
-                    </a:solidFill>
-                  </a:tcPr>
-                </a:tc>
-                <a:tc>
-                  <a:txBody>
-                    <a:bodyPr/>
-                    <a:lstStyle/>
-                    <a:p>
-                      <a:endParaRPr lang="en-US" dirty="0"/>
-                    </a:p>
-                  </a:txBody>
-                  <a:tcPr>
-                    <a:solidFill>
-                      <a:schemeClr val="bg2"/>
-                    </a:solidFill>
-                  </a:tcPr>
-                </a:tc>
-                <a:tc>
-                  <a:txBody>
-                    <a:bodyPr/>
-                    <a:lstStyle/>
-                    <a:p>
-                      <a:endParaRPr lang="en-US" dirty="0"/>
-                    </a:p>
-                  </a:txBody>
-                  <a:tcPr>
-                    <a:solidFill>
-                      <a:schemeClr val="bg2"/>
-                    </a:solidFill>
-                  </a:tcPr>
-                </a:tc>
-              </a:tr>
-              <a:tr h="445029">
-                <a:tc>
-                  <a:txBody>
-                    <a:bodyPr/>
-                    <a:lstStyle/>
-                    <a:p>
-                      <a:endParaRPr lang="en-US" dirty="0"/>
-                    </a:p>
-                  </a:txBody>
-                  <a:tcPr>
-                    <a:solidFill>
-                      <a:schemeClr val="bg2"/>
-                    </a:solidFill>
-                  </a:tcPr>
-                </a:tc>
-                <a:tc>
-                  <a:txBody>
-                    <a:bodyPr/>
-                    <a:lstStyle/>
-                    <a:p>
-                      <a:endParaRPr lang="en-US" dirty="0"/>
-                    </a:p>
-                  </a:txBody>
-                  <a:tcPr>
-                    <a:solidFill>
-                      <a:schemeClr val="bg2"/>
-                    </a:solidFill>
-                  </a:tcPr>
-                </a:tc>
-                <a:tc>
-                  <a:txBody>
-                    <a:bodyPr/>
-                    <a:lstStyle/>
-                    <a:p>
-                      <a:endParaRPr lang="en-US"/>
-                    </a:p>
-                  </a:txBody>
-                  <a:tcPr>
-                    <a:solidFill>
-                      <a:schemeClr val="bg2"/>
-                    </a:solidFill>
-                  </a:tcPr>
-                </a:tc>
-                <a:tc>
-                  <a:txBody>
-                    <a:bodyPr/>
-                    <a:lstStyle/>
-                    <a:p>
-                      <a:endParaRPr lang="en-US"/>
-                    </a:p>
-                  </a:txBody>
-                  <a:tcPr>
-                    <a:solidFill>
-                      <a:schemeClr val="bg2"/>
-                    </a:solidFill>
-                  </a:tcPr>
-                </a:tc>
-                <a:tc>
-                  <a:txBody>
-                    <a:bodyPr/>
-                    <a:lstStyle/>
-                    <a:p>
-                      <a:endParaRPr lang="en-US"/>
-                    </a:p>
-                  </a:txBody>
-                  <a:tcPr>
-                    <a:solidFill>
-                      <a:schemeClr val="bg2"/>
-                    </a:solidFill>
-                  </a:tcPr>
-                </a:tc>
-                <a:tc>
-                  <a:txBody>
-                    <a:bodyPr/>
-                    <a:lstStyle/>
-                    <a:p>
-                      <a:endParaRPr lang="en-US" dirty="0"/>
-                    </a:p>
-                  </a:txBody>
-                  <a:tcPr>
-                    <a:solidFill>
-                      <a:schemeClr val="bg2"/>
-                    </a:solidFill>
-                  </a:tcPr>
-                </a:tc>
-                <a:tc>
-                  <a:txBody>
-                    <a:bodyPr/>
-                    <a:lstStyle/>
-                    <a:p>
-                      <a:endParaRPr lang="en-US" dirty="0"/>
-                    </a:p>
-                  </a:txBody>
-                  <a:tcPr>
-                    <a:solidFill>
-                      <a:schemeClr val="bg2"/>
-                    </a:solidFill>
-                  </a:tcPr>
-                </a:tc>
-                <a:tc>
-                  <a:txBody>
-                    <a:bodyPr/>
-                    <a:lstStyle/>
-                    <a:p>
-                      <a:endParaRPr lang="en-US" dirty="0"/>
-                    </a:p>
-                  </a:txBody>
-                  <a:tcPr>
-                    <a:solidFill>
-                      <a:schemeClr val="bg2"/>
-                    </a:solidFill>
-                  </a:tcPr>
-                </a:tc>
-                <a:tc>
-                  <a:txBody>
-                    <a:bodyPr/>
-                    <a:lstStyle/>
-                    <a:p>
-                      <a:endParaRPr lang="en-US"/>
-                    </a:p>
-                  </a:txBody>
-                  <a:tcPr>
-                    <a:solidFill>
-                      <a:schemeClr val="bg2"/>
-                    </a:solidFill>
-                  </a:tcPr>
-                </a:tc>
-                <a:tc>
-                  <a:txBody>
-                    <a:bodyPr/>
-                    <a:lstStyle/>
-                    <a:p>
-                      <a:endParaRPr lang="en-US" dirty="0"/>
-                    </a:p>
-                  </a:txBody>
-                  <a:tcPr>
-                    <a:solidFill>
-                      <a:schemeClr val="bg2"/>
-                    </a:solidFill>
-                  </a:tcPr>
-                </a:tc>
-              </a:tr>
-              <a:tr h="445029">
-                <a:tc>
-                  <a:txBody>
-                    <a:bodyPr/>
-                    <a:lstStyle/>
-                    <a:p>
-                      <a:endParaRPr lang="en-US" dirty="0"/>
-                    </a:p>
-                  </a:txBody>
-                  <a:tcPr>
-                    <a:solidFill>
-                      <a:schemeClr val="bg2"/>
-                    </a:solidFill>
-                  </a:tcPr>
-                </a:tc>
-                <a:tc>
-                  <a:txBody>
-                    <a:bodyPr/>
-                    <a:lstStyle/>
-                    <a:p>
-                      <a:endParaRPr lang="en-US" dirty="0"/>
-                    </a:p>
-                  </a:txBody>
-                  <a:tcPr>
-                    <a:solidFill>
-                      <a:schemeClr val="bg2"/>
-                    </a:solidFill>
-                  </a:tcPr>
-                </a:tc>
-                <a:tc>
-                  <a:txBody>
-                    <a:bodyPr/>
-                    <a:lstStyle/>
-                    <a:p>
-                      <a:endParaRPr lang="en-US"/>
-                    </a:p>
-                  </a:txBody>
-                  <a:tcPr>
-                    <a:solidFill>
-                      <a:schemeClr val="bg2"/>
-                    </a:solidFill>
-                  </a:tcPr>
-                </a:tc>
-                <a:tc>
-                  <a:txBody>
-                    <a:bodyPr/>
-                    <a:lstStyle/>
-                    <a:p>
-                      <a:endParaRPr lang="en-US"/>
-                    </a:p>
-                  </a:txBody>
-                  <a:tcPr>
-                    <a:solidFill>
-                      <a:schemeClr val="bg2"/>
-                    </a:solidFill>
-                  </a:tcPr>
-                </a:tc>
-                <a:tc>
-                  <a:txBody>
-                    <a:bodyPr/>
-                    <a:lstStyle/>
-                    <a:p>
-                      <a:endParaRPr lang="en-US"/>
-                    </a:p>
-                  </a:txBody>
-                  <a:tcPr>
-                    <a:solidFill>
-                      <a:schemeClr val="bg2"/>
-                    </a:solidFill>
-                  </a:tcPr>
-                </a:tc>
-                <a:tc>
-                  <a:txBody>
-                    <a:bodyPr/>
-                    <a:lstStyle/>
-                    <a:p>
-                      <a:endParaRPr lang="en-US" dirty="0"/>
-                    </a:p>
-                  </a:txBody>
-                  <a:tcPr>
-                    <a:solidFill>
-                      <a:schemeClr val="bg2"/>
-                    </a:solidFill>
-                  </a:tcPr>
-                </a:tc>
-                <a:tc>
-                  <a:txBody>
-                    <a:bodyPr/>
-                    <a:lstStyle/>
-                    <a:p>
-                      <a:endParaRPr lang="en-US"/>
-                    </a:p>
-                  </a:txBody>
-                  <a:tcPr>
-                    <a:solidFill>
-                      <a:schemeClr val="bg2"/>
-                    </a:solidFill>
-                  </a:tcPr>
-                </a:tc>
-                <a:tc>
-                  <a:txBody>
-                    <a:bodyPr/>
-                    <a:lstStyle/>
-                    <a:p>
-                      <a:endParaRPr lang="en-US" dirty="0"/>
-                    </a:p>
-                  </a:txBody>
-                  <a:tcPr>
-                    <a:solidFill>
-                      <a:schemeClr val="bg2"/>
-                    </a:solidFill>
-                  </a:tcPr>
-                </a:tc>
-                <a:tc>
-                  <a:txBody>
-                    <a:bodyPr/>
-                    <a:lstStyle/>
-                    <a:p>
-                      <a:endParaRPr lang="en-US" dirty="0"/>
-                    </a:p>
-                  </a:txBody>
-                  <a:tcPr>
-                    <a:solidFill>
-                      <a:schemeClr val="bg2"/>
-                    </a:solidFill>
-                  </a:tcPr>
-                </a:tc>
-                <a:tc>
-                  <a:txBody>
-                    <a:bodyPr/>
-                    <a:lstStyle/>
-                    <a:p>
-                      <a:endParaRPr lang="en-US" dirty="0"/>
-                    </a:p>
-                  </a:txBody>
-                  <a:tcPr>
-                    <a:solidFill>
-                      <a:schemeClr val="bg2"/>
-                    </a:solidFill>
-                  </a:tcPr>
-                </a:tc>
-              </a:tr>
-              <a:tr h="445029">
-                <a:tc>
-                  <a:txBody>
-                    <a:bodyPr/>
-                    <a:lstStyle/>
-                    <a:p>
-                      <a:endParaRPr lang="en-US" dirty="0"/>
-                    </a:p>
-                  </a:txBody>
-                  <a:tcPr/>
-                </a:tc>
-                <a:tc>
-                  <a:txBody>
-                    <a:bodyPr/>
-                    <a:lstStyle/>
-                    <a:p>
-                      <a:endParaRPr lang="en-US" dirty="0"/>
-                    </a:p>
-                  </a:txBody>
-                  <a:tcPr/>
-                </a:tc>
-                <a:tc>
-                  <a:txBody>
-                    <a:bodyPr/>
-                    <a:lstStyle/>
-                    <a:p>
-                      <a:endParaRPr lang="en-US"/>
-                    </a:p>
-                  </a:txBody>
-                  <a:tcPr>
-                    <a:solidFill>
-                      <a:schemeClr val="bg2"/>
-                    </a:solidFill>
-                  </a:tcPr>
-                </a:tc>
-                <a:tc>
-                  <a:txBody>
-                    <a:bodyPr/>
-                    <a:lstStyle/>
-                    <a:p>
-                      <a:endParaRPr lang="en-US"/>
-                    </a:p>
-                  </a:txBody>
-                  <a:tcPr>
-                    <a:solidFill>
-                      <a:schemeClr val="bg2"/>
-                    </a:solidFill>
-                  </a:tcPr>
-                </a:tc>
-                <a:tc>
-                  <a:txBody>
-                    <a:bodyPr/>
-                    <a:lstStyle/>
-                    <a:p>
-                      <a:endParaRPr lang="en-US"/>
-                    </a:p>
-                  </a:txBody>
-                  <a:tcPr>
-                    <a:solidFill>
-                      <a:schemeClr val="bg2"/>
-                    </a:solidFill>
-                  </a:tcPr>
-                </a:tc>
-                <a:tc>
-                  <a:txBody>
-                    <a:bodyPr/>
-                    <a:lstStyle/>
-                    <a:p>
-                      <a:endParaRPr lang="en-US" dirty="0"/>
-                    </a:p>
-                  </a:txBody>
-                  <a:tcPr>
-                    <a:solidFill>
-                      <a:schemeClr val="bg2"/>
-                    </a:solidFill>
-                  </a:tcPr>
-                </a:tc>
-                <a:tc>
-                  <a:txBody>
-                    <a:bodyPr/>
-                    <a:lstStyle/>
-                    <a:p>
-                      <a:endParaRPr lang="en-US"/>
-                    </a:p>
-                  </a:txBody>
-                  <a:tcPr/>
-                </a:tc>
-                <a:tc>
-                  <a:txBody>
-                    <a:bodyPr/>
-                    <a:lstStyle/>
-                    <a:p>
-                      <a:endParaRPr lang="en-US"/>
-                    </a:p>
-                  </a:txBody>
-                  <a:tcPr/>
-                </a:tc>
-                <a:tc>
-                  <a:txBody>
-                    <a:bodyPr/>
-                    <a:lstStyle/>
-                    <a:p>
-                      <a:endParaRPr lang="en-US" dirty="0"/>
-                    </a:p>
-                  </a:txBody>
-                  <a:tcPr/>
-                </a:tc>
-                <a:tc>
-                  <a:txBody>
-                    <a:bodyPr/>
-                    <a:lstStyle/>
-                    <a:p>
-                      <a:endParaRPr lang="en-US" dirty="0"/>
-                    </a:p>
-                  </a:txBody>
-                  <a:tcPr/>
-                </a:tc>
-              </a:tr>
-            </a:tbl>
-          </a:graphicData>
-        </a:graphic>
-      </p:graphicFrame>
-      <p:sp>
-        <p:nvSpPr>
-          <p:cNvPr id="4" name="TextBox 3"/>
-          <p:cNvSpPr txBox="1"/>
-          <p:nvPr/>
-        </p:nvSpPr>
-        <p:spPr>
-          <a:xfrm>
-            <a:off x="6379285" y="168916"/>
-            <a:ext cx="5380915" cy="1200329"/>
-          </a:xfrm>
-          <a:prstGeom prst="rect">
-            <a:avLst/>
-          </a:prstGeom>
-          <a:noFill/>
-        </p:spPr>
-        <p:txBody>
-          <a:bodyPr wrap="square" rtlCol="0">
-            <a:spAutoFit/>
-          </a:bodyPr>
-          <a:lstStyle/>
-          <a:p>
-            <a:r>
-              <a:rPr lang="en-US" sz="3600" dirty="0" smtClean="0"/>
-              <a:t>Columns you’re interested in – get with </a:t>
-            </a:r>
-            <a:r>
-              <a:rPr lang="en-US" sz="3600" dirty="0" smtClean="0">
-                <a:latin typeface="Courier New" panose="02070309020205020404" pitchFamily="49" charset="0"/>
-                <a:cs typeface="Courier New" panose="02070309020205020404" pitchFamily="49" charset="0"/>
-              </a:rPr>
-              <a:t>select()</a:t>
-            </a:r>
-            <a:endParaRPr lang="en-US" sz="3600" dirty="0">
-              <a:latin typeface="Courier New" panose="02070309020205020404" pitchFamily="49" charset="0"/>
-              <a:cs typeface="Courier New" panose="02070309020205020404" pitchFamily="49" charset="0"/>
-            </a:endParaRPr>
-          </a:p>
-        </p:txBody>
-      </p:sp>
-      <p:sp>
-        <p:nvSpPr>
-          <p:cNvPr id="12" name="TextBox 11"/>
-          <p:cNvSpPr txBox="1"/>
-          <p:nvPr/>
-        </p:nvSpPr>
-        <p:spPr>
-          <a:xfrm>
-            <a:off x="215153" y="5951371"/>
-            <a:ext cx="10428194" cy="646331"/>
-          </a:xfrm>
-          <a:prstGeom prst="rect">
-            <a:avLst/>
-          </a:prstGeom>
-          <a:noFill/>
-        </p:spPr>
-        <p:txBody>
-          <a:bodyPr wrap="square" rtlCol="0">
-            <a:spAutoFit/>
-          </a:bodyPr>
-          <a:lstStyle/>
-          <a:p>
-            <a:r>
-              <a:rPr lang="en-US" sz="3600" dirty="0" smtClean="0"/>
-              <a:t>Rows you care about – get them with </a:t>
-            </a:r>
-            <a:r>
-              <a:rPr lang="en-US" sz="3600" dirty="0" smtClean="0">
-                <a:latin typeface="Courier New" panose="02070309020205020404" pitchFamily="49" charset="0"/>
-                <a:cs typeface="Courier New" panose="02070309020205020404" pitchFamily="49" charset="0"/>
-              </a:rPr>
-              <a:t>filter()</a:t>
-            </a:r>
-            <a:endParaRPr lang="en-US" sz="3600" dirty="0">
-              <a:latin typeface="Courier New" panose="02070309020205020404" pitchFamily="49" charset="0"/>
-              <a:cs typeface="Courier New" panose="02070309020205020404" pitchFamily="49" charset="0"/>
-            </a:endParaRPr>
-          </a:p>
-        </p:txBody>
-      </p:sp>
-      <p:sp>
-        <p:nvSpPr>
-          <p:cNvPr id="13" name="Arc 12"/>
-          <p:cNvSpPr/>
-          <p:nvPr/>
-        </p:nvSpPr>
-        <p:spPr>
-          <a:xfrm rot="4632383">
-            <a:off x="8749056" y="5135912"/>
-            <a:ext cx="970838" cy="1529834"/>
-          </a:xfrm>
-          <a:prstGeom prst="arc">
-            <a:avLst>
-              <a:gd name="adj1" fmla="val 15534846"/>
-              <a:gd name="adj2" fmla="val 0"/>
-            </a:avLst>
-          </a:prstGeom>
-          <a:ln w="38100">
-            <a:headEnd type="triangle"/>
-            <a:tailEnd type="none"/>
-          </a:ln>
-        </p:spPr>
-        <p:style>
-          <a:lnRef idx="1">
-            <a:schemeClr val="accent1"/>
-          </a:lnRef>
-          <a:fillRef idx="0">
-            <a:schemeClr val="accent1"/>
-          </a:fillRef>
-          <a:effectRef idx="0">
-            <a:schemeClr val="accent1"/>
-          </a:effectRef>
-          <a:fontRef idx="minor">
-            <a:schemeClr val="tx1"/>
-          </a:fontRef>
-        </p:style>
-        <p:txBody>
-          <a:bodyPr rtlCol="0" anchor="ctr"/>
-          <a:lstStyle/>
-          <a:p>
-            <a:pPr algn="ctr"/>
-            <a:endParaRPr lang="en-US"/>
-          </a:p>
-        </p:txBody>
-      </p:sp>
-      <p:sp>
-        <p:nvSpPr>
-          <p:cNvPr id="10" name="Arc 9"/>
-          <p:cNvSpPr/>
-          <p:nvPr/>
-        </p:nvSpPr>
-        <p:spPr>
-          <a:xfrm rot="3640783">
-            <a:off x="8986610" y="775612"/>
-            <a:ext cx="2146300" cy="1529834"/>
-          </a:xfrm>
-          <a:prstGeom prst="arc">
-            <a:avLst>
-              <a:gd name="adj1" fmla="val 15713019"/>
-              <a:gd name="adj2" fmla="val 19759243"/>
-            </a:avLst>
-          </a:prstGeom>
-          <a:ln w="38100">
-            <a:headEnd type="none"/>
-            <a:tailEnd type="triangle"/>
-          </a:ln>
-        </p:spPr>
-        <p:style>
-          <a:lnRef idx="1">
-            <a:schemeClr val="accent1"/>
-          </a:lnRef>
-          <a:fillRef idx="0">
-            <a:schemeClr val="accent1"/>
-          </a:fillRef>
-          <a:effectRef idx="0">
-            <a:schemeClr val="accent1"/>
-          </a:effectRef>
-          <a:fontRef idx="minor">
-            <a:schemeClr val="tx1"/>
-          </a:fontRef>
-        </p:style>
-        <p:txBody>
-          <a:bodyPr rtlCol="0" anchor="ctr"/>
-          <a:lstStyle/>
-          <a:p>
-            <a:pPr algn="ctr"/>
-            <a:endParaRPr lang="en-US"/>
-          </a:p>
-        </p:txBody>
-      </p:sp>
-    </p:spTree>
-    <p:extLst>
-      <p:ext uri="{BB962C8B-B14F-4D97-AF65-F5344CB8AC3E}">
-        <p14:creationId xmlns:p14="http://schemas.microsoft.com/office/powerpoint/2010/main" val="1969019720"/>
-      </p:ext>
-    </p:extLst>
-  </p:cSld>
-  <p:clrMapOvr>
-    <a:masterClrMapping/>
-  </p:clrMapOvr>
-  <p:timing>
-    <p:tnLst>
-      <p:par>
-        <p:cTn id="1" dur="indefinite" restart="never" nodeType="tmRoot"/>
-      </p:par>
-    </p:tnLst>
-  </p:timing>
-</p:sld>
-</file>
-
-<file path=ppt/slides/slide11.xml><?xml version="1.0" encoding="utf-8"?>
-<p:sld xmlns:a="http://schemas.openxmlformats.org/drawingml/2006/main" xmlns:r="http://schemas.openxmlformats.org/officeDocument/2006/relationships" xmlns:p="http://schemas.openxmlformats.org/presentationml/2006/main">
-  <p:cSld>
-    <p:spTree>
-      <p:nvGrpSpPr>
-        <p:cNvPr id="1" name=""/>
-        <p:cNvGrpSpPr/>
-        <p:nvPr/>
-      </p:nvGrpSpPr>
-      <p:grpSpPr>
-        <a:xfrm>
-          <a:off x="0" y="0"/>
-          <a:ext cx="0" cy="0"/>
-          <a:chOff x="0" y="0"/>
-          <a:chExt cx="0" cy="0"/>
-        </a:xfrm>
-      </p:grpSpPr>
-      <p:sp>
-        <p:nvSpPr>
-          <p:cNvPr id="2" name="Title 1"/>
-          <p:cNvSpPr>
-            <a:spLocks noGrp="1"/>
-          </p:cNvSpPr>
-          <p:nvPr>
-            <p:ph type="title"/>
-          </p:nvPr>
-        </p:nvSpPr>
-        <p:spPr/>
-        <p:txBody>
-          <a:bodyPr/>
-          <a:lstStyle/>
-          <a:p>
-            <a:r>
-              <a:rPr lang="en-US" dirty="0" smtClean="0"/>
               <a:t>Putting both together...</a:t>
             </a:r>
             <a:endParaRPr lang="en-US" dirty="0"/>
@@ -24102,10 +22673,17 @@
   <p:clrMapOvr>
     <a:masterClrMapping/>
   </p:clrMapOvr>
+  <p:timing>
+    <p:tnLst>
+      <p:par>
+        <p:cTn id="1" dur="indefinite" restart="never" nodeType="tmRoot"/>
+      </p:par>
+    </p:tnLst>
+  </p:timing>
 </p:sld>
 </file>
 
-<file path=ppt/slides/slide12.xml><?xml version="1.0" encoding="utf-8"?>
+<file path=ppt/slides/slide11.xml><?xml version="1.0" encoding="utf-8"?>
 <p:sld xmlns:a="http://schemas.openxmlformats.org/drawingml/2006/main" xmlns:r="http://schemas.openxmlformats.org/officeDocument/2006/relationships" xmlns:p="http://schemas.openxmlformats.org/presentationml/2006/main">
   <p:cSld>
     <p:spTree>
@@ -26797,6 +25375,13 @@
   <p:clrMapOvr>
     <a:masterClrMapping/>
   </p:clrMapOvr>
+  <p:timing>
+    <p:tnLst>
+      <p:par>
+        <p:cTn id="1" dur="indefinite" restart="never" nodeType="tmRoot"/>
+      </p:par>
+    </p:tnLst>
+  </p:timing>
 </p:sld>
 </file>
 
@@ -28127,7 +26712,7 @@
           </a:xfrm>
           <a:prstGeom prst="arc">
             <a:avLst>
-              <a:gd name="adj1" fmla="val 14667738"/>
+              <a:gd name="adj1" fmla="val 13284559"/>
               <a:gd name="adj2" fmla="val 0"/>
             </a:avLst>
           </a:prstGeom>
@@ -28167,8 +26752,8 @@
         </p:nvSpPr>
         <p:spPr>
           <a:xfrm>
-            <a:off x="4381500" y="5817570"/>
-            <a:ext cx="6477000" cy="646331"/>
+            <a:off x="5324474" y="5817570"/>
+            <a:ext cx="5534025" cy="646331"/>
           </a:xfrm>
           <a:prstGeom prst="rect">
             <a:avLst/>
@@ -28183,7 +26768,11 @@
           <a:p>
             <a:r>
               <a:rPr lang="en-US" sz="3600" dirty="0" smtClean="0"/>
-              <a:t>Rows you don’t care about</a:t>
+              <a:t>Rows you don’t </a:t>
+            </a:r>
+            <a:r>
+              <a:rPr lang="en-US" sz="3600" dirty="0" smtClean="0"/>
+              <a:t>want</a:t>
             </a:r>
             <a:endParaRPr lang="en-US" sz="3600" dirty="0"/>
           </a:p>
@@ -33419,7 +32008,7 @@
       </p:grpSpPr>
       <p:sp>
         <p:nvSpPr>
-          <p:cNvPr id="5" name="Title 4"/>
+          <p:cNvPr id="2" name="Title 1"/>
           <p:cNvSpPr>
             <a:spLocks noGrp="1"/>
           </p:cNvSpPr>
@@ -33434,85 +32023,1098 @@
           <a:p>
             <a:r>
               <a:rPr lang="en-US" dirty="0" smtClean="0"/>
-              <a:t>Sub-setting </a:t>
+              <a:t>Imagine a scenario:</a:t>
             </a:r>
-            <a:r>
-              <a:rPr lang="en-US" b="1" dirty="0" smtClean="0"/>
-              <a:t>columns:</a:t>
-            </a:r>
-            <a:endParaRPr lang="en-US" b="1" dirty="0">
-              <a:latin typeface="Courier New" panose="02070309020205020404" pitchFamily="49" charset="0"/>
-              <a:cs typeface="Courier New" panose="02070309020205020404" pitchFamily="49" charset="0"/>
-            </a:endParaRPr>
+            <a:endParaRPr lang="en-US" dirty="0"/>
           </a:p>
         </p:txBody>
       </p:sp>
+      <p:graphicFrame>
+        <p:nvGraphicFramePr>
+          <p:cNvPr id="3" name="Table 2"/>
+          <p:cNvGraphicFramePr>
+            <a:graphicFrameLocks noGrp="1"/>
+          </p:cNvGraphicFramePr>
+          <p:nvPr>
+            <p:extLst/>
+          </p:nvPr>
+        </p:nvGraphicFramePr>
+        <p:xfrm>
+          <a:off x="723900" y="2084832"/>
+          <a:ext cx="11036300" cy="3695255"/>
+        </p:xfrm>
+        <a:graphic>
+          <a:graphicData uri="http://schemas.openxmlformats.org/drawingml/2006/table">
+            <a:tbl>
+              <a:tblPr firstRow="1">
+                <a:tableStyleId>{EB9631B5-78F2-41C9-869B-9F39066F8104}</a:tableStyleId>
+              </a:tblPr>
+              <a:tblGrid>
+                <a:gridCol w="1103630"/>
+                <a:gridCol w="1103630"/>
+                <a:gridCol w="1103630"/>
+                <a:gridCol w="1103630"/>
+                <a:gridCol w="1103630"/>
+                <a:gridCol w="1103630"/>
+                <a:gridCol w="1103630"/>
+                <a:gridCol w="1103630"/>
+                <a:gridCol w="1103630"/>
+                <a:gridCol w="1103630"/>
+              </a:tblGrid>
+              <a:tr h="445029">
+                <a:tc>
+                  <a:txBody>
+                    <a:bodyPr/>
+                    <a:lstStyle/>
+                    <a:p>
+                      <a:endParaRPr lang="en-US" dirty="0"/>
+                    </a:p>
+                  </a:txBody>
+                  <a:tcPr/>
+                </a:tc>
+                <a:tc>
+                  <a:txBody>
+                    <a:bodyPr/>
+                    <a:lstStyle/>
+                    <a:p>
+                      <a:endParaRPr lang="en-US"/>
+                    </a:p>
+                  </a:txBody>
+                  <a:tcPr/>
+                </a:tc>
+                <a:tc>
+                  <a:txBody>
+                    <a:bodyPr/>
+                    <a:lstStyle/>
+                    <a:p>
+                      <a:endParaRPr lang="en-US" dirty="0"/>
+                    </a:p>
+                  </a:txBody>
+                  <a:tcPr>
+                    <a:solidFill>
+                      <a:schemeClr val="bg2"/>
+                    </a:solidFill>
+                  </a:tcPr>
+                </a:tc>
+                <a:tc>
+                  <a:txBody>
+                    <a:bodyPr/>
+                    <a:lstStyle/>
+                    <a:p>
+                      <a:endParaRPr lang="en-US"/>
+                    </a:p>
+                  </a:txBody>
+                  <a:tcPr>
+                    <a:solidFill>
+                      <a:schemeClr val="bg2"/>
+                    </a:solidFill>
+                  </a:tcPr>
+                </a:tc>
+                <a:tc>
+                  <a:txBody>
+                    <a:bodyPr/>
+                    <a:lstStyle/>
+                    <a:p>
+                      <a:endParaRPr lang="en-US"/>
+                    </a:p>
+                  </a:txBody>
+                  <a:tcPr>
+                    <a:solidFill>
+                      <a:schemeClr val="bg2"/>
+                    </a:solidFill>
+                  </a:tcPr>
+                </a:tc>
+                <a:tc>
+                  <a:txBody>
+                    <a:bodyPr/>
+                    <a:lstStyle/>
+                    <a:p>
+                      <a:endParaRPr lang="en-US"/>
+                    </a:p>
+                  </a:txBody>
+                  <a:tcPr>
+                    <a:solidFill>
+                      <a:schemeClr val="bg2"/>
+                    </a:solidFill>
+                  </a:tcPr>
+                </a:tc>
+                <a:tc>
+                  <a:txBody>
+                    <a:bodyPr/>
+                    <a:lstStyle/>
+                    <a:p>
+                      <a:endParaRPr lang="en-US"/>
+                    </a:p>
+                  </a:txBody>
+                  <a:tcPr/>
+                </a:tc>
+                <a:tc>
+                  <a:txBody>
+                    <a:bodyPr/>
+                    <a:lstStyle/>
+                    <a:p>
+                      <a:endParaRPr lang="en-US"/>
+                    </a:p>
+                  </a:txBody>
+                  <a:tcPr/>
+                </a:tc>
+                <a:tc>
+                  <a:txBody>
+                    <a:bodyPr/>
+                    <a:lstStyle/>
+                    <a:p>
+                      <a:endParaRPr lang="en-US"/>
+                    </a:p>
+                  </a:txBody>
+                  <a:tcPr/>
+                </a:tc>
+                <a:tc>
+                  <a:txBody>
+                    <a:bodyPr/>
+                    <a:lstStyle/>
+                    <a:p>
+                      <a:endParaRPr lang="en-US"/>
+                    </a:p>
+                  </a:txBody>
+                  <a:tcPr/>
+                </a:tc>
+              </a:tr>
+              <a:tr h="445029">
+                <a:tc>
+                  <a:txBody>
+                    <a:bodyPr/>
+                    <a:lstStyle/>
+                    <a:p>
+                      <a:endParaRPr lang="en-US" dirty="0"/>
+                    </a:p>
+                  </a:txBody>
+                  <a:tcPr/>
+                </a:tc>
+                <a:tc>
+                  <a:txBody>
+                    <a:bodyPr/>
+                    <a:lstStyle/>
+                    <a:p>
+                      <a:endParaRPr lang="en-US" dirty="0"/>
+                    </a:p>
+                  </a:txBody>
+                  <a:tcPr/>
+                </a:tc>
+                <a:tc>
+                  <a:txBody>
+                    <a:bodyPr/>
+                    <a:lstStyle/>
+                    <a:p>
+                      <a:endParaRPr lang="en-US" dirty="0"/>
+                    </a:p>
+                  </a:txBody>
+                  <a:tcPr>
+                    <a:solidFill>
+                      <a:schemeClr val="bg2"/>
+                    </a:solidFill>
+                  </a:tcPr>
+                </a:tc>
+                <a:tc>
+                  <a:txBody>
+                    <a:bodyPr/>
+                    <a:lstStyle/>
+                    <a:p>
+                      <a:endParaRPr lang="en-US" dirty="0"/>
+                    </a:p>
+                  </a:txBody>
+                  <a:tcPr>
+                    <a:solidFill>
+                      <a:schemeClr val="bg2"/>
+                    </a:solidFill>
+                  </a:tcPr>
+                </a:tc>
+                <a:tc>
+                  <a:txBody>
+                    <a:bodyPr/>
+                    <a:lstStyle/>
+                    <a:p>
+                      <a:endParaRPr lang="en-US"/>
+                    </a:p>
+                  </a:txBody>
+                  <a:tcPr>
+                    <a:solidFill>
+                      <a:schemeClr val="bg2"/>
+                    </a:solidFill>
+                  </a:tcPr>
+                </a:tc>
+                <a:tc>
+                  <a:txBody>
+                    <a:bodyPr/>
+                    <a:lstStyle/>
+                    <a:p>
+                      <a:endParaRPr lang="en-US"/>
+                    </a:p>
+                  </a:txBody>
+                  <a:tcPr>
+                    <a:solidFill>
+                      <a:schemeClr val="bg2"/>
+                    </a:solidFill>
+                  </a:tcPr>
+                </a:tc>
+                <a:tc>
+                  <a:txBody>
+                    <a:bodyPr/>
+                    <a:lstStyle/>
+                    <a:p>
+                      <a:endParaRPr lang="en-US"/>
+                    </a:p>
+                  </a:txBody>
+                  <a:tcPr/>
+                </a:tc>
+                <a:tc>
+                  <a:txBody>
+                    <a:bodyPr/>
+                    <a:lstStyle/>
+                    <a:p>
+                      <a:endParaRPr lang="en-US"/>
+                    </a:p>
+                  </a:txBody>
+                  <a:tcPr/>
+                </a:tc>
+                <a:tc>
+                  <a:txBody>
+                    <a:bodyPr/>
+                    <a:lstStyle/>
+                    <a:p>
+                      <a:endParaRPr lang="en-US"/>
+                    </a:p>
+                  </a:txBody>
+                  <a:tcPr/>
+                </a:tc>
+                <a:tc>
+                  <a:txBody>
+                    <a:bodyPr/>
+                    <a:lstStyle/>
+                    <a:p>
+                      <a:endParaRPr lang="en-US"/>
+                    </a:p>
+                  </a:txBody>
+                  <a:tcPr/>
+                </a:tc>
+              </a:tr>
+              <a:tr h="445029">
+                <a:tc>
+                  <a:txBody>
+                    <a:bodyPr/>
+                    <a:lstStyle/>
+                    <a:p>
+                      <a:endParaRPr lang="en-US" dirty="0"/>
+                    </a:p>
+                  </a:txBody>
+                  <a:tcPr/>
+                </a:tc>
+                <a:tc>
+                  <a:txBody>
+                    <a:bodyPr/>
+                    <a:lstStyle/>
+                    <a:p>
+                      <a:endParaRPr lang="en-US" dirty="0"/>
+                    </a:p>
+                  </a:txBody>
+                  <a:tcPr/>
+                </a:tc>
+                <a:tc>
+                  <a:txBody>
+                    <a:bodyPr/>
+                    <a:lstStyle/>
+                    <a:p>
+                      <a:endParaRPr lang="en-US" dirty="0"/>
+                    </a:p>
+                  </a:txBody>
+                  <a:tcPr>
+                    <a:solidFill>
+                      <a:schemeClr val="bg2"/>
+                    </a:solidFill>
+                  </a:tcPr>
+                </a:tc>
+                <a:tc>
+                  <a:txBody>
+                    <a:bodyPr/>
+                    <a:lstStyle/>
+                    <a:p>
+                      <a:endParaRPr lang="en-US" dirty="0"/>
+                    </a:p>
+                  </a:txBody>
+                  <a:tcPr>
+                    <a:solidFill>
+                      <a:schemeClr val="bg2"/>
+                    </a:solidFill>
+                  </a:tcPr>
+                </a:tc>
+                <a:tc>
+                  <a:txBody>
+                    <a:bodyPr/>
+                    <a:lstStyle/>
+                    <a:p>
+                      <a:endParaRPr lang="en-US"/>
+                    </a:p>
+                  </a:txBody>
+                  <a:tcPr>
+                    <a:solidFill>
+                      <a:schemeClr val="bg2"/>
+                    </a:solidFill>
+                  </a:tcPr>
+                </a:tc>
+                <a:tc>
+                  <a:txBody>
+                    <a:bodyPr/>
+                    <a:lstStyle/>
+                    <a:p>
+                      <a:endParaRPr lang="en-US"/>
+                    </a:p>
+                  </a:txBody>
+                  <a:tcPr>
+                    <a:solidFill>
+                      <a:schemeClr val="bg2"/>
+                    </a:solidFill>
+                  </a:tcPr>
+                </a:tc>
+                <a:tc>
+                  <a:txBody>
+                    <a:bodyPr/>
+                    <a:lstStyle/>
+                    <a:p>
+                      <a:endParaRPr lang="en-US"/>
+                    </a:p>
+                  </a:txBody>
+                  <a:tcPr/>
+                </a:tc>
+                <a:tc>
+                  <a:txBody>
+                    <a:bodyPr/>
+                    <a:lstStyle/>
+                    <a:p>
+                      <a:endParaRPr lang="en-US"/>
+                    </a:p>
+                  </a:txBody>
+                  <a:tcPr/>
+                </a:tc>
+                <a:tc>
+                  <a:txBody>
+                    <a:bodyPr/>
+                    <a:lstStyle/>
+                    <a:p>
+                      <a:endParaRPr lang="en-US"/>
+                    </a:p>
+                  </a:txBody>
+                  <a:tcPr/>
+                </a:tc>
+                <a:tc>
+                  <a:txBody>
+                    <a:bodyPr/>
+                    <a:lstStyle/>
+                    <a:p>
+                      <a:endParaRPr lang="en-US"/>
+                    </a:p>
+                  </a:txBody>
+                  <a:tcPr/>
+                </a:tc>
+              </a:tr>
+              <a:tr h="445029">
+                <a:tc>
+                  <a:txBody>
+                    <a:bodyPr/>
+                    <a:lstStyle/>
+                    <a:p>
+                      <a:endParaRPr lang="en-US" dirty="0"/>
+                    </a:p>
+                  </a:txBody>
+                  <a:tcPr>
+                    <a:solidFill>
+                      <a:schemeClr val="bg2"/>
+                    </a:solidFill>
+                  </a:tcPr>
+                </a:tc>
+                <a:tc>
+                  <a:txBody>
+                    <a:bodyPr/>
+                    <a:lstStyle/>
+                    <a:p>
+                      <a:endParaRPr lang="en-US" dirty="0"/>
+                    </a:p>
+                  </a:txBody>
+                  <a:tcPr>
+                    <a:solidFill>
+                      <a:schemeClr val="bg2"/>
+                    </a:solidFill>
+                  </a:tcPr>
+                </a:tc>
+                <a:tc>
+                  <a:txBody>
+                    <a:bodyPr/>
+                    <a:lstStyle/>
+                    <a:p>
+                      <a:endParaRPr lang="en-US"/>
+                    </a:p>
+                  </a:txBody>
+                  <a:tcPr>
+                    <a:solidFill>
+                      <a:schemeClr val="bg2"/>
+                    </a:solidFill>
+                  </a:tcPr>
+                </a:tc>
+                <a:tc>
+                  <a:txBody>
+                    <a:bodyPr/>
+                    <a:lstStyle/>
+                    <a:p>
+                      <a:endParaRPr lang="en-US"/>
+                    </a:p>
+                  </a:txBody>
+                  <a:tcPr>
+                    <a:solidFill>
+                      <a:schemeClr val="bg2"/>
+                    </a:solidFill>
+                  </a:tcPr>
+                </a:tc>
+                <a:tc>
+                  <a:txBody>
+                    <a:bodyPr/>
+                    <a:lstStyle/>
+                    <a:p>
+                      <a:endParaRPr lang="en-US" dirty="0"/>
+                    </a:p>
+                  </a:txBody>
+                  <a:tcPr>
+                    <a:solidFill>
+                      <a:schemeClr val="bg2"/>
+                    </a:solidFill>
+                  </a:tcPr>
+                </a:tc>
+                <a:tc>
+                  <a:txBody>
+                    <a:bodyPr/>
+                    <a:lstStyle/>
+                    <a:p>
+                      <a:endParaRPr lang="en-US"/>
+                    </a:p>
+                  </a:txBody>
+                  <a:tcPr>
+                    <a:solidFill>
+                      <a:schemeClr val="bg2"/>
+                    </a:solidFill>
+                  </a:tcPr>
+                </a:tc>
+                <a:tc>
+                  <a:txBody>
+                    <a:bodyPr/>
+                    <a:lstStyle/>
+                    <a:p>
+                      <a:endParaRPr lang="en-US" dirty="0"/>
+                    </a:p>
+                  </a:txBody>
+                  <a:tcPr>
+                    <a:solidFill>
+                      <a:schemeClr val="bg2"/>
+                    </a:solidFill>
+                  </a:tcPr>
+                </a:tc>
+                <a:tc>
+                  <a:txBody>
+                    <a:bodyPr/>
+                    <a:lstStyle/>
+                    <a:p>
+                      <a:endParaRPr lang="en-US" dirty="0"/>
+                    </a:p>
+                  </a:txBody>
+                  <a:tcPr>
+                    <a:solidFill>
+                      <a:schemeClr val="bg2"/>
+                    </a:solidFill>
+                  </a:tcPr>
+                </a:tc>
+                <a:tc>
+                  <a:txBody>
+                    <a:bodyPr/>
+                    <a:lstStyle/>
+                    <a:p>
+                      <a:endParaRPr lang="en-US"/>
+                    </a:p>
+                  </a:txBody>
+                  <a:tcPr>
+                    <a:solidFill>
+                      <a:schemeClr val="bg2"/>
+                    </a:solidFill>
+                  </a:tcPr>
+                </a:tc>
+                <a:tc>
+                  <a:txBody>
+                    <a:bodyPr/>
+                    <a:lstStyle/>
+                    <a:p>
+                      <a:endParaRPr lang="en-US"/>
+                    </a:p>
+                  </a:txBody>
+                  <a:tcPr>
+                    <a:solidFill>
+                      <a:schemeClr val="bg2"/>
+                    </a:solidFill>
+                  </a:tcPr>
+                </a:tc>
+              </a:tr>
+              <a:tr h="580052">
+                <a:tc>
+                  <a:txBody>
+                    <a:bodyPr/>
+                    <a:lstStyle/>
+                    <a:p>
+                      <a:endParaRPr lang="en-US" dirty="0"/>
+                    </a:p>
+                  </a:txBody>
+                  <a:tcPr>
+                    <a:solidFill>
+                      <a:schemeClr val="bg2"/>
+                    </a:solidFill>
+                  </a:tcPr>
+                </a:tc>
+                <a:tc>
+                  <a:txBody>
+                    <a:bodyPr/>
+                    <a:lstStyle/>
+                    <a:p>
+                      <a:endParaRPr lang="en-US" dirty="0"/>
+                    </a:p>
+                  </a:txBody>
+                  <a:tcPr>
+                    <a:solidFill>
+                      <a:schemeClr val="bg2"/>
+                    </a:solidFill>
+                  </a:tcPr>
+                </a:tc>
+                <a:tc>
+                  <a:txBody>
+                    <a:bodyPr/>
+                    <a:lstStyle/>
+                    <a:p>
+                      <a:endParaRPr lang="en-US"/>
+                    </a:p>
+                  </a:txBody>
+                  <a:tcPr>
+                    <a:solidFill>
+                      <a:schemeClr val="bg2"/>
+                    </a:solidFill>
+                  </a:tcPr>
+                </a:tc>
+                <a:tc>
+                  <a:txBody>
+                    <a:bodyPr/>
+                    <a:lstStyle/>
+                    <a:p>
+                      <a:endParaRPr lang="en-US" dirty="0"/>
+                    </a:p>
+                  </a:txBody>
+                  <a:tcPr>
+                    <a:solidFill>
+                      <a:schemeClr val="bg2"/>
+                    </a:solidFill>
+                  </a:tcPr>
+                </a:tc>
+                <a:tc>
+                  <a:txBody>
+                    <a:bodyPr/>
+                    <a:lstStyle/>
+                    <a:p>
+                      <a:endParaRPr lang="en-US" dirty="0"/>
+                    </a:p>
+                  </a:txBody>
+                  <a:tcPr>
+                    <a:solidFill>
+                      <a:schemeClr val="bg2"/>
+                    </a:solidFill>
+                  </a:tcPr>
+                </a:tc>
+                <a:tc>
+                  <a:txBody>
+                    <a:bodyPr/>
+                    <a:lstStyle/>
+                    <a:p>
+                      <a:endParaRPr lang="en-US" dirty="0"/>
+                    </a:p>
+                  </a:txBody>
+                  <a:tcPr>
+                    <a:solidFill>
+                      <a:schemeClr val="bg2"/>
+                    </a:solidFill>
+                  </a:tcPr>
+                </a:tc>
+                <a:tc>
+                  <a:txBody>
+                    <a:bodyPr/>
+                    <a:lstStyle/>
+                    <a:p>
+                      <a:endParaRPr lang="en-US" dirty="0"/>
+                    </a:p>
+                  </a:txBody>
+                  <a:tcPr>
+                    <a:solidFill>
+                      <a:schemeClr val="bg2"/>
+                    </a:solidFill>
+                  </a:tcPr>
+                </a:tc>
+                <a:tc>
+                  <a:txBody>
+                    <a:bodyPr/>
+                    <a:lstStyle/>
+                    <a:p>
+                      <a:endParaRPr lang="en-US" dirty="0"/>
+                    </a:p>
+                  </a:txBody>
+                  <a:tcPr>
+                    <a:solidFill>
+                      <a:schemeClr val="bg2"/>
+                    </a:solidFill>
+                  </a:tcPr>
+                </a:tc>
+                <a:tc>
+                  <a:txBody>
+                    <a:bodyPr/>
+                    <a:lstStyle/>
+                    <a:p>
+                      <a:endParaRPr lang="en-US" dirty="0"/>
+                    </a:p>
+                  </a:txBody>
+                  <a:tcPr>
+                    <a:solidFill>
+                      <a:schemeClr val="bg2"/>
+                    </a:solidFill>
+                  </a:tcPr>
+                </a:tc>
+                <a:tc>
+                  <a:txBody>
+                    <a:bodyPr/>
+                    <a:lstStyle/>
+                    <a:p>
+                      <a:endParaRPr lang="en-US" dirty="0"/>
+                    </a:p>
+                  </a:txBody>
+                  <a:tcPr>
+                    <a:solidFill>
+                      <a:schemeClr val="bg2"/>
+                    </a:solidFill>
+                  </a:tcPr>
+                </a:tc>
+              </a:tr>
+              <a:tr h="445029">
+                <a:tc>
+                  <a:txBody>
+                    <a:bodyPr/>
+                    <a:lstStyle/>
+                    <a:p>
+                      <a:endParaRPr lang="en-US" dirty="0"/>
+                    </a:p>
+                  </a:txBody>
+                  <a:tcPr>
+                    <a:solidFill>
+                      <a:schemeClr val="bg2"/>
+                    </a:solidFill>
+                  </a:tcPr>
+                </a:tc>
+                <a:tc>
+                  <a:txBody>
+                    <a:bodyPr/>
+                    <a:lstStyle/>
+                    <a:p>
+                      <a:endParaRPr lang="en-US" dirty="0"/>
+                    </a:p>
+                  </a:txBody>
+                  <a:tcPr>
+                    <a:solidFill>
+                      <a:schemeClr val="bg2"/>
+                    </a:solidFill>
+                  </a:tcPr>
+                </a:tc>
+                <a:tc>
+                  <a:txBody>
+                    <a:bodyPr/>
+                    <a:lstStyle/>
+                    <a:p>
+                      <a:endParaRPr lang="en-US"/>
+                    </a:p>
+                  </a:txBody>
+                  <a:tcPr>
+                    <a:solidFill>
+                      <a:schemeClr val="bg2"/>
+                    </a:solidFill>
+                  </a:tcPr>
+                </a:tc>
+                <a:tc>
+                  <a:txBody>
+                    <a:bodyPr/>
+                    <a:lstStyle/>
+                    <a:p>
+                      <a:endParaRPr lang="en-US"/>
+                    </a:p>
+                  </a:txBody>
+                  <a:tcPr>
+                    <a:solidFill>
+                      <a:schemeClr val="bg2"/>
+                    </a:solidFill>
+                  </a:tcPr>
+                </a:tc>
+                <a:tc>
+                  <a:txBody>
+                    <a:bodyPr/>
+                    <a:lstStyle/>
+                    <a:p>
+                      <a:endParaRPr lang="en-US"/>
+                    </a:p>
+                  </a:txBody>
+                  <a:tcPr>
+                    <a:solidFill>
+                      <a:schemeClr val="bg2"/>
+                    </a:solidFill>
+                  </a:tcPr>
+                </a:tc>
+                <a:tc>
+                  <a:txBody>
+                    <a:bodyPr/>
+                    <a:lstStyle/>
+                    <a:p>
+                      <a:endParaRPr lang="en-US" dirty="0"/>
+                    </a:p>
+                  </a:txBody>
+                  <a:tcPr>
+                    <a:solidFill>
+                      <a:schemeClr val="bg2"/>
+                    </a:solidFill>
+                  </a:tcPr>
+                </a:tc>
+                <a:tc>
+                  <a:txBody>
+                    <a:bodyPr/>
+                    <a:lstStyle/>
+                    <a:p>
+                      <a:endParaRPr lang="en-US" dirty="0"/>
+                    </a:p>
+                  </a:txBody>
+                  <a:tcPr>
+                    <a:solidFill>
+                      <a:schemeClr val="bg2"/>
+                    </a:solidFill>
+                  </a:tcPr>
+                </a:tc>
+                <a:tc>
+                  <a:txBody>
+                    <a:bodyPr/>
+                    <a:lstStyle/>
+                    <a:p>
+                      <a:endParaRPr lang="en-US" dirty="0"/>
+                    </a:p>
+                  </a:txBody>
+                  <a:tcPr>
+                    <a:solidFill>
+                      <a:schemeClr val="bg2"/>
+                    </a:solidFill>
+                  </a:tcPr>
+                </a:tc>
+                <a:tc>
+                  <a:txBody>
+                    <a:bodyPr/>
+                    <a:lstStyle/>
+                    <a:p>
+                      <a:endParaRPr lang="en-US"/>
+                    </a:p>
+                  </a:txBody>
+                  <a:tcPr>
+                    <a:solidFill>
+                      <a:schemeClr val="bg2"/>
+                    </a:solidFill>
+                  </a:tcPr>
+                </a:tc>
+                <a:tc>
+                  <a:txBody>
+                    <a:bodyPr/>
+                    <a:lstStyle/>
+                    <a:p>
+                      <a:endParaRPr lang="en-US" dirty="0"/>
+                    </a:p>
+                  </a:txBody>
+                  <a:tcPr>
+                    <a:solidFill>
+                      <a:schemeClr val="bg2"/>
+                    </a:solidFill>
+                  </a:tcPr>
+                </a:tc>
+              </a:tr>
+              <a:tr h="445029">
+                <a:tc>
+                  <a:txBody>
+                    <a:bodyPr/>
+                    <a:lstStyle/>
+                    <a:p>
+                      <a:endParaRPr lang="en-US" dirty="0"/>
+                    </a:p>
+                  </a:txBody>
+                  <a:tcPr>
+                    <a:solidFill>
+                      <a:schemeClr val="bg2"/>
+                    </a:solidFill>
+                  </a:tcPr>
+                </a:tc>
+                <a:tc>
+                  <a:txBody>
+                    <a:bodyPr/>
+                    <a:lstStyle/>
+                    <a:p>
+                      <a:endParaRPr lang="en-US" dirty="0"/>
+                    </a:p>
+                  </a:txBody>
+                  <a:tcPr>
+                    <a:solidFill>
+                      <a:schemeClr val="bg2"/>
+                    </a:solidFill>
+                  </a:tcPr>
+                </a:tc>
+                <a:tc>
+                  <a:txBody>
+                    <a:bodyPr/>
+                    <a:lstStyle/>
+                    <a:p>
+                      <a:endParaRPr lang="en-US"/>
+                    </a:p>
+                  </a:txBody>
+                  <a:tcPr>
+                    <a:solidFill>
+                      <a:schemeClr val="bg2"/>
+                    </a:solidFill>
+                  </a:tcPr>
+                </a:tc>
+                <a:tc>
+                  <a:txBody>
+                    <a:bodyPr/>
+                    <a:lstStyle/>
+                    <a:p>
+                      <a:endParaRPr lang="en-US"/>
+                    </a:p>
+                  </a:txBody>
+                  <a:tcPr>
+                    <a:solidFill>
+                      <a:schemeClr val="bg2"/>
+                    </a:solidFill>
+                  </a:tcPr>
+                </a:tc>
+                <a:tc>
+                  <a:txBody>
+                    <a:bodyPr/>
+                    <a:lstStyle/>
+                    <a:p>
+                      <a:endParaRPr lang="en-US"/>
+                    </a:p>
+                  </a:txBody>
+                  <a:tcPr>
+                    <a:solidFill>
+                      <a:schemeClr val="bg2"/>
+                    </a:solidFill>
+                  </a:tcPr>
+                </a:tc>
+                <a:tc>
+                  <a:txBody>
+                    <a:bodyPr/>
+                    <a:lstStyle/>
+                    <a:p>
+                      <a:endParaRPr lang="en-US" dirty="0"/>
+                    </a:p>
+                  </a:txBody>
+                  <a:tcPr>
+                    <a:solidFill>
+                      <a:schemeClr val="bg2"/>
+                    </a:solidFill>
+                  </a:tcPr>
+                </a:tc>
+                <a:tc>
+                  <a:txBody>
+                    <a:bodyPr/>
+                    <a:lstStyle/>
+                    <a:p>
+                      <a:endParaRPr lang="en-US"/>
+                    </a:p>
+                  </a:txBody>
+                  <a:tcPr>
+                    <a:solidFill>
+                      <a:schemeClr val="bg2"/>
+                    </a:solidFill>
+                  </a:tcPr>
+                </a:tc>
+                <a:tc>
+                  <a:txBody>
+                    <a:bodyPr/>
+                    <a:lstStyle/>
+                    <a:p>
+                      <a:endParaRPr lang="en-US" dirty="0"/>
+                    </a:p>
+                  </a:txBody>
+                  <a:tcPr>
+                    <a:solidFill>
+                      <a:schemeClr val="bg2"/>
+                    </a:solidFill>
+                  </a:tcPr>
+                </a:tc>
+                <a:tc>
+                  <a:txBody>
+                    <a:bodyPr/>
+                    <a:lstStyle/>
+                    <a:p>
+                      <a:endParaRPr lang="en-US" dirty="0"/>
+                    </a:p>
+                  </a:txBody>
+                  <a:tcPr>
+                    <a:solidFill>
+                      <a:schemeClr val="bg2"/>
+                    </a:solidFill>
+                  </a:tcPr>
+                </a:tc>
+                <a:tc>
+                  <a:txBody>
+                    <a:bodyPr/>
+                    <a:lstStyle/>
+                    <a:p>
+                      <a:endParaRPr lang="en-US" dirty="0"/>
+                    </a:p>
+                  </a:txBody>
+                  <a:tcPr>
+                    <a:solidFill>
+                      <a:schemeClr val="bg2"/>
+                    </a:solidFill>
+                  </a:tcPr>
+                </a:tc>
+              </a:tr>
+              <a:tr h="445029">
+                <a:tc>
+                  <a:txBody>
+                    <a:bodyPr/>
+                    <a:lstStyle/>
+                    <a:p>
+                      <a:endParaRPr lang="en-US" dirty="0"/>
+                    </a:p>
+                  </a:txBody>
+                  <a:tcPr/>
+                </a:tc>
+                <a:tc>
+                  <a:txBody>
+                    <a:bodyPr/>
+                    <a:lstStyle/>
+                    <a:p>
+                      <a:endParaRPr lang="en-US" dirty="0"/>
+                    </a:p>
+                  </a:txBody>
+                  <a:tcPr/>
+                </a:tc>
+                <a:tc>
+                  <a:txBody>
+                    <a:bodyPr/>
+                    <a:lstStyle/>
+                    <a:p>
+                      <a:endParaRPr lang="en-US"/>
+                    </a:p>
+                  </a:txBody>
+                  <a:tcPr>
+                    <a:solidFill>
+                      <a:schemeClr val="bg2"/>
+                    </a:solidFill>
+                  </a:tcPr>
+                </a:tc>
+                <a:tc>
+                  <a:txBody>
+                    <a:bodyPr/>
+                    <a:lstStyle/>
+                    <a:p>
+                      <a:endParaRPr lang="en-US"/>
+                    </a:p>
+                  </a:txBody>
+                  <a:tcPr>
+                    <a:solidFill>
+                      <a:schemeClr val="bg2"/>
+                    </a:solidFill>
+                  </a:tcPr>
+                </a:tc>
+                <a:tc>
+                  <a:txBody>
+                    <a:bodyPr/>
+                    <a:lstStyle/>
+                    <a:p>
+                      <a:endParaRPr lang="en-US"/>
+                    </a:p>
+                  </a:txBody>
+                  <a:tcPr>
+                    <a:solidFill>
+                      <a:schemeClr val="bg2"/>
+                    </a:solidFill>
+                  </a:tcPr>
+                </a:tc>
+                <a:tc>
+                  <a:txBody>
+                    <a:bodyPr/>
+                    <a:lstStyle/>
+                    <a:p>
+                      <a:endParaRPr lang="en-US" dirty="0"/>
+                    </a:p>
+                  </a:txBody>
+                  <a:tcPr>
+                    <a:solidFill>
+                      <a:schemeClr val="bg2"/>
+                    </a:solidFill>
+                  </a:tcPr>
+                </a:tc>
+                <a:tc>
+                  <a:txBody>
+                    <a:bodyPr/>
+                    <a:lstStyle/>
+                    <a:p>
+                      <a:endParaRPr lang="en-US"/>
+                    </a:p>
+                  </a:txBody>
+                  <a:tcPr/>
+                </a:tc>
+                <a:tc>
+                  <a:txBody>
+                    <a:bodyPr/>
+                    <a:lstStyle/>
+                    <a:p>
+                      <a:endParaRPr lang="en-US"/>
+                    </a:p>
+                  </a:txBody>
+                  <a:tcPr/>
+                </a:tc>
+                <a:tc>
+                  <a:txBody>
+                    <a:bodyPr/>
+                    <a:lstStyle/>
+                    <a:p>
+                      <a:endParaRPr lang="en-US" dirty="0"/>
+                    </a:p>
+                  </a:txBody>
+                  <a:tcPr/>
+                </a:tc>
+                <a:tc>
+                  <a:txBody>
+                    <a:bodyPr/>
+                    <a:lstStyle/>
+                    <a:p>
+                      <a:endParaRPr lang="en-US" dirty="0"/>
+                    </a:p>
+                  </a:txBody>
+                  <a:tcPr/>
+                </a:tc>
+              </a:tr>
+            </a:tbl>
+          </a:graphicData>
+        </a:graphic>
+      </p:graphicFrame>
       <p:sp>
         <p:nvSpPr>
-          <p:cNvPr id="85" name="Rectangle 84"/>
-          <p:cNvSpPr/>
-          <p:nvPr/>
-        </p:nvSpPr>
-        <p:spPr>
-          <a:xfrm>
-            <a:off x="1024128" y="1531094"/>
-            <a:ext cx="5692075" cy="584775"/>
-          </a:xfrm>
-          <a:prstGeom prst="rect">
-            <a:avLst/>
-          </a:prstGeom>
-        </p:spPr>
-        <p:txBody>
-          <a:bodyPr wrap="square">
-            <a:spAutoFit/>
-          </a:bodyPr>
-          <a:lstStyle/>
-          <a:p>
-            <a:r>
-              <a:rPr lang="en-US" sz="3200" b="1" dirty="0" smtClean="0">
-                <a:latin typeface="Courier New" panose="02070309020205020404" pitchFamily="49" charset="0"/>
-                <a:cs typeface="Courier New" panose="02070309020205020404" pitchFamily="49" charset="0"/>
-              </a:rPr>
-              <a:t>filter() </a:t>
-            </a:r>
-            <a:r>
-              <a:rPr lang="en-US" sz="3200" cap="all" spc="100" dirty="0" smtClean="0">
-                <a:solidFill>
-                  <a:schemeClr val="tx1">
-                    <a:lumMod val="95000"/>
-                    <a:lumOff val="5000"/>
-                  </a:schemeClr>
-                </a:solidFill>
-                <a:latin typeface="+mj-lt"/>
-                <a:ea typeface="+mj-ea"/>
-                <a:cs typeface="+mj-cs"/>
-              </a:rPr>
-              <a:t>quiz</a:t>
-            </a:r>
-            <a:endParaRPr lang="en-US" sz="3200" cap="all" spc="100" dirty="0">
-              <a:solidFill>
-                <a:schemeClr val="tx1">
-                  <a:lumMod val="95000"/>
-                  <a:lumOff val="5000"/>
-                </a:schemeClr>
-              </a:solidFill>
-              <a:latin typeface="+mj-lt"/>
-              <a:ea typeface="+mj-ea"/>
-              <a:cs typeface="+mj-cs"/>
-            </a:endParaRPr>
-          </a:p>
-        </p:txBody>
-      </p:sp>
-      <p:sp>
-        <p:nvSpPr>
-          <p:cNvPr id="2" name="TextBox 1"/>
+          <p:cNvPr id="4" name="TextBox 3"/>
           <p:cNvSpPr txBox="1"/>
           <p:nvPr/>
         </p:nvSpPr>
         <p:spPr>
           <a:xfrm>
-            <a:off x="879761" y="2300568"/>
-            <a:ext cx="10477500" cy="1384995"/>
+            <a:off x="6379285" y="168916"/>
+            <a:ext cx="5380915" cy="1200329"/>
           </a:xfrm>
           <a:prstGeom prst="rect">
             <a:avLst/>
@@ -33526,54 +33128,17 @@
           <a:lstStyle/>
           <a:p>
             <a:r>
-              <a:rPr lang="en-US" sz="2800" dirty="0" smtClean="0"/>
-              <a:t>You have data, </a:t>
+              <a:rPr lang="en-US" sz="3600" dirty="0" smtClean="0"/>
+              <a:t>Columns you’re interested in – get with </a:t>
             </a:r>
             <a:r>
-              <a:rPr lang="en-US" sz="2800" dirty="0" err="1" smtClean="0">
+              <a:rPr lang="en-US" sz="3600" dirty="0" smtClean="0">
                 <a:latin typeface="Courier New" panose="02070309020205020404" pitchFamily="49" charset="0"/>
                 <a:cs typeface="Courier New" panose="02070309020205020404" pitchFamily="49" charset="0"/>
               </a:rPr>
-              <a:t>some_data</a:t>
+              <a:t>select()</a:t>
             </a:r>
-            <a:r>
-              <a:rPr lang="en-US" sz="2800" dirty="0" smtClean="0">
-                <a:latin typeface="Courier New" panose="02070309020205020404" pitchFamily="49" charset="0"/>
-                <a:cs typeface="Courier New" panose="02070309020205020404" pitchFamily="49" charset="0"/>
-              </a:rPr>
-              <a:t>, </a:t>
-            </a:r>
-            <a:r>
-              <a:rPr lang="en-US" sz="2800" dirty="0" smtClean="0"/>
-              <a:t>and want to take and keep a subset where </a:t>
-            </a:r>
-            <a:r>
-              <a:rPr lang="en-US" sz="2800" dirty="0" err="1" smtClean="0">
-                <a:latin typeface="Courier New" panose="02070309020205020404" pitchFamily="49" charset="0"/>
-                <a:cs typeface="Courier New" panose="02070309020205020404" pitchFamily="49" charset="0"/>
-              </a:rPr>
-              <a:t>colD</a:t>
-            </a:r>
-            <a:r>
-              <a:rPr lang="en-US" sz="2800" dirty="0" smtClean="0"/>
-              <a:t> is over 65 and </a:t>
-            </a:r>
-            <a:r>
-              <a:rPr lang="en-US" sz="2800" dirty="0" err="1" smtClean="0">
-                <a:latin typeface="Courier New" panose="02070309020205020404" pitchFamily="49" charset="0"/>
-                <a:cs typeface="Courier New" panose="02070309020205020404" pitchFamily="49" charset="0"/>
-              </a:rPr>
-              <a:t>colE</a:t>
-            </a:r>
-            <a:r>
-              <a:rPr lang="en-US" sz="2800" dirty="0" smtClean="0"/>
-              <a:t> is exactly 1. </a:t>
-            </a:r>
-            <a:r>
-              <a:rPr lang="en-US" sz="2800" b="1" dirty="0" smtClean="0"/>
-              <a:t>Put the following code snippets together to do this.</a:t>
-            </a:r>
-            <a:endParaRPr lang="en-US" sz="2800" b="1" dirty="0">
+            <a:endParaRPr lang="en-US" sz="3600" dirty="0">
               <a:latin typeface="Courier New" panose="02070309020205020404" pitchFamily="49" charset="0"/>
               <a:cs typeface="Courier New" panose="02070309020205020404" pitchFamily="49" charset="0"/>
             </a:endParaRPr>
@@ -33582,14 +33147,14 @@
       </p:sp>
       <p:sp>
         <p:nvSpPr>
-          <p:cNvPr id="26" name="TextBox 25"/>
+          <p:cNvPr id="12" name="TextBox 11"/>
           <p:cNvSpPr txBox="1"/>
           <p:nvPr/>
         </p:nvSpPr>
         <p:spPr>
           <a:xfrm>
-            <a:off x="6716203" y="3762539"/>
-            <a:ext cx="2542592" cy="1384995"/>
+            <a:off x="215153" y="5951371"/>
+            <a:ext cx="10428194" cy="646331"/>
           </a:xfrm>
           <a:prstGeom prst="rect">
             <a:avLst/>
@@ -33597,280 +33162,123 @@
           <a:noFill/>
         </p:spPr>
         <p:txBody>
-          <a:bodyPr wrap="square" numCol="1" rtlCol="0">
+          <a:bodyPr wrap="square" rtlCol="0">
             <a:spAutoFit/>
           </a:bodyPr>
           <a:lstStyle/>
           <a:p>
             <a:r>
-              <a:rPr lang="en-US" sz="2800" dirty="0" smtClean="0">
+              <a:rPr lang="en-US" sz="3600" dirty="0" smtClean="0"/>
+              <a:t>Rows you care about – get them with </a:t>
+            </a:r>
+            <a:r>
+              <a:rPr lang="en-US" sz="3600" dirty="0" smtClean="0">
                 <a:latin typeface="Courier New" panose="02070309020205020404" pitchFamily="49" charset="0"/>
                 <a:cs typeface="Courier New" panose="02070309020205020404" pitchFamily="49" charset="0"/>
               </a:rPr>
-              <a:t>,</a:t>
+              <a:t>filter()</a:t>
             </a:r>
-            <a:r>
-              <a:rPr lang="en-US" sz="2800" dirty="0" err="1" smtClean="0">
-                <a:latin typeface="Courier New" panose="02070309020205020404" pitchFamily="49" charset="0"/>
-                <a:cs typeface="Courier New" panose="02070309020205020404" pitchFamily="49" charset="0"/>
-              </a:rPr>
-              <a:t>colE</a:t>
-            </a:r>
-            <a:r>
-              <a:rPr lang="en-US" sz="2800" dirty="0" smtClean="0">
-                <a:latin typeface="Courier New" panose="02070309020205020404" pitchFamily="49" charset="0"/>
-                <a:cs typeface="Courier New" panose="02070309020205020404" pitchFamily="49" charset="0"/>
-              </a:rPr>
-              <a:t> == 1)</a:t>
-            </a:r>
-          </a:p>
-          <a:p>
-            <a:endParaRPr lang="en-US" sz="2800" dirty="0" smtClean="0">
-              <a:latin typeface="Courier New" panose="02070309020205020404" pitchFamily="49" charset="0"/>
-              <a:cs typeface="Courier New" panose="02070309020205020404" pitchFamily="49" charset="0"/>
-            </a:endParaRPr>
-          </a:p>
-          <a:p>
-            <a:r>
-              <a:rPr lang="en-US" sz="2800" dirty="0" err="1" smtClean="0">
-                <a:latin typeface="Courier New" panose="02070309020205020404" pitchFamily="49" charset="0"/>
-                <a:cs typeface="Courier New" panose="02070309020205020404" pitchFamily="49" charset="0"/>
-              </a:rPr>
-              <a:t>new_data</a:t>
-            </a:r>
-            <a:r>
-              <a:rPr lang="en-US" sz="2800" dirty="0" smtClean="0">
-                <a:latin typeface="Courier New" panose="02070309020205020404" pitchFamily="49" charset="0"/>
-                <a:cs typeface="Courier New" panose="02070309020205020404" pitchFamily="49" charset="0"/>
-              </a:rPr>
-              <a:t> &lt;-</a:t>
-            </a:r>
-          </a:p>
-        </p:txBody>
-      </p:sp>
-      <p:pic>
-        <p:nvPicPr>
-          <p:cNvPr id="8" name="Content Placeholder 5"/>
-          <p:cNvPicPr>
-            <a:picLocks noChangeAspect="1"/>
-          </p:cNvPicPr>
-          <p:nvPr/>
-        </p:nvPicPr>
-        <p:blipFill>
-          <a:blip r:embed="rId3" cstate="print">
-            <a:extLst>
-              <a:ext uri="{28A0092B-C50C-407E-A947-70E740481C1C}">
-                <a14:useLocalDpi xmlns:a14="http://schemas.microsoft.com/office/drawing/2010/main" val="0"/>
-              </a:ext>
-            </a:extLst>
-          </a:blip>
-          <a:stretch>
-            <a:fillRect/>
-          </a:stretch>
-        </p:blipFill>
-        <p:spPr>
-          <a:xfrm>
-            <a:off x="10858501" y="237198"/>
-            <a:ext cx="1115114" cy="1293896"/>
-          </a:xfrm>
-          <a:prstGeom prst="rect">
-            <a:avLst/>
-          </a:prstGeom>
-        </p:spPr>
-      </p:pic>
-      <p:pic>
-        <p:nvPicPr>
-          <p:cNvPr id="9" name="Picture 8"/>
-          <p:cNvPicPr>
-            <a:picLocks noChangeAspect="1"/>
-          </p:cNvPicPr>
-          <p:nvPr/>
-        </p:nvPicPr>
-        <p:blipFill>
-          <a:blip r:embed="rId4" cstate="print">
-            <a:extLst>
-              <a:ext uri="{28A0092B-C50C-407E-A947-70E740481C1C}">
-                <a14:useLocalDpi xmlns:a14="http://schemas.microsoft.com/office/drawing/2010/main" val="0"/>
-              </a:ext>
-            </a:extLst>
-          </a:blip>
-          <a:stretch>
-            <a:fillRect/>
-          </a:stretch>
-        </p:blipFill>
-        <p:spPr>
-          <a:xfrm>
-            <a:off x="9421153" y="25666"/>
-            <a:ext cx="1380198" cy="1693043"/>
-          </a:xfrm>
-          <a:prstGeom prst="rect">
-            <a:avLst/>
-          </a:prstGeom>
-        </p:spPr>
-      </p:pic>
-      <p:sp>
-        <p:nvSpPr>
-          <p:cNvPr id="4" name="Rectangle 3"/>
-          <p:cNvSpPr/>
-          <p:nvPr/>
-        </p:nvSpPr>
-        <p:spPr>
-          <a:xfrm>
-            <a:off x="571584" y="5625100"/>
-            <a:ext cx="11093854" cy="523220"/>
-          </a:xfrm>
-          <a:prstGeom prst="rect">
-            <a:avLst/>
-          </a:prstGeom>
-        </p:spPr>
-        <p:txBody>
-          <a:bodyPr wrap="square">
-            <a:spAutoFit/>
-          </a:bodyPr>
-          <a:lstStyle/>
-          <a:p>
-            <a:r>
-              <a:rPr lang="en-US" sz="2800" dirty="0" err="1">
-                <a:latin typeface="Courier New" panose="02070309020205020404" pitchFamily="49" charset="0"/>
-                <a:cs typeface="Courier New" panose="02070309020205020404" pitchFamily="49" charset="0"/>
-              </a:rPr>
-              <a:t>new_data</a:t>
-            </a:r>
-            <a:r>
-              <a:rPr lang="en-US" sz="2800" dirty="0">
-                <a:latin typeface="Courier New" panose="02070309020205020404" pitchFamily="49" charset="0"/>
-                <a:cs typeface="Courier New" panose="02070309020205020404" pitchFamily="49" charset="0"/>
-              </a:rPr>
-              <a:t> &lt;- filter(</a:t>
-            </a:r>
-            <a:r>
-              <a:rPr lang="en-US" sz="2800" dirty="0" err="1">
-                <a:latin typeface="Courier New" panose="02070309020205020404" pitchFamily="49" charset="0"/>
-                <a:cs typeface="Courier New" panose="02070309020205020404" pitchFamily="49" charset="0"/>
-              </a:rPr>
-              <a:t>some_data</a:t>
-            </a:r>
-            <a:r>
-              <a:rPr lang="en-US" sz="2800" dirty="0">
-                <a:latin typeface="Courier New" panose="02070309020205020404" pitchFamily="49" charset="0"/>
-                <a:cs typeface="Courier New" panose="02070309020205020404" pitchFamily="49" charset="0"/>
-              </a:rPr>
-              <a:t>, </a:t>
-            </a:r>
-            <a:r>
-              <a:rPr lang="en-US" sz="2800" dirty="0" err="1">
-                <a:latin typeface="Courier New" panose="02070309020205020404" pitchFamily="49" charset="0"/>
-                <a:cs typeface="Courier New" panose="02070309020205020404" pitchFamily="49" charset="0"/>
-              </a:rPr>
-              <a:t>colD</a:t>
-            </a:r>
-            <a:r>
-              <a:rPr lang="en-US" sz="2800" dirty="0">
-                <a:latin typeface="Courier New" panose="02070309020205020404" pitchFamily="49" charset="0"/>
-                <a:cs typeface="Courier New" panose="02070309020205020404" pitchFamily="49" charset="0"/>
-              </a:rPr>
-              <a:t> &gt; 65, </a:t>
-            </a:r>
-            <a:r>
-              <a:rPr lang="en-US" sz="2800" dirty="0" err="1">
-                <a:latin typeface="Courier New" panose="02070309020205020404" pitchFamily="49" charset="0"/>
-                <a:cs typeface="Courier New" panose="02070309020205020404" pitchFamily="49" charset="0"/>
-              </a:rPr>
-              <a:t>colE</a:t>
-            </a:r>
-            <a:r>
-              <a:rPr lang="en-US" sz="2800" dirty="0">
-                <a:latin typeface="Courier New" panose="02070309020205020404" pitchFamily="49" charset="0"/>
-                <a:cs typeface="Courier New" panose="02070309020205020404" pitchFamily="49" charset="0"/>
-              </a:rPr>
-              <a:t> == 1)</a:t>
-            </a:r>
-          </a:p>
-        </p:txBody>
-      </p:sp>
-      <p:sp>
-        <p:nvSpPr>
-          <p:cNvPr id="11" name="TextBox 10"/>
-          <p:cNvSpPr txBox="1"/>
-          <p:nvPr/>
-        </p:nvSpPr>
-        <p:spPr>
-          <a:xfrm>
-            <a:off x="1511559" y="3901299"/>
-            <a:ext cx="3705808" cy="1384995"/>
-          </a:xfrm>
-          <a:prstGeom prst="rect">
-            <a:avLst/>
-          </a:prstGeom>
-          <a:noFill/>
-        </p:spPr>
-        <p:txBody>
-          <a:bodyPr wrap="square" numCol="1" rtlCol="0">
-            <a:spAutoFit/>
-          </a:bodyPr>
-          <a:lstStyle/>
-          <a:p>
-            <a:r>
-              <a:rPr lang="en-US" sz="2800" dirty="0" smtClean="0">
-                <a:latin typeface="Courier New" panose="02070309020205020404" pitchFamily="49" charset="0"/>
-                <a:cs typeface="Courier New" panose="02070309020205020404" pitchFamily="49" charset="0"/>
-              </a:rPr>
-              <a:t>,</a:t>
-            </a:r>
-            <a:r>
-              <a:rPr lang="en-US" sz="2800" dirty="0" err="1" smtClean="0">
-                <a:latin typeface="Courier New" panose="02070309020205020404" pitchFamily="49" charset="0"/>
-                <a:cs typeface="Courier New" panose="02070309020205020404" pitchFamily="49" charset="0"/>
-              </a:rPr>
-              <a:t>colD</a:t>
-            </a:r>
-            <a:r>
-              <a:rPr lang="en-US" sz="2800" dirty="0" smtClean="0">
-                <a:latin typeface="Courier New" panose="02070309020205020404" pitchFamily="49" charset="0"/>
-                <a:cs typeface="Courier New" panose="02070309020205020404" pitchFamily="49" charset="0"/>
-              </a:rPr>
-              <a:t> &gt; 65</a:t>
-            </a:r>
-          </a:p>
-          <a:p>
-            <a:endParaRPr lang="en-US" sz="2800" dirty="0" smtClean="0">
-              <a:latin typeface="Courier New" panose="02070309020205020404" pitchFamily="49" charset="0"/>
-              <a:cs typeface="Courier New" panose="02070309020205020404" pitchFamily="49" charset="0"/>
-            </a:endParaRPr>
-          </a:p>
-          <a:p>
-            <a:r>
-              <a:rPr lang="en-US" sz="2800" dirty="0">
-                <a:latin typeface="Courier New" panose="02070309020205020404" pitchFamily="49" charset="0"/>
-                <a:cs typeface="Courier New" panose="02070309020205020404" pitchFamily="49" charset="0"/>
-              </a:rPr>
-              <a:t>f</a:t>
-            </a:r>
-            <a:r>
-              <a:rPr lang="en-US" sz="2800" dirty="0" smtClean="0">
-                <a:latin typeface="Courier New" panose="02070309020205020404" pitchFamily="49" charset="0"/>
-                <a:cs typeface="Courier New" panose="02070309020205020404" pitchFamily="49" charset="0"/>
-              </a:rPr>
-              <a:t>ilter(</a:t>
-            </a:r>
-            <a:r>
-              <a:rPr lang="en-US" sz="2800" dirty="0" err="1" smtClean="0">
-                <a:latin typeface="Courier New" panose="02070309020205020404" pitchFamily="49" charset="0"/>
-                <a:cs typeface="Courier New" panose="02070309020205020404" pitchFamily="49" charset="0"/>
-              </a:rPr>
-              <a:t>some_data</a:t>
-            </a:r>
-            <a:endParaRPr lang="en-US" sz="2800" dirty="0" smtClean="0">
+            <a:endParaRPr lang="en-US" sz="3600" dirty="0">
               <a:latin typeface="Courier New" panose="02070309020205020404" pitchFamily="49" charset="0"/>
               <a:cs typeface="Courier New" panose="02070309020205020404" pitchFamily="49" charset="0"/>
             </a:endParaRPr>
           </a:p>
         </p:txBody>
       </p:sp>
+      <p:sp>
+        <p:nvSpPr>
+          <p:cNvPr id="13" name="Arc 12"/>
+          <p:cNvSpPr/>
+          <p:nvPr/>
+        </p:nvSpPr>
+        <p:spPr>
+          <a:xfrm rot="4632383">
+            <a:off x="8749056" y="5135912"/>
+            <a:ext cx="970838" cy="1529834"/>
+          </a:xfrm>
+          <a:prstGeom prst="arc">
+            <a:avLst>
+              <a:gd name="adj1" fmla="val 15534846"/>
+              <a:gd name="adj2" fmla="val 0"/>
+            </a:avLst>
+          </a:prstGeom>
+          <a:ln w="38100">
+            <a:headEnd type="triangle"/>
+            <a:tailEnd type="none"/>
+          </a:ln>
+        </p:spPr>
+        <p:style>
+          <a:lnRef idx="1">
+            <a:schemeClr val="accent1"/>
+          </a:lnRef>
+          <a:fillRef idx="0">
+            <a:schemeClr val="accent1"/>
+          </a:fillRef>
+          <a:effectRef idx="0">
+            <a:schemeClr val="accent1"/>
+          </a:effectRef>
+          <a:fontRef idx="minor">
+            <a:schemeClr val="tx1"/>
+          </a:fontRef>
+        </p:style>
+        <p:txBody>
+          <a:bodyPr rtlCol="0" anchor="ctr"/>
+          <a:lstStyle/>
+          <a:p>
+            <a:pPr algn="ctr"/>
+            <a:endParaRPr lang="en-US"/>
+          </a:p>
+        </p:txBody>
+      </p:sp>
+      <p:sp>
+        <p:nvSpPr>
+          <p:cNvPr id="10" name="Arc 9"/>
+          <p:cNvSpPr/>
+          <p:nvPr/>
+        </p:nvSpPr>
+        <p:spPr>
+          <a:xfrm rot="3640783">
+            <a:off x="8986610" y="775612"/>
+            <a:ext cx="2146300" cy="1529834"/>
+          </a:xfrm>
+          <a:prstGeom prst="arc">
+            <a:avLst>
+              <a:gd name="adj1" fmla="val 15713019"/>
+              <a:gd name="adj2" fmla="val 19759243"/>
+            </a:avLst>
+          </a:prstGeom>
+          <a:ln w="38100">
+            <a:headEnd type="none"/>
+            <a:tailEnd type="triangle"/>
+          </a:ln>
+        </p:spPr>
+        <p:style>
+          <a:lnRef idx="1">
+            <a:schemeClr val="accent1"/>
+          </a:lnRef>
+          <a:fillRef idx="0">
+            <a:schemeClr val="accent1"/>
+          </a:fillRef>
+          <a:effectRef idx="0">
+            <a:schemeClr val="accent1"/>
+          </a:effectRef>
+          <a:fontRef idx="minor">
+            <a:schemeClr val="tx1"/>
+          </a:fontRef>
+        </p:style>
+        <p:txBody>
+          <a:bodyPr rtlCol="0" anchor="ctr"/>
+          <a:lstStyle/>
+          <a:p>
+            <a:pPr algn="ctr"/>
+            <a:endParaRPr lang="en-US"/>
+          </a:p>
+        </p:txBody>
+      </p:sp>
     </p:spTree>
     <p:extLst>
       <p:ext uri="{BB962C8B-B14F-4D97-AF65-F5344CB8AC3E}">
-        <p14:creationId xmlns:p14="http://schemas.microsoft.com/office/powerpoint/2010/main" val="2122515654"/>
+        <p14:creationId xmlns:p14="http://schemas.microsoft.com/office/powerpoint/2010/main" val="1969019720"/>
       </p:ext>
     </p:extLst>
   </p:cSld>
@@ -33880,80 +33288,9 @@
   <p:timing>
     <p:tnLst>
       <p:par>
-        <p:cTn id="1" dur="indefinite" restart="never" nodeType="tmRoot">
-          <p:childTnLst>
-            <p:seq concurrent="1" nextAc="seek">
-              <p:cTn id="2" dur="indefinite" nodeType="mainSeq">
-                <p:childTnLst>
-                  <p:par>
-                    <p:cTn id="3" fill="hold">
-                      <p:stCondLst>
-                        <p:cond delay="indefinite"/>
-                      </p:stCondLst>
-                      <p:childTnLst>
-                        <p:par>
-                          <p:cTn id="4" fill="hold">
-                            <p:stCondLst>
-                              <p:cond delay="0"/>
-                            </p:stCondLst>
-                            <p:childTnLst>
-                              <p:par>
-                                <p:cTn id="5" presetID="1" presetClass="entr" presetSubtype="0" fill="hold" grpId="0" nodeType="clickEffect">
-                                  <p:stCondLst>
-                                    <p:cond delay="0"/>
-                                  </p:stCondLst>
-                                  <p:childTnLst>
-                                    <p:set>
-                                      <p:cBhvr>
-                                        <p:cTn id="6" dur="1" fill="hold">
-                                          <p:stCondLst>
-                                            <p:cond delay="0"/>
-                                          </p:stCondLst>
-                                        </p:cTn>
-                                        <p:tgtEl>
-                                          <p:spTgt spid="4"/>
-                                        </p:tgtEl>
-                                        <p:attrNameLst>
-                                          <p:attrName>style.visibility</p:attrName>
-                                        </p:attrNameLst>
-                                      </p:cBhvr>
-                                      <p:to>
-                                        <p:strVal val="visible"/>
-                                      </p:to>
-                                    </p:set>
-                                  </p:childTnLst>
-                                </p:cTn>
-                              </p:par>
-                            </p:childTnLst>
-                          </p:cTn>
-                        </p:par>
-                      </p:childTnLst>
-                    </p:cTn>
-                  </p:par>
-                </p:childTnLst>
-              </p:cTn>
-              <p:prevCondLst>
-                <p:cond evt="onPrev" delay="0">
-                  <p:tgtEl>
-                    <p:sldTgt/>
-                  </p:tgtEl>
-                </p:cond>
-              </p:prevCondLst>
-              <p:nextCondLst>
-                <p:cond evt="onNext" delay="0">
-                  <p:tgtEl>
-                    <p:sldTgt/>
-                  </p:tgtEl>
-                </p:cond>
-              </p:nextCondLst>
-            </p:seq>
-          </p:childTnLst>
-        </p:cTn>
+        <p:cTn id="1" dur="indefinite" restart="never" nodeType="tmRoot"/>
       </p:par>
     </p:tnLst>
-    <p:bldLst>
-      <p:bldP spid="4" grpId="0"/>
-    </p:bldLst>
   </p:timing>
 </p:sld>
 </file>

</xml_diff>